<commit_message>
Added task 4 and did a test run of the current material
</commit_message>
<xml_diff>
--- a/koding workshop powerpoint.pptx
+++ b/koding workshop powerpoint.pptx
@@ -5,10 +5,10 @@
     <p:sldMasterId id="2147483672" r:id="rId1"/>
   </p:sldMasterIdLst>
   <p:notesMasterIdLst>
-    <p:notesMasterId r:id="rId19"/>
+    <p:notesMasterId r:id="rId23"/>
   </p:notesMasterIdLst>
   <p:handoutMasterIdLst>
-    <p:handoutMasterId r:id="rId20"/>
+    <p:handoutMasterId r:id="rId24"/>
   </p:handoutMasterIdLst>
   <p:sldIdLst>
     <p:sldId id="256" r:id="rId2"/>
@@ -27,7 +27,11 @@
     <p:sldId id="271" r:id="rId15"/>
     <p:sldId id="269" r:id="rId16"/>
     <p:sldId id="272" r:id="rId17"/>
-    <p:sldId id="270" r:id="rId18"/>
+    <p:sldId id="273" r:id="rId18"/>
+    <p:sldId id="270" r:id="rId19"/>
+    <p:sldId id="274" r:id="rId20"/>
+    <p:sldId id="275" r:id="rId21"/>
+    <p:sldId id="276" r:id="rId22"/>
   </p:sldIdLst>
   <p:sldSz cx="12192000" cy="6858000"/>
   <p:notesSz cx="6858000" cy="9144000"/>
@@ -231,7 +235,7 @@
           <a:p>
             <a:fld id="{AF869721-F543-4A6C-BF9D-65D7CC540427}" type="datetimeFigureOut">
               <a:rPr lang="en-US" smtClean="0"/>
-              <a:t>2/6/2023</a:t>
+              <a:t>2/11/2023</a:t>
             </a:fld>
             <a:endParaRPr lang="en-US" dirty="0"/>
           </a:p>
@@ -408,7 +412,7 @@
           <a:p>
             <a:fld id="{C732326A-4C88-4AFB-AA5B-5919D81DFF5B}" type="datetimeFigureOut">
               <a:rPr lang="en-US" smtClean="0"/>
-              <a:t>2/6/2023</a:t>
+              <a:t>2/11/2023</a:t>
             </a:fld>
             <a:endParaRPr lang="en-US" dirty="0"/>
           </a:p>
@@ -1843,6 +1847,228 @@
 </p:notes>
 </file>
 
+<file path=ppt/notesSlides/notesSlide4.xml><?xml version="1.0" encoding="utf-8"?>
+<p:notes xmlns:a="http://schemas.openxmlformats.org/drawingml/2006/main" xmlns:r="http://schemas.openxmlformats.org/officeDocument/2006/relationships" xmlns:p="http://schemas.openxmlformats.org/presentationml/2006/main">
+  <p:cSld>
+    <p:spTree>
+      <p:nvGrpSpPr>
+        <p:cNvPr id="1" name=""/>
+        <p:cNvGrpSpPr/>
+        <p:nvPr/>
+      </p:nvGrpSpPr>
+      <p:grpSpPr>
+        <a:xfrm>
+          <a:off x="0" y="0"/>
+          <a:ext cx="0" cy="0"/>
+          <a:chOff x="0" y="0"/>
+          <a:chExt cx="0" cy="0"/>
+        </a:xfrm>
+      </p:grpSpPr>
+      <p:sp>
+        <p:nvSpPr>
+          <p:cNvPr id="2" name="Slide Image Placeholder 1"/>
+          <p:cNvSpPr>
+            <a:spLocks noGrp="1" noRot="1" noChangeAspect="1"/>
+          </p:cNvSpPr>
+          <p:nvPr>
+            <p:ph type="sldImg"/>
+          </p:nvPr>
+        </p:nvSpPr>
+        <p:spPr/>
+      </p:sp>
+      <p:sp>
+        <p:nvSpPr>
+          <p:cNvPr id="3" name="Notes Placeholder 2"/>
+          <p:cNvSpPr>
+            <a:spLocks noGrp="1"/>
+          </p:cNvSpPr>
+          <p:nvPr>
+            <p:ph type="body" idx="1"/>
+          </p:nvPr>
+        </p:nvSpPr>
+        <p:spPr/>
+        <p:txBody>
+          <a:bodyPr/>
+          <a:lstStyle/>
+          <a:p>
+            <a:r>
+              <a:rPr lang="en-US" dirty="0"/>
+              <a:t>Task0: # Write a program that prints out </a:t>
+            </a:r>
+            <a:r>
+              <a:rPr lang="en-US" dirty="0" err="1"/>
+              <a:t>ditt</a:t>
+            </a:r>
+            <a:r>
+              <a:rPr lang="en-US" dirty="0"/>
+              <a:t> </a:t>
+            </a:r>
+            <a:r>
+              <a:rPr lang="en-US" dirty="0" err="1"/>
+              <a:t>navn</a:t>
+            </a:r>
+            <a:r>
+              <a:rPr lang="en-US" dirty="0"/>
+              <a:t>, alder </a:t>
+            </a:r>
+            <a:r>
+              <a:rPr lang="en-US" dirty="0" err="1"/>
+              <a:t>og</a:t>
+            </a:r>
+            <a:r>
+              <a:rPr lang="en-US" dirty="0"/>
+              <a:t> stilling</a:t>
+            </a:r>
+          </a:p>
+        </p:txBody>
+      </p:sp>
+      <p:sp>
+        <p:nvSpPr>
+          <p:cNvPr id="4" name="Slide Number Placeholder 3"/>
+          <p:cNvSpPr>
+            <a:spLocks noGrp="1"/>
+          </p:cNvSpPr>
+          <p:nvPr>
+            <p:ph type="sldNum" sz="quarter" idx="5"/>
+          </p:nvPr>
+        </p:nvSpPr>
+        <p:spPr/>
+        <p:txBody>
+          <a:bodyPr/>
+          <a:lstStyle/>
+          <a:p>
+            <a:fld id="{C6B3AB32-59DF-41F1-9618-EDFBF5049629}" type="slidenum">
+              <a:rPr lang="en-US" smtClean="0"/>
+              <a:t>16</a:t>
+            </a:fld>
+            <a:endParaRPr lang="en-US" dirty="0"/>
+          </a:p>
+        </p:txBody>
+      </p:sp>
+    </p:spTree>
+    <p:extLst>
+      <p:ext uri="{BB962C8B-B14F-4D97-AF65-F5344CB8AC3E}">
+        <p14:creationId xmlns:p14="http://schemas.microsoft.com/office/powerpoint/2010/main" val="958887499"/>
+      </p:ext>
+    </p:extLst>
+  </p:cSld>
+  <p:clrMapOvr>
+    <a:masterClrMapping/>
+  </p:clrMapOvr>
+</p:notes>
+</file>
+
+<file path=ppt/notesSlides/notesSlide5.xml><?xml version="1.0" encoding="utf-8"?>
+<p:notes xmlns:a="http://schemas.openxmlformats.org/drawingml/2006/main" xmlns:r="http://schemas.openxmlformats.org/officeDocument/2006/relationships" xmlns:p="http://schemas.openxmlformats.org/presentationml/2006/main">
+  <p:cSld>
+    <p:spTree>
+      <p:nvGrpSpPr>
+        <p:cNvPr id="1" name=""/>
+        <p:cNvGrpSpPr/>
+        <p:nvPr/>
+      </p:nvGrpSpPr>
+      <p:grpSpPr>
+        <a:xfrm>
+          <a:off x="0" y="0"/>
+          <a:ext cx="0" cy="0"/>
+          <a:chOff x="0" y="0"/>
+          <a:chExt cx="0" cy="0"/>
+        </a:xfrm>
+      </p:grpSpPr>
+      <p:sp>
+        <p:nvSpPr>
+          <p:cNvPr id="2" name="Slide Image Placeholder 1"/>
+          <p:cNvSpPr>
+            <a:spLocks noGrp="1" noRot="1" noChangeAspect="1"/>
+          </p:cNvSpPr>
+          <p:nvPr>
+            <p:ph type="sldImg"/>
+          </p:nvPr>
+        </p:nvSpPr>
+        <p:spPr/>
+      </p:sp>
+      <p:sp>
+        <p:nvSpPr>
+          <p:cNvPr id="3" name="Notes Placeholder 2"/>
+          <p:cNvSpPr>
+            <a:spLocks noGrp="1"/>
+          </p:cNvSpPr>
+          <p:nvPr>
+            <p:ph type="body" idx="1"/>
+          </p:nvPr>
+        </p:nvSpPr>
+        <p:spPr/>
+        <p:txBody>
+          <a:bodyPr/>
+          <a:lstStyle/>
+          <a:p>
+            <a:r>
+              <a:rPr lang="en-US" dirty="0"/>
+              <a:t>Task0: # Write a program that prints out </a:t>
+            </a:r>
+            <a:r>
+              <a:rPr lang="en-US" dirty="0" err="1"/>
+              <a:t>ditt</a:t>
+            </a:r>
+            <a:r>
+              <a:rPr lang="en-US" dirty="0"/>
+              <a:t> </a:t>
+            </a:r>
+            <a:r>
+              <a:rPr lang="en-US" dirty="0" err="1"/>
+              <a:t>navn</a:t>
+            </a:r>
+            <a:r>
+              <a:rPr lang="en-US" dirty="0"/>
+              <a:t>, alder </a:t>
+            </a:r>
+            <a:r>
+              <a:rPr lang="en-US" dirty="0" err="1"/>
+              <a:t>og</a:t>
+            </a:r>
+            <a:r>
+              <a:rPr lang="en-US" dirty="0"/>
+              <a:t> stilling</a:t>
+            </a:r>
+          </a:p>
+        </p:txBody>
+      </p:sp>
+      <p:sp>
+        <p:nvSpPr>
+          <p:cNvPr id="4" name="Slide Number Placeholder 3"/>
+          <p:cNvSpPr>
+            <a:spLocks noGrp="1"/>
+          </p:cNvSpPr>
+          <p:nvPr>
+            <p:ph type="sldNum" sz="quarter" idx="5"/>
+          </p:nvPr>
+        </p:nvSpPr>
+        <p:spPr/>
+        <p:txBody>
+          <a:bodyPr/>
+          <a:lstStyle/>
+          <a:p>
+            <a:fld id="{C6B3AB32-59DF-41F1-9618-EDFBF5049629}" type="slidenum">
+              <a:rPr lang="en-US" smtClean="0"/>
+              <a:t>17</a:t>
+            </a:fld>
+            <a:endParaRPr lang="en-US" dirty="0"/>
+          </a:p>
+        </p:txBody>
+      </p:sp>
+    </p:spTree>
+    <p:extLst>
+      <p:ext uri="{BB962C8B-B14F-4D97-AF65-F5344CB8AC3E}">
+        <p14:creationId xmlns:p14="http://schemas.microsoft.com/office/powerpoint/2010/main" val="3714338658"/>
+      </p:ext>
+    </p:extLst>
+  </p:cSld>
+  <p:clrMapOvr>
+    <a:masterClrMapping/>
+  </p:clrMapOvr>
+</p:notes>
+</file>
+
 <file path=ppt/slideLayouts/slideLayout1.xml><?xml version="1.0" encoding="utf-8"?>
 <p:sldLayout xmlns:a="http://schemas.openxmlformats.org/drawingml/2006/main" xmlns:r="http://schemas.openxmlformats.org/officeDocument/2006/relationships" xmlns:p="http://schemas.openxmlformats.org/presentationml/2006/main" type="title" preserve="1">
   <p:cSld name="Title Slide">
@@ -2089,7 +2315,7 @@
             <a:fld id="{B61BEF0D-F0BB-DE4B-95CE-6DB70DBA9567}" type="datetimeFigureOut">
               <a:rPr lang="en-US" smtClean="0"/>
               <a:pPr/>
-              <a:t>2/6/2023</a:t>
+              <a:t>2/11/2023</a:t>
             </a:fld>
             <a:endParaRPr lang="en-US" dirty="0"/>
           </a:p>
@@ -2353,7 +2579,7 @@
             <a:fld id="{B61BEF0D-F0BB-DE4B-95CE-6DB70DBA9567}" type="datetimeFigureOut">
               <a:rPr lang="en-US" smtClean="0"/>
               <a:pPr/>
-              <a:t>2/6/2023</a:t>
+              <a:t>2/11/2023</a:t>
             </a:fld>
             <a:endParaRPr lang="en-US" dirty="0"/>
           </a:p>
@@ -2590,7 +2816,7 @@
             <a:fld id="{B61BEF0D-F0BB-DE4B-95CE-6DB70DBA9567}" type="datetimeFigureOut">
               <a:rPr lang="en-US" smtClean="0"/>
               <a:pPr/>
-              <a:t>2/6/2023</a:t>
+              <a:t>2/11/2023</a:t>
             </a:fld>
             <a:endParaRPr lang="en-US" dirty="0"/>
           </a:p>
@@ -2832,7 +3058,7 @@
             <a:fld id="{B61BEF0D-F0BB-DE4B-95CE-6DB70DBA9567}" type="datetimeFigureOut">
               <a:rPr lang="en-US" smtClean="0"/>
               <a:pPr/>
-              <a:t>2/6/2023</a:t>
+              <a:t>2/11/2023</a:t>
             </a:fld>
             <a:endParaRPr lang="en-US" dirty="0"/>
           </a:p>
@@ -3141,7 +3367,7 @@
             <a:fld id="{B61BEF0D-F0BB-DE4B-95CE-6DB70DBA9567}" type="datetimeFigureOut">
               <a:rPr lang="en-US" smtClean="0"/>
               <a:pPr/>
-              <a:t>2/6/2023</a:t>
+              <a:t>2/11/2023</a:t>
             </a:fld>
             <a:endParaRPr lang="en-US" dirty="0"/>
           </a:p>
@@ -3445,7 +3671,7 @@
             <a:fld id="{B61BEF0D-F0BB-DE4B-95CE-6DB70DBA9567}" type="datetimeFigureOut">
               <a:rPr lang="en-US" smtClean="0"/>
               <a:pPr/>
-              <a:t>2/6/2023</a:t>
+              <a:t>2/11/2023</a:t>
             </a:fld>
             <a:endParaRPr lang="en-US" dirty="0"/>
           </a:p>
@@ -3869,7 +4095,7 @@
             <a:fld id="{B61BEF0D-F0BB-DE4B-95CE-6DB70DBA9567}" type="datetimeFigureOut">
               <a:rPr lang="en-US" smtClean="0"/>
               <a:pPr/>
-              <a:t>2/6/2023</a:t>
+              <a:t>2/11/2023</a:t>
             </a:fld>
             <a:endParaRPr lang="en-US" dirty="0"/>
           </a:p>
@@ -3966,7 +4192,7 @@
             <a:fld id="{B61BEF0D-F0BB-DE4B-95CE-6DB70DBA9567}" type="datetimeFigureOut">
               <a:rPr lang="en-US" smtClean="0"/>
               <a:pPr/>
-              <a:t>2/6/2023</a:t>
+              <a:t>2/11/2023</a:t>
             </a:fld>
             <a:endParaRPr lang="en-US" dirty="0"/>
           </a:p>
@@ -4130,7 +4356,7 @@
             <a:fld id="{B61BEF0D-F0BB-DE4B-95CE-6DB70DBA9567}" type="datetimeFigureOut">
               <a:rPr lang="en-US" smtClean="0"/>
               <a:pPr/>
-              <a:t>2/6/2023</a:t>
+              <a:t>2/11/2023</a:t>
             </a:fld>
             <a:endParaRPr lang="en-US" dirty="0"/>
           </a:p>
@@ -4510,7 +4736,7 @@
             <a:fld id="{B61BEF0D-F0BB-DE4B-95CE-6DB70DBA9567}" type="datetimeFigureOut">
               <a:rPr lang="en-US" smtClean="0"/>
               <a:pPr/>
-              <a:t>2/6/2023</a:t>
+              <a:t>2/11/2023</a:t>
             </a:fld>
             <a:endParaRPr lang="en-US" dirty="0"/>
           </a:p>
@@ -4800,7 +5026,7 @@
             <a:fld id="{B61BEF0D-F0BB-DE4B-95CE-6DB70DBA9567}" type="datetimeFigureOut">
               <a:rPr lang="en-US" smtClean="0"/>
               <a:pPr/>
-              <a:t>2/6/2023</a:t>
+              <a:t>2/11/2023</a:t>
             </a:fld>
             <a:endParaRPr lang="en-US" dirty="0"/>
           </a:p>
@@ -5013,7 +5239,7 @@
             <a:fld id="{B61BEF0D-F0BB-DE4B-95CE-6DB70DBA9567}" type="datetimeFigureOut">
               <a:rPr lang="en-US" smtClean="0"/>
               <a:pPr/>
-              <a:t>2/6/2023</a:t>
+              <a:t>2/11/2023</a:t>
             </a:fld>
             <a:endParaRPr lang="en-US" dirty="0"/>
           </a:p>
@@ -7441,6 +7667,268 @@
           <p:cNvPr id="2" name="Title 1">
             <a:extLst>
               <a:ext uri="{FF2B5EF4-FFF2-40B4-BE49-F238E27FC236}">
+                <a16:creationId xmlns:a16="http://schemas.microsoft.com/office/drawing/2014/main" id="{548EB038-B657-61D3-426C-2792B9746EA4}"/>
+              </a:ext>
+            </a:extLst>
+          </p:cNvPr>
+          <p:cNvSpPr>
+            <a:spLocks noGrp="1"/>
+          </p:cNvSpPr>
+          <p:nvPr>
+            <p:ph type="title"/>
+          </p:nvPr>
+        </p:nvSpPr>
+        <p:spPr/>
+        <p:txBody>
+          <a:bodyPr/>
+          <a:lstStyle/>
+          <a:p>
+            <a:r>
+              <a:rPr lang="en-US" dirty="0" err="1"/>
+              <a:t>Funksjoner</a:t>
+            </a:r>
+            <a:endParaRPr lang="en-US" dirty="0"/>
+          </a:p>
+        </p:txBody>
+      </p:sp>
+      <p:sp>
+        <p:nvSpPr>
+          <p:cNvPr id="3" name="Content Placeholder 2">
+            <a:extLst>
+              <a:ext uri="{FF2B5EF4-FFF2-40B4-BE49-F238E27FC236}">
+                <a16:creationId xmlns:a16="http://schemas.microsoft.com/office/drawing/2014/main" id="{5DE7BA5F-FF47-6F7F-763D-CC652B47A46F}"/>
+              </a:ext>
+            </a:extLst>
+          </p:cNvPr>
+          <p:cNvSpPr>
+            <a:spLocks noGrp="1"/>
+          </p:cNvSpPr>
+          <p:nvPr>
+            <p:ph idx="1"/>
+          </p:nvPr>
+        </p:nvSpPr>
+        <p:spPr/>
+        <p:txBody>
+          <a:bodyPr/>
+          <a:lstStyle/>
+          <a:p>
+            <a:r>
+              <a:rPr lang="en-US" dirty="0" err="1"/>
+              <a:t>Gratulerer</a:t>
+            </a:r>
+            <a:r>
+              <a:rPr lang="en-US" dirty="0"/>
+              <a:t>! Du </a:t>
+            </a:r>
+            <a:r>
+              <a:rPr lang="en-US" dirty="0" err="1"/>
+              <a:t>har</a:t>
+            </a:r>
+            <a:r>
+              <a:rPr lang="en-US" dirty="0"/>
+              <a:t> </a:t>
+            </a:r>
+            <a:r>
+              <a:rPr lang="en-US" dirty="0" err="1"/>
+              <a:t>laget</a:t>
+            </a:r>
+            <a:r>
+              <a:rPr lang="en-US" dirty="0"/>
+              <a:t> </a:t>
+            </a:r>
+            <a:r>
+              <a:rPr lang="en-US" dirty="0" err="1"/>
+              <a:t>ditt</a:t>
+            </a:r>
+            <a:r>
+              <a:rPr lang="en-US" dirty="0"/>
+              <a:t> </a:t>
+            </a:r>
+            <a:r>
+              <a:rPr lang="en-US" dirty="0" err="1"/>
+              <a:t>første</a:t>
+            </a:r>
+            <a:r>
+              <a:rPr lang="en-US" dirty="0"/>
+              <a:t> python program!</a:t>
+            </a:r>
+          </a:p>
+          <a:p>
+            <a:r>
+              <a:rPr lang="en-US" dirty="0" err="1"/>
+              <a:t>Oppdater</a:t>
+            </a:r>
+            <a:r>
+              <a:rPr lang="en-US" dirty="0"/>
+              <a:t> </a:t>
+            </a:r>
+            <a:r>
+              <a:rPr lang="en-US" dirty="0" err="1"/>
+              <a:t>ditt</a:t>
+            </a:r>
+            <a:r>
+              <a:rPr lang="en-US" dirty="0"/>
+              <a:t> program, </a:t>
+            </a:r>
+            <a:r>
+              <a:rPr lang="en-US" dirty="0" err="1"/>
+              <a:t>slik</a:t>
+            </a:r>
+            <a:r>
+              <a:rPr lang="en-US" dirty="0"/>
+              <a:t> at du </a:t>
+            </a:r>
+            <a:r>
+              <a:rPr lang="en-US" dirty="0" err="1"/>
+              <a:t>også</a:t>
+            </a:r>
+            <a:r>
+              <a:rPr lang="en-US" dirty="0"/>
+              <a:t> </a:t>
+            </a:r>
+            <a:r>
+              <a:rPr lang="en-US" dirty="0" err="1"/>
+              <a:t>skriver</a:t>
+            </a:r>
+            <a:r>
+              <a:rPr lang="en-US" dirty="0"/>
+              <a:t> </a:t>
+            </a:r>
+            <a:r>
+              <a:rPr lang="en-US" dirty="0" err="1"/>
+              <a:t>ut</a:t>
+            </a:r>
+            <a:r>
+              <a:rPr lang="en-US" dirty="0"/>
+              <a:t> 5 </a:t>
+            </a:r>
+            <a:r>
+              <a:rPr lang="en-US" dirty="0" err="1"/>
+              <a:t>fakta</a:t>
+            </a:r>
+            <a:r>
+              <a:rPr lang="en-US" dirty="0"/>
+              <a:t> om deg </a:t>
+            </a:r>
+            <a:r>
+              <a:rPr lang="en-US" dirty="0" err="1"/>
+              <a:t>selv</a:t>
+            </a:r>
+            <a:r>
+              <a:rPr lang="en-US" dirty="0"/>
+              <a:t>, </a:t>
+            </a:r>
+            <a:r>
+              <a:rPr lang="en-US" dirty="0" err="1"/>
+              <a:t>på</a:t>
+            </a:r>
+            <a:r>
+              <a:rPr lang="en-US" dirty="0"/>
+              <a:t> </a:t>
+            </a:r>
+            <a:r>
+              <a:rPr lang="en-US" dirty="0" err="1"/>
+              <a:t>dette</a:t>
+            </a:r>
+            <a:r>
+              <a:rPr lang="en-US" dirty="0"/>
+              <a:t> format:</a:t>
+            </a:r>
+            <a:br>
+              <a:rPr lang="en-US" dirty="0"/>
+            </a:br>
+            <a:r>
+              <a:rPr lang="en-US" dirty="0"/>
+              <a:t>“</a:t>
+            </a:r>
+            <a:r>
+              <a:rPr lang="en-US" dirty="0" err="1"/>
+              <a:t>ditt_navn</a:t>
+            </a:r>
+            <a:r>
+              <a:rPr lang="en-US" dirty="0"/>
+              <a:t> </a:t>
+            </a:r>
+            <a:r>
+              <a:rPr lang="en-US" dirty="0" err="1"/>
+              <a:t>fakta_om_deg</a:t>
+            </a:r>
+            <a:r>
+              <a:rPr lang="en-US" dirty="0"/>
+              <a:t>”</a:t>
+            </a:r>
+            <a:br>
+              <a:rPr lang="en-US" dirty="0"/>
+            </a:br>
+            <a:r>
+              <a:rPr lang="en-US" dirty="0" err="1"/>
+              <a:t>f.eks</a:t>
+            </a:r>
+            <a:r>
+              <a:rPr lang="en-US" dirty="0"/>
+              <a:t>:</a:t>
+            </a:r>
+            <a:br>
+              <a:rPr lang="en-US" dirty="0"/>
+            </a:br>
+            <a:r>
+              <a:rPr lang="en-US" dirty="0"/>
+              <a:t>“Martin driver med hacking </a:t>
+            </a:r>
+            <a:r>
+              <a:rPr lang="en-US" dirty="0" err="1"/>
+              <a:t>på</a:t>
+            </a:r>
+            <a:r>
+              <a:rPr lang="en-US" dirty="0"/>
+              <a:t> </a:t>
+            </a:r>
+            <a:r>
+              <a:rPr lang="en-US" dirty="0" err="1"/>
+              <a:t>fritiden</a:t>
+            </a:r>
+            <a:r>
+              <a:rPr lang="en-US" dirty="0"/>
+              <a:t>”</a:t>
+            </a:r>
+          </a:p>
+        </p:txBody>
+      </p:sp>
+    </p:spTree>
+    <p:extLst>
+      <p:ext uri="{BB962C8B-B14F-4D97-AF65-F5344CB8AC3E}">
+        <p14:creationId xmlns:p14="http://schemas.microsoft.com/office/powerpoint/2010/main" val="615119659"/>
+      </p:ext>
+    </p:extLst>
+  </p:cSld>
+  <p:clrMapOvr>
+    <a:masterClrMapping/>
+  </p:clrMapOvr>
+</p:sld>
+</file>
+
+<file path=ppt/slides/slide18.xml><?xml version="1.0" encoding="utf-8"?>
+<p:sld xmlns:a="http://schemas.openxmlformats.org/drawingml/2006/main" xmlns:r="http://schemas.openxmlformats.org/officeDocument/2006/relationships" xmlns:p="http://schemas.openxmlformats.org/presentationml/2006/main">
+  <p:cSld>
+    <p:spTree>
+      <p:nvGrpSpPr>
+        <p:cNvPr id="1" name=""/>
+        <p:cNvGrpSpPr/>
+        <p:nvPr/>
+      </p:nvGrpSpPr>
+      <p:grpSpPr>
+        <a:xfrm>
+          <a:off x="0" y="0"/>
+          <a:ext cx="0" cy="0"/>
+          <a:chOff x="0" y="0"/>
+          <a:chExt cx="0" cy="0"/>
+        </a:xfrm>
+      </p:grpSpPr>
+      <p:sp>
+        <p:nvSpPr>
+          <p:cNvPr id="2" name="Title 1">
+            <a:extLst>
+              <a:ext uri="{FF2B5EF4-FFF2-40B4-BE49-F238E27FC236}">
                 <a16:creationId xmlns:a16="http://schemas.microsoft.com/office/drawing/2014/main" id="{7F32FFDA-185B-17DF-6388-6F9F99AFCA78}"/>
               </a:ext>
             </a:extLst>
@@ -7614,6 +8102,219 @@
     <p:extLst>
       <p:ext uri="{BB962C8B-B14F-4D97-AF65-F5344CB8AC3E}">
         <p14:creationId xmlns:p14="http://schemas.microsoft.com/office/powerpoint/2010/main" val="2474937094"/>
+      </p:ext>
+    </p:extLst>
+  </p:cSld>
+  <p:clrMapOvr>
+    <a:masterClrMapping/>
+  </p:clrMapOvr>
+</p:sld>
+</file>
+
+<file path=ppt/slides/slide19.xml><?xml version="1.0" encoding="utf-8"?>
+<p:sld xmlns:a="http://schemas.openxmlformats.org/drawingml/2006/main" xmlns:r="http://schemas.openxmlformats.org/officeDocument/2006/relationships" xmlns:p="http://schemas.openxmlformats.org/presentationml/2006/main">
+  <p:cSld>
+    <p:spTree>
+      <p:nvGrpSpPr>
+        <p:cNvPr id="1" name=""/>
+        <p:cNvGrpSpPr/>
+        <p:nvPr/>
+      </p:nvGrpSpPr>
+      <p:grpSpPr>
+        <a:xfrm>
+          <a:off x="0" y="0"/>
+          <a:ext cx="0" cy="0"/>
+          <a:chOff x="0" y="0"/>
+          <a:chExt cx="0" cy="0"/>
+        </a:xfrm>
+      </p:grpSpPr>
+      <p:sp>
+        <p:nvSpPr>
+          <p:cNvPr id="2" name="Title 1">
+            <a:extLst>
+              <a:ext uri="{FF2B5EF4-FFF2-40B4-BE49-F238E27FC236}">
+                <a16:creationId xmlns:a16="http://schemas.microsoft.com/office/drawing/2014/main" id="{91A87611-D424-442D-A0A4-0D6D8F9EF817}"/>
+              </a:ext>
+            </a:extLst>
+          </p:cNvPr>
+          <p:cNvSpPr>
+            <a:spLocks noGrp="1"/>
+          </p:cNvSpPr>
+          <p:nvPr>
+            <p:ph type="title"/>
+          </p:nvPr>
+        </p:nvSpPr>
+        <p:spPr/>
+        <p:txBody>
+          <a:bodyPr/>
+          <a:lstStyle/>
+          <a:p>
+            <a:r>
+              <a:rPr lang="en-US" dirty="0"/>
+              <a:t>Data </a:t>
+            </a:r>
+            <a:r>
+              <a:rPr lang="en-US" dirty="0" err="1"/>
+              <a:t>typer</a:t>
+            </a:r>
+            <a:r>
+              <a:rPr lang="en-US" dirty="0"/>
+              <a:t> – </a:t>
+            </a:r>
+            <a:r>
+              <a:rPr lang="en-US" dirty="0" err="1"/>
+              <a:t>Typer</a:t>
+            </a:r>
+            <a:r>
+              <a:rPr lang="en-US" dirty="0"/>
+              <a:t> av data</a:t>
+            </a:r>
+          </a:p>
+        </p:txBody>
+      </p:sp>
+      <p:sp>
+        <p:nvSpPr>
+          <p:cNvPr id="3" name="Content Placeholder 2">
+            <a:extLst>
+              <a:ext uri="{FF2B5EF4-FFF2-40B4-BE49-F238E27FC236}">
+                <a16:creationId xmlns:a16="http://schemas.microsoft.com/office/drawing/2014/main" id="{31E19111-5785-0F5C-0DC4-A27F28FAA980}"/>
+              </a:ext>
+            </a:extLst>
+          </p:cNvPr>
+          <p:cNvSpPr>
+            <a:spLocks noGrp="1"/>
+          </p:cNvSpPr>
+          <p:nvPr>
+            <p:ph idx="1"/>
+          </p:nvPr>
+        </p:nvSpPr>
+        <p:spPr/>
+        <p:txBody>
+          <a:bodyPr/>
+          <a:lstStyle/>
+          <a:p>
+            <a:r>
+              <a:rPr lang="en-US" b="1" dirty="0" err="1"/>
+              <a:t>Data</a:t>
+            </a:r>
+            <a:r>
+              <a:rPr lang="en-US" dirty="0" err="1"/>
+              <a:t>maskiner</a:t>
+            </a:r>
+            <a:r>
+              <a:rPr lang="en-US" dirty="0"/>
+              <a:t>, </a:t>
+            </a:r>
+            <a:r>
+              <a:rPr lang="en-US" dirty="0" err="1"/>
+              <a:t>en</a:t>
+            </a:r>
+            <a:r>
+              <a:rPr lang="en-US" dirty="0"/>
+              <a:t> </a:t>
+            </a:r>
+            <a:r>
+              <a:rPr lang="en-US" dirty="0" err="1"/>
+              <a:t>maskin</a:t>
+            </a:r>
+            <a:r>
+              <a:rPr lang="en-US" dirty="0"/>
+              <a:t> </a:t>
+            </a:r>
+            <a:r>
+              <a:rPr lang="en-US" dirty="0" err="1"/>
+              <a:t>som</a:t>
+            </a:r>
+            <a:r>
+              <a:rPr lang="en-US" dirty="0"/>
+              <a:t> jobber med data</a:t>
+            </a:r>
+          </a:p>
+          <a:p>
+            <a:r>
+              <a:rPr lang="en-US" dirty="0"/>
+              <a:t>Vi </a:t>
+            </a:r>
+            <a:r>
+              <a:rPr lang="en-US" dirty="0" err="1"/>
+              <a:t>har</a:t>
+            </a:r>
+            <a:r>
+              <a:rPr lang="en-US" dirty="0"/>
+              <a:t> mange </a:t>
+            </a:r>
+            <a:r>
+              <a:rPr lang="en-US" dirty="0" err="1"/>
+              <a:t>forskjellige</a:t>
+            </a:r>
+            <a:r>
+              <a:rPr lang="en-US" dirty="0"/>
+              <a:t> </a:t>
+            </a:r>
+            <a:r>
+              <a:rPr lang="en-US" dirty="0" err="1"/>
+              <a:t>typer</a:t>
+            </a:r>
+            <a:r>
+              <a:rPr lang="en-US" dirty="0"/>
+              <a:t> av data</a:t>
+            </a:r>
+          </a:p>
+          <a:p>
+            <a:pPr lvl="1"/>
+            <a:r>
+              <a:rPr lang="en-US" dirty="0"/>
+              <a:t>Tall – integers (int): 22</a:t>
+            </a:r>
+          </a:p>
+          <a:p>
+            <a:pPr lvl="1"/>
+            <a:r>
+              <a:rPr lang="en-US" dirty="0" err="1"/>
+              <a:t>Tekst</a:t>
+            </a:r>
+            <a:r>
+              <a:rPr lang="en-US" dirty="0"/>
+              <a:t> – String: “Martin er </a:t>
+            </a:r>
+            <a:r>
+              <a:rPr lang="en-US" dirty="0" err="1"/>
+              <a:t>kul</a:t>
+            </a:r>
+            <a:r>
+              <a:rPr lang="en-US" dirty="0"/>
+              <a:t>”</a:t>
+            </a:r>
+          </a:p>
+          <a:p>
+            <a:pPr lvl="1"/>
+            <a:r>
+              <a:rPr lang="en-US" dirty="0"/>
+              <a:t>Lister – Array: [“Martin”, “Marianne”, “Dervis”]</a:t>
+            </a:r>
+          </a:p>
+          <a:p>
+            <a:pPr lvl="1"/>
+            <a:r>
+              <a:rPr lang="en-US" dirty="0" err="1"/>
+              <a:t>Og</a:t>
+            </a:r>
+            <a:r>
+              <a:rPr lang="en-US" dirty="0"/>
+              <a:t> mange </a:t>
+            </a:r>
+            <a:r>
+              <a:rPr lang="en-US" dirty="0" err="1"/>
+              <a:t>flere</a:t>
+            </a:r>
+            <a:endParaRPr lang="en-US" dirty="0"/>
+          </a:p>
+        </p:txBody>
+      </p:sp>
+    </p:spTree>
+    <p:extLst>
+      <p:ext uri="{BB962C8B-B14F-4D97-AF65-F5344CB8AC3E}">
+        <p14:creationId xmlns:p14="http://schemas.microsoft.com/office/powerpoint/2010/main" val="4016889106"/>
       </p:ext>
     </p:extLst>
   </p:cSld>
@@ -7840,6 +8541,455 @@
     <p:extLst>
       <p:ext uri="{BB962C8B-B14F-4D97-AF65-F5344CB8AC3E}">
         <p14:creationId xmlns:p14="http://schemas.microsoft.com/office/powerpoint/2010/main" val="1520408623"/>
+      </p:ext>
+    </p:extLst>
+  </p:cSld>
+  <p:clrMapOvr>
+    <a:masterClrMapping/>
+  </p:clrMapOvr>
+</p:sld>
+</file>
+
+<file path=ppt/slides/slide20.xml><?xml version="1.0" encoding="utf-8"?>
+<p:sld xmlns:a="http://schemas.openxmlformats.org/drawingml/2006/main" xmlns:r="http://schemas.openxmlformats.org/officeDocument/2006/relationships" xmlns:p="http://schemas.openxmlformats.org/presentationml/2006/main">
+  <p:cSld>
+    <p:spTree>
+      <p:nvGrpSpPr>
+        <p:cNvPr id="1" name=""/>
+        <p:cNvGrpSpPr/>
+        <p:nvPr/>
+      </p:nvGrpSpPr>
+      <p:grpSpPr>
+        <a:xfrm>
+          <a:off x="0" y="0"/>
+          <a:ext cx="0" cy="0"/>
+          <a:chOff x="0" y="0"/>
+          <a:chExt cx="0" cy="0"/>
+        </a:xfrm>
+      </p:grpSpPr>
+      <p:sp>
+        <p:nvSpPr>
+          <p:cNvPr id="2" name="Title 1">
+            <a:extLst>
+              <a:ext uri="{FF2B5EF4-FFF2-40B4-BE49-F238E27FC236}">
+                <a16:creationId xmlns:a16="http://schemas.microsoft.com/office/drawing/2014/main" id="{D36CFA5E-D697-23CC-1692-3373ABE68EBA}"/>
+              </a:ext>
+            </a:extLst>
+          </p:cNvPr>
+          <p:cNvSpPr>
+            <a:spLocks noGrp="1"/>
+          </p:cNvSpPr>
+          <p:nvPr>
+            <p:ph type="title"/>
+          </p:nvPr>
+        </p:nvSpPr>
+        <p:spPr/>
+        <p:txBody>
+          <a:bodyPr/>
+          <a:lstStyle/>
+          <a:p>
+            <a:r>
+              <a:rPr lang="en-US" dirty="0"/>
+              <a:t>Tall - integer</a:t>
+            </a:r>
+          </a:p>
+        </p:txBody>
+      </p:sp>
+      <p:sp>
+        <p:nvSpPr>
+          <p:cNvPr id="3" name="Content Placeholder 2">
+            <a:extLst>
+              <a:ext uri="{FF2B5EF4-FFF2-40B4-BE49-F238E27FC236}">
+                <a16:creationId xmlns:a16="http://schemas.microsoft.com/office/drawing/2014/main" id="{CC5EB7C1-0885-61BF-E704-42C33CF7C8B7}"/>
+              </a:ext>
+            </a:extLst>
+          </p:cNvPr>
+          <p:cNvSpPr>
+            <a:spLocks noGrp="1"/>
+          </p:cNvSpPr>
+          <p:nvPr>
+            <p:ph idx="1"/>
+          </p:nvPr>
+        </p:nvSpPr>
+        <p:spPr/>
+        <p:txBody>
+          <a:bodyPr/>
+          <a:lstStyle/>
+          <a:p>
+            <a:r>
+              <a:rPr lang="en-US" dirty="0" err="1"/>
+              <a:t>Programmet</a:t>
+            </a:r>
+            <a:r>
+              <a:rPr lang="en-US" dirty="0"/>
+              <a:t> </a:t>
+            </a:r>
+            <a:r>
+              <a:rPr lang="en-US" dirty="0" err="1"/>
+              <a:t>vårt</a:t>
+            </a:r>
+            <a:r>
+              <a:rPr lang="en-US" dirty="0"/>
+              <a:t> </a:t>
+            </a:r>
+            <a:r>
+              <a:rPr lang="en-US" dirty="0" err="1"/>
+              <a:t>skal</a:t>
+            </a:r>
+            <a:r>
+              <a:rPr lang="en-US" dirty="0"/>
+              <a:t> </a:t>
+            </a:r>
+            <a:r>
+              <a:rPr lang="en-US" dirty="0" err="1"/>
+              <a:t>tolke</a:t>
+            </a:r>
+            <a:r>
+              <a:rPr lang="en-US" dirty="0"/>
+              <a:t> </a:t>
+            </a:r>
+            <a:r>
+              <a:rPr lang="en-US" dirty="0" err="1"/>
+              <a:t>matematiske</a:t>
+            </a:r>
+            <a:r>
+              <a:rPr lang="en-US" dirty="0"/>
+              <a:t> tall</a:t>
+            </a:r>
+          </a:p>
+          <a:p>
+            <a:r>
+              <a:rPr lang="en-US" dirty="0"/>
+              <a:t>alder = 20+6</a:t>
+            </a:r>
+          </a:p>
+          <a:p>
+            <a:endParaRPr lang="en-US" dirty="0"/>
+          </a:p>
+        </p:txBody>
+      </p:sp>
+      <p:pic>
+        <p:nvPicPr>
+          <p:cNvPr id="5" name="Picture 4">
+            <a:extLst>
+              <a:ext uri="{FF2B5EF4-FFF2-40B4-BE49-F238E27FC236}">
+                <a16:creationId xmlns:a16="http://schemas.microsoft.com/office/drawing/2014/main" id="{178740DA-F657-A175-D44C-6E35BECF3BED}"/>
+              </a:ext>
+            </a:extLst>
+          </p:cNvPr>
+          <p:cNvPicPr>
+            <a:picLocks noChangeAspect="1"/>
+          </p:cNvPicPr>
+          <p:nvPr/>
+        </p:nvPicPr>
+        <p:blipFill>
+          <a:blip r:embed="rId2"/>
+          <a:stretch>
+            <a:fillRect/>
+          </a:stretch>
+        </p:blipFill>
+        <p:spPr>
+          <a:xfrm>
+            <a:off x="581192" y="4300537"/>
+            <a:ext cx="4029075" cy="828675"/>
+          </a:xfrm>
+          <a:prstGeom prst="rect">
+            <a:avLst/>
+          </a:prstGeom>
+        </p:spPr>
+      </p:pic>
+    </p:spTree>
+    <p:extLst>
+      <p:ext uri="{BB962C8B-B14F-4D97-AF65-F5344CB8AC3E}">
+        <p14:creationId xmlns:p14="http://schemas.microsoft.com/office/powerpoint/2010/main" val="2421001368"/>
+      </p:ext>
+    </p:extLst>
+  </p:cSld>
+  <p:clrMapOvr>
+    <a:masterClrMapping/>
+  </p:clrMapOvr>
+</p:sld>
+</file>
+
+<file path=ppt/slides/slide21.xml><?xml version="1.0" encoding="utf-8"?>
+<p:sld xmlns:a="http://schemas.openxmlformats.org/drawingml/2006/main" xmlns:r="http://schemas.openxmlformats.org/officeDocument/2006/relationships" xmlns:p="http://schemas.openxmlformats.org/presentationml/2006/main">
+  <p:cSld>
+    <p:spTree>
+      <p:nvGrpSpPr>
+        <p:cNvPr id="1" name=""/>
+        <p:cNvGrpSpPr/>
+        <p:nvPr/>
+      </p:nvGrpSpPr>
+      <p:grpSpPr>
+        <a:xfrm>
+          <a:off x="0" y="0"/>
+          <a:ext cx="0" cy="0"/>
+          <a:chOff x="0" y="0"/>
+          <a:chExt cx="0" cy="0"/>
+        </a:xfrm>
+      </p:grpSpPr>
+      <p:sp>
+        <p:nvSpPr>
+          <p:cNvPr id="2" name="Title 1">
+            <a:extLst>
+              <a:ext uri="{FF2B5EF4-FFF2-40B4-BE49-F238E27FC236}">
+                <a16:creationId xmlns:a16="http://schemas.microsoft.com/office/drawing/2014/main" id="{06F5458D-B9C5-0E53-72F1-CEDCE49BC8ED}"/>
+              </a:ext>
+            </a:extLst>
+          </p:cNvPr>
+          <p:cNvSpPr>
+            <a:spLocks noGrp="1"/>
+          </p:cNvSpPr>
+          <p:nvPr>
+            <p:ph type="title"/>
+          </p:nvPr>
+        </p:nvSpPr>
+        <p:spPr/>
+        <p:txBody>
+          <a:bodyPr/>
+          <a:lstStyle/>
+          <a:p>
+            <a:r>
+              <a:rPr lang="en-US" dirty="0" err="1"/>
+              <a:t>Tekst</a:t>
+            </a:r>
+            <a:r>
+              <a:rPr lang="en-US" dirty="0"/>
+              <a:t> - string</a:t>
+            </a:r>
+          </a:p>
+        </p:txBody>
+      </p:sp>
+      <p:sp>
+        <p:nvSpPr>
+          <p:cNvPr id="3" name="Content Placeholder 2">
+            <a:extLst>
+              <a:ext uri="{FF2B5EF4-FFF2-40B4-BE49-F238E27FC236}">
+                <a16:creationId xmlns:a16="http://schemas.microsoft.com/office/drawing/2014/main" id="{5BA6D6A5-FB48-964B-EC9F-79A5701DCB8D}"/>
+              </a:ext>
+            </a:extLst>
+          </p:cNvPr>
+          <p:cNvSpPr>
+            <a:spLocks noGrp="1"/>
+          </p:cNvSpPr>
+          <p:nvPr>
+            <p:ph idx="1"/>
+          </p:nvPr>
+        </p:nvSpPr>
+        <p:spPr/>
+        <p:txBody>
+          <a:bodyPr/>
+          <a:lstStyle/>
+          <a:p>
+            <a:r>
+              <a:rPr lang="en-US" dirty="0" err="1"/>
+              <a:t>Nå</a:t>
+            </a:r>
+            <a:r>
+              <a:rPr lang="en-US" dirty="0"/>
+              <a:t> </a:t>
+            </a:r>
+            <a:r>
+              <a:rPr lang="en-US" dirty="0" err="1"/>
+              <a:t>som</a:t>
+            </a:r>
+            <a:r>
+              <a:rPr lang="en-US" dirty="0"/>
+              <a:t> vi vet </a:t>
+            </a:r>
+            <a:r>
+              <a:rPr lang="en-US" dirty="0" err="1"/>
+              <a:t>hvordan</a:t>
+            </a:r>
+            <a:r>
+              <a:rPr lang="en-US" dirty="0"/>
+              <a:t> vi </a:t>
+            </a:r>
+            <a:r>
+              <a:rPr lang="en-US" dirty="0" err="1"/>
+              <a:t>håntere</a:t>
+            </a:r>
+            <a:r>
+              <a:rPr lang="en-US" dirty="0"/>
+              <a:t> tall, </a:t>
+            </a:r>
+            <a:r>
+              <a:rPr lang="en-US" dirty="0" err="1"/>
+              <a:t>hva</a:t>
+            </a:r>
+            <a:r>
+              <a:rPr lang="en-US" dirty="0"/>
+              <a:t> med </a:t>
+            </a:r>
+            <a:r>
+              <a:rPr lang="en-US" dirty="0" err="1"/>
+              <a:t>tekst</a:t>
+            </a:r>
+            <a:r>
+              <a:rPr lang="en-US" dirty="0"/>
+              <a:t>?</a:t>
+            </a:r>
+          </a:p>
+          <a:p>
+            <a:r>
+              <a:rPr lang="en-US" dirty="0"/>
+              <a:t>Legg </a:t>
+            </a:r>
+            <a:r>
+              <a:rPr lang="en-US" dirty="0" err="1"/>
+              <a:t>merke</a:t>
+            </a:r>
+            <a:r>
+              <a:rPr lang="en-US" dirty="0"/>
+              <a:t> </a:t>
+            </a:r>
+            <a:r>
+              <a:rPr lang="en-US" dirty="0" err="1"/>
+              <a:t>til</a:t>
+            </a:r>
+            <a:r>
+              <a:rPr lang="en-US" dirty="0"/>
+              <a:t>, at variable er bare </a:t>
+            </a:r>
+            <a:r>
+              <a:rPr lang="en-US" dirty="0" err="1"/>
+              <a:t>ord</a:t>
+            </a:r>
+            <a:r>
+              <a:rPr lang="en-US" dirty="0"/>
+              <a:t>:</a:t>
+            </a:r>
+          </a:p>
+          <a:p>
+            <a:endParaRPr lang="en-US" dirty="0"/>
+          </a:p>
+          <a:p>
+            <a:endParaRPr lang="en-US" dirty="0"/>
+          </a:p>
+          <a:p>
+            <a:r>
+              <a:rPr lang="en-US" dirty="0" err="1"/>
+              <a:t>Hvordan</a:t>
+            </a:r>
+            <a:r>
+              <a:rPr lang="en-US" dirty="0"/>
+              <a:t> </a:t>
+            </a:r>
+            <a:r>
+              <a:rPr lang="en-US" dirty="0" err="1"/>
+              <a:t>skal</a:t>
+            </a:r>
+            <a:r>
+              <a:rPr lang="en-US" dirty="0"/>
+              <a:t> </a:t>
+            </a:r>
+            <a:r>
+              <a:rPr lang="en-US" dirty="0" err="1"/>
+              <a:t>vårt</a:t>
+            </a:r>
+            <a:r>
+              <a:rPr lang="en-US" dirty="0"/>
+              <a:t> program </a:t>
+            </a:r>
+            <a:r>
+              <a:rPr lang="en-US" dirty="0" err="1"/>
+              <a:t>vite</a:t>
+            </a:r>
+            <a:r>
+              <a:rPr lang="en-US" dirty="0"/>
+              <a:t> om vi </a:t>
+            </a:r>
+            <a:r>
+              <a:rPr lang="en-US" dirty="0" err="1"/>
+              <a:t>snakker</a:t>
+            </a:r>
+            <a:r>
+              <a:rPr lang="en-US" dirty="0"/>
+              <a:t> om </a:t>
+            </a:r>
+            <a:r>
+              <a:rPr lang="en-US" dirty="0" err="1"/>
+              <a:t>variablene</a:t>
+            </a:r>
+            <a:r>
+              <a:rPr lang="en-US" dirty="0"/>
+              <a:t> </a:t>
+            </a:r>
+            <a:r>
+              <a:rPr lang="en-US" dirty="0" err="1"/>
+              <a:t>navn</a:t>
+            </a:r>
+            <a:r>
+              <a:rPr lang="en-US" dirty="0"/>
+              <a:t> </a:t>
+            </a:r>
+            <a:r>
+              <a:rPr lang="en-US" dirty="0" err="1"/>
+              <a:t>eller</a:t>
+            </a:r>
+            <a:r>
+              <a:rPr lang="en-US" dirty="0"/>
+              <a:t> </a:t>
+            </a:r>
+            <a:r>
+              <a:rPr lang="en-US" dirty="0" err="1"/>
+              <a:t>teksten</a:t>
+            </a:r>
+            <a:r>
+              <a:rPr lang="en-US" dirty="0"/>
+              <a:t> </a:t>
+            </a:r>
+            <a:r>
+              <a:rPr lang="en-US" dirty="0" err="1"/>
+              <a:t>navn</a:t>
+            </a:r>
+            <a:r>
+              <a:rPr lang="en-US" dirty="0"/>
+              <a:t>? </a:t>
+            </a:r>
+          </a:p>
+          <a:p>
+            <a:endParaRPr lang="en-US" dirty="0"/>
+          </a:p>
+          <a:p>
+            <a:endParaRPr lang="en-US" dirty="0"/>
+          </a:p>
+        </p:txBody>
+      </p:sp>
+      <p:pic>
+        <p:nvPicPr>
+          <p:cNvPr id="7" name="Picture 6">
+            <a:extLst>
+              <a:ext uri="{FF2B5EF4-FFF2-40B4-BE49-F238E27FC236}">
+                <a16:creationId xmlns:a16="http://schemas.microsoft.com/office/drawing/2014/main" id="{E4EA40EA-4797-AB7A-3EB7-5B19A7A93ECF}"/>
+              </a:ext>
+            </a:extLst>
+          </p:cNvPr>
+          <p:cNvPicPr>
+            <a:picLocks noChangeAspect="1"/>
+          </p:cNvPicPr>
+          <p:nvPr/>
+        </p:nvPicPr>
+        <p:blipFill>
+          <a:blip r:embed="rId2"/>
+          <a:stretch>
+            <a:fillRect/>
+          </a:stretch>
+        </p:blipFill>
+        <p:spPr>
+          <a:xfrm>
+            <a:off x="819317" y="3428999"/>
+            <a:ext cx="2479531" cy="790575"/>
+          </a:xfrm>
+          <a:prstGeom prst="rect">
+            <a:avLst/>
+          </a:prstGeom>
+        </p:spPr>
+      </p:pic>
+    </p:spTree>
+    <p:extLst>
+      <p:ext uri="{BB962C8B-B14F-4D97-AF65-F5344CB8AC3E}">
+        <p14:creationId xmlns:p14="http://schemas.microsoft.com/office/powerpoint/2010/main" val="3874022857"/>
       </p:ext>
     </p:extLst>
   </p:cSld>

</xml_diff>

<commit_message>
Added Control logic and dynmic printing with vars. Also updated a lot of the task to fit the flow better.
</commit_message>
<xml_diff>
--- a/koding workshop powerpoint.pptx
+++ b/koding workshop powerpoint.pptx
@@ -5,10 +5,10 @@
     <p:sldMasterId id="2147483672" r:id="rId1"/>
   </p:sldMasterIdLst>
   <p:notesMasterIdLst>
-    <p:notesMasterId r:id="rId23"/>
+    <p:notesMasterId r:id="rId34"/>
   </p:notesMasterIdLst>
   <p:handoutMasterIdLst>
-    <p:handoutMasterId r:id="rId24"/>
+    <p:handoutMasterId r:id="rId35"/>
   </p:handoutMasterIdLst>
   <p:sldIdLst>
     <p:sldId id="256" r:id="rId2"/>
@@ -32,6 +32,17 @@
     <p:sldId id="274" r:id="rId20"/>
     <p:sldId id="275" r:id="rId21"/>
     <p:sldId id="276" r:id="rId22"/>
+    <p:sldId id="277" r:id="rId23"/>
+    <p:sldId id="278" r:id="rId24"/>
+    <p:sldId id="279" r:id="rId25"/>
+    <p:sldId id="280" r:id="rId26"/>
+    <p:sldId id="281" r:id="rId27"/>
+    <p:sldId id="282" r:id="rId28"/>
+    <p:sldId id="283" r:id="rId29"/>
+    <p:sldId id="284" r:id="rId30"/>
+    <p:sldId id="285" r:id="rId31"/>
+    <p:sldId id="286" r:id="rId32"/>
+    <p:sldId id="287" r:id="rId33"/>
   </p:sldIdLst>
   <p:sldSz cx="12192000" cy="6858000"/>
   <p:notesSz cx="6858000" cy="9144000"/>
@@ -235,7 +246,7 @@
           <a:p>
             <a:fld id="{AF869721-F543-4A6C-BF9D-65D7CC540427}" type="datetimeFigureOut">
               <a:rPr lang="en-US" smtClean="0"/>
-              <a:t>2/11/2023</a:t>
+              <a:t>2/13/2023</a:t>
             </a:fld>
             <a:endParaRPr lang="en-US" dirty="0"/>
           </a:p>
@@ -412,7 +423,7 @@
           <a:p>
             <a:fld id="{C732326A-4C88-4AFB-AA5B-5919D81DFF5B}" type="datetimeFigureOut">
               <a:rPr lang="en-US" smtClean="0"/>
-              <a:t>2/11/2023</a:t>
+              <a:t>2/13/2023</a:t>
             </a:fld>
             <a:endParaRPr lang="en-US" dirty="0"/>
           </a:p>
@@ -763,6 +774,479 @@
 </p:notes>
 </file>
 
+<file path=ppt/notesSlides/notesSlide10.xml><?xml version="1.0" encoding="utf-8"?>
+<p:notes xmlns:a="http://schemas.openxmlformats.org/drawingml/2006/main" xmlns:r="http://schemas.openxmlformats.org/officeDocument/2006/relationships" xmlns:p="http://schemas.openxmlformats.org/presentationml/2006/main">
+  <p:cSld>
+    <p:spTree>
+      <p:nvGrpSpPr>
+        <p:cNvPr id="1" name=""/>
+        <p:cNvGrpSpPr/>
+        <p:nvPr/>
+      </p:nvGrpSpPr>
+      <p:grpSpPr>
+        <a:xfrm>
+          <a:off x="0" y="0"/>
+          <a:ext cx="0" cy="0"/>
+          <a:chOff x="0" y="0"/>
+          <a:chExt cx="0" cy="0"/>
+        </a:xfrm>
+      </p:grpSpPr>
+      <p:sp>
+        <p:nvSpPr>
+          <p:cNvPr id="2" name="Slide Image Placeholder 1"/>
+          <p:cNvSpPr>
+            <a:spLocks noGrp="1" noRot="1" noChangeAspect="1"/>
+          </p:cNvSpPr>
+          <p:nvPr>
+            <p:ph type="sldImg"/>
+          </p:nvPr>
+        </p:nvSpPr>
+        <p:spPr/>
+      </p:sp>
+      <p:sp>
+        <p:nvSpPr>
+          <p:cNvPr id="3" name="Notes Placeholder 2"/>
+          <p:cNvSpPr>
+            <a:spLocks noGrp="1"/>
+          </p:cNvSpPr>
+          <p:nvPr>
+            <p:ph type="body" idx="1"/>
+          </p:nvPr>
+        </p:nvSpPr>
+        <p:spPr/>
+        <p:txBody>
+          <a:bodyPr/>
+          <a:lstStyle/>
+          <a:p>
+            <a:r>
+              <a:rPr lang="en-US" dirty="0" err="1"/>
+              <a:t>Alkohol</a:t>
+            </a:r>
+            <a:r>
+              <a:rPr lang="en-US" baseline="0" dirty="0"/>
+              <a:t> </a:t>
+            </a:r>
+            <a:r>
+              <a:rPr lang="en-US" baseline="0" dirty="0" err="1"/>
+              <a:t>sjekking</a:t>
+            </a:r>
+            <a:r>
+              <a:rPr lang="en-US" baseline="0" dirty="0"/>
+              <a:t> program</a:t>
+            </a:r>
+            <a:endParaRPr lang="en-US" dirty="0"/>
+          </a:p>
+        </p:txBody>
+      </p:sp>
+      <p:sp>
+        <p:nvSpPr>
+          <p:cNvPr id="4" name="Slide Number Placeholder 3"/>
+          <p:cNvSpPr>
+            <a:spLocks noGrp="1"/>
+          </p:cNvSpPr>
+          <p:nvPr>
+            <p:ph type="sldNum" sz="quarter" idx="5"/>
+          </p:nvPr>
+        </p:nvSpPr>
+        <p:spPr/>
+        <p:txBody>
+          <a:bodyPr/>
+          <a:lstStyle/>
+          <a:p>
+            <a:fld id="{C6B3AB32-59DF-41F1-9618-EDFBF5049629}" type="slidenum">
+              <a:rPr lang="en-US" smtClean="0"/>
+              <a:t>26</a:t>
+            </a:fld>
+            <a:endParaRPr lang="en-US" dirty="0"/>
+          </a:p>
+        </p:txBody>
+      </p:sp>
+    </p:spTree>
+    <p:extLst>
+      <p:ext uri="{BB962C8B-B14F-4D97-AF65-F5344CB8AC3E}">
+        <p14:creationId xmlns:p14="http://schemas.microsoft.com/office/powerpoint/2010/main" val="3875022490"/>
+      </p:ext>
+    </p:extLst>
+  </p:cSld>
+  <p:clrMapOvr>
+    <a:masterClrMapping/>
+  </p:clrMapOvr>
+</p:notes>
+</file>
+
+<file path=ppt/notesSlides/notesSlide11.xml><?xml version="1.0" encoding="utf-8"?>
+<p:notes xmlns:a="http://schemas.openxmlformats.org/drawingml/2006/main" xmlns:r="http://schemas.openxmlformats.org/officeDocument/2006/relationships" xmlns:p="http://schemas.openxmlformats.org/presentationml/2006/main">
+  <p:cSld>
+    <p:spTree>
+      <p:nvGrpSpPr>
+        <p:cNvPr id="1" name=""/>
+        <p:cNvGrpSpPr/>
+        <p:nvPr/>
+      </p:nvGrpSpPr>
+      <p:grpSpPr>
+        <a:xfrm>
+          <a:off x="0" y="0"/>
+          <a:ext cx="0" cy="0"/>
+          <a:chOff x="0" y="0"/>
+          <a:chExt cx="0" cy="0"/>
+        </a:xfrm>
+      </p:grpSpPr>
+      <p:sp>
+        <p:nvSpPr>
+          <p:cNvPr id="2" name="Slide Image Placeholder 1"/>
+          <p:cNvSpPr>
+            <a:spLocks noGrp="1" noRot="1" noChangeAspect="1"/>
+          </p:cNvSpPr>
+          <p:nvPr>
+            <p:ph type="sldImg"/>
+          </p:nvPr>
+        </p:nvSpPr>
+        <p:spPr/>
+      </p:sp>
+      <p:sp>
+        <p:nvSpPr>
+          <p:cNvPr id="3" name="Notes Placeholder 2"/>
+          <p:cNvSpPr>
+            <a:spLocks noGrp="1"/>
+          </p:cNvSpPr>
+          <p:nvPr>
+            <p:ph type="body" idx="1"/>
+          </p:nvPr>
+        </p:nvSpPr>
+        <p:spPr/>
+        <p:txBody>
+          <a:bodyPr/>
+          <a:lstStyle/>
+          <a:p>
+            <a:r>
+              <a:rPr lang="en-US" dirty="0" err="1"/>
+              <a:t>Indentering</a:t>
+            </a:r>
+            <a:r>
+              <a:rPr lang="en-US" baseline="0" dirty="0"/>
+              <a:t> = tab = 4 </a:t>
+            </a:r>
+            <a:r>
+              <a:rPr lang="en-US" baseline="0" dirty="0" err="1"/>
+              <a:t>mellomrom</a:t>
+            </a:r>
+            <a:endParaRPr lang="en-US" baseline="0" dirty="0"/>
+          </a:p>
+          <a:p>
+            <a:endParaRPr lang="en-US" baseline="0" dirty="0"/>
+          </a:p>
+          <a:p>
+            <a:r>
+              <a:rPr lang="en-US" baseline="0" dirty="0" err="1"/>
+              <a:t>Spør</a:t>
+            </a:r>
+            <a:r>
+              <a:rPr lang="en-US" baseline="0" dirty="0"/>
+              <a:t>: SER DU PROBLEMET?</a:t>
+            </a:r>
+            <a:endParaRPr lang="en-US" dirty="0"/>
+          </a:p>
+        </p:txBody>
+      </p:sp>
+      <p:sp>
+        <p:nvSpPr>
+          <p:cNvPr id="4" name="Slide Number Placeholder 3"/>
+          <p:cNvSpPr>
+            <a:spLocks noGrp="1"/>
+          </p:cNvSpPr>
+          <p:nvPr>
+            <p:ph type="sldNum" sz="quarter" idx="5"/>
+          </p:nvPr>
+        </p:nvSpPr>
+        <p:spPr/>
+        <p:txBody>
+          <a:bodyPr/>
+          <a:lstStyle/>
+          <a:p>
+            <a:fld id="{C6B3AB32-59DF-41F1-9618-EDFBF5049629}" type="slidenum">
+              <a:rPr lang="en-US" smtClean="0"/>
+              <a:t>27</a:t>
+            </a:fld>
+            <a:endParaRPr lang="en-US" dirty="0"/>
+          </a:p>
+        </p:txBody>
+      </p:sp>
+    </p:spTree>
+    <p:extLst>
+      <p:ext uri="{BB962C8B-B14F-4D97-AF65-F5344CB8AC3E}">
+        <p14:creationId xmlns:p14="http://schemas.microsoft.com/office/powerpoint/2010/main" val="3406160797"/>
+      </p:ext>
+    </p:extLst>
+  </p:cSld>
+  <p:clrMapOvr>
+    <a:masterClrMapping/>
+  </p:clrMapOvr>
+</p:notes>
+</file>
+
+<file path=ppt/notesSlides/notesSlide12.xml><?xml version="1.0" encoding="utf-8"?>
+<p:notes xmlns:a="http://schemas.openxmlformats.org/drawingml/2006/main" xmlns:r="http://schemas.openxmlformats.org/officeDocument/2006/relationships" xmlns:p="http://schemas.openxmlformats.org/presentationml/2006/main">
+  <p:cSld>
+    <p:spTree>
+      <p:nvGrpSpPr>
+        <p:cNvPr id="1" name=""/>
+        <p:cNvGrpSpPr/>
+        <p:nvPr/>
+      </p:nvGrpSpPr>
+      <p:grpSpPr>
+        <a:xfrm>
+          <a:off x="0" y="0"/>
+          <a:ext cx="0" cy="0"/>
+          <a:chOff x="0" y="0"/>
+          <a:chExt cx="0" cy="0"/>
+        </a:xfrm>
+      </p:grpSpPr>
+      <p:sp>
+        <p:nvSpPr>
+          <p:cNvPr id="2" name="Slide Image Placeholder 1"/>
+          <p:cNvSpPr>
+            <a:spLocks noGrp="1" noRot="1" noChangeAspect="1"/>
+          </p:cNvSpPr>
+          <p:nvPr>
+            <p:ph type="sldImg"/>
+          </p:nvPr>
+        </p:nvSpPr>
+        <p:spPr/>
+      </p:sp>
+      <p:sp>
+        <p:nvSpPr>
+          <p:cNvPr id="3" name="Notes Placeholder 2"/>
+          <p:cNvSpPr>
+            <a:spLocks noGrp="1"/>
+          </p:cNvSpPr>
+          <p:nvPr>
+            <p:ph type="body" idx="1"/>
+          </p:nvPr>
+        </p:nvSpPr>
+        <p:spPr/>
+        <p:txBody>
+          <a:bodyPr/>
+          <a:lstStyle/>
+          <a:p>
+            <a:endParaRPr lang="en-US" dirty="0"/>
+          </a:p>
+        </p:txBody>
+      </p:sp>
+      <p:sp>
+        <p:nvSpPr>
+          <p:cNvPr id="4" name="Slide Number Placeholder 3"/>
+          <p:cNvSpPr>
+            <a:spLocks noGrp="1"/>
+          </p:cNvSpPr>
+          <p:nvPr>
+            <p:ph type="sldNum" sz="quarter" idx="5"/>
+          </p:nvPr>
+        </p:nvSpPr>
+        <p:spPr/>
+        <p:txBody>
+          <a:bodyPr/>
+          <a:lstStyle/>
+          <a:p>
+            <a:fld id="{C6B3AB32-59DF-41F1-9618-EDFBF5049629}" type="slidenum">
+              <a:rPr lang="en-US" smtClean="0"/>
+              <a:t>28</a:t>
+            </a:fld>
+            <a:endParaRPr lang="en-US" dirty="0"/>
+          </a:p>
+        </p:txBody>
+      </p:sp>
+    </p:spTree>
+    <p:extLst>
+      <p:ext uri="{BB962C8B-B14F-4D97-AF65-F5344CB8AC3E}">
+        <p14:creationId xmlns:p14="http://schemas.microsoft.com/office/powerpoint/2010/main" val="783291606"/>
+      </p:ext>
+    </p:extLst>
+  </p:cSld>
+  <p:clrMapOvr>
+    <a:masterClrMapping/>
+  </p:clrMapOvr>
+</p:notes>
+</file>
+
+<file path=ppt/notesSlides/notesSlide13.xml><?xml version="1.0" encoding="utf-8"?>
+<p:notes xmlns:a="http://schemas.openxmlformats.org/drawingml/2006/main" xmlns:r="http://schemas.openxmlformats.org/officeDocument/2006/relationships" xmlns:p="http://schemas.openxmlformats.org/presentationml/2006/main">
+  <p:cSld>
+    <p:spTree>
+      <p:nvGrpSpPr>
+        <p:cNvPr id="1" name=""/>
+        <p:cNvGrpSpPr/>
+        <p:nvPr/>
+      </p:nvGrpSpPr>
+      <p:grpSpPr>
+        <a:xfrm>
+          <a:off x="0" y="0"/>
+          <a:ext cx="0" cy="0"/>
+          <a:chOff x="0" y="0"/>
+          <a:chExt cx="0" cy="0"/>
+        </a:xfrm>
+      </p:grpSpPr>
+      <p:sp>
+        <p:nvSpPr>
+          <p:cNvPr id="2" name="Slide Image Placeholder 1"/>
+          <p:cNvSpPr>
+            <a:spLocks noGrp="1" noRot="1" noChangeAspect="1"/>
+          </p:cNvSpPr>
+          <p:nvPr>
+            <p:ph type="sldImg"/>
+          </p:nvPr>
+        </p:nvSpPr>
+        <p:spPr/>
+      </p:sp>
+      <p:sp>
+        <p:nvSpPr>
+          <p:cNvPr id="3" name="Notes Placeholder 2"/>
+          <p:cNvSpPr>
+            <a:spLocks noGrp="1"/>
+          </p:cNvSpPr>
+          <p:nvPr>
+            <p:ph type="body" idx="1"/>
+          </p:nvPr>
+        </p:nvSpPr>
+        <p:spPr/>
+        <p:txBody>
+          <a:bodyPr/>
+          <a:lstStyle/>
+          <a:p>
+            <a:r>
+              <a:rPr lang="en-US" dirty="0"/>
+              <a:t>Task</a:t>
+            </a:r>
+            <a:r>
+              <a:rPr lang="en-US" baseline="0" dirty="0"/>
+              <a:t> 4</a:t>
+            </a:r>
+            <a:endParaRPr lang="en-US" dirty="0"/>
+          </a:p>
+        </p:txBody>
+      </p:sp>
+      <p:sp>
+        <p:nvSpPr>
+          <p:cNvPr id="4" name="Slide Number Placeholder 3"/>
+          <p:cNvSpPr>
+            <a:spLocks noGrp="1"/>
+          </p:cNvSpPr>
+          <p:nvPr>
+            <p:ph type="sldNum" sz="quarter" idx="5"/>
+          </p:nvPr>
+        </p:nvSpPr>
+        <p:spPr/>
+        <p:txBody>
+          <a:bodyPr/>
+          <a:lstStyle/>
+          <a:p>
+            <a:fld id="{C6B3AB32-59DF-41F1-9618-EDFBF5049629}" type="slidenum">
+              <a:rPr lang="en-US" smtClean="0"/>
+              <a:t>31</a:t>
+            </a:fld>
+            <a:endParaRPr lang="en-US" dirty="0"/>
+          </a:p>
+        </p:txBody>
+      </p:sp>
+    </p:spTree>
+    <p:extLst>
+      <p:ext uri="{BB962C8B-B14F-4D97-AF65-F5344CB8AC3E}">
+        <p14:creationId xmlns:p14="http://schemas.microsoft.com/office/powerpoint/2010/main" val="3718065837"/>
+      </p:ext>
+    </p:extLst>
+  </p:cSld>
+  <p:clrMapOvr>
+    <a:masterClrMapping/>
+  </p:clrMapOvr>
+</p:notes>
+</file>
+
+<file path=ppt/notesSlides/notesSlide14.xml><?xml version="1.0" encoding="utf-8"?>
+<p:notes xmlns:a="http://schemas.openxmlformats.org/drawingml/2006/main" xmlns:r="http://schemas.openxmlformats.org/officeDocument/2006/relationships" xmlns:p="http://schemas.openxmlformats.org/presentationml/2006/main">
+  <p:cSld>
+    <p:spTree>
+      <p:nvGrpSpPr>
+        <p:cNvPr id="1" name=""/>
+        <p:cNvGrpSpPr/>
+        <p:nvPr/>
+      </p:nvGrpSpPr>
+      <p:grpSpPr>
+        <a:xfrm>
+          <a:off x="0" y="0"/>
+          <a:ext cx="0" cy="0"/>
+          <a:chOff x="0" y="0"/>
+          <a:chExt cx="0" cy="0"/>
+        </a:xfrm>
+      </p:grpSpPr>
+      <p:sp>
+        <p:nvSpPr>
+          <p:cNvPr id="2" name="Slide Image Placeholder 1"/>
+          <p:cNvSpPr>
+            <a:spLocks noGrp="1" noRot="1" noChangeAspect="1"/>
+          </p:cNvSpPr>
+          <p:nvPr>
+            <p:ph type="sldImg"/>
+          </p:nvPr>
+        </p:nvSpPr>
+        <p:spPr/>
+      </p:sp>
+      <p:sp>
+        <p:nvSpPr>
+          <p:cNvPr id="3" name="Notes Placeholder 2"/>
+          <p:cNvSpPr>
+            <a:spLocks noGrp="1"/>
+          </p:cNvSpPr>
+          <p:nvPr>
+            <p:ph type="body" idx="1"/>
+          </p:nvPr>
+        </p:nvSpPr>
+        <p:spPr/>
+        <p:txBody>
+          <a:bodyPr/>
+          <a:lstStyle/>
+          <a:p>
+            <a:r>
+              <a:rPr lang="en-US"/>
+              <a:t>Task 5</a:t>
+            </a:r>
+          </a:p>
+        </p:txBody>
+      </p:sp>
+      <p:sp>
+        <p:nvSpPr>
+          <p:cNvPr id="4" name="Slide Number Placeholder 3"/>
+          <p:cNvSpPr>
+            <a:spLocks noGrp="1"/>
+          </p:cNvSpPr>
+          <p:nvPr>
+            <p:ph type="sldNum" sz="quarter" idx="5"/>
+          </p:nvPr>
+        </p:nvSpPr>
+        <p:spPr/>
+        <p:txBody>
+          <a:bodyPr/>
+          <a:lstStyle/>
+          <a:p>
+            <a:fld id="{C6B3AB32-59DF-41F1-9618-EDFBF5049629}" type="slidenum">
+              <a:rPr lang="en-US" smtClean="0"/>
+              <a:t>32</a:t>
+            </a:fld>
+            <a:endParaRPr lang="en-US" dirty="0"/>
+          </a:p>
+        </p:txBody>
+      </p:sp>
+    </p:spTree>
+    <p:extLst>
+      <p:ext uri="{BB962C8B-B14F-4D97-AF65-F5344CB8AC3E}">
+        <p14:creationId xmlns:p14="http://schemas.microsoft.com/office/powerpoint/2010/main" val="3448279359"/>
+      </p:ext>
+    </p:extLst>
+  </p:cSld>
+  <p:clrMapOvr>
+    <a:masterClrMapping/>
+  </p:clrMapOvr>
+</p:notes>
+</file>
+
 <file path=ppt/notesSlides/notesSlide2.xml><?xml version="1.0" encoding="utf-8"?>
 <p:notes xmlns:a="http://schemas.openxmlformats.org/drawingml/2006/main" xmlns:r="http://schemas.openxmlformats.org/officeDocument/2006/relationships" xmlns:p="http://schemas.openxmlformats.org/presentationml/2006/main">
   <p:cSld>
@@ -2002,33 +2486,86 @@
           <a:bodyPr/>
           <a:lstStyle/>
           <a:p>
-            <a:r>
-              <a:rPr lang="en-US" dirty="0"/>
-              <a:t>Task0: # Write a program that prints out </a:t>
-            </a:r>
-            <a:r>
-              <a:rPr lang="en-US" dirty="0" err="1"/>
-              <a:t>ditt</a:t>
-            </a:r>
-            <a:r>
-              <a:rPr lang="en-US" dirty="0"/>
-              <a:t> </a:t>
-            </a:r>
-            <a:r>
-              <a:rPr lang="en-US" dirty="0" err="1"/>
-              <a:t>navn</a:t>
-            </a:r>
-            <a:r>
-              <a:rPr lang="en-US" dirty="0"/>
-              <a:t>, alder </a:t>
-            </a:r>
-            <a:r>
-              <a:rPr lang="en-US" dirty="0" err="1"/>
-              <a:t>og</a:t>
-            </a:r>
-            <a:r>
-              <a:rPr lang="en-US" dirty="0"/>
-              <a:t> stilling</a:t>
+            <a:pPr marL="0" marR="0" lvl="0" indent="0" algn="l" defTabSz="914400" rtl="0" eaLnBrk="1" fontAlgn="auto" latinLnBrk="0" hangingPunct="1">
+              <a:lnSpc>
+                <a:spcPct val="100000"/>
+              </a:lnSpc>
+              <a:spcBef>
+                <a:spcPts val="0"/>
+              </a:spcBef>
+              <a:spcAft>
+                <a:spcPts val="0"/>
+              </a:spcAft>
+              <a:buClrTx/>
+              <a:buSzTx/>
+              <a:buFontTx/>
+              <a:buNone/>
+              <a:tabLst/>
+              <a:defRPr/>
+            </a:pPr>
+            <a:r>
+              <a:rPr lang="en-US" dirty="0"/>
+              <a:t>Task0v2: </a:t>
+            </a:r>
+            <a:r>
+              <a:rPr lang="en-US" sz="1200" kern="1200" dirty="0">
+                <a:solidFill>
+                  <a:schemeClr val="tx1"/>
+                </a:solidFill>
+                <a:effectLst/>
+                <a:latin typeface="+mn-lt"/>
+                <a:ea typeface="+mn-ea"/>
+                <a:cs typeface="+mn-cs"/>
+              </a:rPr>
+              <a:t># Write 5 facts about yourself, with the following format: "</a:t>
+            </a:r>
+            <a:r>
+              <a:rPr lang="en-US" sz="1200" kern="1200" dirty="0" err="1">
+                <a:solidFill>
+                  <a:schemeClr val="tx1"/>
+                </a:solidFill>
+                <a:effectLst/>
+                <a:latin typeface="+mn-lt"/>
+                <a:ea typeface="+mn-ea"/>
+                <a:cs typeface="+mn-cs"/>
+              </a:rPr>
+              <a:t>your_name</a:t>
+            </a:r>
+            <a:r>
+              <a:rPr lang="en-US" sz="1200" kern="1200" dirty="0">
+                <a:solidFill>
+                  <a:schemeClr val="tx1"/>
+                </a:solidFill>
+                <a:effectLst/>
+                <a:latin typeface="+mn-lt"/>
+                <a:ea typeface="+mn-ea"/>
+                <a:cs typeface="+mn-cs"/>
+              </a:rPr>
+              <a:t> </a:t>
+            </a:r>
+            <a:r>
+              <a:rPr lang="en-US" sz="1200" kern="1200" dirty="0" err="1">
+                <a:solidFill>
+                  <a:schemeClr val="tx1"/>
+                </a:solidFill>
+                <a:effectLst/>
+                <a:latin typeface="+mn-lt"/>
+                <a:ea typeface="+mn-ea"/>
+                <a:cs typeface="+mn-cs"/>
+              </a:rPr>
+              <a:t>fact_about_yourself</a:t>
+            </a:r>
+            <a:r>
+              <a:rPr lang="en-US" sz="1200" kern="1200" dirty="0">
+                <a:solidFill>
+                  <a:schemeClr val="tx1"/>
+                </a:solidFill>
+                <a:effectLst/>
+                <a:latin typeface="+mn-lt"/>
+                <a:ea typeface="+mn-ea"/>
+                <a:cs typeface="+mn-cs"/>
+              </a:rPr>
+              <a:t>"</a:t>
             </a:r>
           </a:p>
         </p:txBody>
@@ -2060,6 +2597,560 @@
     <p:extLst>
       <p:ext uri="{BB962C8B-B14F-4D97-AF65-F5344CB8AC3E}">
         <p14:creationId xmlns:p14="http://schemas.microsoft.com/office/powerpoint/2010/main" val="3714338658"/>
+      </p:ext>
+    </p:extLst>
+  </p:cSld>
+  <p:clrMapOvr>
+    <a:masterClrMapping/>
+  </p:clrMapOvr>
+</p:notes>
+</file>
+
+<file path=ppt/notesSlides/notesSlide6.xml><?xml version="1.0" encoding="utf-8"?>
+<p:notes xmlns:a="http://schemas.openxmlformats.org/drawingml/2006/main" xmlns:r="http://schemas.openxmlformats.org/officeDocument/2006/relationships" xmlns:p="http://schemas.openxmlformats.org/presentationml/2006/main">
+  <p:cSld>
+    <p:spTree>
+      <p:nvGrpSpPr>
+        <p:cNvPr id="1" name=""/>
+        <p:cNvGrpSpPr/>
+        <p:nvPr/>
+      </p:nvGrpSpPr>
+      <p:grpSpPr>
+        <a:xfrm>
+          <a:off x="0" y="0"/>
+          <a:ext cx="0" cy="0"/>
+          <a:chOff x="0" y="0"/>
+          <a:chExt cx="0" cy="0"/>
+        </a:xfrm>
+      </p:grpSpPr>
+      <p:sp>
+        <p:nvSpPr>
+          <p:cNvPr id="2" name="Slide Image Placeholder 1"/>
+          <p:cNvSpPr>
+            <a:spLocks noGrp="1" noRot="1" noChangeAspect="1"/>
+          </p:cNvSpPr>
+          <p:nvPr>
+            <p:ph type="sldImg"/>
+          </p:nvPr>
+        </p:nvSpPr>
+        <p:spPr/>
+      </p:sp>
+      <p:sp>
+        <p:nvSpPr>
+          <p:cNvPr id="3" name="Notes Placeholder 2"/>
+          <p:cNvSpPr>
+            <a:spLocks noGrp="1"/>
+          </p:cNvSpPr>
+          <p:nvPr>
+            <p:ph type="body" idx="1"/>
+          </p:nvPr>
+        </p:nvSpPr>
+        <p:spPr/>
+        <p:txBody>
+          <a:bodyPr/>
+          <a:lstStyle/>
+          <a:p>
+            <a:endParaRPr lang="en-US" dirty="0"/>
+          </a:p>
+        </p:txBody>
+      </p:sp>
+      <p:sp>
+        <p:nvSpPr>
+          <p:cNvPr id="4" name="Slide Number Placeholder 3"/>
+          <p:cNvSpPr>
+            <a:spLocks noGrp="1"/>
+          </p:cNvSpPr>
+          <p:nvPr>
+            <p:ph type="sldNum" sz="quarter" idx="5"/>
+          </p:nvPr>
+        </p:nvSpPr>
+        <p:spPr/>
+        <p:txBody>
+          <a:bodyPr/>
+          <a:lstStyle/>
+          <a:p>
+            <a:fld id="{C6B3AB32-59DF-41F1-9618-EDFBF5049629}" type="slidenum">
+              <a:rPr lang="en-US" smtClean="0"/>
+              <a:t>18</a:t>
+            </a:fld>
+            <a:endParaRPr lang="en-US" dirty="0"/>
+          </a:p>
+        </p:txBody>
+      </p:sp>
+    </p:spTree>
+    <p:extLst>
+      <p:ext uri="{BB962C8B-B14F-4D97-AF65-F5344CB8AC3E}">
+        <p14:creationId xmlns:p14="http://schemas.microsoft.com/office/powerpoint/2010/main" val="4085209257"/>
+      </p:ext>
+    </p:extLst>
+  </p:cSld>
+  <p:clrMapOvr>
+    <a:masterClrMapping/>
+  </p:clrMapOvr>
+</p:notes>
+</file>
+
+<file path=ppt/notesSlides/notesSlide7.xml><?xml version="1.0" encoding="utf-8"?>
+<p:notes xmlns:a="http://schemas.openxmlformats.org/drawingml/2006/main" xmlns:r="http://schemas.openxmlformats.org/officeDocument/2006/relationships" xmlns:p="http://schemas.openxmlformats.org/presentationml/2006/main">
+  <p:cSld>
+    <p:spTree>
+      <p:nvGrpSpPr>
+        <p:cNvPr id="1" name=""/>
+        <p:cNvGrpSpPr/>
+        <p:nvPr/>
+      </p:nvGrpSpPr>
+      <p:grpSpPr>
+        <a:xfrm>
+          <a:off x="0" y="0"/>
+          <a:ext cx="0" cy="0"/>
+          <a:chOff x="0" y="0"/>
+          <a:chExt cx="0" cy="0"/>
+        </a:xfrm>
+      </p:grpSpPr>
+      <p:sp>
+        <p:nvSpPr>
+          <p:cNvPr id="2" name="Slide Image Placeholder 1"/>
+          <p:cNvSpPr>
+            <a:spLocks noGrp="1" noRot="1" noChangeAspect="1"/>
+          </p:cNvSpPr>
+          <p:nvPr>
+            <p:ph type="sldImg"/>
+          </p:nvPr>
+        </p:nvSpPr>
+        <p:spPr/>
+      </p:sp>
+      <p:sp>
+        <p:nvSpPr>
+          <p:cNvPr id="3" name="Notes Placeholder 2"/>
+          <p:cNvSpPr>
+            <a:spLocks noGrp="1"/>
+          </p:cNvSpPr>
+          <p:nvPr>
+            <p:ph type="body" idx="1"/>
+          </p:nvPr>
+        </p:nvSpPr>
+        <p:spPr/>
+        <p:txBody>
+          <a:bodyPr/>
+          <a:lstStyle/>
+          <a:p>
+            <a:pPr marL="0" marR="0" lvl="0" indent="0" algn="l" defTabSz="914400" rtl="0" eaLnBrk="1" fontAlgn="auto" latinLnBrk="0" hangingPunct="1">
+              <a:lnSpc>
+                <a:spcPct val="100000"/>
+              </a:lnSpc>
+              <a:spcBef>
+                <a:spcPts val="0"/>
+              </a:spcBef>
+              <a:spcAft>
+                <a:spcPts val="0"/>
+              </a:spcAft>
+              <a:buClrTx/>
+              <a:buSzTx/>
+              <a:buFontTx/>
+              <a:buNone/>
+              <a:tabLst/>
+              <a:defRPr/>
+            </a:pPr>
+            <a:r>
+              <a:rPr lang="en-US" dirty="0"/>
+              <a:t>Task1: </a:t>
+            </a:r>
+            <a:r>
+              <a:rPr lang="en-US" sz="1200" kern="1200" dirty="0">
+                <a:solidFill>
+                  <a:schemeClr val="tx1"/>
+                </a:solidFill>
+                <a:effectLst/>
+                <a:latin typeface="+mn-lt"/>
+                <a:ea typeface="+mn-ea"/>
+                <a:cs typeface="+mn-cs"/>
+              </a:rPr>
+              <a:t>Write a program that holds the following information:</a:t>
+            </a:r>
+            <a:br>
+              <a:rPr lang="en-US" sz="1200" kern="1200" dirty="0">
+                <a:solidFill>
+                  <a:schemeClr val="tx1"/>
+                </a:solidFill>
+                <a:effectLst/>
+                <a:latin typeface="+mn-lt"/>
+                <a:ea typeface="+mn-ea"/>
+                <a:cs typeface="+mn-cs"/>
+              </a:rPr>
+            </a:br>
+            <a:r>
+              <a:rPr lang="en-US" sz="1200" kern="1200" dirty="0">
+                <a:solidFill>
+                  <a:schemeClr val="tx1"/>
+                </a:solidFill>
+                <a:effectLst/>
+                <a:latin typeface="+mn-lt"/>
+                <a:ea typeface="+mn-ea"/>
+                <a:cs typeface="+mn-cs"/>
+              </a:rPr>
+              <a:t> - your name</a:t>
+            </a:r>
+            <a:br>
+              <a:rPr lang="en-US" sz="1200" kern="1200" dirty="0">
+                <a:solidFill>
+                  <a:schemeClr val="tx1"/>
+                </a:solidFill>
+                <a:effectLst/>
+                <a:latin typeface="+mn-lt"/>
+                <a:ea typeface="+mn-ea"/>
+                <a:cs typeface="+mn-cs"/>
+              </a:rPr>
+            </a:br>
+            <a:r>
+              <a:rPr lang="en-US" sz="1200" kern="1200" dirty="0">
+                <a:solidFill>
+                  <a:schemeClr val="tx1"/>
+                </a:solidFill>
+                <a:effectLst/>
+                <a:latin typeface="+mn-lt"/>
+                <a:ea typeface="+mn-ea"/>
+                <a:cs typeface="+mn-cs"/>
+              </a:rPr>
+              <a:t> - your age</a:t>
+            </a:r>
+            <a:br>
+              <a:rPr lang="en-US" sz="1200" kern="1200" dirty="0">
+                <a:solidFill>
+                  <a:schemeClr val="tx1"/>
+                </a:solidFill>
+                <a:effectLst/>
+                <a:latin typeface="+mn-lt"/>
+                <a:ea typeface="+mn-ea"/>
+                <a:cs typeface="+mn-cs"/>
+              </a:rPr>
+            </a:br>
+            <a:r>
+              <a:rPr lang="en-US" sz="1200" kern="1200" dirty="0">
+                <a:solidFill>
+                  <a:schemeClr val="tx1"/>
+                </a:solidFill>
+                <a:effectLst/>
+                <a:latin typeface="+mn-lt"/>
+                <a:ea typeface="+mn-ea"/>
+                <a:cs typeface="+mn-cs"/>
+              </a:rPr>
+              <a:t> - your position in PIT</a:t>
+            </a:r>
+            <a:br>
+              <a:rPr lang="en-US" sz="1200" kern="1200" dirty="0">
+                <a:solidFill>
+                  <a:schemeClr val="tx1"/>
+                </a:solidFill>
+                <a:effectLst/>
+                <a:latin typeface="+mn-lt"/>
+                <a:ea typeface="+mn-ea"/>
+                <a:cs typeface="+mn-cs"/>
+              </a:rPr>
+            </a:br>
+            <a:r>
+              <a:rPr lang="en-US" sz="1200" kern="1200" dirty="0">
+                <a:solidFill>
+                  <a:schemeClr val="tx1"/>
+                </a:solidFill>
+                <a:effectLst/>
+                <a:latin typeface="+mn-lt"/>
+                <a:ea typeface="+mn-ea"/>
+                <a:cs typeface="+mn-cs"/>
+              </a:rPr>
+              <a:t> - your desired salary</a:t>
+            </a:r>
+            <a:br>
+              <a:rPr lang="en-US" sz="1200" kern="1200" dirty="0">
+                <a:solidFill>
+                  <a:schemeClr val="tx1"/>
+                </a:solidFill>
+                <a:effectLst/>
+                <a:latin typeface="+mn-lt"/>
+                <a:ea typeface="+mn-ea"/>
+                <a:cs typeface="+mn-cs"/>
+              </a:rPr>
+            </a:br>
+            <a:r>
+              <a:rPr lang="en-US" sz="1200" kern="1200" dirty="0">
+                <a:solidFill>
+                  <a:schemeClr val="tx1"/>
+                </a:solidFill>
+                <a:effectLst/>
+                <a:latin typeface="+mn-lt"/>
+                <a:ea typeface="+mn-ea"/>
+                <a:cs typeface="+mn-cs"/>
+              </a:rPr>
+              <a:t>-  your current salary</a:t>
+            </a:r>
+          </a:p>
+          <a:p>
+            <a:pPr marL="0" marR="0" lvl="0" indent="0" algn="l" defTabSz="914400" rtl="0" eaLnBrk="1" fontAlgn="auto" latinLnBrk="0" hangingPunct="1">
+              <a:lnSpc>
+                <a:spcPct val="100000"/>
+              </a:lnSpc>
+              <a:spcBef>
+                <a:spcPts val="0"/>
+              </a:spcBef>
+              <a:spcAft>
+                <a:spcPts val="0"/>
+              </a:spcAft>
+              <a:buClrTx/>
+              <a:buSzTx/>
+              <a:buFontTx/>
+              <a:buNone/>
+              <a:tabLst/>
+              <a:defRPr/>
+            </a:pPr>
+            <a:endParaRPr lang="en-US" sz="1200" kern="1200" dirty="0">
+              <a:solidFill>
+                <a:schemeClr val="tx1"/>
+              </a:solidFill>
+              <a:effectLst/>
+              <a:latin typeface="+mn-lt"/>
+              <a:ea typeface="+mn-ea"/>
+              <a:cs typeface="+mn-cs"/>
+            </a:endParaRPr>
+          </a:p>
+          <a:p>
+            <a:endParaRPr lang="en-US" dirty="0"/>
+          </a:p>
+        </p:txBody>
+      </p:sp>
+      <p:sp>
+        <p:nvSpPr>
+          <p:cNvPr id="4" name="Slide Number Placeholder 3"/>
+          <p:cNvSpPr>
+            <a:spLocks noGrp="1"/>
+          </p:cNvSpPr>
+          <p:nvPr>
+            <p:ph type="sldNum" sz="quarter" idx="5"/>
+          </p:nvPr>
+        </p:nvSpPr>
+        <p:spPr/>
+        <p:txBody>
+          <a:bodyPr/>
+          <a:lstStyle/>
+          <a:p>
+            <a:fld id="{C6B3AB32-59DF-41F1-9618-EDFBF5049629}" type="slidenum">
+              <a:rPr lang="en-US" smtClean="0"/>
+              <a:t>23</a:t>
+            </a:fld>
+            <a:endParaRPr lang="en-US" dirty="0"/>
+          </a:p>
+        </p:txBody>
+      </p:sp>
+    </p:spTree>
+    <p:extLst>
+      <p:ext uri="{BB962C8B-B14F-4D97-AF65-F5344CB8AC3E}">
+        <p14:creationId xmlns:p14="http://schemas.microsoft.com/office/powerpoint/2010/main" val="1431559605"/>
+      </p:ext>
+    </p:extLst>
+  </p:cSld>
+  <p:clrMapOvr>
+    <a:masterClrMapping/>
+  </p:clrMapOvr>
+</p:notes>
+</file>
+
+<file path=ppt/notesSlides/notesSlide8.xml><?xml version="1.0" encoding="utf-8"?>
+<p:notes xmlns:a="http://schemas.openxmlformats.org/drawingml/2006/main" xmlns:r="http://schemas.openxmlformats.org/officeDocument/2006/relationships" xmlns:p="http://schemas.openxmlformats.org/presentationml/2006/main">
+  <p:cSld>
+    <p:spTree>
+      <p:nvGrpSpPr>
+        <p:cNvPr id="1" name=""/>
+        <p:cNvGrpSpPr/>
+        <p:nvPr/>
+      </p:nvGrpSpPr>
+      <p:grpSpPr>
+        <a:xfrm>
+          <a:off x="0" y="0"/>
+          <a:ext cx="0" cy="0"/>
+          <a:chOff x="0" y="0"/>
+          <a:chExt cx="0" cy="0"/>
+        </a:xfrm>
+      </p:grpSpPr>
+      <p:sp>
+        <p:nvSpPr>
+          <p:cNvPr id="2" name="Slide Image Placeholder 1"/>
+          <p:cNvSpPr>
+            <a:spLocks noGrp="1" noRot="1" noChangeAspect="1"/>
+          </p:cNvSpPr>
+          <p:nvPr>
+            <p:ph type="sldImg"/>
+          </p:nvPr>
+        </p:nvSpPr>
+        <p:spPr/>
+      </p:sp>
+      <p:sp>
+        <p:nvSpPr>
+          <p:cNvPr id="3" name="Notes Placeholder 2"/>
+          <p:cNvSpPr>
+            <a:spLocks noGrp="1"/>
+          </p:cNvSpPr>
+          <p:nvPr>
+            <p:ph type="body" idx="1"/>
+          </p:nvPr>
+        </p:nvSpPr>
+        <p:spPr/>
+        <p:txBody>
+          <a:bodyPr/>
+          <a:lstStyle/>
+          <a:p>
+            <a:r>
+              <a:rPr lang="en-US" dirty="0"/>
+              <a:t>Task2:</a:t>
+            </a:r>
+            <a:r>
+              <a:rPr lang="en-US" baseline="0" dirty="0"/>
+              <a:t> Update your prints to now use the name variable instead of a hardcoded name</a:t>
+            </a:r>
+            <a:endParaRPr lang="en-US" dirty="0"/>
+          </a:p>
+        </p:txBody>
+      </p:sp>
+      <p:sp>
+        <p:nvSpPr>
+          <p:cNvPr id="4" name="Slide Number Placeholder 3"/>
+          <p:cNvSpPr>
+            <a:spLocks noGrp="1"/>
+          </p:cNvSpPr>
+          <p:nvPr>
+            <p:ph type="sldNum" sz="quarter" idx="5"/>
+          </p:nvPr>
+        </p:nvSpPr>
+        <p:spPr/>
+        <p:txBody>
+          <a:bodyPr/>
+          <a:lstStyle/>
+          <a:p>
+            <a:fld id="{C6B3AB32-59DF-41F1-9618-EDFBF5049629}" type="slidenum">
+              <a:rPr lang="en-US" smtClean="0"/>
+              <a:t>24</a:t>
+            </a:fld>
+            <a:endParaRPr lang="en-US" dirty="0"/>
+          </a:p>
+        </p:txBody>
+      </p:sp>
+    </p:spTree>
+    <p:extLst>
+      <p:ext uri="{BB962C8B-B14F-4D97-AF65-F5344CB8AC3E}">
+        <p14:creationId xmlns:p14="http://schemas.microsoft.com/office/powerpoint/2010/main" val="1771431531"/>
+      </p:ext>
+    </p:extLst>
+  </p:cSld>
+  <p:clrMapOvr>
+    <a:masterClrMapping/>
+  </p:clrMapOvr>
+</p:notes>
+</file>
+
+<file path=ppt/notesSlides/notesSlide9.xml><?xml version="1.0" encoding="utf-8"?>
+<p:notes xmlns:a="http://schemas.openxmlformats.org/drawingml/2006/main" xmlns:r="http://schemas.openxmlformats.org/officeDocument/2006/relationships" xmlns:p="http://schemas.openxmlformats.org/presentationml/2006/main">
+  <p:cSld>
+    <p:spTree>
+      <p:nvGrpSpPr>
+        <p:cNvPr id="1" name=""/>
+        <p:cNvGrpSpPr/>
+        <p:nvPr/>
+      </p:nvGrpSpPr>
+      <p:grpSpPr>
+        <a:xfrm>
+          <a:off x="0" y="0"/>
+          <a:ext cx="0" cy="0"/>
+          <a:chOff x="0" y="0"/>
+          <a:chExt cx="0" cy="0"/>
+        </a:xfrm>
+      </p:grpSpPr>
+      <p:sp>
+        <p:nvSpPr>
+          <p:cNvPr id="2" name="Slide Image Placeholder 1"/>
+          <p:cNvSpPr>
+            <a:spLocks noGrp="1" noRot="1" noChangeAspect="1"/>
+          </p:cNvSpPr>
+          <p:nvPr>
+            <p:ph type="sldImg"/>
+          </p:nvPr>
+        </p:nvSpPr>
+        <p:spPr/>
+      </p:sp>
+      <p:sp>
+        <p:nvSpPr>
+          <p:cNvPr id="3" name="Notes Placeholder 2"/>
+          <p:cNvSpPr>
+            <a:spLocks noGrp="1"/>
+          </p:cNvSpPr>
+          <p:nvPr>
+            <p:ph type="body" idx="1"/>
+          </p:nvPr>
+        </p:nvSpPr>
+        <p:spPr/>
+        <p:txBody>
+          <a:bodyPr/>
+          <a:lstStyle/>
+          <a:p>
+            <a:pPr marL="0" marR="0" lvl="0" indent="0" algn="l" defTabSz="914400" rtl="0" eaLnBrk="1" fontAlgn="auto" latinLnBrk="0" hangingPunct="1">
+              <a:lnSpc>
+                <a:spcPct val="100000"/>
+              </a:lnSpc>
+              <a:spcBef>
+                <a:spcPts val="0"/>
+              </a:spcBef>
+              <a:spcAft>
+                <a:spcPts val="0"/>
+              </a:spcAft>
+              <a:buClrTx/>
+              <a:buSzTx/>
+              <a:buFontTx/>
+              <a:buNone/>
+              <a:tabLst/>
+              <a:defRPr/>
+            </a:pPr>
+            <a:r>
+              <a:rPr lang="en-US" dirty="0"/>
+              <a:t>Task3: </a:t>
+            </a:r>
+            <a:r>
+              <a:rPr lang="en-US" sz="1200" kern="1200" dirty="0">
+                <a:solidFill>
+                  <a:schemeClr val="tx1"/>
+                </a:solidFill>
+                <a:effectLst/>
+                <a:latin typeface="+mn-lt"/>
+                <a:ea typeface="+mn-ea"/>
+                <a:cs typeface="+mn-cs"/>
+              </a:rPr>
+              <a:t>Make a super print, that uses all 5 variables!</a:t>
+            </a:r>
+          </a:p>
+        </p:txBody>
+      </p:sp>
+      <p:sp>
+        <p:nvSpPr>
+          <p:cNvPr id="4" name="Slide Number Placeholder 3"/>
+          <p:cNvSpPr>
+            <a:spLocks noGrp="1"/>
+          </p:cNvSpPr>
+          <p:nvPr>
+            <p:ph type="sldNum" sz="quarter" idx="5"/>
+          </p:nvPr>
+        </p:nvSpPr>
+        <p:spPr/>
+        <p:txBody>
+          <a:bodyPr/>
+          <a:lstStyle/>
+          <a:p>
+            <a:fld id="{C6B3AB32-59DF-41F1-9618-EDFBF5049629}" type="slidenum">
+              <a:rPr lang="en-US" smtClean="0"/>
+              <a:t>25</a:t>
+            </a:fld>
+            <a:endParaRPr lang="en-US" dirty="0"/>
+          </a:p>
+        </p:txBody>
+      </p:sp>
+    </p:spTree>
+    <p:extLst>
+      <p:ext uri="{BB962C8B-B14F-4D97-AF65-F5344CB8AC3E}">
+        <p14:creationId xmlns:p14="http://schemas.microsoft.com/office/powerpoint/2010/main" val="3641394381"/>
       </p:ext>
     </p:extLst>
   </p:cSld>
@@ -2315,7 +3406,7 @@
             <a:fld id="{B61BEF0D-F0BB-DE4B-95CE-6DB70DBA9567}" type="datetimeFigureOut">
               <a:rPr lang="en-US" smtClean="0"/>
               <a:pPr/>
-              <a:t>2/11/2023</a:t>
+              <a:t>2/13/2023</a:t>
             </a:fld>
             <a:endParaRPr lang="en-US" dirty="0"/>
           </a:p>
@@ -2579,7 +3670,7 @@
             <a:fld id="{B61BEF0D-F0BB-DE4B-95CE-6DB70DBA9567}" type="datetimeFigureOut">
               <a:rPr lang="en-US" smtClean="0"/>
               <a:pPr/>
-              <a:t>2/11/2023</a:t>
+              <a:t>2/13/2023</a:t>
             </a:fld>
             <a:endParaRPr lang="en-US" dirty="0"/>
           </a:p>
@@ -2816,7 +3907,7 @@
             <a:fld id="{B61BEF0D-F0BB-DE4B-95CE-6DB70DBA9567}" type="datetimeFigureOut">
               <a:rPr lang="en-US" smtClean="0"/>
               <a:pPr/>
-              <a:t>2/11/2023</a:t>
+              <a:t>2/13/2023</a:t>
             </a:fld>
             <a:endParaRPr lang="en-US" dirty="0"/>
           </a:p>
@@ -3058,7 +4149,7 @@
             <a:fld id="{B61BEF0D-F0BB-DE4B-95CE-6DB70DBA9567}" type="datetimeFigureOut">
               <a:rPr lang="en-US" smtClean="0"/>
               <a:pPr/>
-              <a:t>2/11/2023</a:t>
+              <a:t>2/13/2023</a:t>
             </a:fld>
             <a:endParaRPr lang="en-US" dirty="0"/>
           </a:p>
@@ -3367,7 +4458,7 @@
             <a:fld id="{B61BEF0D-F0BB-DE4B-95CE-6DB70DBA9567}" type="datetimeFigureOut">
               <a:rPr lang="en-US" smtClean="0"/>
               <a:pPr/>
-              <a:t>2/11/2023</a:t>
+              <a:t>2/13/2023</a:t>
             </a:fld>
             <a:endParaRPr lang="en-US" dirty="0"/>
           </a:p>
@@ -3671,7 +4762,7 @@
             <a:fld id="{B61BEF0D-F0BB-DE4B-95CE-6DB70DBA9567}" type="datetimeFigureOut">
               <a:rPr lang="en-US" smtClean="0"/>
               <a:pPr/>
-              <a:t>2/11/2023</a:t>
+              <a:t>2/13/2023</a:t>
             </a:fld>
             <a:endParaRPr lang="en-US" dirty="0"/>
           </a:p>
@@ -4095,7 +5186,7 @@
             <a:fld id="{B61BEF0D-F0BB-DE4B-95CE-6DB70DBA9567}" type="datetimeFigureOut">
               <a:rPr lang="en-US" smtClean="0"/>
               <a:pPr/>
-              <a:t>2/11/2023</a:t>
+              <a:t>2/13/2023</a:t>
             </a:fld>
             <a:endParaRPr lang="en-US" dirty="0"/>
           </a:p>
@@ -4192,7 +5283,7 @@
             <a:fld id="{B61BEF0D-F0BB-DE4B-95CE-6DB70DBA9567}" type="datetimeFigureOut">
               <a:rPr lang="en-US" smtClean="0"/>
               <a:pPr/>
-              <a:t>2/11/2023</a:t>
+              <a:t>2/13/2023</a:t>
             </a:fld>
             <a:endParaRPr lang="en-US" dirty="0"/>
           </a:p>
@@ -4356,7 +5447,7 @@
             <a:fld id="{B61BEF0D-F0BB-DE4B-95CE-6DB70DBA9567}" type="datetimeFigureOut">
               <a:rPr lang="en-US" smtClean="0"/>
               <a:pPr/>
-              <a:t>2/11/2023</a:t>
+              <a:t>2/13/2023</a:t>
             </a:fld>
             <a:endParaRPr lang="en-US" dirty="0"/>
           </a:p>
@@ -4736,7 +5827,7 @@
             <a:fld id="{B61BEF0D-F0BB-DE4B-95CE-6DB70DBA9567}" type="datetimeFigureOut">
               <a:rPr lang="en-US" smtClean="0"/>
               <a:pPr/>
-              <a:t>2/11/2023</a:t>
+              <a:t>2/13/2023</a:t>
             </a:fld>
             <a:endParaRPr lang="en-US" dirty="0"/>
           </a:p>
@@ -5026,7 +6117,7 @@
             <a:fld id="{B61BEF0D-F0BB-DE4B-95CE-6DB70DBA9567}" type="datetimeFigureOut">
               <a:rPr lang="en-US" smtClean="0"/>
               <a:pPr/>
-              <a:t>2/11/2023</a:t>
+              <a:t>2/13/2023</a:t>
             </a:fld>
             <a:endParaRPr lang="en-US" dirty="0"/>
           </a:p>
@@ -5239,7 +6330,7 @@
             <a:fld id="{B61BEF0D-F0BB-DE4B-95CE-6DB70DBA9567}" type="datetimeFigureOut">
               <a:rPr lang="en-US" smtClean="0"/>
               <a:pPr/>
-              <a:t>2/11/2023</a:t>
+              <a:t>2/13/2023</a:t>
             </a:fld>
             <a:endParaRPr lang="en-US" dirty="0"/>
           </a:p>
@@ -8913,7 +10004,7 @@
             </a:r>
             <a:r>
               <a:rPr lang="en-US" dirty="0"/>
-              <a:t> </a:t>
+              <a:t> ‘</a:t>
             </a:r>
             <a:r>
               <a:rPr lang="en-US" dirty="0" err="1"/>
@@ -8921,7 +10012,7 @@
             </a:r>
             <a:r>
               <a:rPr lang="en-US" dirty="0"/>
-              <a:t> </a:t>
+              <a:t>’ </a:t>
             </a:r>
             <a:r>
               <a:rPr lang="en-US" dirty="0" err="1"/>
@@ -8937,7 +10028,7 @@
             </a:r>
             <a:r>
               <a:rPr lang="en-US" dirty="0"/>
-              <a:t> </a:t>
+              <a:t> ‘</a:t>
             </a:r>
             <a:r>
               <a:rPr lang="en-US" dirty="0" err="1"/>
@@ -8945,7 +10036,7 @@
             </a:r>
             <a:r>
               <a:rPr lang="en-US" dirty="0"/>
-              <a:t>? </a:t>
+              <a:t>’? </a:t>
             </a:r>
           </a:p>
           <a:p>
@@ -8999,6 +10090,1402 @@
 </p:sld>
 </file>
 
+<file path=ppt/slides/slide22.xml><?xml version="1.0" encoding="utf-8"?>
+<p:sld xmlns:a="http://schemas.openxmlformats.org/drawingml/2006/main" xmlns:r="http://schemas.openxmlformats.org/officeDocument/2006/relationships" xmlns:p="http://schemas.openxmlformats.org/presentationml/2006/main">
+  <p:cSld>
+    <p:spTree>
+      <p:nvGrpSpPr>
+        <p:cNvPr id="1" name=""/>
+        <p:cNvGrpSpPr/>
+        <p:nvPr/>
+      </p:nvGrpSpPr>
+      <p:grpSpPr>
+        <a:xfrm>
+          <a:off x="0" y="0"/>
+          <a:ext cx="0" cy="0"/>
+          <a:chOff x="0" y="0"/>
+          <a:chExt cx="0" cy="0"/>
+        </a:xfrm>
+      </p:grpSpPr>
+      <p:sp>
+        <p:nvSpPr>
+          <p:cNvPr id="2" name="Title 1">
+            <a:extLst>
+              <a:ext uri="{FF2B5EF4-FFF2-40B4-BE49-F238E27FC236}">
+                <a16:creationId xmlns:a16="http://schemas.microsoft.com/office/drawing/2014/main" id="{A70596B8-1AE2-D719-42F2-C6C214BAF936}"/>
+              </a:ext>
+            </a:extLst>
+          </p:cNvPr>
+          <p:cNvSpPr>
+            <a:spLocks noGrp="1"/>
+          </p:cNvSpPr>
+          <p:nvPr>
+            <p:ph type="title"/>
+          </p:nvPr>
+        </p:nvSpPr>
+        <p:spPr/>
+        <p:txBody>
+          <a:bodyPr/>
+          <a:lstStyle/>
+          <a:p>
+            <a:r>
+              <a:rPr lang="en-US" dirty="0" err="1"/>
+              <a:t>Dynamisk</a:t>
+            </a:r>
+            <a:r>
+              <a:rPr lang="en-US" dirty="0"/>
+              <a:t> vs </a:t>
+            </a:r>
+            <a:r>
+              <a:rPr lang="en-US" dirty="0" err="1"/>
+              <a:t>statisk</a:t>
+            </a:r>
+            <a:endParaRPr lang="en-US" dirty="0"/>
+          </a:p>
+        </p:txBody>
+      </p:sp>
+      <p:sp>
+        <p:nvSpPr>
+          <p:cNvPr id="3" name="Content Placeholder 2">
+            <a:extLst>
+              <a:ext uri="{FF2B5EF4-FFF2-40B4-BE49-F238E27FC236}">
+                <a16:creationId xmlns:a16="http://schemas.microsoft.com/office/drawing/2014/main" id="{147382DE-5ECD-5C3F-8451-DC3D93F88049}"/>
+              </a:ext>
+            </a:extLst>
+          </p:cNvPr>
+          <p:cNvSpPr>
+            <a:spLocks noGrp="1"/>
+          </p:cNvSpPr>
+          <p:nvPr>
+            <p:ph idx="1"/>
+          </p:nvPr>
+        </p:nvSpPr>
+        <p:spPr/>
+        <p:txBody>
+          <a:bodyPr/>
+          <a:lstStyle/>
+          <a:p>
+            <a:r>
+              <a:rPr lang="en-US" dirty="0"/>
+              <a:t>I din </a:t>
+            </a:r>
+            <a:r>
+              <a:rPr lang="en-US" dirty="0" err="1"/>
+              <a:t>kode</a:t>
+            </a:r>
+            <a:r>
+              <a:rPr lang="en-US" dirty="0"/>
+              <a:t>, </a:t>
+            </a:r>
+            <a:r>
+              <a:rPr lang="en-US" dirty="0" err="1"/>
+              <a:t>oppdater</a:t>
+            </a:r>
+            <a:r>
+              <a:rPr lang="en-US" dirty="0"/>
+              <a:t> </a:t>
+            </a:r>
+            <a:r>
+              <a:rPr lang="en-US" dirty="0" err="1"/>
+              <a:t>navnet</a:t>
+            </a:r>
+            <a:r>
+              <a:rPr lang="en-US" dirty="0"/>
+              <a:t> </a:t>
+            </a:r>
+            <a:r>
+              <a:rPr lang="en-US" dirty="0" err="1"/>
+              <a:t>til</a:t>
+            </a:r>
+            <a:r>
+              <a:rPr lang="en-US" dirty="0"/>
+              <a:t> </a:t>
+            </a:r>
+            <a:r>
+              <a:rPr lang="en-US" dirty="0" err="1"/>
+              <a:t>personen</a:t>
+            </a:r>
+            <a:r>
+              <a:rPr lang="en-US" dirty="0"/>
+              <a:t> for </a:t>
+            </a:r>
+            <a:r>
+              <a:rPr lang="en-US" dirty="0" err="1"/>
+              <a:t>hver</a:t>
+            </a:r>
+            <a:r>
+              <a:rPr lang="en-US" dirty="0"/>
+              <a:t> </a:t>
+            </a:r>
+            <a:r>
+              <a:rPr lang="en-US" dirty="0" err="1"/>
+              <a:t>fakta</a:t>
+            </a:r>
+            <a:r>
+              <a:rPr lang="en-US" dirty="0"/>
+              <a:t> du </a:t>
+            </a:r>
+            <a:r>
+              <a:rPr lang="en-US" dirty="0" err="1"/>
+              <a:t>skrev</a:t>
+            </a:r>
+            <a:r>
+              <a:rPr lang="en-US" dirty="0"/>
+              <a:t>. </a:t>
+            </a:r>
+          </a:p>
+          <a:p>
+            <a:r>
+              <a:rPr lang="en-US" dirty="0" err="1"/>
+              <a:t>F.eks</a:t>
+            </a:r>
+            <a:r>
+              <a:rPr lang="en-US" dirty="0"/>
+              <a:t>: </a:t>
+            </a:r>
+            <a:r>
+              <a:rPr lang="en-US" dirty="0" err="1"/>
+              <a:t>endre</a:t>
+            </a:r>
+            <a:r>
+              <a:rPr lang="en-US" dirty="0"/>
+              <a:t> </a:t>
+            </a:r>
+            <a:r>
+              <a:rPr lang="en-US" dirty="0" err="1"/>
+              <a:t>navnet</a:t>
+            </a:r>
+            <a:r>
+              <a:rPr lang="en-US" dirty="0"/>
+              <a:t> </a:t>
+            </a:r>
+            <a:r>
+              <a:rPr lang="en-US" dirty="0" err="1"/>
+              <a:t>fra</a:t>
+            </a:r>
+            <a:r>
+              <a:rPr lang="en-US" dirty="0"/>
+              <a:t> Martin </a:t>
+            </a:r>
+            <a:r>
+              <a:rPr lang="en-US" dirty="0" err="1"/>
+              <a:t>til</a:t>
+            </a:r>
+            <a:r>
+              <a:rPr lang="en-US" dirty="0"/>
+              <a:t> </a:t>
+            </a:r>
+            <a:r>
+              <a:rPr lang="en-US" dirty="0" err="1"/>
+              <a:t>Snørre</a:t>
+            </a:r>
+            <a:r>
+              <a:rPr lang="en-US" dirty="0"/>
+              <a:t> </a:t>
+            </a:r>
+            <a:r>
+              <a:rPr lang="en-US" dirty="0" err="1"/>
+              <a:t>Snurlandson</a:t>
+            </a:r>
+            <a:endParaRPr lang="en-US" dirty="0"/>
+          </a:p>
+          <a:p>
+            <a:pPr marL="0" indent="0">
+              <a:buNone/>
+            </a:pPr>
+            <a:endParaRPr lang="en-US" dirty="0"/>
+          </a:p>
+        </p:txBody>
+      </p:sp>
+      <p:pic>
+        <p:nvPicPr>
+          <p:cNvPr id="5" name="Picture 4">
+            <a:extLst>
+              <a:ext uri="{FF2B5EF4-FFF2-40B4-BE49-F238E27FC236}">
+                <a16:creationId xmlns:a16="http://schemas.microsoft.com/office/drawing/2014/main" id="{1B24F6F4-9A15-6566-F67A-3BE09DF3A988}"/>
+              </a:ext>
+            </a:extLst>
+          </p:cNvPr>
+          <p:cNvPicPr>
+            <a:picLocks noChangeAspect="1"/>
+          </p:cNvPicPr>
+          <p:nvPr/>
+        </p:nvPicPr>
+        <p:blipFill>
+          <a:blip r:embed="rId2"/>
+          <a:stretch>
+            <a:fillRect/>
+          </a:stretch>
+        </p:blipFill>
+        <p:spPr>
+          <a:xfrm>
+            <a:off x="932581" y="4183720"/>
+            <a:ext cx="4648849" cy="981212"/>
+          </a:xfrm>
+          <a:prstGeom prst="rect">
+            <a:avLst/>
+          </a:prstGeom>
+        </p:spPr>
+      </p:pic>
+    </p:spTree>
+    <p:extLst>
+      <p:ext uri="{BB962C8B-B14F-4D97-AF65-F5344CB8AC3E}">
+        <p14:creationId xmlns:p14="http://schemas.microsoft.com/office/powerpoint/2010/main" val="1200427163"/>
+      </p:ext>
+    </p:extLst>
+  </p:cSld>
+  <p:clrMapOvr>
+    <a:masterClrMapping/>
+  </p:clrMapOvr>
+</p:sld>
+</file>
+
+<file path=ppt/slides/slide23.xml><?xml version="1.0" encoding="utf-8"?>
+<p:sld xmlns:a="http://schemas.openxmlformats.org/drawingml/2006/main" xmlns:r="http://schemas.openxmlformats.org/officeDocument/2006/relationships" xmlns:p="http://schemas.openxmlformats.org/presentationml/2006/main">
+  <p:cSld>
+    <p:spTree>
+      <p:nvGrpSpPr>
+        <p:cNvPr id="1" name=""/>
+        <p:cNvGrpSpPr/>
+        <p:nvPr/>
+      </p:nvGrpSpPr>
+      <p:grpSpPr>
+        <a:xfrm>
+          <a:off x="0" y="0"/>
+          <a:ext cx="0" cy="0"/>
+          <a:chOff x="0" y="0"/>
+          <a:chExt cx="0" cy="0"/>
+        </a:xfrm>
+      </p:grpSpPr>
+      <p:sp>
+        <p:nvSpPr>
+          <p:cNvPr id="2" name="Title 1">
+            <a:extLst>
+              <a:ext uri="{FF2B5EF4-FFF2-40B4-BE49-F238E27FC236}">
+                <a16:creationId xmlns:a16="http://schemas.microsoft.com/office/drawing/2014/main" id="{865DE95A-4FE3-530D-318F-9A40B783B618}"/>
+              </a:ext>
+            </a:extLst>
+          </p:cNvPr>
+          <p:cNvSpPr>
+            <a:spLocks noGrp="1"/>
+          </p:cNvSpPr>
+          <p:nvPr>
+            <p:ph type="title"/>
+          </p:nvPr>
+        </p:nvSpPr>
+        <p:spPr/>
+        <p:txBody>
+          <a:bodyPr/>
+          <a:lstStyle/>
+          <a:p>
+            <a:r>
+              <a:rPr lang="en-US" dirty="0" err="1"/>
+              <a:t>Dynamisk</a:t>
+            </a:r>
+            <a:r>
+              <a:rPr lang="en-US" dirty="0"/>
+              <a:t> vs </a:t>
+            </a:r>
+            <a:r>
+              <a:rPr lang="en-US" dirty="0" err="1"/>
+              <a:t>statisk</a:t>
+            </a:r>
+            <a:endParaRPr lang="en-US" dirty="0"/>
+          </a:p>
+        </p:txBody>
+      </p:sp>
+      <p:sp>
+        <p:nvSpPr>
+          <p:cNvPr id="3" name="Content Placeholder 2">
+            <a:extLst>
+              <a:ext uri="{FF2B5EF4-FFF2-40B4-BE49-F238E27FC236}">
+                <a16:creationId xmlns:a16="http://schemas.microsoft.com/office/drawing/2014/main" id="{600EAB19-2527-6C77-B0D5-47E4AC0447C2}"/>
+              </a:ext>
+            </a:extLst>
+          </p:cNvPr>
+          <p:cNvSpPr>
+            <a:spLocks noGrp="1"/>
+          </p:cNvSpPr>
+          <p:nvPr>
+            <p:ph idx="1"/>
+          </p:nvPr>
+        </p:nvSpPr>
+        <p:spPr/>
+        <p:txBody>
+          <a:bodyPr/>
+          <a:lstStyle/>
+          <a:p>
+            <a:r>
+              <a:rPr lang="en-US" dirty="0"/>
+              <a:t>Dette </a:t>
+            </a:r>
+            <a:r>
+              <a:rPr lang="en-US" dirty="0" err="1"/>
+              <a:t>kaller</a:t>
+            </a:r>
+            <a:r>
+              <a:rPr lang="en-US" dirty="0"/>
+              <a:t> vi “Hardcoded / hardcoded”</a:t>
+            </a:r>
+          </a:p>
+          <a:p>
+            <a:r>
+              <a:rPr lang="en-US" dirty="0"/>
+              <a:t>Vi </a:t>
+            </a:r>
+            <a:r>
+              <a:rPr lang="en-US" dirty="0" err="1"/>
+              <a:t>vil</a:t>
+            </a:r>
+            <a:r>
+              <a:rPr lang="en-US" dirty="0"/>
+              <a:t> ha </a:t>
+            </a:r>
+            <a:r>
+              <a:rPr lang="en-US" dirty="0" err="1"/>
+              <a:t>dynamisk</a:t>
+            </a:r>
+            <a:r>
+              <a:rPr lang="en-US" dirty="0"/>
+              <a:t> </a:t>
+            </a:r>
+            <a:r>
+              <a:rPr lang="en-US" dirty="0" err="1"/>
+              <a:t>kode</a:t>
+            </a:r>
+            <a:r>
+              <a:rPr lang="en-US" dirty="0"/>
+              <a:t>/data, </a:t>
+            </a:r>
+            <a:r>
+              <a:rPr lang="en-US" dirty="0" err="1"/>
+              <a:t>som</a:t>
+            </a:r>
+            <a:r>
+              <a:rPr lang="en-US" dirty="0"/>
+              <a:t> </a:t>
+            </a:r>
+            <a:r>
+              <a:rPr lang="en-US" dirty="0" err="1"/>
+              <a:t>kan</a:t>
+            </a:r>
+            <a:r>
+              <a:rPr lang="en-US" dirty="0"/>
+              <a:t> </a:t>
+            </a:r>
+            <a:r>
+              <a:rPr lang="en-US" dirty="0" err="1"/>
+              <a:t>gjenbrukes</a:t>
+            </a:r>
+            <a:r>
+              <a:rPr lang="en-US" dirty="0"/>
+              <a:t>!</a:t>
+            </a:r>
+          </a:p>
+          <a:p>
+            <a:r>
+              <a:rPr lang="en-US" dirty="0"/>
+              <a:t>Lag </a:t>
+            </a:r>
+            <a:r>
+              <a:rPr lang="en-US" dirty="0" err="1"/>
+              <a:t>variabler</a:t>
+            </a:r>
+            <a:r>
+              <a:rPr lang="en-US" dirty="0"/>
+              <a:t> </a:t>
+            </a:r>
+            <a:r>
+              <a:rPr lang="en-US" dirty="0" err="1"/>
+              <a:t>som</a:t>
+            </a:r>
+            <a:r>
+              <a:rPr lang="en-US" dirty="0"/>
+              <a:t> </a:t>
+            </a:r>
+            <a:r>
+              <a:rPr lang="en-US" dirty="0" err="1"/>
+              <a:t>kan</a:t>
+            </a:r>
+            <a:r>
+              <a:rPr lang="en-US" dirty="0"/>
+              <a:t> </a:t>
+            </a:r>
+            <a:r>
+              <a:rPr lang="en-US" dirty="0" err="1"/>
+              <a:t>huske</a:t>
+            </a:r>
+            <a:r>
+              <a:rPr lang="en-US" dirty="0"/>
+              <a:t> </a:t>
+            </a:r>
+            <a:r>
+              <a:rPr lang="en-US" dirty="0" err="1"/>
+              <a:t>følgene</a:t>
+            </a:r>
+            <a:r>
+              <a:rPr lang="en-US" dirty="0"/>
+              <a:t> </a:t>
+            </a:r>
+            <a:r>
+              <a:rPr lang="en-US" dirty="0" err="1"/>
+              <a:t>informasjon</a:t>
+            </a:r>
+            <a:r>
+              <a:rPr lang="en-US" dirty="0"/>
+              <a:t> om deg </a:t>
+            </a:r>
+            <a:r>
+              <a:rPr lang="en-US" dirty="0" err="1"/>
+              <a:t>selv</a:t>
+            </a:r>
+            <a:r>
+              <a:rPr lang="en-US" dirty="0"/>
+              <a:t>:</a:t>
+            </a:r>
+          </a:p>
+          <a:p>
+            <a:pPr lvl="1"/>
+            <a:r>
+              <a:rPr lang="en-US" dirty="0" err="1"/>
+              <a:t>Navn</a:t>
+            </a:r>
+            <a:endParaRPr lang="en-US" dirty="0"/>
+          </a:p>
+          <a:p>
+            <a:pPr lvl="1"/>
+            <a:r>
+              <a:rPr lang="en-US" dirty="0"/>
+              <a:t>Alder</a:t>
+            </a:r>
+          </a:p>
+          <a:p>
+            <a:pPr lvl="1"/>
+            <a:r>
+              <a:rPr lang="en-US" dirty="0"/>
+              <a:t>Stilling</a:t>
+            </a:r>
+          </a:p>
+          <a:p>
+            <a:pPr lvl="1"/>
+            <a:r>
+              <a:rPr lang="en-US" dirty="0"/>
+              <a:t>“</a:t>
+            </a:r>
+            <a:r>
+              <a:rPr lang="en-US" dirty="0" err="1"/>
+              <a:t>nåværende</a:t>
+            </a:r>
+            <a:r>
+              <a:rPr lang="en-US" dirty="0"/>
+              <a:t> </a:t>
+            </a:r>
+            <a:r>
+              <a:rPr lang="en-US" dirty="0" err="1"/>
+              <a:t>lønn</a:t>
+            </a:r>
+            <a:r>
+              <a:rPr lang="en-US" dirty="0"/>
+              <a:t>”</a:t>
+            </a:r>
+          </a:p>
+          <a:p>
+            <a:pPr lvl="1"/>
+            <a:r>
+              <a:rPr lang="en-US" dirty="0"/>
+              <a:t>“</a:t>
+            </a:r>
+            <a:r>
+              <a:rPr lang="en-US" dirty="0" err="1"/>
+              <a:t>ønsket</a:t>
+            </a:r>
+            <a:r>
+              <a:rPr lang="en-US" dirty="0"/>
+              <a:t> </a:t>
+            </a:r>
+            <a:r>
+              <a:rPr lang="en-US" dirty="0" err="1"/>
+              <a:t>lønn</a:t>
+            </a:r>
+            <a:r>
+              <a:rPr lang="en-US" dirty="0"/>
+              <a:t>”</a:t>
+            </a:r>
+          </a:p>
+        </p:txBody>
+      </p:sp>
+    </p:spTree>
+    <p:extLst>
+      <p:ext uri="{BB962C8B-B14F-4D97-AF65-F5344CB8AC3E}">
+        <p14:creationId xmlns:p14="http://schemas.microsoft.com/office/powerpoint/2010/main" val="3827437478"/>
+      </p:ext>
+    </p:extLst>
+  </p:cSld>
+  <p:clrMapOvr>
+    <a:masterClrMapping/>
+  </p:clrMapOvr>
+</p:sld>
+</file>
+
+<file path=ppt/slides/slide24.xml><?xml version="1.0" encoding="utf-8"?>
+<p:sld xmlns:a="http://schemas.openxmlformats.org/drawingml/2006/main" xmlns:r="http://schemas.openxmlformats.org/officeDocument/2006/relationships" xmlns:p="http://schemas.openxmlformats.org/presentationml/2006/main">
+  <p:cSld>
+    <p:spTree>
+      <p:nvGrpSpPr>
+        <p:cNvPr id="1" name=""/>
+        <p:cNvGrpSpPr/>
+        <p:nvPr/>
+      </p:nvGrpSpPr>
+      <p:grpSpPr>
+        <a:xfrm>
+          <a:off x="0" y="0"/>
+          <a:ext cx="0" cy="0"/>
+          <a:chOff x="0" y="0"/>
+          <a:chExt cx="0" cy="0"/>
+        </a:xfrm>
+      </p:grpSpPr>
+      <p:sp>
+        <p:nvSpPr>
+          <p:cNvPr id="2" name="Title 1">
+            <a:extLst>
+              <a:ext uri="{FF2B5EF4-FFF2-40B4-BE49-F238E27FC236}">
+                <a16:creationId xmlns:a16="http://schemas.microsoft.com/office/drawing/2014/main" id="{14437D4C-573A-E0F6-7C55-330880B1BBAC}"/>
+              </a:ext>
+            </a:extLst>
+          </p:cNvPr>
+          <p:cNvSpPr>
+            <a:spLocks noGrp="1"/>
+          </p:cNvSpPr>
+          <p:nvPr>
+            <p:ph type="title"/>
+          </p:nvPr>
+        </p:nvSpPr>
+        <p:spPr/>
+        <p:txBody>
+          <a:bodyPr/>
+          <a:lstStyle/>
+          <a:p>
+            <a:r>
+              <a:rPr lang="en-US" dirty="0" err="1"/>
+              <a:t>Dynamisk</a:t>
+            </a:r>
+            <a:r>
+              <a:rPr lang="en-US" dirty="0"/>
+              <a:t> print()</a:t>
+            </a:r>
+          </a:p>
+        </p:txBody>
+      </p:sp>
+      <p:sp>
+        <p:nvSpPr>
+          <p:cNvPr id="3" name="Content Placeholder 2">
+            <a:extLst>
+              <a:ext uri="{FF2B5EF4-FFF2-40B4-BE49-F238E27FC236}">
+                <a16:creationId xmlns:a16="http://schemas.microsoft.com/office/drawing/2014/main" id="{0419B363-1DC2-8BDA-C702-A594BD850146}"/>
+              </a:ext>
+            </a:extLst>
+          </p:cNvPr>
+          <p:cNvSpPr>
+            <a:spLocks noGrp="1"/>
+          </p:cNvSpPr>
+          <p:nvPr>
+            <p:ph idx="1"/>
+          </p:nvPr>
+        </p:nvSpPr>
+        <p:spPr/>
+        <p:txBody>
+          <a:bodyPr/>
+          <a:lstStyle/>
+          <a:p>
+            <a:r>
+              <a:rPr lang="en-US" dirty="0" err="1"/>
+              <a:t>Erstatt</a:t>
+            </a:r>
+            <a:r>
+              <a:rPr lang="en-US" dirty="0"/>
+              <a:t> det hardcoded </a:t>
+            </a:r>
+            <a:r>
+              <a:rPr lang="en-US" dirty="0" err="1"/>
+              <a:t>navnet</a:t>
+            </a:r>
+            <a:r>
+              <a:rPr lang="en-US" dirty="0"/>
+              <a:t> </a:t>
+            </a:r>
+            <a:r>
+              <a:rPr lang="en-US" dirty="0" err="1"/>
+              <a:t>i</a:t>
+            </a:r>
+            <a:r>
+              <a:rPr lang="en-US" dirty="0"/>
+              <a:t> din print </a:t>
+            </a:r>
+            <a:r>
+              <a:rPr lang="en-US" dirty="0" err="1"/>
+              <a:t>funksjoner</a:t>
+            </a:r>
+            <a:r>
+              <a:rPr lang="en-US" dirty="0"/>
+              <a:t> med </a:t>
+            </a:r>
+            <a:r>
+              <a:rPr lang="en-US" dirty="0" err="1"/>
+              <a:t>navn</a:t>
+            </a:r>
+            <a:r>
+              <a:rPr lang="en-US" dirty="0"/>
+              <a:t> </a:t>
+            </a:r>
+            <a:r>
+              <a:rPr lang="en-US" dirty="0" err="1"/>
+              <a:t>variabelen</a:t>
+            </a:r>
+            <a:r>
+              <a:rPr lang="en-US" dirty="0"/>
+              <a:t>!</a:t>
+            </a:r>
+          </a:p>
+          <a:p>
+            <a:pPr marL="0" indent="0">
+              <a:buNone/>
+            </a:pPr>
+            <a:endParaRPr lang="en-US" dirty="0"/>
+          </a:p>
+        </p:txBody>
+      </p:sp>
+      <p:pic>
+        <p:nvPicPr>
+          <p:cNvPr id="5" name="Picture 4">
+            <a:extLst>
+              <a:ext uri="{FF2B5EF4-FFF2-40B4-BE49-F238E27FC236}">
+                <a16:creationId xmlns:a16="http://schemas.microsoft.com/office/drawing/2014/main" id="{27BE7581-AA72-33AB-9998-C4B15FE2046B}"/>
+              </a:ext>
+            </a:extLst>
+          </p:cNvPr>
+          <p:cNvPicPr>
+            <a:picLocks noChangeAspect="1"/>
+          </p:cNvPicPr>
+          <p:nvPr/>
+        </p:nvPicPr>
+        <p:blipFill>
+          <a:blip r:embed="rId3"/>
+          <a:stretch>
+            <a:fillRect/>
+          </a:stretch>
+        </p:blipFill>
+        <p:spPr>
+          <a:xfrm>
+            <a:off x="977418" y="4134454"/>
+            <a:ext cx="4858953" cy="904906"/>
+          </a:xfrm>
+          <a:prstGeom prst="rect">
+            <a:avLst/>
+          </a:prstGeom>
+        </p:spPr>
+      </p:pic>
+    </p:spTree>
+    <p:extLst>
+      <p:ext uri="{BB962C8B-B14F-4D97-AF65-F5344CB8AC3E}">
+        <p14:creationId xmlns:p14="http://schemas.microsoft.com/office/powerpoint/2010/main" val="1558092430"/>
+      </p:ext>
+    </p:extLst>
+  </p:cSld>
+  <p:clrMapOvr>
+    <a:masterClrMapping/>
+  </p:clrMapOvr>
+</p:sld>
+</file>
+
+<file path=ppt/slides/slide25.xml><?xml version="1.0" encoding="utf-8"?>
+<p:sld xmlns:a="http://schemas.openxmlformats.org/drawingml/2006/main" xmlns:r="http://schemas.openxmlformats.org/officeDocument/2006/relationships" xmlns:p="http://schemas.openxmlformats.org/presentationml/2006/main">
+  <p:cSld>
+    <p:spTree>
+      <p:nvGrpSpPr>
+        <p:cNvPr id="1" name=""/>
+        <p:cNvGrpSpPr/>
+        <p:nvPr/>
+      </p:nvGrpSpPr>
+      <p:grpSpPr>
+        <a:xfrm>
+          <a:off x="0" y="0"/>
+          <a:ext cx="0" cy="0"/>
+          <a:chOff x="0" y="0"/>
+          <a:chExt cx="0" cy="0"/>
+        </a:xfrm>
+      </p:grpSpPr>
+      <p:sp>
+        <p:nvSpPr>
+          <p:cNvPr id="2" name="Title 1">
+            <a:extLst>
+              <a:ext uri="{FF2B5EF4-FFF2-40B4-BE49-F238E27FC236}">
+                <a16:creationId xmlns:a16="http://schemas.microsoft.com/office/drawing/2014/main" id="{EF91C368-9EDD-9597-8962-12FB7D4C49EC}"/>
+              </a:ext>
+            </a:extLst>
+          </p:cNvPr>
+          <p:cNvSpPr>
+            <a:spLocks noGrp="1"/>
+          </p:cNvSpPr>
+          <p:nvPr>
+            <p:ph type="title"/>
+          </p:nvPr>
+        </p:nvSpPr>
+        <p:spPr/>
+        <p:txBody>
+          <a:bodyPr/>
+          <a:lstStyle/>
+          <a:p>
+            <a:r>
+              <a:rPr lang="en-US" dirty="0" err="1"/>
+              <a:t>Dynamisk</a:t>
+            </a:r>
+            <a:r>
+              <a:rPr lang="en-US" dirty="0"/>
+              <a:t> print</a:t>
+            </a:r>
+          </a:p>
+        </p:txBody>
+      </p:sp>
+      <p:sp>
+        <p:nvSpPr>
+          <p:cNvPr id="3" name="Content Placeholder 2">
+            <a:extLst>
+              <a:ext uri="{FF2B5EF4-FFF2-40B4-BE49-F238E27FC236}">
+                <a16:creationId xmlns:a16="http://schemas.microsoft.com/office/drawing/2014/main" id="{746DAE08-574E-4490-6BDF-C74034B7256B}"/>
+              </a:ext>
+            </a:extLst>
+          </p:cNvPr>
+          <p:cNvSpPr>
+            <a:spLocks noGrp="1"/>
+          </p:cNvSpPr>
+          <p:nvPr>
+            <p:ph idx="1"/>
+          </p:nvPr>
+        </p:nvSpPr>
+        <p:spPr/>
+        <p:txBody>
+          <a:bodyPr/>
+          <a:lstStyle/>
+          <a:p>
+            <a:r>
+              <a:rPr lang="en-US" dirty="0"/>
+              <a:t>Lag </a:t>
+            </a:r>
+            <a:r>
+              <a:rPr lang="en-US" dirty="0" err="1"/>
+              <a:t>en</a:t>
+            </a:r>
+            <a:r>
+              <a:rPr lang="en-US" dirty="0"/>
+              <a:t> print </a:t>
+            </a:r>
+            <a:r>
+              <a:rPr lang="en-US" dirty="0" err="1"/>
+              <a:t>som</a:t>
+            </a:r>
+            <a:r>
+              <a:rPr lang="en-US" dirty="0"/>
+              <a:t> </a:t>
+            </a:r>
+            <a:r>
+              <a:rPr lang="en-US" dirty="0" err="1"/>
+              <a:t>bruker</a:t>
+            </a:r>
+            <a:r>
+              <a:rPr lang="en-US" dirty="0"/>
+              <a:t> alle </a:t>
+            </a:r>
+            <a:r>
+              <a:rPr lang="en-US" dirty="0" err="1"/>
+              <a:t>variablene</a:t>
+            </a:r>
+            <a:r>
+              <a:rPr lang="en-US" dirty="0"/>
+              <a:t> dine I </a:t>
+            </a:r>
+            <a:r>
+              <a:rPr lang="en-US" dirty="0" err="1"/>
+              <a:t>en</a:t>
+            </a:r>
+            <a:r>
+              <a:rPr lang="en-US" dirty="0"/>
+              <a:t> </a:t>
+            </a:r>
+            <a:r>
+              <a:rPr lang="en-US" dirty="0" err="1"/>
+              <a:t>setning</a:t>
+            </a:r>
+            <a:r>
+              <a:rPr lang="en-US" dirty="0"/>
+              <a:t>:</a:t>
+            </a:r>
+          </a:p>
+          <a:p>
+            <a:r>
+              <a:rPr lang="en-US" dirty="0" err="1"/>
+              <a:t>F.eks</a:t>
+            </a:r>
+            <a:r>
+              <a:rPr lang="en-US" dirty="0"/>
+              <a:t>:  </a:t>
+            </a:r>
+          </a:p>
+          <a:p>
+            <a:pPr marL="0" indent="0">
+              <a:buNone/>
+            </a:pPr>
+            <a:r>
+              <a:rPr lang="en-US" dirty="0"/>
+              <a:t>“</a:t>
+            </a:r>
+            <a:r>
+              <a:rPr lang="nb-NO" dirty="0"/>
+              <a:t>Mitt navn er Martin Jeg er 26 år gammel, min stilling i PIT er Utvikler min nåværende lønn er 700000 men, jeg ønsker en lønn på 10000000</a:t>
+            </a:r>
+            <a:r>
+              <a:rPr lang="en-US" dirty="0"/>
+              <a:t>”</a:t>
+            </a:r>
+          </a:p>
+        </p:txBody>
+      </p:sp>
+    </p:spTree>
+    <p:extLst>
+      <p:ext uri="{BB962C8B-B14F-4D97-AF65-F5344CB8AC3E}">
+        <p14:creationId xmlns:p14="http://schemas.microsoft.com/office/powerpoint/2010/main" val="1957394844"/>
+      </p:ext>
+    </p:extLst>
+  </p:cSld>
+  <p:clrMapOvr>
+    <a:masterClrMapping/>
+  </p:clrMapOvr>
+</p:sld>
+</file>
+
+<file path=ppt/slides/slide26.xml><?xml version="1.0" encoding="utf-8"?>
+<p:sld xmlns:a="http://schemas.openxmlformats.org/drawingml/2006/main" xmlns:r="http://schemas.openxmlformats.org/officeDocument/2006/relationships" xmlns:p="http://schemas.openxmlformats.org/presentationml/2006/main">
+  <p:cSld>
+    <p:spTree>
+      <p:nvGrpSpPr>
+        <p:cNvPr id="1" name=""/>
+        <p:cNvGrpSpPr/>
+        <p:nvPr/>
+      </p:nvGrpSpPr>
+      <p:grpSpPr>
+        <a:xfrm>
+          <a:off x="0" y="0"/>
+          <a:ext cx="0" cy="0"/>
+          <a:chOff x="0" y="0"/>
+          <a:chExt cx="0" cy="0"/>
+        </a:xfrm>
+      </p:grpSpPr>
+      <p:sp>
+        <p:nvSpPr>
+          <p:cNvPr id="2" name="Title 1">
+            <a:extLst>
+              <a:ext uri="{FF2B5EF4-FFF2-40B4-BE49-F238E27FC236}">
+                <a16:creationId xmlns:a16="http://schemas.microsoft.com/office/drawing/2014/main" id="{69BFACBD-DB06-5A18-5DA2-70AD3E6AC238}"/>
+              </a:ext>
+            </a:extLst>
+          </p:cNvPr>
+          <p:cNvSpPr>
+            <a:spLocks noGrp="1"/>
+          </p:cNvSpPr>
+          <p:nvPr>
+            <p:ph type="title"/>
+          </p:nvPr>
+        </p:nvSpPr>
+        <p:spPr/>
+        <p:txBody>
+          <a:bodyPr/>
+          <a:lstStyle/>
+          <a:p>
+            <a:r>
+              <a:rPr lang="en-US" dirty="0" err="1"/>
+              <a:t>Kontrol</a:t>
+            </a:r>
+            <a:r>
+              <a:rPr lang="en-US" dirty="0"/>
+              <a:t> </a:t>
+            </a:r>
+            <a:r>
+              <a:rPr lang="en-US" dirty="0" err="1"/>
+              <a:t>logikk</a:t>
+            </a:r>
+            <a:endParaRPr lang="en-US" dirty="0"/>
+          </a:p>
+        </p:txBody>
+      </p:sp>
+      <p:sp>
+        <p:nvSpPr>
+          <p:cNvPr id="3" name="Content Placeholder 2">
+            <a:extLst>
+              <a:ext uri="{FF2B5EF4-FFF2-40B4-BE49-F238E27FC236}">
+                <a16:creationId xmlns:a16="http://schemas.microsoft.com/office/drawing/2014/main" id="{CABA440B-2BB8-31A9-C38B-1298F8576705}"/>
+              </a:ext>
+            </a:extLst>
+          </p:cNvPr>
+          <p:cNvSpPr>
+            <a:spLocks noGrp="1"/>
+          </p:cNvSpPr>
+          <p:nvPr>
+            <p:ph idx="1"/>
+          </p:nvPr>
+        </p:nvSpPr>
+        <p:spPr/>
+        <p:txBody>
+          <a:bodyPr/>
+          <a:lstStyle/>
+          <a:p>
+            <a:r>
+              <a:rPr lang="en-US" dirty="0" err="1"/>
+              <a:t>Kontrol</a:t>
+            </a:r>
+            <a:r>
+              <a:rPr lang="en-US" dirty="0"/>
+              <a:t> </a:t>
+            </a:r>
+            <a:r>
+              <a:rPr lang="en-US" dirty="0" err="1"/>
+              <a:t>logikk</a:t>
+            </a:r>
+            <a:r>
+              <a:rPr lang="en-US" dirty="0"/>
+              <a:t>: </a:t>
+            </a:r>
+            <a:r>
+              <a:rPr lang="en-US" dirty="0" err="1"/>
+              <a:t>Regler</a:t>
+            </a:r>
+            <a:r>
+              <a:rPr lang="en-US" dirty="0"/>
+              <a:t> </a:t>
+            </a:r>
+            <a:r>
+              <a:rPr lang="en-US" dirty="0" err="1"/>
+              <a:t>og</a:t>
+            </a:r>
+            <a:r>
+              <a:rPr lang="en-US" dirty="0"/>
+              <a:t> </a:t>
+            </a:r>
+            <a:r>
+              <a:rPr lang="en-US" dirty="0" err="1"/>
+              <a:t>normer</a:t>
+            </a:r>
+            <a:r>
+              <a:rPr lang="en-US" dirty="0"/>
+              <a:t> for </a:t>
+            </a:r>
+            <a:r>
+              <a:rPr lang="en-US" dirty="0" err="1"/>
+              <a:t>vårt</a:t>
+            </a:r>
+            <a:r>
+              <a:rPr lang="en-US" dirty="0"/>
+              <a:t> program. </a:t>
+            </a:r>
+          </a:p>
+          <a:p>
+            <a:r>
+              <a:rPr lang="en-US" dirty="0"/>
+              <a:t>3 </a:t>
+            </a:r>
+            <a:r>
+              <a:rPr lang="en-US" dirty="0" err="1"/>
+              <a:t>nøkkelord</a:t>
+            </a:r>
+            <a:r>
+              <a:rPr lang="en-US" dirty="0"/>
+              <a:t>:</a:t>
+            </a:r>
+          </a:p>
+          <a:p>
+            <a:pPr lvl="1"/>
+            <a:r>
+              <a:rPr lang="en-US" dirty="0"/>
+              <a:t>if </a:t>
+            </a:r>
+          </a:p>
+          <a:p>
+            <a:pPr lvl="1"/>
+            <a:r>
+              <a:rPr lang="en-US" dirty="0" err="1"/>
+              <a:t>elif</a:t>
+            </a:r>
+            <a:r>
+              <a:rPr lang="en-US" dirty="0"/>
+              <a:t> (else if)</a:t>
+            </a:r>
+          </a:p>
+          <a:p>
+            <a:pPr lvl="1"/>
+            <a:r>
+              <a:rPr lang="en-US" dirty="0"/>
+              <a:t>else</a:t>
+            </a:r>
+          </a:p>
+        </p:txBody>
+      </p:sp>
+    </p:spTree>
+    <p:extLst>
+      <p:ext uri="{BB962C8B-B14F-4D97-AF65-F5344CB8AC3E}">
+        <p14:creationId xmlns:p14="http://schemas.microsoft.com/office/powerpoint/2010/main" val="2418039450"/>
+      </p:ext>
+    </p:extLst>
+  </p:cSld>
+  <p:clrMapOvr>
+    <a:masterClrMapping/>
+  </p:clrMapOvr>
+</p:sld>
+</file>
+
+<file path=ppt/slides/slide27.xml><?xml version="1.0" encoding="utf-8"?>
+<p:sld xmlns:a="http://schemas.openxmlformats.org/drawingml/2006/main" xmlns:r="http://schemas.openxmlformats.org/officeDocument/2006/relationships" xmlns:p="http://schemas.openxmlformats.org/presentationml/2006/main">
+  <p:cSld>
+    <p:spTree>
+      <p:nvGrpSpPr>
+        <p:cNvPr id="1" name=""/>
+        <p:cNvGrpSpPr/>
+        <p:nvPr/>
+      </p:nvGrpSpPr>
+      <p:grpSpPr>
+        <a:xfrm>
+          <a:off x="0" y="0"/>
+          <a:ext cx="0" cy="0"/>
+          <a:chOff x="0" y="0"/>
+          <a:chExt cx="0" cy="0"/>
+        </a:xfrm>
+      </p:grpSpPr>
+      <p:sp>
+        <p:nvSpPr>
+          <p:cNvPr id="2" name="Title 1">
+            <a:extLst>
+              <a:ext uri="{FF2B5EF4-FFF2-40B4-BE49-F238E27FC236}">
+                <a16:creationId xmlns:a16="http://schemas.microsoft.com/office/drawing/2014/main" id="{7120B945-499F-6915-B922-7A76C427C042}"/>
+              </a:ext>
+            </a:extLst>
+          </p:cNvPr>
+          <p:cNvSpPr>
+            <a:spLocks noGrp="1"/>
+          </p:cNvSpPr>
+          <p:nvPr>
+            <p:ph type="title"/>
+          </p:nvPr>
+        </p:nvSpPr>
+        <p:spPr/>
+        <p:txBody>
+          <a:bodyPr/>
+          <a:lstStyle/>
+          <a:p>
+            <a:r>
+              <a:rPr lang="en-US" dirty="0"/>
+              <a:t>If statement</a:t>
+            </a:r>
+          </a:p>
+        </p:txBody>
+      </p:sp>
+      <p:sp>
+        <p:nvSpPr>
+          <p:cNvPr id="3" name="Content Placeholder 2">
+            <a:extLst>
+              <a:ext uri="{FF2B5EF4-FFF2-40B4-BE49-F238E27FC236}">
+                <a16:creationId xmlns:a16="http://schemas.microsoft.com/office/drawing/2014/main" id="{C509F5A3-EB29-1B76-D634-0A7800E6C274}"/>
+              </a:ext>
+            </a:extLst>
+          </p:cNvPr>
+          <p:cNvSpPr>
+            <a:spLocks noGrp="1"/>
+          </p:cNvSpPr>
+          <p:nvPr>
+            <p:ph idx="1"/>
+          </p:nvPr>
+        </p:nvSpPr>
+        <p:spPr/>
+        <p:txBody>
+          <a:bodyPr/>
+          <a:lstStyle/>
+          <a:p>
+            <a:pPr marL="0" indent="0">
+              <a:buNone/>
+            </a:pPr>
+            <a:endParaRPr lang="en-US" dirty="0"/>
+          </a:p>
+        </p:txBody>
+      </p:sp>
+      <p:pic>
+        <p:nvPicPr>
+          <p:cNvPr id="11" name="Picture 10">
+            <a:extLst>
+              <a:ext uri="{FF2B5EF4-FFF2-40B4-BE49-F238E27FC236}">
+                <a16:creationId xmlns:a16="http://schemas.microsoft.com/office/drawing/2014/main" id="{6DB4FEFD-556F-C14E-72CC-CD5C02FBC9CA}"/>
+              </a:ext>
+            </a:extLst>
+          </p:cNvPr>
+          <p:cNvPicPr>
+            <a:picLocks noChangeAspect="1"/>
+          </p:cNvPicPr>
+          <p:nvPr/>
+        </p:nvPicPr>
+        <p:blipFill>
+          <a:blip r:embed="rId3"/>
+          <a:stretch>
+            <a:fillRect/>
+          </a:stretch>
+        </p:blipFill>
+        <p:spPr>
+          <a:xfrm>
+            <a:off x="2834640" y="2546624"/>
+            <a:ext cx="6745653" cy="2665456"/>
+          </a:xfrm>
+          <a:prstGeom prst="rect">
+            <a:avLst/>
+          </a:prstGeom>
+        </p:spPr>
+      </p:pic>
+    </p:spTree>
+    <p:extLst>
+      <p:ext uri="{BB962C8B-B14F-4D97-AF65-F5344CB8AC3E}">
+        <p14:creationId xmlns:p14="http://schemas.microsoft.com/office/powerpoint/2010/main" val="2769731117"/>
+      </p:ext>
+    </p:extLst>
+  </p:cSld>
+  <p:clrMapOvr>
+    <a:masterClrMapping/>
+  </p:clrMapOvr>
+</p:sld>
+</file>
+
+<file path=ppt/slides/slide28.xml><?xml version="1.0" encoding="utf-8"?>
+<p:sld xmlns:a="http://schemas.openxmlformats.org/drawingml/2006/main" xmlns:r="http://schemas.openxmlformats.org/officeDocument/2006/relationships" xmlns:p="http://schemas.openxmlformats.org/presentationml/2006/main">
+  <p:cSld>
+    <p:spTree>
+      <p:nvGrpSpPr>
+        <p:cNvPr id="1" name=""/>
+        <p:cNvGrpSpPr/>
+        <p:nvPr/>
+      </p:nvGrpSpPr>
+      <p:grpSpPr>
+        <a:xfrm>
+          <a:off x="0" y="0"/>
+          <a:ext cx="0" cy="0"/>
+          <a:chOff x="0" y="0"/>
+          <a:chExt cx="0" cy="0"/>
+        </a:xfrm>
+      </p:grpSpPr>
+      <p:sp>
+        <p:nvSpPr>
+          <p:cNvPr id="2" name="Title 1">
+            <a:extLst>
+              <a:ext uri="{FF2B5EF4-FFF2-40B4-BE49-F238E27FC236}">
+                <a16:creationId xmlns:a16="http://schemas.microsoft.com/office/drawing/2014/main" id="{89450F8C-2F98-F9C9-4B95-266C765280F0}"/>
+              </a:ext>
+            </a:extLst>
+          </p:cNvPr>
+          <p:cNvSpPr>
+            <a:spLocks noGrp="1"/>
+          </p:cNvSpPr>
+          <p:nvPr>
+            <p:ph type="title"/>
+          </p:nvPr>
+        </p:nvSpPr>
+        <p:spPr/>
+        <p:txBody>
+          <a:bodyPr/>
+          <a:lstStyle/>
+          <a:p>
+            <a:r>
+              <a:rPr lang="en-US" dirty="0" err="1"/>
+              <a:t>Elif</a:t>
+            </a:r>
+            <a:r>
+              <a:rPr lang="en-US" dirty="0"/>
+              <a:t> (else if)</a:t>
+            </a:r>
+          </a:p>
+        </p:txBody>
+      </p:sp>
+      <p:sp>
+        <p:nvSpPr>
+          <p:cNvPr id="6" name="Content Placeholder 5">
+            <a:extLst>
+              <a:ext uri="{FF2B5EF4-FFF2-40B4-BE49-F238E27FC236}">
+                <a16:creationId xmlns:a16="http://schemas.microsoft.com/office/drawing/2014/main" id="{607ECEDF-AE01-6250-C50B-35F790848527}"/>
+              </a:ext>
+            </a:extLst>
+          </p:cNvPr>
+          <p:cNvSpPr>
+            <a:spLocks noGrp="1"/>
+          </p:cNvSpPr>
+          <p:nvPr>
+            <p:ph idx="1"/>
+          </p:nvPr>
+        </p:nvSpPr>
+        <p:spPr/>
+        <p:txBody>
+          <a:bodyPr/>
+          <a:lstStyle/>
+          <a:p>
+            <a:endParaRPr lang="en-US"/>
+          </a:p>
+        </p:txBody>
+      </p:sp>
+      <p:pic>
+        <p:nvPicPr>
+          <p:cNvPr id="12" name="Picture 11">
+            <a:extLst>
+              <a:ext uri="{FF2B5EF4-FFF2-40B4-BE49-F238E27FC236}">
+                <a16:creationId xmlns:a16="http://schemas.microsoft.com/office/drawing/2014/main" id="{AB8BC46F-5FBF-54FF-58F8-1AB13C9EF022}"/>
+              </a:ext>
+            </a:extLst>
+          </p:cNvPr>
+          <p:cNvPicPr>
+            <a:picLocks noChangeAspect="1"/>
+          </p:cNvPicPr>
+          <p:nvPr/>
+        </p:nvPicPr>
+        <p:blipFill>
+          <a:blip r:embed="rId3"/>
+          <a:stretch>
+            <a:fillRect/>
+          </a:stretch>
+        </p:blipFill>
+        <p:spPr>
+          <a:xfrm>
+            <a:off x="2232385" y="2281021"/>
+            <a:ext cx="7727227" cy="3477251"/>
+          </a:xfrm>
+          <a:prstGeom prst="rect">
+            <a:avLst/>
+          </a:prstGeom>
+        </p:spPr>
+      </p:pic>
+    </p:spTree>
+    <p:extLst>
+      <p:ext uri="{BB962C8B-B14F-4D97-AF65-F5344CB8AC3E}">
+        <p14:creationId xmlns:p14="http://schemas.microsoft.com/office/powerpoint/2010/main" val="1422685395"/>
+      </p:ext>
+    </p:extLst>
+  </p:cSld>
+  <p:clrMapOvr>
+    <a:masterClrMapping/>
+  </p:clrMapOvr>
+</p:sld>
+</file>
+
+<file path=ppt/slides/slide29.xml><?xml version="1.0" encoding="utf-8"?>
+<p:sld xmlns:a="http://schemas.openxmlformats.org/drawingml/2006/main" xmlns:r="http://schemas.openxmlformats.org/officeDocument/2006/relationships" xmlns:p="http://schemas.openxmlformats.org/presentationml/2006/main">
+  <p:cSld>
+    <p:spTree>
+      <p:nvGrpSpPr>
+        <p:cNvPr id="1" name=""/>
+        <p:cNvGrpSpPr/>
+        <p:nvPr/>
+      </p:nvGrpSpPr>
+      <p:grpSpPr>
+        <a:xfrm>
+          <a:off x="0" y="0"/>
+          <a:ext cx="0" cy="0"/>
+          <a:chOff x="0" y="0"/>
+          <a:chExt cx="0" cy="0"/>
+        </a:xfrm>
+      </p:grpSpPr>
+      <p:sp>
+        <p:nvSpPr>
+          <p:cNvPr id="2" name="Title 1">
+            <a:extLst>
+              <a:ext uri="{FF2B5EF4-FFF2-40B4-BE49-F238E27FC236}">
+                <a16:creationId xmlns:a16="http://schemas.microsoft.com/office/drawing/2014/main" id="{55E7957F-7723-058F-5BDB-219120A58FDB}"/>
+              </a:ext>
+            </a:extLst>
+          </p:cNvPr>
+          <p:cNvSpPr>
+            <a:spLocks noGrp="1"/>
+          </p:cNvSpPr>
+          <p:nvPr>
+            <p:ph type="title"/>
+          </p:nvPr>
+        </p:nvSpPr>
+        <p:spPr/>
+        <p:txBody>
+          <a:bodyPr/>
+          <a:lstStyle/>
+          <a:p>
+            <a:r>
+              <a:rPr lang="en-US" dirty="0"/>
+              <a:t>Else</a:t>
+            </a:r>
+          </a:p>
+        </p:txBody>
+      </p:sp>
+      <p:sp>
+        <p:nvSpPr>
+          <p:cNvPr id="3" name="Content Placeholder 2">
+            <a:extLst>
+              <a:ext uri="{FF2B5EF4-FFF2-40B4-BE49-F238E27FC236}">
+                <a16:creationId xmlns:a16="http://schemas.microsoft.com/office/drawing/2014/main" id="{DADDCB92-E460-3FE5-C3A0-A17835BE1FE1}"/>
+              </a:ext>
+            </a:extLst>
+          </p:cNvPr>
+          <p:cNvSpPr>
+            <a:spLocks noGrp="1"/>
+          </p:cNvSpPr>
+          <p:nvPr>
+            <p:ph idx="1"/>
+          </p:nvPr>
+        </p:nvSpPr>
+        <p:spPr/>
+        <p:txBody>
+          <a:bodyPr/>
+          <a:lstStyle/>
+          <a:p>
+            <a:endParaRPr lang="en-US" dirty="0"/>
+          </a:p>
+        </p:txBody>
+      </p:sp>
+      <p:pic>
+        <p:nvPicPr>
+          <p:cNvPr id="4" name="Picture 3">
+            <a:extLst>
+              <a:ext uri="{FF2B5EF4-FFF2-40B4-BE49-F238E27FC236}">
+                <a16:creationId xmlns:a16="http://schemas.microsoft.com/office/drawing/2014/main" id="{F222A28C-2AC8-268D-E6FE-5B29AC107C1F}"/>
+              </a:ext>
+            </a:extLst>
+          </p:cNvPr>
+          <p:cNvPicPr>
+            <a:picLocks noChangeAspect="1"/>
+          </p:cNvPicPr>
+          <p:nvPr/>
+        </p:nvPicPr>
+        <p:blipFill>
+          <a:blip r:embed="rId2"/>
+          <a:stretch>
+            <a:fillRect/>
+          </a:stretch>
+        </p:blipFill>
+        <p:spPr>
+          <a:xfrm>
+            <a:off x="2846184" y="2180496"/>
+            <a:ext cx="6913079" cy="4128864"/>
+          </a:xfrm>
+          <a:prstGeom prst="rect">
+            <a:avLst/>
+          </a:prstGeom>
+        </p:spPr>
+      </p:pic>
+    </p:spTree>
+    <p:extLst>
+      <p:ext uri="{BB962C8B-B14F-4D97-AF65-F5344CB8AC3E}">
+        <p14:creationId xmlns:p14="http://schemas.microsoft.com/office/powerpoint/2010/main" val="796344891"/>
+      </p:ext>
+    </p:extLst>
+  </p:cSld>
+  <p:clrMapOvr>
+    <a:masterClrMapping/>
+  </p:clrMapOvr>
+</p:sld>
+</file>
+
 <file path=ppt/slides/slide3.xml><?xml version="1.0" encoding="utf-8"?>
 <p:sld xmlns:a="http://schemas.openxmlformats.org/drawingml/2006/main" xmlns:r="http://schemas.openxmlformats.org/officeDocument/2006/relationships" xmlns:p="http://schemas.openxmlformats.org/presentationml/2006/main">
   <p:cSld>
@@ -9196,6 +11683,685 @@
     <p:extLst>
       <p:ext uri="{BB962C8B-B14F-4D97-AF65-F5344CB8AC3E}">
         <p14:creationId xmlns:p14="http://schemas.microsoft.com/office/powerpoint/2010/main" val="734347442"/>
+      </p:ext>
+    </p:extLst>
+  </p:cSld>
+  <p:clrMapOvr>
+    <a:masterClrMapping/>
+  </p:clrMapOvr>
+</p:sld>
+</file>
+
+<file path=ppt/slides/slide30.xml><?xml version="1.0" encoding="utf-8"?>
+<p:sld xmlns:a="http://schemas.openxmlformats.org/drawingml/2006/main" xmlns:r="http://schemas.openxmlformats.org/officeDocument/2006/relationships" xmlns:p="http://schemas.openxmlformats.org/presentationml/2006/main">
+  <p:cSld>
+    <p:spTree>
+      <p:nvGrpSpPr>
+        <p:cNvPr id="1" name=""/>
+        <p:cNvGrpSpPr/>
+        <p:nvPr/>
+      </p:nvGrpSpPr>
+      <p:grpSpPr>
+        <a:xfrm>
+          <a:off x="0" y="0"/>
+          <a:ext cx="0" cy="0"/>
+          <a:chOff x="0" y="0"/>
+          <a:chExt cx="0" cy="0"/>
+        </a:xfrm>
+      </p:grpSpPr>
+      <p:sp>
+        <p:nvSpPr>
+          <p:cNvPr id="2" name="Title 1">
+            <a:extLst>
+              <a:ext uri="{FF2B5EF4-FFF2-40B4-BE49-F238E27FC236}">
+                <a16:creationId xmlns:a16="http://schemas.microsoft.com/office/drawing/2014/main" id="{F6611E77-183C-5CB3-EFAC-687A26E05A8E}"/>
+              </a:ext>
+            </a:extLst>
+          </p:cNvPr>
+          <p:cNvSpPr>
+            <a:spLocks noGrp="1"/>
+          </p:cNvSpPr>
+          <p:nvPr>
+            <p:ph type="title"/>
+          </p:nvPr>
+        </p:nvSpPr>
+        <p:spPr/>
+        <p:txBody>
+          <a:bodyPr/>
+          <a:lstStyle/>
+          <a:p>
+            <a:r>
+              <a:rPr lang="en-US" dirty="0"/>
+              <a:t>Du </a:t>
+            </a:r>
+            <a:r>
+              <a:rPr lang="en-US" dirty="0" err="1"/>
+              <a:t>trenger</a:t>
+            </a:r>
+            <a:r>
+              <a:rPr lang="en-US" dirty="0"/>
+              <a:t> </a:t>
+            </a:r>
+            <a:r>
+              <a:rPr lang="en-US" dirty="0" err="1"/>
+              <a:t>ikke</a:t>
+            </a:r>
+            <a:r>
+              <a:rPr lang="en-US" dirty="0"/>
+              <a:t> </a:t>
+            </a:r>
+            <a:r>
+              <a:rPr lang="en-US" dirty="0" err="1"/>
+              <a:t>altid</a:t>
+            </a:r>
+            <a:r>
+              <a:rPr lang="en-US" dirty="0"/>
+              <a:t> </a:t>
+            </a:r>
+            <a:r>
+              <a:rPr lang="en-US" dirty="0" err="1"/>
+              <a:t>elif</a:t>
+            </a:r>
+            <a:r>
+              <a:rPr lang="en-US" dirty="0"/>
+              <a:t>!</a:t>
+            </a:r>
+          </a:p>
+        </p:txBody>
+      </p:sp>
+      <p:pic>
+        <p:nvPicPr>
+          <p:cNvPr id="5" name="Content Placeholder 4">
+            <a:extLst>
+              <a:ext uri="{FF2B5EF4-FFF2-40B4-BE49-F238E27FC236}">
+                <a16:creationId xmlns:a16="http://schemas.microsoft.com/office/drawing/2014/main" id="{763CB6F1-75FE-D726-9354-29B1A6F3A27C}"/>
+              </a:ext>
+            </a:extLst>
+          </p:cNvPr>
+          <p:cNvPicPr>
+            <a:picLocks noGrp="1" noChangeAspect="1"/>
+          </p:cNvPicPr>
+          <p:nvPr>
+            <p:ph idx="1"/>
+          </p:nvPr>
+        </p:nvPicPr>
+        <p:blipFill>
+          <a:blip r:embed="rId2"/>
+          <a:stretch>
+            <a:fillRect/>
+          </a:stretch>
+        </p:blipFill>
+        <p:spPr>
+          <a:xfrm>
+            <a:off x="2011680" y="2022048"/>
+            <a:ext cx="8846346" cy="4338112"/>
+          </a:xfrm>
+        </p:spPr>
+      </p:pic>
+    </p:spTree>
+    <p:extLst>
+      <p:ext uri="{BB962C8B-B14F-4D97-AF65-F5344CB8AC3E}">
+        <p14:creationId xmlns:p14="http://schemas.microsoft.com/office/powerpoint/2010/main" val="3265046266"/>
+      </p:ext>
+    </p:extLst>
+  </p:cSld>
+  <p:clrMapOvr>
+    <a:masterClrMapping/>
+  </p:clrMapOvr>
+</p:sld>
+</file>
+
+<file path=ppt/slides/slide31.xml><?xml version="1.0" encoding="utf-8"?>
+<p:sld xmlns:a="http://schemas.openxmlformats.org/drawingml/2006/main" xmlns:r="http://schemas.openxmlformats.org/officeDocument/2006/relationships" xmlns:p="http://schemas.openxmlformats.org/presentationml/2006/main">
+  <p:cSld>
+    <p:spTree>
+      <p:nvGrpSpPr>
+        <p:cNvPr id="1" name=""/>
+        <p:cNvGrpSpPr/>
+        <p:nvPr/>
+      </p:nvGrpSpPr>
+      <p:grpSpPr>
+        <a:xfrm>
+          <a:off x="0" y="0"/>
+          <a:ext cx="0" cy="0"/>
+          <a:chOff x="0" y="0"/>
+          <a:chExt cx="0" cy="0"/>
+        </a:xfrm>
+      </p:grpSpPr>
+      <p:sp>
+        <p:nvSpPr>
+          <p:cNvPr id="2" name="Title 1">
+            <a:extLst>
+              <a:ext uri="{FF2B5EF4-FFF2-40B4-BE49-F238E27FC236}">
+                <a16:creationId xmlns:a16="http://schemas.microsoft.com/office/drawing/2014/main" id="{CE7EAA93-BCFE-C953-4160-8610AEE88586}"/>
+              </a:ext>
+            </a:extLst>
+          </p:cNvPr>
+          <p:cNvSpPr>
+            <a:spLocks noGrp="1"/>
+          </p:cNvSpPr>
+          <p:nvPr>
+            <p:ph type="title"/>
+          </p:nvPr>
+        </p:nvSpPr>
+        <p:spPr/>
+        <p:txBody>
+          <a:bodyPr/>
+          <a:lstStyle/>
+          <a:p>
+            <a:r>
+              <a:rPr lang="en-US" dirty="0" err="1"/>
+              <a:t>Kontrol</a:t>
+            </a:r>
+            <a:r>
+              <a:rPr lang="en-US" dirty="0"/>
+              <a:t> </a:t>
+            </a:r>
+            <a:r>
+              <a:rPr lang="en-US" dirty="0" err="1"/>
+              <a:t>logikk</a:t>
+            </a:r>
+            <a:endParaRPr lang="en-US" dirty="0"/>
+          </a:p>
+        </p:txBody>
+      </p:sp>
+      <p:sp>
+        <p:nvSpPr>
+          <p:cNvPr id="3" name="Content Placeholder 2">
+            <a:extLst>
+              <a:ext uri="{FF2B5EF4-FFF2-40B4-BE49-F238E27FC236}">
+                <a16:creationId xmlns:a16="http://schemas.microsoft.com/office/drawing/2014/main" id="{D190358B-9AF1-633C-36C1-17533D436BAE}"/>
+              </a:ext>
+            </a:extLst>
+          </p:cNvPr>
+          <p:cNvSpPr>
+            <a:spLocks noGrp="1"/>
+          </p:cNvSpPr>
+          <p:nvPr>
+            <p:ph idx="1"/>
+          </p:nvPr>
+        </p:nvSpPr>
+        <p:spPr/>
+        <p:txBody>
+          <a:bodyPr/>
+          <a:lstStyle/>
+          <a:p>
+            <a:r>
+              <a:rPr lang="en-US" dirty="0" err="1"/>
+              <a:t>Oppdater</a:t>
+            </a:r>
+            <a:r>
+              <a:rPr lang="en-US" dirty="0"/>
+              <a:t> </a:t>
+            </a:r>
+            <a:r>
+              <a:rPr lang="en-US" dirty="0" err="1"/>
+              <a:t>ditt</a:t>
+            </a:r>
+            <a:r>
+              <a:rPr lang="en-US" dirty="0"/>
+              <a:t> program, </a:t>
+            </a:r>
+            <a:r>
+              <a:rPr lang="en-US" dirty="0" err="1"/>
+              <a:t>slik</a:t>
+            </a:r>
+            <a:r>
+              <a:rPr lang="en-US" dirty="0"/>
+              <a:t> at du </a:t>
+            </a:r>
+            <a:r>
+              <a:rPr lang="en-US" dirty="0" err="1"/>
+              <a:t>kan</a:t>
+            </a:r>
+            <a:r>
+              <a:rPr lang="en-US" dirty="0"/>
+              <a:t> </a:t>
+            </a:r>
+            <a:r>
+              <a:rPr lang="en-US" dirty="0" err="1"/>
+              <a:t>sjekke</a:t>
+            </a:r>
+            <a:r>
+              <a:rPr lang="en-US" dirty="0"/>
+              <a:t> om du er </a:t>
+            </a:r>
+            <a:r>
+              <a:rPr lang="en-US" dirty="0" err="1"/>
+              <a:t>fornøyd</a:t>
+            </a:r>
+            <a:r>
+              <a:rPr lang="en-US" dirty="0"/>
+              <a:t> med din </a:t>
+            </a:r>
+            <a:r>
+              <a:rPr lang="en-US" dirty="0" err="1"/>
+              <a:t>nåværende</a:t>
+            </a:r>
+            <a:r>
+              <a:rPr lang="en-US" dirty="0"/>
+              <a:t> </a:t>
+            </a:r>
+            <a:r>
+              <a:rPr lang="en-US" dirty="0" err="1"/>
+              <a:t>lønn</a:t>
+            </a:r>
+            <a:r>
+              <a:rPr lang="en-US" dirty="0"/>
+              <a:t>!</a:t>
+            </a:r>
+          </a:p>
+          <a:p>
+            <a:pPr lvl="1"/>
+            <a:r>
+              <a:rPr lang="en-US" dirty="0"/>
+              <a:t>1. </a:t>
+            </a:r>
+            <a:r>
+              <a:rPr lang="en-US" dirty="0" err="1"/>
+              <a:t>Hvis</a:t>
+            </a:r>
+            <a:r>
+              <a:rPr lang="en-US" dirty="0"/>
+              <a:t> din </a:t>
+            </a:r>
+            <a:r>
+              <a:rPr lang="en-US" dirty="0" err="1"/>
+              <a:t>nåværende</a:t>
+            </a:r>
+            <a:r>
+              <a:rPr lang="en-US" dirty="0"/>
+              <a:t> </a:t>
+            </a:r>
+            <a:r>
+              <a:rPr lang="en-US" dirty="0" err="1"/>
+              <a:t>lønn</a:t>
+            </a:r>
+            <a:r>
+              <a:rPr lang="en-US" dirty="0"/>
+              <a:t> er </a:t>
+            </a:r>
+            <a:r>
+              <a:rPr lang="en-US" dirty="0" err="1"/>
+              <a:t>større</a:t>
+            </a:r>
+            <a:r>
+              <a:rPr lang="en-US" dirty="0"/>
+              <a:t> </a:t>
+            </a:r>
+            <a:r>
+              <a:rPr lang="en-US" dirty="0" err="1"/>
+              <a:t>enn</a:t>
+            </a:r>
+            <a:r>
+              <a:rPr lang="en-US" dirty="0"/>
+              <a:t> din </a:t>
+            </a:r>
+            <a:r>
+              <a:rPr lang="en-US" dirty="0" err="1"/>
+              <a:t>ønsket</a:t>
+            </a:r>
+            <a:r>
+              <a:rPr lang="en-US" dirty="0"/>
+              <a:t> </a:t>
+            </a:r>
+            <a:r>
+              <a:rPr lang="en-US" dirty="0" err="1"/>
+              <a:t>lønn</a:t>
+            </a:r>
+            <a:r>
+              <a:rPr lang="en-US" dirty="0"/>
+              <a:t>, print </a:t>
+            </a:r>
+            <a:r>
+              <a:rPr lang="en-US" dirty="0" err="1"/>
+              <a:t>ut</a:t>
+            </a:r>
+            <a:r>
+              <a:rPr lang="en-US" dirty="0"/>
+              <a:t> </a:t>
+            </a:r>
+            <a:r>
+              <a:rPr lang="en-US" dirty="0" err="1"/>
+              <a:t>meldingen</a:t>
+            </a:r>
+            <a:r>
+              <a:rPr lang="en-US" dirty="0"/>
+              <a:t> “</a:t>
+            </a:r>
+            <a:r>
+              <a:rPr lang="en-US" dirty="0" err="1"/>
+              <a:t>Veldig</a:t>
+            </a:r>
+            <a:r>
+              <a:rPr lang="en-US" dirty="0"/>
+              <a:t> </a:t>
+            </a:r>
+            <a:r>
+              <a:rPr lang="en-US" dirty="0" err="1"/>
+              <a:t>fornøyd</a:t>
+            </a:r>
+            <a:r>
+              <a:rPr lang="en-US" dirty="0"/>
+              <a:t>!”</a:t>
+            </a:r>
+          </a:p>
+          <a:p>
+            <a:pPr lvl="1"/>
+            <a:r>
+              <a:rPr lang="en-US" dirty="0"/>
+              <a:t>2. </a:t>
+            </a:r>
+            <a:r>
+              <a:rPr lang="en-US" dirty="0" err="1"/>
+              <a:t>Hvis</a:t>
+            </a:r>
+            <a:r>
+              <a:rPr lang="en-US" dirty="0"/>
+              <a:t> din </a:t>
+            </a:r>
+            <a:r>
+              <a:rPr lang="en-US" dirty="0" err="1"/>
+              <a:t>nåværende</a:t>
+            </a:r>
+            <a:r>
+              <a:rPr lang="en-US" dirty="0"/>
+              <a:t> er </a:t>
+            </a:r>
+            <a:r>
+              <a:rPr lang="en-US" dirty="0" err="1"/>
+              <a:t>lik</a:t>
+            </a:r>
+            <a:r>
+              <a:rPr lang="en-US" dirty="0"/>
+              <a:t> din </a:t>
+            </a:r>
+            <a:r>
+              <a:rPr lang="en-US" dirty="0" err="1"/>
+              <a:t>ønsket</a:t>
+            </a:r>
+            <a:r>
+              <a:rPr lang="en-US" dirty="0"/>
+              <a:t> </a:t>
+            </a:r>
+            <a:r>
+              <a:rPr lang="en-US" dirty="0" err="1"/>
+              <a:t>lønn</a:t>
+            </a:r>
+            <a:r>
+              <a:rPr lang="en-US" dirty="0"/>
+              <a:t>, print </a:t>
+            </a:r>
+            <a:r>
+              <a:rPr lang="en-US" dirty="0" err="1"/>
+              <a:t>ut</a:t>
+            </a:r>
+            <a:r>
+              <a:rPr lang="en-US" dirty="0"/>
+              <a:t> </a:t>
+            </a:r>
+            <a:r>
+              <a:rPr lang="en-US" dirty="0" err="1"/>
+              <a:t>meldingen</a:t>
+            </a:r>
+            <a:r>
+              <a:rPr lang="en-US" dirty="0"/>
+              <a:t> “</a:t>
+            </a:r>
+            <a:r>
+              <a:rPr lang="en-US" dirty="0" err="1"/>
+              <a:t>fornøyd</a:t>
+            </a:r>
+            <a:r>
+              <a:rPr lang="en-US" dirty="0"/>
+              <a:t>!”</a:t>
+            </a:r>
+          </a:p>
+          <a:p>
+            <a:pPr lvl="1"/>
+            <a:r>
+              <a:rPr lang="en-US" dirty="0"/>
+              <a:t>3. </a:t>
+            </a:r>
+            <a:r>
+              <a:rPr lang="en-US" dirty="0" err="1"/>
+              <a:t>Hvis</a:t>
+            </a:r>
+            <a:r>
+              <a:rPr lang="en-US" dirty="0"/>
+              <a:t> din </a:t>
+            </a:r>
+            <a:r>
+              <a:rPr lang="en-US" dirty="0" err="1"/>
+              <a:t>lønn</a:t>
+            </a:r>
+            <a:r>
+              <a:rPr lang="en-US" dirty="0"/>
+              <a:t>, er </a:t>
+            </a:r>
+            <a:r>
+              <a:rPr lang="en-US" dirty="0" err="1"/>
+              <a:t>lavere</a:t>
+            </a:r>
+            <a:r>
+              <a:rPr lang="en-US" dirty="0"/>
+              <a:t> </a:t>
+            </a:r>
+            <a:r>
+              <a:rPr lang="en-US" dirty="0" err="1"/>
+              <a:t>enn</a:t>
+            </a:r>
+            <a:r>
+              <a:rPr lang="en-US" dirty="0"/>
+              <a:t> det du </a:t>
+            </a:r>
+            <a:r>
+              <a:rPr lang="en-US" dirty="0" err="1"/>
+              <a:t>ønsker</a:t>
+            </a:r>
+            <a:r>
+              <a:rPr lang="en-US" dirty="0"/>
+              <a:t>, print </a:t>
+            </a:r>
+            <a:r>
+              <a:rPr lang="en-US" dirty="0" err="1"/>
+              <a:t>ut</a:t>
+            </a:r>
+            <a:r>
+              <a:rPr lang="en-US" dirty="0"/>
+              <a:t> </a:t>
+            </a:r>
+            <a:r>
+              <a:rPr lang="en-US" dirty="0" err="1"/>
+              <a:t>en</a:t>
+            </a:r>
+            <a:r>
+              <a:rPr lang="en-US" dirty="0"/>
+              <a:t> sur melding!</a:t>
+            </a:r>
+          </a:p>
+        </p:txBody>
+      </p:sp>
+    </p:spTree>
+    <p:extLst>
+      <p:ext uri="{BB962C8B-B14F-4D97-AF65-F5344CB8AC3E}">
+        <p14:creationId xmlns:p14="http://schemas.microsoft.com/office/powerpoint/2010/main" val="2802691029"/>
+      </p:ext>
+    </p:extLst>
+  </p:cSld>
+  <p:clrMapOvr>
+    <a:masterClrMapping/>
+  </p:clrMapOvr>
+</p:sld>
+</file>
+
+<file path=ppt/slides/slide32.xml><?xml version="1.0" encoding="utf-8"?>
+<p:sld xmlns:a="http://schemas.openxmlformats.org/drawingml/2006/main" xmlns:r="http://schemas.openxmlformats.org/officeDocument/2006/relationships" xmlns:p="http://schemas.openxmlformats.org/presentationml/2006/main">
+  <p:cSld>
+    <p:spTree>
+      <p:nvGrpSpPr>
+        <p:cNvPr id="1" name=""/>
+        <p:cNvGrpSpPr/>
+        <p:nvPr/>
+      </p:nvGrpSpPr>
+      <p:grpSpPr>
+        <a:xfrm>
+          <a:off x="0" y="0"/>
+          <a:ext cx="0" cy="0"/>
+          <a:chOff x="0" y="0"/>
+          <a:chExt cx="0" cy="0"/>
+        </a:xfrm>
+      </p:grpSpPr>
+      <p:sp>
+        <p:nvSpPr>
+          <p:cNvPr id="2" name="Title 1">
+            <a:extLst>
+              <a:ext uri="{FF2B5EF4-FFF2-40B4-BE49-F238E27FC236}">
+                <a16:creationId xmlns:a16="http://schemas.microsoft.com/office/drawing/2014/main" id="{CC8E6DE9-2FB6-5BE7-2189-6BF35345BF2E}"/>
+              </a:ext>
+            </a:extLst>
+          </p:cNvPr>
+          <p:cNvSpPr>
+            <a:spLocks noGrp="1"/>
+          </p:cNvSpPr>
+          <p:nvPr>
+            <p:ph type="title"/>
+          </p:nvPr>
+        </p:nvSpPr>
+        <p:spPr/>
+        <p:txBody>
+          <a:bodyPr/>
+          <a:lstStyle/>
+          <a:p>
+            <a:r>
+              <a:rPr lang="en-US" dirty="0" err="1"/>
+              <a:t>Kontrol</a:t>
+            </a:r>
+            <a:r>
+              <a:rPr lang="en-US" dirty="0"/>
+              <a:t> </a:t>
+            </a:r>
+            <a:r>
+              <a:rPr lang="en-US" dirty="0" err="1"/>
+              <a:t>logikk</a:t>
+            </a:r>
+            <a:endParaRPr lang="en-US" dirty="0"/>
+          </a:p>
+        </p:txBody>
+      </p:sp>
+      <p:sp>
+        <p:nvSpPr>
+          <p:cNvPr id="3" name="Content Placeholder 2">
+            <a:extLst>
+              <a:ext uri="{FF2B5EF4-FFF2-40B4-BE49-F238E27FC236}">
+                <a16:creationId xmlns:a16="http://schemas.microsoft.com/office/drawing/2014/main" id="{2DF39232-83E7-50A0-05A2-5F0453FE1BE1}"/>
+              </a:ext>
+            </a:extLst>
+          </p:cNvPr>
+          <p:cNvSpPr>
+            <a:spLocks noGrp="1"/>
+          </p:cNvSpPr>
+          <p:nvPr>
+            <p:ph idx="1"/>
+          </p:nvPr>
+        </p:nvSpPr>
+        <p:spPr/>
+        <p:txBody>
+          <a:bodyPr/>
+          <a:lstStyle/>
+          <a:p>
+            <a:r>
+              <a:rPr lang="en-US" dirty="0" err="1"/>
+              <a:t>Oppdater</a:t>
+            </a:r>
+            <a:r>
+              <a:rPr lang="en-US" dirty="0"/>
+              <a:t> din </a:t>
+            </a:r>
+            <a:r>
+              <a:rPr lang="en-US" dirty="0" err="1"/>
+              <a:t>lønns</a:t>
+            </a:r>
+            <a:r>
+              <a:rPr lang="en-US" dirty="0"/>
+              <a:t> </a:t>
+            </a:r>
+            <a:r>
+              <a:rPr lang="en-US" dirty="0" err="1"/>
+              <a:t>sjekking</a:t>
+            </a:r>
+            <a:r>
+              <a:rPr lang="en-US" dirty="0"/>
+              <a:t> </a:t>
+            </a:r>
+            <a:r>
+              <a:rPr lang="en-US" dirty="0" err="1"/>
+              <a:t>funksjon</a:t>
+            </a:r>
+            <a:r>
+              <a:rPr lang="en-US" dirty="0"/>
+              <a:t>, </a:t>
+            </a:r>
+            <a:r>
+              <a:rPr lang="en-US" dirty="0" err="1"/>
+              <a:t>slik</a:t>
+            </a:r>
+            <a:r>
+              <a:rPr lang="en-US" dirty="0"/>
+              <a:t> at den </a:t>
+            </a:r>
+            <a:r>
+              <a:rPr lang="en-US" dirty="0" err="1"/>
+              <a:t>kun</a:t>
+            </a:r>
+            <a:r>
+              <a:rPr lang="en-US" dirty="0"/>
+              <a:t> </a:t>
+            </a:r>
+            <a:r>
+              <a:rPr lang="en-US" dirty="0" err="1"/>
+              <a:t>sjekker</a:t>
+            </a:r>
+            <a:r>
+              <a:rPr lang="en-US" dirty="0"/>
+              <a:t> folk </a:t>
+            </a:r>
+            <a:r>
+              <a:rPr lang="en-US" dirty="0" err="1"/>
+              <a:t>som</a:t>
+            </a:r>
+            <a:r>
+              <a:rPr lang="en-US" dirty="0"/>
+              <a:t> er 18 </a:t>
+            </a:r>
+            <a:r>
+              <a:rPr lang="en-US" dirty="0" err="1"/>
+              <a:t>år</a:t>
+            </a:r>
+            <a:r>
+              <a:rPr lang="en-US" dirty="0"/>
+              <a:t> </a:t>
+            </a:r>
+            <a:r>
+              <a:rPr lang="en-US" dirty="0" err="1"/>
+              <a:t>eller</a:t>
+            </a:r>
+            <a:r>
+              <a:rPr lang="en-US" dirty="0"/>
+              <a:t> </a:t>
+            </a:r>
+            <a:r>
+              <a:rPr lang="en-US" dirty="0" err="1"/>
+              <a:t>eldre</a:t>
+            </a:r>
+            <a:endParaRPr lang="en-US" dirty="0"/>
+          </a:p>
+        </p:txBody>
+      </p:sp>
+    </p:spTree>
+    <p:extLst>
+      <p:ext uri="{BB962C8B-B14F-4D97-AF65-F5344CB8AC3E}">
+        <p14:creationId xmlns:p14="http://schemas.microsoft.com/office/powerpoint/2010/main" val="1391934264"/>
       </p:ext>
     </p:extLst>
   </p:cSld>

</xml_diff>

<commit_message>
Fixed errors in the PP and code base. Added the chapter about functions and control logic.
</commit_message>
<xml_diff>
--- a/koding workshop powerpoint.pptx
+++ b/koding workshop powerpoint.pptx
@@ -5,10 +5,10 @@
     <p:sldMasterId id="2147483672" r:id="rId1"/>
   </p:sldMasterIdLst>
   <p:notesMasterIdLst>
-    <p:notesMasterId r:id="rId34"/>
+    <p:notesMasterId r:id="rId46"/>
   </p:notesMasterIdLst>
   <p:handoutMasterIdLst>
-    <p:handoutMasterId r:id="rId35"/>
+    <p:handoutMasterId r:id="rId47"/>
   </p:handoutMasterIdLst>
   <p:sldIdLst>
     <p:sldId id="256" r:id="rId2"/>
@@ -43,6 +43,18 @@
     <p:sldId id="285" r:id="rId31"/>
     <p:sldId id="286" r:id="rId32"/>
     <p:sldId id="287" r:id="rId33"/>
+    <p:sldId id="293" r:id="rId34"/>
+    <p:sldId id="294" r:id="rId35"/>
+    <p:sldId id="288" r:id="rId36"/>
+    <p:sldId id="290" r:id="rId37"/>
+    <p:sldId id="289" r:id="rId38"/>
+    <p:sldId id="291" r:id="rId39"/>
+    <p:sldId id="295" r:id="rId40"/>
+    <p:sldId id="296" r:id="rId41"/>
+    <p:sldId id="297" r:id="rId42"/>
+    <p:sldId id="298" r:id="rId43"/>
+    <p:sldId id="292" r:id="rId44"/>
+    <p:sldId id="299" r:id="rId45"/>
   </p:sldIdLst>
   <p:sldSz cx="12192000" cy="6858000"/>
   <p:notesSz cx="6858000" cy="9144000"/>
@@ -246,7 +258,7 @@
           <a:p>
             <a:fld id="{AF869721-F543-4A6C-BF9D-65D7CC540427}" type="datetimeFigureOut">
               <a:rPr lang="en-US" smtClean="0"/>
-              <a:t>2/13/2023</a:t>
+              <a:t>2/17/2023</a:t>
             </a:fld>
             <a:endParaRPr lang="en-US" dirty="0"/>
           </a:p>
@@ -423,7 +435,7 @@
           <a:p>
             <a:fld id="{C732326A-4C88-4AFB-AA5B-5919D81DFF5B}" type="datetimeFigureOut">
               <a:rPr lang="en-US" smtClean="0"/>
-              <a:t>2/13/2023</a:t>
+              <a:t>2/17/2023</a:t>
             </a:fld>
             <a:endParaRPr lang="en-US" dirty="0"/>
           </a:p>
@@ -1247,6 +1259,651 @@
 </p:notes>
 </file>
 
+<file path=ppt/notesSlides/notesSlide15.xml><?xml version="1.0" encoding="utf-8"?>
+<p:notes xmlns:a="http://schemas.openxmlformats.org/drawingml/2006/main" xmlns:r="http://schemas.openxmlformats.org/officeDocument/2006/relationships" xmlns:p="http://schemas.openxmlformats.org/presentationml/2006/main">
+  <p:cSld>
+    <p:spTree>
+      <p:nvGrpSpPr>
+        <p:cNvPr id="1" name=""/>
+        <p:cNvGrpSpPr/>
+        <p:nvPr/>
+      </p:nvGrpSpPr>
+      <p:grpSpPr>
+        <a:xfrm>
+          <a:off x="0" y="0"/>
+          <a:ext cx="0" cy="0"/>
+          <a:chOff x="0" y="0"/>
+          <a:chExt cx="0" cy="0"/>
+        </a:xfrm>
+      </p:grpSpPr>
+      <p:sp>
+        <p:nvSpPr>
+          <p:cNvPr id="2" name="Slide Image Placeholder 1"/>
+          <p:cNvSpPr>
+            <a:spLocks noGrp="1" noRot="1" noChangeAspect="1"/>
+          </p:cNvSpPr>
+          <p:nvPr>
+            <p:ph type="sldImg"/>
+          </p:nvPr>
+        </p:nvSpPr>
+        <p:spPr/>
+      </p:sp>
+      <p:sp>
+        <p:nvSpPr>
+          <p:cNvPr id="3" name="Notes Placeholder 2"/>
+          <p:cNvSpPr>
+            <a:spLocks noGrp="1"/>
+          </p:cNvSpPr>
+          <p:nvPr>
+            <p:ph type="body" idx="1"/>
+          </p:nvPr>
+        </p:nvSpPr>
+        <p:spPr/>
+        <p:txBody>
+          <a:bodyPr/>
+          <a:lstStyle/>
+          <a:p>
+            <a:r>
+              <a:rPr lang="en-US" dirty="0"/>
+              <a:t>VIS DEM PROBLEMET MED OPPGAVEN</a:t>
+            </a:r>
+          </a:p>
+        </p:txBody>
+      </p:sp>
+      <p:sp>
+        <p:nvSpPr>
+          <p:cNvPr id="4" name="Slide Number Placeholder 3"/>
+          <p:cNvSpPr>
+            <a:spLocks noGrp="1"/>
+          </p:cNvSpPr>
+          <p:nvPr>
+            <p:ph type="sldNum" sz="quarter" idx="5"/>
+          </p:nvPr>
+        </p:nvSpPr>
+        <p:spPr/>
+        <p:txBody>
+          <a:bodyPr/>
+          <a:lstStyle/>
+          <a:p>
+            <a:fld id="{C6B3AB32-59DF-41F1-9618-EDFBF5049629}" type="slidenum">
+              <a:rPr lang="en-US" smtClean="0"/>
+              <a:t>34</a:t>
+            </a:fld>
+            <a:endParaRPr lang="en-US" dirty="0"/>
+          </a:p>
+        </p:txBody>
+      </p:sp>
+    </p:spTree>
+    <p:extLst>
+      <p:ext uri="{BB962C8B-B14F-4D97-AF65-F5344CB8AC3E}">
+        <p14:creationId xmlns:p14="http://schemas.microsoft.com/office/powerpoint/2010/main" val="1040670687"/>
+      </p:ext>
+    </p:extLst>
+  </p:cSld>
+  <p:clrMapOvr>
+    <a:masterClrMapping/>
+  </p:clrMapOvr>
+</p:notes>
+</file>
+
+<file path=ppt/notesSlides/notesSlide16.xml><?xml version="1.0" encoding="utf-8"?>
+<p:notes xmlns:a="http://schemas.openxmlformats.org/drawingml/2006/main" xmlns:r="http://schemas.openxmlformats.org/officeDocument/2006/relationships" xmlns:p="http://schemas.openxmlformats.org/presentationml/2006/main">
+  <p:cSld>
+    <p:spTree>
+      <p:nvGrpSpPr>
+        <p:cNvPr id="1" name=""/>
+        <p:cNvGrpSpPr/>
+        <p:nvPr/>
+      </p:nvGrpSpPr>
+      <p:grpSpPr>
+        <a:xfrm>
+          <a:off x="0" y="0"/>
+          <a:ext cx="0" cy="0"/>
+          <a:chOff x="0" y="0"/>
+          <a:chExt cx="0" cy="0"/>
+        </a:xfrm>
+      </p:grpSpPr>
+      <p:sp>
+        <p:nvSpPr>
+          <p:cNvPr id="2" name="Slide Image Placeholder 1"/>
+          <p:cNvSpPr>
+            <a:spLocks noGrp="1" noRot="1" noChangeAspect="1"/>
+          </p:cNvSpPr>
+          <p:nvPr>
+            <p:ph type="sldImg"/>
+          </p:nvPr>
+        </p:nvSpPr>
+        <p:spPr/>
+      </p:sp>
+      <p:sp>
+        <p:nvSpPr>
+          <p:cNvPr id="3" name="Notes Placeholder 2"/>
+          <p:cNvSpPr>
+            <a:spLocks noGrp="1"/>
+          </p:cNvSpPr>
+          <p:nvPr>
+            <p:ph type="body" idx="1"/>
+          </p:nvPr>
+        </p:nvSpPr>
+        <p:spPr/>
+        <p:txBody>
+          <a:bodyPr/>
+          <a:lstStyle/>
+          <a:p>
+            <a:r>
+              <a:rPr lang="en-US" dirty="0" err="1"/>
+              <a:t>Funksjoner</a:t>
+            </a:r>
+            <a:r>
+              <a:rPr lang="en-US" dirty="0"/>
+              <a:t> </a:t>
+            </a:r>
+            <a:r>
+              <a:rPr lang="en-US" dirty="0" err="1"/>
+              <a:t>gjør</a:t>
+            </a:r>
+            <a:r>
+              <a:rPr lang="en-US" dirty="0"/>
+              <a:t> </a:t>
+            </a:r>
+            <a:r>
+              <a:rPr lang="en-US" dirty="0" err="1"/>
+              <a:t>koden</a:t>
+            </a:r>
+            <a:r>
+              <a:rPr lang="en-US" dirty="0"/>
+              <a:t> </a:t>
+            </a:r>
+            <a:r>
+              <a:rPr lang="en-US" dirty="0" err="1"/>
+              <a:t>gjenbrukbar</a:t>
+            </a:r>
+            <a:r>
+              <a:rPr lang="en-US" dirty="0"/>
+              <a:t>, </a:t>
+            </a:r>
+            <a:r>
+              <a:rPr lang="en-US" dirty="0" err="1"/>
+              <a:t>på</a:t>
+            </a:r>
+            <a:r>
+              <a:rPr lang="en-US" dirty="0"/>
+              <a:t> </a:t>
+            </a:r>
+            <a:r>
+              <a:rPr lang="en-US" dirty="0" err="1"/>
+              <a:t>samme</a:t>
+            </a:r>
+            <a:r>
+              <a:rPr lang="en-US" dirty="0"/>
+              <a:t> mate </a:t>
+            </a:r>
+            <a:r>
+              <a:rPr lang="en-US" dirty="0" err="1"/>
+              <a:t>som</a:t>
+            </a:r>
+            <a:r>
+              <a:rPr lang="en-US" dirty="0"/>
+              <a:t> </a:t>
+            </a:r>
+            <a:r>
+              <a:rPr lang="en-US" dirty="0" err="1"/>
+              <a:t>variabler</a:t>
+            </a:r>
+            <a:endParaRPr lang="en-US" dirty="0"/>
+          </a:p>
+        </p:txBody>
+      </p:sp>
+      <p:sp>
+        <p:nvSpPr>
+          <p:cNvPr id="4" name="Slide Number Placeholder 3"/>
+          <p:cNvSpPr>
+            <a:spLocks noGrp="1"/>
+          </p:cNvSpPr>
+          <p:nvPr>
+            <p:ph type="sldNum" sz="quarter" idx="5"/>
+          </p:nvPr>
+        </p:nvSpPr>
+        <p:spPr/>
+        <p:txBody>
+          <a:bodyPr/>
+          <a:lstStyle/>
+          <a:p>
+            <a:fld id="{C6B3AB32-59DF-41F1-9618-EDFBF5049629}" type="slidenum">
+              <a:rPr lang="en-US" smtClean="0"/>
+              <a:t>35</a:t>
+            </a:fld>
+            <a:endParaRPr lang="en-US" dirty="0"/>
+          </a:p>
+        </p:txBody>
+      </p:sp>
+    </p:spTree>
+    <p:extLst>
+      <p:ext uri="{BB962C8B-B14F-4D97-AF65-F5344CB8AC3E}">
+        <p14:creationId xmlns:p14="http://schemas.microsoft.com/office/powerpoint/2010/main" val="2117558311"/>
+      </p:ext>
+    </p:extLst>
+  </p:cSld>
+  <p:clrMapOvr>
+    <a:masterClrMapping/>
+  </p:clrMapOvr>
+</p:notes>
+</file>
+
+<file path=ppt/notesSlides/notesSlide17.xml><?xml version="1.0" encoding="utf-8"?>
+<p:notes xmlns:a="http://schemas.openxmlformats.org/drawingml/2006/main" xmlns:r="http://schemas.openxmlformats.org/officeDocument/2006/relationships" xmlns:p="http://schemas.openxmlformats.org/presentationml/2006/main">
+  <p:cSld>
+    <p:spTree>
+      <p:nvGrpSpPr>
+        <p:cNvPr id="1" name=""/>
+        <p:cNvGrpSpPr/>
+        <p:nvPr/>
+      </p:nvGrpSpPr>
+      <p:grpSpPr>
+        <a:xfrm>
+          <a:off x="0" y="0"/>
+          <a:ext cx="0" cy="0"/>
+          <a:chOff x="0" y="0"/>
+          <a:chExt cx="0" cy="0"/>
+        </a:xfrm>
+      </p:grpSpPr>
+      <p:sp>
+        <p:nvSpPr>
+          <p:cNvPr id="2" name="Slide Image Placeholder 1"/>
+          <p:cNvSpPr>
+            <a:spLocks noGrp="1" noRot="1" noChangeAspect="1"/>
+          </p:cNvSpPr>
+          <p:nvPr>
+            <p:ph type="sldImg"/>
+          </p:nvPr>
+        </p:nvSpPr>
+        <p:spPr/>
+      </p:sp>
+      <p:sp>
+        <p:nvSpPr>
+          <p:cNvPr id="3" name="Notes Placeholder 2"/>
+          <p:cNvSpPr>
+            <a:spLocks noGrp="1"/>
+          </p:cNvSpPr>
+          <p:nvPr>
+            <p:ph type="body" idx="1"/>
+          </p:nvPr>
+        </p:nvSpPr>
+        <p:spPr/>
+        <p:txBody>
+          <a:bodyPr/>
+          <a:lstStyle/>
+          <a:p>
+            <a:pPr marL="0" marR="0" lvl="0" indent="0" algn="l" defTabSz="914400" rtl="0" eaLnBrk="1" fontAlgn="auto" latinLnBrk="0" hangingPunct="1">
+              <a:lnSpc>
+                <a:spcPct val="100000"/>
+              </a:lnSpc>
+              <a:spcBef>
+                <a:spcPts val="0"/>
+              </a:spcBef>
+              <a:spcAft>
+                <a:spcPts val="0"/>
+              </a:spcAft>
+              <a:buClrTx/>
+              <a:buSzTx/>
+              <a:buFontTx/>
+              <a:buNone/>
+              <a:tabLst/>
+              <a:defRPr/>
+            </a:pPr>
+            <a:r>
+              <a:rPr lang="en-US" dirty="0" err="1"/>
+              <a:t>Indentering</a:t>
+            </a:r>
+            <a:r>
+              <a:rPr lang="en-US" baseline="0" dirty="0"/>
+              <a:t> = tab = 4 </a:t>
+            </a:r>
+            <a:r>
+              <a:rPr lang="en-US" baseline="0" dirty="0" err="1"/>
+              <a:t>mellomrom</a:t>
+            </a:r>
+            <a:endParaRPr lang="en-US" baseline="0" dirty="0"/>
+          </a:p>
+          <a:p>
+            <a:endParaRPr lang="en-US" dirty="0"/>
+          </a:p>
+        </p:txBody>
+      </p:sp>
+      <p:sp>
+        <p:nvSpPr>
+          <p:cNvPr id="4" name="Slide Number Placeholder 3"/>
+          <p:cNvSpPr>
+            <a:spLocks noGrp="1"/>
+          </p:cNvSpPr>
+          <p:nvPr>
+            <p:ph type="sldNum" sz="quarter" idx="5"/>
+          </p:nvPr>
+        </p:nvSpPr>
+        <p:spPr/>
+        <p:txBody>
+          <a:bodyPr/>
+          <a:lstStyle/>
+          <a:p>
+            <a:fld id="{C6B3AB32-59DF-41F1-9618-EDFBF5049629}" type="slidenum">
+              <a:rPr lang="en-US" smtClean="0"/>
+              <a:t>36</a:t>
+            </a:fld>
+            <a:endParaRPr lang="en-US" dirty="0"/>
+          </a:p>
+        </p:txBody>
+      </p:sp>
+    </p:spTree>
+    <p:extLst>
+      <p:ext uri="{BB962C8B-B14F-4D97-AF65-F5344CB8AC3E}">
+        <p14:creationId xmlns:p14="http://schemas.microsoft.com/office/powerpoint/2010/main" val="749240704"/>
+      </p:ext>
+    </p:extLst>
+  </p:cSld>
+  <p:clrMapOvr>
+    <a:masterClrMapping/>
+  </p:clrMapOvr>
+</p:notes>
+</file>
+
+<file path=ppt/notesSlides/notesSlide18.xml><?xml version="1.0" encoding="utf-8"?>
+<p:notes xmlns:a="http://schemas.openxmlformats.org/drawingml/2006/main" xmlns:r="http://schemas.openxmlformats.org/officeDocument/2006/relationships" xmlns:p="http://schemas.openxmlformats.org/presentationml/2006/main">
+  <p:cSld>
+    <p:spTree>
+      <p:nvGrpSpPr>
+        <p:cNvPr id="1" name=""/>
+        <p:cNvGrpSpPr/>
+        <p:nvPr/>
+      </p:nvGrpSpPr>
+      <p:grpSpPr>
+        <a:xfrm>
+          <a:off x="0" y="0"/>
+          <a:ext cx="0" cy="0"/>
+          <a:chOff x="0" y="0"/>
+          <a:chExt cx="0" cy="0"/>
+        </a:xfrm>
+      </p:grpSpPr>
+      <p:sp>
+        <p:nvSpPr>
+          <p:cNvPr id="2" name="Slide Image Placeholder 1"/>
+          <p:cNvSpPr>
+            <a:spLocks noGrp="1" noRot="1" noChangeAspect="1"/>
+          </p:cNvSpPr>
+          <p:nvPr>
+            <p:ph type="sldImg"/>
+          </p:nvPr>
+        </p:nvSpPr>
+        <p:spPr/>
+      </p:sp>
+      <p:sp>
+        <p:nvSpPr>
+          <p:cNvPr id="3" name="Notes Placeholder 2"/>
+          <p:cNvSpPr>
+            <a:spLocks noGrp="1"/>
+          </p:cNvSpPr>
+          <p:nvPr>
+            <p:ph type="body" idx="1"/>
+          </p:nvPr>
+        </p:nvSpPr>
+        <p:spPr/>
+        <p:txBody>
+          <a:bodyPr/>
+          <a:lstStyle/>
+          <a:p>
+            <a:pPr marL="0" marR="0" lvl="0" indent="0" algn="l" defTabSz="914400" rtl="0" eaLnBrk="1" fontAlgn="auto" latinLnBrk="0" hangingPunct="1">
+              <a:lnSpc>
+                <a:spcPct val="100000"/>
+              </a:lnSpc>
+              <a:spcBef>
+                <a:spcPts val="0"/>
+              </a:spcBef>
+              <a:spcAft>
+                <a:spcPts val="0"/>
+              </a:spcAft>
+              <a:buClrTx/>
+              <a:buSzTx/>
+              <a:buFontTx/>
+              <a:buNone/>
+              <a:tabLst/>
+              <a:defRPr/>
+            </a:pPr>
+            <a:r>
+              <a:rPr lang="en-US" sz="1800" dirty="0">
+                <a:solidFill>
+                  <a:srgbClr val="808080"/>
+                </a:solidFill>
+                <a:effectLst/>
+                <a:latin typeface="JetBrains Mono"/>
+              </a:rPr>
+              <a:t>Task 6: move the "check age for alcohol consumption" into a function</a:t>
+            </a:r>
+            <a:endParaRPr lang="en-US" sz="1800" dirty="0">
+              <a:solidFill>
+                <a:srgbClr val="A9B7C6"/>
+              </a:solidFill>
+              <a:effectLst/>
+              <a:latin typeface="JetBrains Mono"/>
+            </a:endParaRPr>
+          </a:p>
+          <a:p>
+            <a:pPr marL="0" marR="0" lvl="0" indent="0" algn="l" defTabSz="914400" rtl="0" eaLnBrk="1" fontAlgn="auto" latinLnBrk="0" hangingPunct="1">
+              <a:lnSpc>
+                <a:spcPct val="100000"/>
+              </a:lnSpc>
+              <a:spcBef>
+                <a:spcPts val="0"/>
+              </a:spcBef>
+              <a:spcAft>
+                <a:spcPts val="0"/>
+              </a:spcAft>
+              <a:buClrTx/>
+              <a:buSzTx/>
+              <a:buFontTx/>
+              <a:buNone/>
+              <a:tabLst/>
+              <a:defRPr/>
+            </a:pPr>
+            <a:endParaRPr lang="en-US" dirty="0"/>
+          </a:p>
+          <a:p>
+            <a:pPr marL="0" marR="0" lvl="0" indent="0" algn="l" defTabSz="914400" rtl="0" eaLnBrk="1" fontAlgn="auto" latinLnBrk="0" hangingPunct="1">
+              <a:lnSpc>
+                <a:spcPct val="100000"/>
+              </a:lnSpc>
+              <a:spcBef>
+                <a:spcPts val="0"/>
+              </a:spcBef>
+              <a:spcAft>
+                <a:spcPts val="0"/>
+              </a:spcAft>
+              <a:buClrTx/>
+              <a:buSzTx/>
+              <a:buFontTx/>
+              <a:buNone/>
+              <a:tabLst/>
+              <a:defRPr/>
+            </a:pPr>
+            <a:endParaRPr lang="en-US" baseline="0" dirty="0"/>
+          </a:p>
+          <a:p>
+            <a:pPr marL="0" marR="0" lvl="0" indent="0" algn="l" defTabSz="914400" rtl="0" eaLnBrk="1" fontAlgn="auto" latinLnBrk="0" hangingPunct="1">
+              <a:lnSpc>
+                <a:spcPct val="100000"/>
+              </a:lnSpc>
+              <a:spcBef>
+                <a:spcPts val="0"/>
+              </a:spcBef>
+              <a:spcAft>
+                <a:spcPts val="0"/>
+              </a:spcAft>
+              <a:buClrTx/>
+              <a:buSzTx/>
+              <a:buFontTx/>
+              <a:buNone/>
+              <a:tabLst/>
+              <a:defRPr/>
+            </a:pPr>
+            <a:endParaRPr lang="en-US" baseline="0" dirty="0"/>
+          </a:p>
+        </p:txBody>
+      </p:sp>
+      <p:sp>
+        <p:nvSpPr>
+          <p:cNvPr id="4" name="Slide Number Placeholder 3"/>
+          <p:cNvSpPr>
+            <a:spLocks noGrp="1"/>
+          </p:cNvSpPr>
+          <p:nvPr>
+            <p:ph type="sldNum" sz="quarter" idx="5"/>
+          </p:nvPr>
+        </p:nvSpPr>
+        <p:spPr/>
+        <p:txBody>
+          <a:bodyPr/>
+          <a:lstStyle/>
+          <a:p>
+            <a:fld id="{C6B3AB32-59DF-41F1-9618-EDFBF5049629}" type="slidenum">
+              <a:rPr lang="en-US" smtClean="0"/>
+              <a:t>37</a:t>
+            </a:fld>
+            <a:endParaRPr lang="en-US" dirty="0"/>
+          </a:p>
+        </p:txBody>
+      </p:sp>
+    </p:spTree>
+    <p:extLst>
+      <p:ext uri="{BB962C8B-B14F-4D97-AF65-F5344CB8AC3E}">
+        <p14:creationId xmlns:p14="http://schemas.microsoft.com/office/powerpoint/2010/main" val="4076772416"/>
+      </p:ext>
+    </p:extLst>
+  </p:cSld>
+  <p:clrMapOvr>
+    <a:masterClrMapping/>
+  </p:clrMapOvr>
+</p:notes>
+</file>
+
+<file path=ppt/notesSlides/notesSlide19.xml><?xml version="1.0" encoding="utf-8"?>
+<p:notes xmlns:a="http://schemas.openxmlformats.org/drawingml/2006/main" xmlns:r="http://schemas.openxmlformats.org/officeDocument/2006/relationships" xmlns:p="http://schemas.openxmlformats.org/presentationml/2006/main">
+  <p:cSld>
+    <p:spTree>
+      <p:nvGrpSpPr>
+        <p:cNvPr id="1" name=""/>
+        <p:cNvGrpSpPr/>
+        <p:nvPr/>
+      </p:nvGrpSpPr>
+      <p:grpSpPr>
+        <a:xfrm>
+          <a:off x="0" y="0"/>
+          <a:ext cx="0" cy="0"/>
+          <a:chOff x="0" y="0"/>
+          <a:chExt cx="0" cy="0"/>
+        </a:xfrm>
+      </p:grpSpPr>
+      <p:sp>
+        <p:nvSpPr>
+          <p:cNvPr id="2" name="Slide Image Placeholder 1"/>
+          <p:cNvSpPr>
+            <a:spLocks noGrp="1" noRot="1" noChangeAspect="1"/>
+          </p:cNvSpPr>
+          <p:nvPr>
+            <p:ph type="sldImg"/>
+          </p:nvPr>
+        </p:nvSpPr>
+        <p:spPr/>
+      </p:sp>
+      <p:sp>
+        <p:nvSpPr>
+          <p:cNvPr id="3" name="Notes Placeholder 2"/>
+          <p:cNvSpPr>
+            <a:spLocks noGrp="1"/>
+          </p:cNvSpPr>
+          <p:nvPr>
+            <p:ph type="body" idx="1"/>
+          </p:nvPr>
+        </p:nvSpPr>
+        <p:spPr/>
+        <p:txBody>
+          <a:bodyPr/>
+          <a:lstStyle/>
+          <a:p>
+            <a:pPr marL="0" marR="0" lvl="0" indent="0" algn="l" defTabSz="914400" rtl="0" eaLnBrk="1" fontAlgn="auto" latinLnBrk="0" hangingPunct="1">
+              <a:lnSpc>
+                <a:spcPct val="100000"/>
+              </a:lnSpc>
+              <a:spcBef>
+                <a:spcPts val="0"/>
+              </a:spcBef>
+              <a:spcAft>
+                <a:spcPts val="0"/>
+              </a:spcAft>
+              <a:buClrTx/>
+              <a:buSzTx/>
+              <a:buFontTx/>
+              <a:buNone/>
+              <a:tabLst/>
+              <a:defRPr/>
+            </a:pPr>
+            <a:r>
+              <a:rPr lang="en-US" dirty="0"/>
+              <a:t>Task 7: </a:t>
+            </a:r>
+            <a:r>
+              <a:rPr lang="en-US" sz="1800" dirty="0">
+                <a:solidFill>
+                  <a:srgbClr val="808080"/>
+                </a:solidFill>
+                <a:effectLst/>
+                <a:latin typeface="JetBrains Mono"/>
+              </a:rPr>
+              <a:t>move your "facts about me" part of the program into a function</a:t>
+            </a:r>
+            <a:endParaRPr lang="en-US" sz="1800" dirty="0">
+              <a:solidFill>
+                <a:srgbClr val="A9B7C6"/>
+              </a:solidFill>
+              <a:effectLst/>
+              <a:latin typeface="JetBrains Mono"/>
+            </a:endParaRPr>
+          </a:p>
+        </p:txBody>
+      </p:sp>
+      <p:sp>
+        <p:nvSpPr>
+          <p:cNvPr id="4" name="Slide Number Placeholder 3"/>
+          <p:cNvSpPr>
+            <a:spLocks noGrp="1"/>
+          </p:cNvSpPr>
+          <p:nvPr>
+            <p:ph type="sldNum" sz="quarter" idx="5"/>
+          </p:nvPr>
+        </p:nvSpPr>
+        <p:spPr/>
+        <p:txBody>
+          <a:bodyPr/>
+          <a:lstStyle/>
+          <a:p>
+            <a:fld id="{C6B3AB32-59DF-41F1-9618-EDFBF5049629}" type="slidenum">
+              <a:rPr lang="en-US" smtClean="0"/>
+              <a:t>38</a:t>
+            </a:fld>
+            <a:endParaRPr lang="en-US" dirty="0"/>
+          </a:p>
+        </p:txBody>
+      </p:sp>
+    </p:spTree>
+    <p:extLst>
+      <p:ext uri="{BB962C8B-B14F-4D97-AF65-F5344CB8AC3E}">
+        <p14:creationId xmlns:p14="http://schemas.microsoft.com/office/powerpoint/2010/main" val="1014657198"/>
+      </p:ext>
+    </p:extLst>
+  </p:cSld>
+  <p:clrMapOvr>
+    <a:masterClrMapping/>
+  </p:clrMapOvr>
+</p:notes>
+</file>
+
 <file path=ppt/notesSlides/notesSlide2.xml><?xml version="1.0" encoding="utf-8"?>
 <p:notes xmlns:a="http://schemas.openxmlformats.org/drawingml/2006/main" xmlns:r="http://schemas.openxmlformats.org/officeDocument/2006/relationships" xmlns:p="http://schemas.openxmlformats.org/presentationml/2006/main">
   <p:cSld>
@@ -1634,6 +2291,612 @@
     <p:extLst>
       <p:ext uri="{BB962C8B-B14F-4D97-AF65-F5344CB8AC3E}">
         <p14:creationId xmlns:p14="http://schemas.microsoft.com/office/powerpoint/2010/main" val="3079544872"/>
+      </p:ext>
+    </p:extLst>
+  </p:cSld>
+  <p:clrMapOvr>
+    <a:masterClrMapping/>
+  </p:clrMapOvr>
+</p:notes>
+</file>
+
+<file path=ppt/notesSlides/notesSlide20.xml><?xml version="1.0" encoding="utf-8"?>
+<p:notes xmlns:a="http://schemas.openxmlformats.org/drawingml/2006/main" xmlns:r="http://schemas.openxmlformats.org/officeDocument/2006/relationships" xmlns:p="http://schemas.openxmlformats.org/presentationml/2006/main">
+  <p:cSld>
+    <p:spTree>
+      <p:nvGrpSpPr>
+        <p:cNvPr id="1" name=""/>
+        <p:cNvGrpSpPr/>
+        <p:nvPr/>
+      </p:nvGrpSpPr>
+      <p:grpSpPr>
+        <a:xfrm>
+          <a:off x="0" y="0"/>
+          <a:ext cx="0" cy="0"/>
+          <a:chOff x="0" y="0"/>
+          <a:chExt cx="0" cy="0"/>
+        </a:xfrm>
+      </p:grpSpPr>
+      <p:sp>
+        <p:nvSpPr>
+          <p:cNvPr id="2" name="Slide Image Placeholder 1"/>
+          <p:cNvSpPr>
+            <a:spLocks noGrp="1" noRot="1" noChangeAspect="1"/>
+          </p:cNvSpPr>
+          <p:nvPr>
+            <p:ph type="sldImg"/>
+          </p:nvPr>
+        </p:nvSpPr>
+        <p:spPr/>
+      </p:sp>
+      <p:sp>
+        <p:nvSpPr>
+          <p:cNvPr id="3" name="Notes Placeholder 2"/>
+          <p:cNvSpPr>
+            <a:spLocks noGrp="1"/>
+          </p:cNvSpPr>
+          <p:nvPr>
+            <p:ph type="body" idx="1"/>
+          </p:nvPr>
+        </p:nvSpPr>
+        <p:spPr/>
+        <p:txBody>
+          <a:bodyPr/>
+          <a:lstStyle/>
+          <a:p>
+            <a:r>
+              <a:rPr lang="en-US" dirty="0" err="1"/>
+              <a:t>Problemet</a:t>
+            </a:r>
+            <a:r>
+              <a:rPr lang="en-US" dirty="0"/>
+              <a:t> med </a:t>
+            </a:r>
+            <a:r>
+              <a:rPr lang="en-US" dirty="0" err="1"/>
+              <a:t>vår</a:t>
+            </a:r>
+            <a:r>
+              <a:rPr lang="en-US" dirty="0"/>
+              <a:t> </a:t>
+            </a:r>
+            <a:r>
+              <a:rPr lang="en-US" dirty="0" err="1"/>
+              <a:t>alkhol</a:t>
+            </a:r>
+            <a:r>
+              <a:rPr lang="en-US" dirty="0"/>
+              <a:t> </a:t>
+            </a:r>
+            <a:r>
+              <a:rPr lang="en-US" dirty="0" err="1"/>
+              <a:t>sjekke</a:t>
+            </a:r>
+            <a:endParaRPr lang="en-US" dirty="0"/>
+          </a:p>
+        </p:txBody>
+      </p:sp>
+      <p:sp>
+        <p:nvSpPr>
+          <p:cNvPr id="4" name="Slide Number Placeholder 3"/>
+          <p:cNvSpPr>
+            <a:spLocks noGrp="1"/>
+          </p:cNvSpPr>
+          <p:nvPr>
+            <p:ph type="sldNum" sz="quarter" idx="5"/>
+          </p:nvPr>
+        </p:nvSpPr>
+        <p:spPr/>
+        <p:txBody>
+          <a:bodyPr/>
+          <a:lstStyle/>
+          <a:p>
+            <a:fld id="{C6B3AB32-59DF-41F1-9618-EDFBF5049629}" type="slidenum">
+              <a:rPr lang="en-US" smtClean="0"/>
+              <a:t>39</a:t>
+            </a:fld>
+            <a:endParaRPr lang="en-US" dirty="0"/>
+          </a:p>
+        </p:txBody>
+      </p:sp>
+    </p:spTree>
+    <p:extLst>
+      <p:ext uri="{BB962C8B-B14F-4D97-AF65-F5344CB8AC3E}">
+        <p14:creationId xmlns:p14="http://schemas.microsoft.com/office/powerpoint/2010/main" val="573198788"/>
+      </p:ext>
+    </p:extLst>
+  </p:cSld>
+  <p:clrMapOvr>
+    <a:masterClrMapping/>
+  </p:clrMapOvr>
+</p:notes>
+</file>
+
+<file path=ppt/notesSlides/notesSlide21.xml><?xml version="1.0" encoding="utf-8"?>
+<p:notes xmlns:a="http://schemas.openxmlformats.org/drawingml/2006/main" xmlns:r="http://schemas.openxmlformats.org/officeDocument/2006/relationships" xmlns:p="http://schemas.openxmlformats.org/presentationml/2006/main">
+  <p:cSld>
+    <p:spTree>
+      <p:nvGrpSpPr>
+        <p:cNvPr id="1" name=""/>
+        <p:cNvGrpSpPr/>
+        <p:nvPr/>
+      </p:nvGrpSpPr>
+      <p:grpSpPr>
+        <a:xfrm>
+          <a:off x="0" y="0"/>
+          <a:ext cx="0" cy="0"/>
+          <a:chOff x="0" y="0"/>
+          <a:chExt cx="0" cy="0"/>
+        </a:xfrm>
+      </p:grpSpPr>
+      <p:sp>
+        <p:nvSpPr>
+          <p:cNvPr id="2" name="Slide Image Placeholder 1"/>
+          <p:cNvSpPr>
+            <a:spLocks noGrp="1" noRot="1" noChangeAspect="1"/>
+          </p:cNvSpPr>
+          <p:nvPr>
+            <p:ph type="sldImg"/>
+          </p:nvPr>
+        </p:nvSpPr>
+        <p:spPr/>
+      </p:sp>
+      <p:sp>
+        <p:nvSpPr>
+          <p:cNvPr id="3" name="Notes Placeholder 2"/>
+          <p:cNvSpPr>
+            <a:spLocks noGrp="1"/>
+          </p:cNvSpPr>
+          <p:nvPr>
+            <p:ph type="body" idx="1"/>
+          </p:nvPr>
+        </p:nvSpPr>
+        <p:spPr/>
+        <p:txBody>
+          <a:bodyPr/>
+          <a:lstStyle/>
+          <a:p>
+            <a:endParaRPr lang="en-US" dirty="0"/>
+          </a:p>
+        </p:txBody>
+      </p:sp>
+      <p:sp>
+        <p:nvSpPr>
+          <p:cNvPr id="4" name="Slide Number Placeholder 3"/>
+          <p:cNvSpPr>
+            <a:spLocks noGrp="1"/>
+          </p:cNvSpPr>
+          <p:nvPr>
+            <p:ph type="sldNum" sz="quarter" idx="5"/>
+          </p:nvPr>
+        </p:nvSpPr>
+        <p:spPr/>
+        <p:txBody>
+          <a:bodyPr/>
+          <a:lstStyle/>
+          <a:p>
+            <a:fld id="{C6B3AB32-59DF-41F1-9618-EDFBF5049629}" type="slidenum">
+              <a:rPr lang="en-US" smtClean="0"/>
+              <a:t>40</a:t>
+            </a:fld>
+            <a:endParaRPr lang="en-US" dirty="0"/>
+          </a:p>
+        </p:txBody>
+      </p:sp>
+    </p:spTree>
+    <p:extLst>
+      <p:ext uri="{BB962C8B-B14F-4D97-AF65-F5344CB8AC3E}">
+        <p14:creationId xmlns:p14="http://schemas.microsoft.com/office/powerpoint/2010/main" val="1408318038"/>
+      </p:ext>
+    </p:extLst>
+  </p:cSld>
+  <p:clrMapOvr>
+    <a:masterClrMapping/>
+  </p:clrMapOvr>
+</p:notes>
+</file>
+
+<file path=ppt/notesSlides/notesSlide22.xml><?xml version="1.0" encoding="utf-8"?>
+<p:notes xmlns:a="http://schemas.openxmlformats.org/drawingml/2006/main" xmlns:r="http://schemas.openxmlformats.org/officeDocument/2006/relationships" xmlns:p="http://schemas.openxmlformats.org/presentationml/2006/main">
+  <p:cSld>
+    <p:spTree>
+      <p:nvGrpSpPr>
+        <p:cNvPr id="1" name=""/>
+        <p:cNvGrpSpPr/>
+        <p:nvPr/>
+      </p:nvGrpSpPr>
+      <p:grpSpPr>
+        <a:xfrm>
+          <a:off x="0" y="0"/>
+          <a:ext cx="0" cy="0"/>
+          <a:chOff x="0" y="0"/>
+          <a:chExt cx="0" cy="0"/>
+        </a:xfrm>
+      </p:grpSpPr>
+      <p:sp>
+        <p:nvSpPr>
+          <p:cNvPr id="2" name="Slide Image Placeholder 1"/>
+          <p:cNvSpPr>
+            <a:spLocks noGrp="1" noRot="1" noChangeAspect="1"/>
+          </p:cNvSpPr>
+          <p:nvPr>
+            <p:ph type="sldImg"/>
+          </p:nvPr>
+        </p:nvSpPr>
+        <p:spPr/>
+      </p:sp>
+      <p:sp>
+        <p:nvSpPr>
+          <p:cNvPr id="3" name="Notes Placeholder 2"/>
+          <p:cNvSpPr>
+            <a:spLocks noGrp="1"/>
+          </p:cNvSpPr>
+          <p:nvPr>
+            <p:ph type="body" idx="1"/>
+          </p:nvPr>
+        </p:nvSpPr>
+        <p:spPr/>
+        <p:txBody>
+          <a:bodyPr/>
+          <a:lstStyle/>
+          <a:p>
+            <a:pPr marL="0" marR="0" lvl="0" indent="0" algn="l" defTabSz="914400" rtl="0" eaLnBrk="1" fontAlgn="auto" latinLnBrk="0" hangingPunct="1">
+              <a:lnSpc>
+                <a:spcPct val="100000"/>
+              </a:lnSpc>
+              <a:spcBef>
+                <a:spcPts val="0"/>
+              </a:spcBef>
+              <a:spcAft>
+                <a:spcPts val="0"/>
+              </a:spcAft>
+              <a:buClrTx/>
+              <a:buSzTx/>
+              <a:buFontTx/>
+              <a:buNone/>
+              <a:tabLst/>
+              <a:defRPr/>
+            </a:pPr>
+            <a:r>
+              <a:rPr lang="en-US" dirty="0"/>
+              <a:t>Argument = </a:t>
+            </a:r>
+            <a:r>
+              <a:rPr lang="en-US" dirty="0" err="1"/>
+              <a:t>en</a:t>
+            </a:r>
+            <a:r>
+              <a:rPr lang="en-US" dirty="0"/>
+              <a:t> </a:t>
+            </a:r>
+            <a:r>
+              <a:rPr lang="en-US" dirty="0" err="1"/>
+              <a:t>måte</a:t>
+            </a:r>
+            <a:r>
+              <a:rPr lang="en-US" dirty="0"/>
+              <a:t> å </a:t>
+            </a:r>
+            <a:r>
+              <a:rPr lang="en-US" dirty="0" err="1"/>
+              <a:t>sende</a:t>
+            </a:r>
+            <a:r>
+              <a:rPr lang="en-US" dirty="0"/>
+              <a:t> inn data </a:t>
+            </a:r>
+            <a:r>
+              <a:rPr lang="en-US" dirty="0" err="1"/>
+              <a:t>til</a:t>
+            </a:r>
+            <a:r>
+              <a:rPr lang="en-US" dirty="0"/>
+              <a:t> </a:t>
+            </a:r>
+            <a:r>
+              <a:rPr lang="en-US" dirty="0" err="1"/>
+              <a:t>en</a:t>
+            </a:r>
+            <a:r>
+              <a:rPr lang="en-US" dirty="0"/>
+              <a:t> </a:t>
+            </a:r>
+            <a:r>
+              <a:rPr lang="en-US" dirty="0" err="1"/>
+              <a:t>funksjon</a:t>
+            </a:r>
+            <a:endParaRPr lang="en-US" dirty="0"/>
+          </a:p>
+          <a:p>
+            <a:endParaRPr lang="en-US" dirty="0"/>
+          </a:p>
+        </p:txBody>
+      </p:sp>
+      <p:sp>
+        <p:nvSpPr>
+          <p:cNvPr id="4" name="Slide Number Placeholder 3"/>
+          <p:cNvSpPr>
+            <a:spLocks noGrp="1"/>
+          </p:cNvSpPr>
+          <p:nvPr>
+            <p:ph type="sldNum" sz="quarter" idx="5"/>
+          </p:nvPr>
+        </p:nvSpPr>
+        <p:spPr/>
+        <p:txBody>
+          <a:bodyPr/>
+          <a:lstStyle/>
+          <a:p>
+            <a:fld id="{C6B3AB32-59DF-41F1-9618-EDFBF5049629}" type="slidenum">
+              <a:rPr lang="en-US" smtClean="0"/>
+              <a:t>41</a:t>
+            </a:fld>
+            <a:endParaRPr lang="en-US" dirty="0"/>
+          </a:p>
+        </p:txBody>
+      </p:sp>
+    </p:spTree>
+    <p:extLst>
+      <p:ext uri="{BB962C8B-B14F-4D97-AF65-F5344CB8AC3E}">
+        <p14:creationId xmlns:p14="http://schemas.microsoft.com/office/powerpoint/2010/main" val="1115778320"/>
+      </p:ext>
+    </p:extLst>
+  </p:cSld>
+  <p:clrMapOvr>
+    <a:masterClrMapping/>
+  </p:clrMapOvr>
+</p:notes>
+</file>
+
+<file path=ppt/notesSlides/notesSlide23.xml><?xml version="1.0" encoding="utf-8"?>
+<p:notes xmlns:a="http://schemas.openxmlformats.org/drawingml/2006/main" xmlns:r="http://schemas.openxmlformats.org/officeDocument/2006/relationships" xmlns:p="http://schemas.openxmlformats.org/presentationml/2006/main">
+  <p:cSld>
+    <p:spTree>
+      <p:nvGrpSpPr>
+        <p:cNvPr id="1" name=""/>
+        <p:cNvGrpSpPr/>
+        <p:nvPr/>
+      </p:nvGrpSpPr>
+      <p:grpSpPr>
+        <a:xfrm>
+          <a:off x="0" y="0"/>
+          <a:ext cx="0" cy="0"/>
+          <a:chOff x="0" y="0"/>
+          <a:chExt cx="0" cy="0"/>
+        </a:xfrm>
+      </p:grpSpPr>
+      <p:sp>
+        <p:nvSpPr>
+          <p:cNvPr id="2" name="Slide Image Placeholder 1"/>
+          <p:cNvSpPr>
+            <a:spLocks noGrp="1" noRot="1" noChangeAspect="1"/>
+          </p:cNvSpPr>
+          <p:nvPr>
+            <p:ph type="sldImg"/>
+          </p:nvPr>
+        </p:nvSpPr>
+        <p:spPr/>
+      </p:sp>
+      <p:sp>
+        <p:nvSpPr>
+          <p:cNvPr id="3" name="Notes Placeholder 2"/>
+          <p:cNvSpPr>
+            <a:spLocks noGrp="1"/>
+          </p:cNvSpPr>
+          <p:nvPr>
+            <p:ph type="body" idx="1"/>
+          </p:nvPr>
+        </p:nvSpPr>
+        <p:spPr/>
+        <p:txBody>
+          <a:bodyPr/>
+          <a:lstStyle/>
+          <a:p>
+            <a:endParaRPr lang="en-US" dirty="0"/>
+          </a:p>
+        </p:txBody>
+      </p:sp>
+      <p:sp>
+        <p:nvSpPr>
+          <p:cNvPr id="4" name="Slide Number Placeholder 3"/>
+          <p:cNvSpPr>
+            <a:spLocks noGrp="1"/>
+          </p:cNvSpPr>
+          <p:nvPr>
+            <p:ph type="sldNum" sz="quarter" idx="5"/>
+          </p:nvPr>
+        </p:nvSpPr>
+        <p:spPr/>
+        <p:txBody>
+          <a:bodyPr/>
+          <a:lstStyle/>
+          <a:p>
+            <a:fld id="{C6B3AB32-59DF-41F1-9618-EDFBF5049629}" type="slidenum">
+              <a:rPr lang="en-US" smtClean="0"/>
+              <a:t>42</a:t>
+            </a:fld>
+            <a:endParaRPr lang="en-US" dirty="0"/>
+          </a:p>
+        </p:txBody>
+      </p:sp>
+    </p:spTree>
+    <p:extLst>
+      <p:ext uri="{BB962C8B-B14F-4D97-AF65-F5344CB8AC3E}">
+        <p14:creationId xmlns:p14="http://schemas.microsoft.com/office/powerpoint/2010/main" val="611392913"/>
+      </p:ext>
+    </p:extLst>
+  </p:cSld>
+  <p:clrMapOvr>
+    <a:masterClrMapping/>
+  </p:clrMapOvr>
+</p:notes>
+</file>
+
+<file path=ppt/notesSlides/notesSlide24.xml><?xml version="1.0" encoding="utf-8"?>
+<p:notes xmlns:a="http://schemas.openxmlformats.org/drawingml/2006/main" xmlns:r="http://schemas.openxmlformats.org/officeDocument/2006/relationships" xmlns:p="http://schemas.openxmlformats.org/presentationml/2006/main">
+  <p:cSld>
+    <p:spTree>
+      <p:nvGrpSpPr>
+        <p:cNvPr id="1" name=""/>
+        <p:cNvGrpSpPr/>
+        <p:nvPr/>
+      </p:nvGrpSpPr>
+      <p:grpSpPr>
+        <a:xfrm>
+          <a:off x="0" y="0"/>
+          <a:ext cx="0" cy="0"/>
+          <a:chOff x="0" y="0"/>
+          <a:chExt cx="0" cy="0"/>
+        </a:xfrm>
+      </p:grpSpPr>
+      <p:sp>
+        <p:nvSpPr>
+          <p:cNvPr id="2" name="Slide Image Placeholder 1"/>
+          <p:cNvSpPr>
+            <a:spLocks noGrp="1" noRot="1" noChangeAspect="1"/>
+          </p:cNvSpPr>
+          <p:nvPr>
+            <p:ph type="sldImg"/>
+          </p:nvPr>
+        </p:nvSpPr>
+        <p:spPr/>
+      </p:sp>
+      <p:sp>
+        <p:nvSpPr>
+          <p:cNvPr id="3" name="Notes Placeholder 2"/>
+          <p:cNvSpPr>
+            <a:spLocks noGrp="1"/>
+          </p:cNvSpPr>
+          <p:nvPr>
+            <p:ph type="body" idx="1"/>
+          </p:nvPr>
+        </p:nvSpPr>
+        <p:spPr/>
+        <p:txBody>
+          <a:bodyPr/>
+          <a:lstStyle/>
+          <a:p>
+            <a:r>
+              <a:rPr lang="en-US" dirty="0"/>
+              <a:t>Task 8</a:t>
+            </a:r>
+          </a:p>
+        </p:txBody>
+      </p:sp>
+      <p:sp>
+        <p:nvSpPr>
+          <p:cNvPr id="4" name="Slide Number Placeholder 3"/>
+          <p:cNvSpPr>
+            <a:spLocks noGrp="1"/>
+          </p:cNvSpPr>
+          <p:nvPr>
+            <p:ph type="sldNum" sz="quarter" idx="5"/>
+          </p:nvPr>
+        </p:nvSpPr>
+        <p:spPr/>
+        <p:txBody>
+          <a:bodyPr/>
+          <a:lstStyle/>
+          <a:p>
+            <a:fld id="{C6B3AB32-59DF-41F1-9618-EDFBF5049629}" type="slidenum">
+              <a:rPr lang="en-US" smtClean="0"/>
+              <a:t>43</a:t>
+            </a:fld>
+            <a:endParaRPr lang="en-US" dirty="0"/>
+          </a:p>
+        </p:txBody>
+      </p:sp>
+    </p:spTree>
+    <p:extLst>
+      <p:ext uri="{BB962C8B-B14F-4D97-AF65-F5344CB8AC3E}">
+        <p14:creationId xmlns:p14="http://schemas.microsoft.com/office/powerpoint/2010/main" val="3983931157"/>
+      </p:ext>
+    </p:extLst>
+  </p:cSld>
+  <p:clrMapOvr>
+    <a:masterClrMapping/>
+  </p:clrMapOvr>
+</p:notes>
+</file>
+
+<file path=ppt/notesSlides/notesSlide25.xml><?xml version="1.0" encoding="utf-8"?>
+<p:notes xmlns:a="http://schemas.openxmlformats.org/drawingml/2006/main" xmlns:r="http://schemas.openxmlformats.org/officeDocument/2006/relationships" xmlns:p="http://schemas.openxmlformats.org/presentationml/2006/main">
+  <p:cSld>
+    <p:spTree>
+      <p:nvGrpSpPr>
+        <p:cNvPr id="1" name=""/>
+        <p:cNvGrpSpPr/>
+        <p:nvPr/>
+      </p:nvGrpSpPr>
+      <p:grpSpPr>
+        <a:xfrm>
+          <a:off x="0" y="0"/>
+          <a:ext cx="0" cy="0"/>
+          <a:chOff x="0" y="0"/>
+          <a:chExt cx="0" cy="0"/>
+        </a:xfrm>
+      </p:grpSpPr>
+      <p:sp>
+        <p:nvSpPr>
+          <p:cNvPr id="2" name="Slide Image Placeholder 1"/>
+          <p:cNvSpPr>
+            <a:spLocks noGrp="1" noRot="1" noChangeAspect="1"/>
+          </p:cNvSpPr>
+          <p:nvPr>
+            <p:ph type="sldImg"/>
+          </p:nvPr>
+        </p:nvSpPr>
+        <p:spPr/>
+      </p:sp>
+      <p:sp>
+        <p:nvSpPr>
+          <p:cNvPr id="3" name="Notes Placeholder 2"/>
+          <p:cNvSpPr>
+            <a:spLocks noGrp="1"/>
+          </p:cNvSpPr>
+          <p:nvPr>
+            <p:ph type="body" idx="1"/>
+          </p:nvPr>
+        </p:nvSpPr>
+        <p:spPr/>
+        <p:txBody>
+          <a:bodyPr/>
+          <a:lstStyle/>
+          <a:p>
+            <a:r>
+              <a:rPr lang="en-US" dirty="0"/>
+              <a:t>Task 9</a:t>
+            </a:r>
+          </a:p>
+        </p:txBody>
+      </p:sp>
+      <p:sp>
+        <p:nvSpPr>
+          <p:cNvPr id="4" name="Slide Number Placeholder 3"/>
+          <p:cNvSpPr>
+            <a:spLocks noGrp="1"/>
+          </p:cNvSpPr>
+          <p:nvPr>
+            <p:ph type="sldNum" sz="quarter" idx="5"/>
+          </p:nvPr>
+        </p:nvSpPr>
+        <p:spPr/>
+        <p:txBody>
+          <a:bodyPr/>
+          <a:lstStyle/>
+          <a:p>
+            <a:fld id="{C6B3AB32-59DF-41F1-9618-EDFBF5049629}" type="slidenum">
+              <a:rPr lang="en-US" smtClean="0"/>
+              <a:t>44</a:t>
+            </a:fld>
+            <a:endParaRPr lang="en-US" dirty="0"/>
+          </a:p>
+        </p:txBody>
+      </p:sp>
+    </p:spTree>
+    <p:extLst>
+      <p:ext uri="{BB962C8B-B14F-4D97-AF65-F5344CB8AC3E}">
+        <p14:creationId xmlns:p14="http://schemas.microsoft.com/office/powerpoint/2010/main" val="3708620349"/>
       </p:ext>
     </p:extLst>
   </p:cSld>
@@ -3406,7 +4669,7 @@
             <a:fld id="{B61BEF0D-F0BB-DE4B-95CE-6DB70DBA9567}" type="datetimeFigureOut">
               <a:rPr lang="en-US" smtClean="0"/>
               <a:pPr/>
-              <a:t>2/13/2023</a:t>
+              <a:t>2/17/2023</a:t>
             </a:fld>
             <a:endParaRPr lang="en-US" dirty="0"/>
           </a:p>
@@ -3670,7 +4933,7 @@
             <a:fld id="{B61BEF0D-F0BB-DE4B-95CE-6DB70DBA9567}" type="datetimeFigureOut">
               <a:rPr lang="en-US" smtClean="0"/>
               <a:pPr/>
-              <a:t>2/13/2023</a:t>
+              <a:t>2/17/2023</a:t>
             </a:fld>
             <a:endParaRPr lang="en-US" dirty="0"/>
           </a:p>
@@ -3907,7 +5170,7 @@
             <a:fld id="{B61BEF0D-F0BB-DE4B-95CE-6DB70DBA9567}" type="datetimeFigureOut">
               <a:rPr lang="en-US" smtClean="0"/>
               <a:pPr/>
-              <a:t>2/13/2023</a:t>
+              <a:t>2/17/2023</a:t>
             </a:fld>
             <a:endParaRPr lang="en-US" dirty="0"/>
           </a:p>
@@ -4149,7 +5412,7 @@
             <a:fld id="{B61BEF0D-F0BB-DE4B-95CE-6DB70DBA9567}" type="datetimeFigureOut">
               <a:rPr lang="en-US" smtClean="0"/>
               <a:pPr/>
-              <a:t>2/13/2023</a:t>
+              <a:t>2/17/2023</a:t>
             </a:fld>
             <a:endParaRPr lang="en-US" dirty="0"/>
           </a:p>
@@ -4458,7 +5721,7 @@
             <a:fld id="{B61BEF0D-F0BB-DE4B-95CE-6DB70DBA9567}" type="datetimeFigureOut">
               <a:rPr lang="en-US" smtClean="0"/>
               <a:pPr/>
-              <a:t>2/13/2023</a:t>
+              <a:t>2/17/2023</a:t>
             </a:fld>
             <a:endParaRPr lang="en-US" dirty="0"/>
           </a:p>
@@ -4762,7 +6025,7 @@
             <a:fld id="{B61BEF0D-F0BB-DE4B-95CE-6DB70DBA9567}" type="datetimeFigureOut">
               <a:rPr lang="en-US" smtClean="0"/>
               <a:pPr/>
-              <a:t>2/13/2023</a:t>
+              <a:t>2/17/2023</a:t>
             </a:fld>
             <a:endParaRPr lang="en-US" dirty="0"/>
           </a:p>
@@ -5186,7 +6449,7 @@
             <a:fld id="{B61BEF0D-F0BB-DE4B-95CE-6DB70DBA9567}" type="datetimeFigureOut">
               <a:rPr lang="en-US" smtClean="0"/>
               <a:pPr/>
-              <a:t>2/13/2023</a:t>
+              <a:t>2/17/2023</a:t>
             </a:fld>
             <a:endParaRPr lang="en-US" dirty="0"/>
           </a:p>
@@ -5283,7 +6546,7 @@
             <a:fld id="{B61BEF0D-F0BB-DE4B-95CE-6DB70DBA9567}" type="datetimeFigureOut">
               <a:rPr lang="en-US" smtClean="0"/>
               <a:pPr/>
-              <a:t>2/13/2023</a:t>
+              <a:t>2/17/2023</a:t>
             </a:fld>
             <a:endParaRPr lang="en-US" dirty="0"/>
           </a:p>
@@ -5447,7 +6710,7 @@
             <a:fld id="{B61BEF0D-F0BB-DE4B-95CE-6DB70DBA9567}" type="datetimeFigureOut">
               <a:rPr lang="en-US" smtClean="0"/>
               <a:pPr/>
-              <a:t>2/13/2023</a:t>
+              <a:t>2/17/2023</a:t>
             </a:fld>
             <a:endParaRPr lang="en-US" dirty="0"/>
           </a:p>
@@ -5827,7 +7090,7 @@
             <a:fld id="{B61BEF0D-F0BB-DE4B-95CE-6DB70DBA9567}" type="datetimeFigureOut">
               <a:rPr lang="en-US" smtClean="0"/>
               <a:pPr/>
-              <a:t>2/13/2023</a:t>
+              <a:t>2/17/2023</a:t>
             </a:fld>
             <a:endParaRPr lang="en-US" dirty="0"/>
           </a:p>
@@ -6117,7 +7380,7 @@
             <a:fld id="{B61BEF0D-F0BB-DE4B-95CE-6DB70DBA9567}" type="datetimeFigureOut">
               <a:rPr lang="en-US" smtClean="0"/>
               <a:pPr/>
-              <a:t>2/13/2023</a:t>
+              <a:t>2/17/2023</a:t>
             </a:fld>
             <a:endParaRPr lang="en-US" dirty="0"/>
           </a:p>
@@ -6330,7 +7593,7 @@
             <a:fld id="{B61BEF0D-F0BB-DE4B-95CE-6DB70DBA9567}" type="datetimeFigureOut">
               <a:rPr lang="en-US" smtClean="0"/>
               <a:pPr/>
-              <a:t>2/13/2023</a:t>
+              <a:t>2/17/2023</a:t>
             </a:fld>
             <a:endParaRPr lang="en-US" dirty="0"/>
           </a:p>
@@ -12280,15 +13543,7 @@
             </a:r>
             <a:r>
               <a:rPr lang="en-US" dirty="0" err="1"/>
-              <a:t>lønns</a:t>
-            </a:r>
-            <a:r>
-              <a:rPr lang="en-US" dirty="0"/>
-              <a:t> </a:t>
-            </a:r>
-            <a:r>
-              <a:rPr lang="en-US" dirty="0" err="1"/>
-              <a:t>sjekking</a:t>
+              <a:t>lønnsjekking</a:t>
             </a:r>
             <a:r>
               <a:rPr lang="en-US" dirty="0"/>
@@ -12362,6 +13617,1270 @@
     <p:extLst>
       <p:ext uri="{BB962C8B-B14F-4D97-AF65-F5344CB8AC3E}">
         <p14:creationId xmlns:p14="http://schemas.microsoft.com/office/powerpoint/2010/main" val="1391934264"/>
+      </p:ext>
+    </p:extLst>
+  </p:cSld>
+  <p:clrMapOvr>
+    <a:masterClrMapping/>
+  </p:clrMapOvr>
+</p:sld>
+</file>
+
+<file path=ppt/slides/slide33.xml><?xml version="1.0" encoding="utf-8"?>
+<p:sld xmlns:a="http://schemas.openxmlformats.org/drawingml/2006/main" xmlns:r="http://schemas.openxmlformats.org/officeDocument/2006/relationships" xmlns:p="http://schemas.openxmlformats.org/presentationml/2006/main">
+  <p:cSld>
+    <p:spTree>
+      <p:nvGrpSpPr>
+        <p:cNvPr id="1" name=""/>
+        <p:cNvGrpSpPr/>
+        <p:nvPr/>
+      </p:nvGrpSpPr>
+      <p:grpSpPr>
+        <a:xfrm>
+          <a:off x="0" y="0"/>
+          <a:ext cx="0" cy="0"/>
+          <a:chOff x="0" y="0"/>
+          <a:chExt cx="0" cy="0"/>
+        </a:xfrm>
+      </p:grpSpPr>
+      <p:sp>
+        <p:nvSpPr>
+          <p:cNvPr id="2" name="Title 1">
+            <a:extLst>
+              <a:ext uri="{FF2B5EF4-FFF2-40B4-BE49-F238E27FC236}">
+                <a16:creationId xmlns:a16="http://schemas.microsoft.com/office/drawing/2014/main" id="{3ABFBF39-3400-48EA-F0E7-48E7B9FC9789}"/>
+              </a:ext>
+            </a:extLst>
+          </p:cNvPr>
+          <p:cNvSpPr>
+            <a:spLocks noGrp="1"/>
+          </p:cNvSpPr>
+          <p:nvPr>
+            <p:ph type="title"/>
+          </p:nvPr>
+        </p:nvSpPr>
+        <p:spPr/>
+        <p:txBody>
+          <a:bodyPr/>
+          <a:lstStyle/>
+          <a:p>
+            <a:r>
+              <a:rPr lang="en-US" dirty="0" err="1"/>
+              <a:t>Oppsumering</a:t>
+            </a:r>
+            <a:r>
+              <a:rPr lang="en-US" dirty="0"/>
+              <a:t> av </a:t>
+            </a:r>
+            <a:r>
+              <a:rPr lang="en-US" dirty="0" err="1"/>
+              <a:t>vårt</a:t>
+            </a:r>
+            <a:r>
+              <a:rPr lang="en-US" dirty="0"/>
+              <a:t> </a:t>
+            </a:r>
+            <a:r>
+              <a:rPr lang="en-US" dirty="0" err="1"/>
+              <a:t>nåværende</a:t>
+            </a:r>
+            <a:r>
+              <a:rPr lang="en-US" dirty="0"/>
+              <a:t> program</a:t>
+            </a:r>
+          </a:p>
+        </p:txBody>
+      </p:sp>
+      <p:sp>
+        <p:nvSpPr>
+          <p:cNvPr id="3" name="Content Placeholder 2">
+            <a:extLst>
+              <a:ext uri="{FF2B5EF4-FFF2-40B4-BE49-F238E27FC236}">
+                <a16:creationId xmlns:a16="http://schemas.microsoft.com/office/drawing/2014/main" id="{15C7F59B-8EB9-F31A-9ABF-46980A77D09C}"/>
+              </a:ext>
+            </a:extLst>
+          </p:cNvPr>
+          <p:cNvSpPr>
+            <a:spLocks noGrp="1"/>
+          </p:cNvSpPr>
+          <p:nvPr>
+            <p:ph idx="1"/>
+          </p:nvPr>
+        </p:nvSpPr>
+        <p:spPr/>
+        <p:txBody>
+          <a:bodyPr/>
+          <a:lstStyle/>
+          <a:p>
+            <a:r>
+              <a:rPr lang="en-US" dirty="0" err="1"/>
+              <a:t>Vårt</a:t>
+            </a:r>
+            <a:r>
+              <a:rPr lang="en-US" dirty="0"/>
+              <a:t> program </a:t>
+            </a:r>
+            <a:r>
+              <a:rPr lang="en-US" dirty="0" err="1"/>
+              <a:t>gjør</a:t>
+            </a:r>
+            <a:r>
+              <a:rPr lang="en-US" dirty="0"/>
+              <a:t> 2 ting:</a:t>
+            </a:r>
+          </a:p>
+          <a:p>
+            <a:pPr lvl="1"/>
+            <a:r>
+              <a:rPr lang="en-US" dirty="0"/>
+              <a:t>Printer </a:t>
+            </a:r>
+            <a:r>
+              <a:rPr lang="en-US" dirty="0" err="1"/>
+              <a:t>informasjon</a:t>
+            </a:r>
+            <a:r>
+              <a:rPr lang="en-US" dirty="0"/>
+              <a:t> om deg</a:t>
+            </a:r>
+          </a:p>
+          <a:p>
+            <a:pPr lvl="1"/>
+            <a:r>
+              <a:rPr lang="en-US" dirty="0" err="1"/>
+              <a:t>Sjekker</a:t>
+            </a:r>
+            <a:r>
+              <a:rPr lang="en-US" dirty="0"/>
+              <a:t> om du er </a:t>
+            </a:r>
+            <a:r>
+              <a:rPr lang="en-US" dirty="0" err="1"/>
+              <a:t>fornøyd</a:t>
+            </a:r>
+            <a:r>
+              <a:rPr lang="en-US" dirty="0"/>
+              <a:t> med din </a:t>
+            </a:r>
+            <a:r>
+              <a:rPr lang="en-US" dirty="0" err="1"/>
+              <a:t>lønn</a:t>
+            </a:r>
+            <a:endParaRPr lang="en-US" dirty="0"/>
+          </a:p>
+        </p:txBody>
+      </p:sp>
+    </p:spTree>
+    <p:extLst>
+      <p:ext uri="{BB962C8B-B14F-4D97-AF65-F5344CB8AC3E}">
+        <p14:creationId xmlns:p14="http://schemas.microsoft.com/office/powerpoint/2010/main" val="2510393707"/>
+      </p:ext>
+    </p:extLst>
+  </p:cSld>
+  <p:clrMapOvr>
+    <a:masterClrMapping/>
+  </p:clrMapOvr>
+</p:sld>
+</file>
+
+<file path=ppt/slides/slide34.xml><?xml version="1.0" encoding="utf-8"?>
+<p:sld xmlns:a="http://schemas.openxmlformats.org/drawingml/2006/main" xmlns:r="http://schemas.openxmlformats.org/officeDocument/2006/relationships" xmlns:p="http://schemas.openxmlformats.org/presentationml/2006/main">
+  <p:cSld>
+    <p:spTree>
+      <p:nvGrpSpPr>
+        <p:cNvPr id="1" name=""/>
+        <p:cNvGrpSpPr/>
+        <p:nvPr/>
+      </p:nvGrpSpPr>
+      <p:grpSpPr>
+        <a:xfrm>
+          <a:off x="0" y="0"/>
+          <a:ext cx="0" cy="0"/>
+          <a:chOff x="0" y="0"/>
+          <a:chExt cx="0" cy="0"/>
+        </a:xfrm>
+      </p:grpSpPr>
+      <p:sp>
+        <p:nvSpPr>
+          <p:cNvPr id="2" name="Title 1">
+            <a:extLst>
+              <a:ext uri="{FF2B5EF4-FFF2-40B4-BE49-F238E27FC236}">
+                <a16:creationId xmlns:a16="http://schemas.microsoft.com/office/drawing/2014/main" id="{01179F77-1DD0-7211-5A4C-F2FF335A8D05}"/>
+              </a:ext>
+            </a:extLst>
+          </p:cNvPr>
+          <p:cNvSpPr>
+            <a:spLocks noGrp="1"/>
+          </p:cNvSpPr>
+          <p:nvPr>
+            <p:ph type="title"/>
+          </p:nvPr>
+        </p:nvSpPr>
+        <p:spPr/>
+        <p:txBody>
+          <a:bodyPr/>
+          <a:lstStyle/>
+          <a:p>
+            <a:r>
+              <a:rPr lang="en-US" dirty="0"/>
+              <a:t>Ny </a:t>
+            </a:r>
+            <a:r>
+              <a:rPr lang="en-US" dirty="0" err="1"/>
+              <a:t>problemstilling</a:t>
+            </a:r>
+            <a:endParaRPr lang="en-US" dirty="0"/>
+          </a:p>
+        </p:txBody>
+      </p:sp>
+      <p:sp>
+        <p:nvSpPr>
+          <p:cNvPr id="3" name="Content Placeholder 2">
+            <a:extLst>
+              <a:ext uri="{FF2B5EF4-FFF2-40B4-BE49-F238E27FC236}">
+                <a16:creationId xmlns:a16="http://schemas.microsoft.com/office/drawing/2014/main" id="{A3A493DE-AEB1-D184-7746-2FA32D13B7CC}"/>
+              </a:ext>
+            </a:extLst>
+          </p:cNvPr>
+          <p:cNvSpPr>
+            <a:spLocks noGrp="1"/>
+          </p:cNvSpPr>
+          <p:nvPr>
+            <p:ph idx="1"/>
+          </p:nvPr>
+        </p:nvSpPr>
+        <p:spPr/>
+        <p:txBody>
+          <a:bodyPr/>
+          <a:lstStyle/>
+          <a:p>
+            <a:r>
+              <a:rPr lang="en-US" dirty="0" err="1"/>
+              <a:t>Istedenfor</a:t>
+            </a:r>
+            <a:r>
+              <a:rPr lang="en-US" dirty="0"/>
+              <a:t> å </a:t>
+            </a:r>
+            <a:r>
+              <a:rPr lang="en-US" dirty="0" err="1"/>
+              <a:t>kun</a:t>
+            </a:r>
+            <a:r>
+              <a:rPr lang="en-US" dirty="0"/>
+              <a:t> </a:t>
+            </a:r>
+            <a:r>
+              <a:rPr lang="en-US" dirty="0" err="1"/>
+              <a:t>sjekke</a:t>
+            </a:r>
+            <a:r>
+              <a:rPr lang="en-US" dirty="0"/>
+              <a:t> </a:t>
+            </a:r>
+            <a:r>
+              <a:rPr lang="en-US" dirty="0" err="1"/>
+              <a:t>lønnenstilfredehente</a:t>
+            </a:r>
+            <a:r>
+              <a:rPr lang="en-US" dirty="0"/>
+              <a:t> </a:t>
+            </a:r>
+            <a:r>
+              <a:rPr lang="en-US" dirty="0" err="1"/>
+              <a:t>til</a:t>
+            </a:r>
+            <a:r>
+              <a:rPr lang="en-US" dirty="0"/>
+              <a:t> </a:t>
+            </a:r>
+            <a:r>
+              <a:rPr lang="en-US" dirty="0" err="1"/>
+              <a:t>kun</a:t>
+            </a:r>
+            <a:r>
+              <a:rPr lang="en-US" dirty="0"/>
+              <a:t> deg, </a:t>
+            </a:r>
+            <a:r>
+              <a:rPr lang="en-US" dirty="0" err="1"/>
+              <a:t>så</a:t>
+            </a:r>
+            <a:r>
+              <a:rPr lang="en-US" dirty="0"/>
+              <a:t> </a:t>
+            </a:r>
+            <a:r>
+              <a:rPr lang="en-US" dirty="0" err="1"/>
+              <a:t>vil</a:t>
+            </a:r>
+            <a:r>
+              <a:rPr lang="en-US" dirty="0"/>
+              <a:t> at du </a:t>
+            </a:r>
+            <a:r>
+              <a:rPr lang="en-US" dirty="0" err="1"/>
+              <a:t>skal</a:t>
+            </a:r>
+            <a:r>
+              <a:rPr lang="en-US" dirty="0"/>
+              <a:t> </a:t>
+            </a:r>
+            <a:r>
+              <a:rPr lang="en-US" dirty="0" err="1"/>
+              <a:t>sjekke</a:t>
+            </a:r>
+            <a:r>
+              <a:rPr lang="en-US" dirty="0"/>
+              <a:t> for mange </a:t>
+            </a:r>
+            <a:r>
+              <a:rPr lang="en-US" dirty="0" err="1"/>
+              <a:t>forskjellige</a:t>
+            </a:r>
+            <a:r>
+              <a:rPr lang="en-US" dirty="0"/>
+              <a:t> folk. </a:t>
+            </a:r>
+          </a:p>
+          <a:p>
+            <a:r>
+              <a:rPr lang="en-US" dirty="0" err="1"/>
+              <a:t>Jeg</a:t>
+            </a:r>
+            <a:r>
+              <a:rPr lang="en-US" dirty="0"/>
+              <a:t> </a:t>
+            </a:r>
+            <a:r>
+              <a:rPr lang="en-US" dirty="0" err="1"/>
+              <a:t>vil</a:t>
+            </a:r>
+            <a:r>
+              <a:rPr lang="en-US" dirty="0"/>
+              <a:t> </a:t>
+            </a:r>
+            <a:r>
+              <a:rPr lang="en-US" dirty="0" err="1"/>
+              <a:t>også</a:t>
+            </a:r>
+            <a:r>
+              <a:rPr lang="en-US" dirty="0"/>
+              <a:t> at du </a:t>
+            </a:r>
+            <a:r>
+              <a:rPr lang="en-US" dirty="0" err="1"/>
+              <a:t>skal</a:t>
+            </a:r>
+            <a:r>
+              <a:rPr lang="en-US" dirty="0"/>
+              <a:t> </a:t>
+            </a:r>
+            <a:r>
+              <a:rPr lang="en-US" dirty="0" err="1"/>
+              <a:t>printe</a:t>
+            </a:r>
+            <a:r>
+              <a:rPr lang="en-US" dirty="0"/>
+              <a:t> </a:t>
+            </a:r>
+            <a:r>
+              <a:rPr lang="en-US" dirty="0" err="1"/>
+              <a:t>ut</a:t>
+            </a:r>
+            <a:r>
+              <a:rPr lang="en-US" dirty="0"/>
+              <a:t> </a:t>
+            </a:r>
+            <a:r>
+              <a:rPr lang="en-US" dirty="0" err="1"/>
+              <a:t>faktaen</a:t>
+            </a:r>
+            <a:r>
+              <a:rPr lang="en-US" dirty="0"/>
+              <a:t> om deg </a:t>
+            </a:r>
+            <a:r>
+              <a:rPr lang="en-US" dirty="0" err="1"/>
+              <a:t>selv</a:t>
+            </a:r>
+            <a:r>
+              <a:rPr lang="en-US" dirty="0"/>
+              <a:t>, 10 ganger. </a:t>
+            </a:r>
+          </a:p>
+        </p:txBody>
+      </p:sp>
+    </p:spTree>
+    <p:extLst>
+      <p:ext uri="{BB962C8B-B14F-4D97-AF65-F5344CB8AC3E}">
+        <p14:creationId xmlns:p14="http://schemas.microsoft.com/office/powerpoint/2010/main" val="4074006484"/>
+      </p:ext>
+    </p:extLst>
+  </p:cSld>
+  <p:clrMapOvr>
+    <a:masterClrMapping/>
+  </p:clrMapOvr>
+</p:sld>
+</file>
+
+<file path=ppt/slides/slide35.xml><?xml version="1.0" encoding="utf-8"?>
+<p:sld xmlns:a="http://schemas.openxmlformats.org/drawingml/2006/main" xmlns:r="http://schemas.openxmlformats.org/officeDocument/2006/relationships" xmlns:p="http://schemas.openxmlformats.org/presentationml/2006/main">
+  <p:cSld>
+    <p:spTree>
+      <p:nvGrpSpPr>
+        <p:cNvPr id="1" name=""/>
+        <p:cNvGrpSpPr/>
+        <p:nvPr/>
+      </p:nvGrpSpPr>
+      <p:grpSpPr>
+        <a:xfrm>
+          <a:off x="0" y="0"/>
+          <a:ext cx="0" cy="0"/>
+          <a:chOff x="0" y="0"/>
+          <a:chExt cx="0" cy="0"/>
+        </a:xfrm>
+      </p:grpSpPr>
+      <p:sp>
+        <p:nvSpPr>
+          <p:cNvPr id="2" name="Title 1">
+            <a:extLst>
+              <a:ext uri="{FF2B5EF4-FFF2-40B4-BE49-F238E27FC236}">
+                <a16:creationId xmlns:a16="http://schemas.microsoft.com/office/drawing/2014/main" id="{DD1553EC-A0C3-978A-D6ED-0468698E0C12}"/>
+              </a:ext>
+            </a:extLst>
+          </p:cNvPr>
+          <p:cNvSpPr>
+            <a:spLocks noGrp="1"/>
+          </p:cNvSpPr>
+          <p:nvPr>
+            <p:ph type="title"/>
+          </p:nvPr>
+        </p:nvSpPr>
+        <p:spPr/>
+        <p:txBody>
+          <a:bodyPr/>
+          <a:lstStyle/>
+          <a:p>
+            <a:r>
+              <a:rPr lang="en-US" dirty="0" err="1"/>
+              <a:t>Tilbake</a:t>
+            </a:r>
+            <a:r>
+              <a:rPr lang="en-US" dirty="0"/>
+              <a:t> </a:t>
+            </a:r>
+            <a:r>
+              <a:rPr lang="en-US" dirty="0" err="1"/>
+              <a:t>til</a:t>
+            </a:r>
+            <a:r>
+              <a:rPr lang="en-US" dirty="0"/>
+              <a:t> </a:t>
+            </a:r>
+            <a:r>
+              <a:rPr lang="en-US" dirty="0" err="1"/>
+              <a:t>funksjoner</a:t>
+            </a:r>
+            <a:endParaRPr lang="en-US" dirty="0"/>
+          </a:p>
+        </p:txBody>
+      </p:sp>
+      <p:sp>
+        <p:nvSpPr>
+          <p:cNvPr id="3" name="Content Placeholder 2">
+            <a:extLst>
+              <a:ext uri="{FF2B5EF4-FFF2-40B4-BE49-F238E27FC236}">
+                <a16:creationId xmlns:a16="http://schemas.microsoft.com/office/drawing/2014/main" id="{9B82FEF4-3CE8-CB03-B141-151D5671751E}"/>
+              </a:ext>
+            </a:extLst>
+          </p:cNvPr>
+          <p:cNvSpPr>
+            <a:spLocks noGrp="1"/>
+          </p:cNvSpPr>
+          <p:nvPr>
+            <p:ph idx="1"/>
+          </p:nvPr>
+        </p:nvSpPr>
+        <p:spPr/>
+        <p:txBody>
+          <a:bodyPr/>
+          <a:lstStyle/>
+          <a:p>
+            <a:r>
+              <a:rPr lang="en-US" dirty="0"/>
+              <a:t>Vi </a:t>
+            </a:r>
+            <a:r>
+              <a:rPr lang="en-US" dirty="0" err="1"/>
+              <a:t>har</a:t>
+            </a:r>
+            <a:r>
+              <a:rPr lang="en-US" dirty="0"/>
+              <a:t> </a:t>
+            </a:r>
+            <a:r>
+              <a:rPr lang="en-US" dirty="0" err="1"/>
+              <a:t>brukt</a:t>
+            </a:r>
+            <a:r>
+              <a:rPr lang="en-US" dirty="0"/>
+              <a:t> python sine </a:t>
+            </a:r>
+            <a:r>
+              <a:rPr lang="en-US" dirty="0" err="1"/>
+              <a:t>ferdiglagte</a:t>
+            </a:r>
+            <a:r>
+              <a:rPr lang="en-US" dirty="0"/>
+              <a:t> </a:t>
+            </a:r>
+            <a:r>
+              <a:rPr lang="en-US" dirty="0" err="1"/>
+              <a:t>funksjoner</a:t>
+            </a:r>
+            <a:r>
+              <a:rPr lang="en-US" dirty="0"/>
+              <a:t>.</a:t>
+            </a:r>
+          </a:p>
+          <a:p>
+            <a:r>
+              <a:rPr lang="en-US" dirty="0" err="1"/>
+              <a:t>Nå</a:t>
+            </a:r>
+            <a:r>
+              <a:rPr lang="en-US" dirty="0"/>
+              <a:t> </a:t>
+            </a:r>
+            <a:r>
+              <a:rPr lang="en-US" dirty="0" err="1"/>
+              <a:t>skal</a:t>
+            </a:r>
+            <a:r>
+              <a:rPr lang="en-US" dirty="0"/>
+              <a:t> vi </a:t>
+            </a:r>
+            <a:r>
+              <a:rPr lang="en-US" dirty="0" err="1"/>
+              <a:t>lage</a:t>
+            </a:r>
+            <a:r>
+              <a:rPr lang="en-US" dirty="0"/>
+              <a:t> </a:t>
+            </a:r>
+            <a:r>
+              <a:rPr lang="en-US" dirty="0" err="1"/>
+              <a:t>våre</a:t>
+            </a:r>
+            <a:r>
+              <a:rPr lang="en-US" dirty="0"/>
+              <a:t> </a:t>
+            </a:r>
+            <a:r>
+              <a:rPr lang="en-US" dirty="0" err="1"/>
+              <a:t>egne</a:t>
+            </a:r>
+            <a:r>
+              <a:rPr lang="en-US" dirty="0"/>
+              <a:t>!</a:t>
+            </a:r>
+          </a:p>
+          <a:p>
+            <a:r>
+              <a:rPr lang="en-US" dirty="0" err="1"/>
+              <a:t>Gjør</a:t>
+            </a:r>
+            <a:r>
+              <a:rPr lang="en-US" dirty="0"/>
+              <a:t> </a:t>
+            </a:r>
+            <a:r>
+              <a:rPr lang="en-US" dirty="0" err="1"/>
+              <a:t>kode</a:t>
+            </a:r>
+            <a:r>
+              <a:rPr lang="en-US" dirty="0"/>
+              <a:t> </a:t>
+            </a:r>
+            <a:r>
+              <a:rPr lang="en-US" dirty="0" err="1"/>
+              <a:t>gjenbrukbar</a:t>
+            </a:r>
+            <a:r>
+              <a:rPr lang="en-US" dirty="0"/>
+              <a:t> </a:t>
+            </a:r>
+            <a:r>
+              <a:rPr lang="en-US" dirty="0" err="1"/>
+              <a:t>og</a:t>
+            </a:r>
+            <a:r>
+              <a:rPr lang="en-US" dirty="0"/>
+              <a:t> </a:t>
+            </a:r>
+            <a:r>
+              <a:rPr lang="en-US" dirty="0" err="1"/>
+              <a:t>dynamisk</a:t>
+            </a:r>
+            <a:endParaRPr lang="en-US" dirty="0"/>
+          </a:p>
+          <a:p>
+            <a:r>
+              <a:rPr lang="en-US" dirty="0"/>
+              <a:t>But how?! (╯°□°）╯︵ ┻━┻</a:t>
+            </a:r>
+          </a:p>
+        </p:txBody>
+      </p:sp>
+    </p:spTree>
+    <p:extLst>
+      <p:ext uri="{BB962C8B-B14F-4D97-AF65-F5344CB8AC3E}">
+        <p14:creationId xmlns:p14="http://schemas.microsoft.com/office/powerpoint/2010/main" val="3803287924"/>
+      </p:ext>
+    </p:extLst>
+  </p:cSld>
+  <p:clrMapOvr>
+    <a:masterClrMapping/>
+  </p:clrMapOvr>
+</p:sld>
+</file>
+
+<file path=ppt/slides/slide36.xml><?xml version="1.0" encoding="utf-8"?>
+<p:sld xmlns:a="http://schemas.openxmlformats.org/drawingml/2006/main" xmlns:r="http://schemas.openxmlformats.org/officeDocument/2006/relationships" xmlns:p="http://schemas.openxmlformats.org/presentationml/2006/main">
+  <p:cSld>
+    <p:spTree>
+      <p:nvGrpSpPr>
+        <p:cNvPr id="1" name=""/>
+        <p:cNvGrpSpPr/>
+        <p:nvPr/>
+      </p:nvGrpSpPr>
+      <p:grpSpPr>
+        <a:xfrm>
+          <a:off x="0" y="0"/>
+          <a:ext cx="0" cy="0"/>
+          <a:chOff x="0" y="0"/>
+          <a:chExt cx="0" cy="0"/>
+        </a:xfrm>
+      </p:grpSpPr>
+      <p:sp>
+        <p:nvSpPr>
+          <p:cNvPr id="2" name="Title 1">
+            <a:extLst>
+              <a:ext uri="{FF2B5EF4-FFF2-40B4-BE49-F238E27FC236}">
+                <a16:creationId xmlns:a16="http://schemas.microsoft.com/office/drawing/2014/main" id="{2F3D8E9F-B86C-D8C1-279A-46E681BC38B2}"/>
+              </a:ext>
+            </a:extLst>
+          </p:cNvPr>
+          <p:cNvSpPr>
+            <a:spLocks noGrp="1"/>
+          </p:cNvSpPr>
+          <p:nvPr>
+            <p:ph type="title"/>
+          </p:nvPr>
+        </p:nvSpPr>
+        <p:spPr/>
+        <p:txBody>
+          <a:bodyPr/>
+          <a:lstStyle/>
+          <a:p>
+            <a:r>
+              <a:rPr lang="en-US" dirty="0" err="1"/>
+              <a:t>Egendefinerte</a:t>
+            </a:r>
+            <a:r>
+              <a:rPr lang="en-US" dirty="0"/>
+              <a:t> </a:t>
+            </a:r>
+            <a:r>
+              <a:rPr lang="en-US" dirty="0" err="1"/>
+              <a:t>funksjoner</a:t>
+            </a:r>
+            <a:endParaRPr lang="en-US" dirty="0"/>
+          </a:p>
+        </p:txBody>
+      </p:sp>
+      <p:sp>
+        <p:nvSpPr>
+          <p:cNvPr id="3" name="Content Placeholder 2">
+            <a:extLst>
+              <a:ext uri="{FF2B5EF4-FFF2-40B4-BE49-F238E27FC236}">
+                <a16:creationId xmlns:a16="http://schemas.microsoft.com/office/drawing/2014/main" id="{DFA79D33-C724-78D9-EE20-77D469B9CC31}"/>
+              </a:ext>
+            </a:extLst>
+          </p:cNvPr>
+          <p:cNvSpPr>
+            <a:spLocks noGrp="1"/>
+          </p:cNvSpPr>
+          <p:nvPr>
+            <p:ph idx="1"/>
+          </p:nvPr>
+        </p:nvSpPr>
+        <p:spPr/>
+        <p:txBody>
+          <a:bodyPr/>
+          <a:lstStyle/>
+          <a:p>
+            <a:r>
+              <a:rPr lang="en-US" dirty="0"/>
+              <a:t>---------------------------------------------------------------------------------------------------------------------------------------------</a:t>
+            </a:r>
+          </a:p>
+        </p:txBody>
+      </p:sp>
+      <p:pic>
+        <p:nvPicPr>
+          <p:cNvPr id="7" name="Picture 6">
+            <a:extLst>
+              <a:ext uri="{FF2B5EF4-FFF2-40B4-BE49-F238E27FC236}">
+                <a16:creationId xmlns:a16="http://schemas.microsoft.com/office/drawing/2014/main" id="{CD7A0939-8EE6-1C1A-346E-37B56B7580E4}"/>
+              </a:ext>
+            </a:extLst>
+          </p:cNvPr>
+          <p:cNvPicPr>
+            <a:picLocks noChangeAspect="1"/>
+          </p:cNvPicPr>
+          <p:nvPr/>
+        </p:nvPicPr>
+        <p:blipFill>
+          <a:blip r:embed="rId3"/>
+          <a:stretch>
+            <a:fillRect/>
+          </a:stretch>
+        </p:blipFill>
+        <p:spPr>
+          <a:xfrm>
+            <a:off x="3761415" y="2180496"/>
+            <a:ext cx="4669167" cy="1556389"/>
+          </a:xfrm>
+          <a:prstGeom prst="rect">
+            <a:avLst/>
+          </a:prstGeom>
+        </p:spPr>
+      </p:pic>
+      <p:pic>
+        <p:nvPicPr>
+          <p:cNvPr id="9" name="Picture 8">
+            <a:extLst>
+              <a:ext uri="{FF2B5EF4-FFF2-40B4-BE49-F238E27FC236}">
+                <a16:creationId xmlns:a16="http://schemas.microsoft.com/office/drawing/2014/main" id="{5B464617-78B7-E707-818D-0B5DF5FECF71}"/>
+              </a:ext>
+            </a:extLst>
+          </p:cNvPr>
+          <p:cNvPicPr>
+            <a:picLocks noChangeAspect="1"/>
+          </p:cNvPicPr>
+          <p:nvPr/>
+        </p:nvPicPr>
+        <p:blipFill>
+          <a:blip r:embed="rId4"/>
+          <a:stretch>
+            <a:fillRect/>
+          </a:stretch>
+        </p:blipFill>
+        <p:spPr>
+          <a:xfrm>
+            <a:off x="3777953" y="4302410"/>
+            <a:ext cx="4652629" cy="1556389"/>
+          </a:xfrm>
+          <a:prstGeom prst="rect">
+            <a:avLst/>
+          </a:prstGeom>
+        </p:spPr>
+      </p:pic>
+    </p:spTree>
+    <p:extLst>
+      <p:ext uri="{BB962C8B-B14F-4D97-AF65-F5344CB8AC3E}">
+        <p14:creationId xmlns:p14="http://schemas.microsoft.com/office/powerpoint/2010/main" val="2090638557"/>
+      </p:ext>
+    </p:extLst>
+  </p:cSld>
+  <p:clrMapOvr>
+    <a:masterClrMapping/>
+  </p:clrMapOvr>
+</p:sld>
+</file>
+
+<file path=ppt/slides/slide37.xml><?xml version="1.0" encoding="utf-8"?>
+<p:sld xmlns:a="http://schemas.openxmlformats.org/drawingml/2006/main" xmlns:r="http://schemas.openxmlformats.org/officeDocument/2006/relationships" xmlns:p="http://schemas.openxmlformats.org/presentationml/2006/main">
+  <p:cSld>
+    <p:spTree>
+      <p:nvGrpSpPr>
+        <p:cNvPr id="1" name=""/>
+        <p:cNvGrpSpPr/>
+        <p:nvPr/>
+      </p:nvGrpSpPr>
+      <p:grpSpPr>
+        <a:xfrm>
+          <a:off x="0" y="0"/>
+          <a:ext cx="0" cy="0"/>
+          <a:chOff x="0" y="0"/>
+          <a:chExt cx="0" cy="0"/>
+        </a:xfrm>
+      </p:grpSpPr>
+      <p:sp>
+        <p:nvSpPr>
+          <p:cNvPr id="2" name="Title 1">
+            <a:extLst>
+              <a:ext uri="{FF2B5EF4-FFF2-40B4-BE49-F238E27FC236}">
+                <a16:creationId xmlns:a16="http://schemas.microsoft.com/office/drawing/2014/main" id="{F7AA3EAF-EA1A-6F01-27F1-13F704D2F1A7}"/>
+              </a:ext>
+            </a:extLst>
+          </p:cNvPr>
+          <p:cNvSpPr>
+            <a:spLocks noGrp="1"/>
+          </p:cNvSpPr>
+          <p:nvPr>
+            <p:ph type="title"/>
+          </p:nvPr>
+        </p:nvSpPr>
+        <p:spPr/>
+        <p:txBody>
+          <a:bodyPr/>
+          <a:lstStyle/>
+          <a:p>
+            <a:r>
+              <a:rPr lang="en-US" dirty="0" err="1"/>
+              <a:t>Egendefinerte</a:t>
+            </a:r>
+            <a:r>
+              <a:rPr lang="en-US" dirty="0"/>
+              <a:t> </a:t>
+            </a:r>
+            <a:r>
+              <a:rPr lang="en-US" dirty="0" err="1"/>
+              <a:t>Funksjoner</a:t>
+            </a:r>
+            <a:r>
+              <a:rPr lang="en-US" dirty="0"/>
+              <a:t> </a:t>
+            </a:r>
+          </a:p>
+        </p:txBody>
+      </p:sp>
+      <p:sp>
+        <p:nvSpPr>
+          <p:cNvPr id="3" name="Content Placeholder 2">
+            <a:extLst>
+              <a:ext uri="{FF2B5EF4-FFF2-40B4-BE49-F238E27FC236}">
+                <a16:creationId xmlns:a16="http://schemas.microsoft.com/office/drawing/2014/main" id="{D7150E91-E22F-235D-20B2-7EE8E0F754A8}"/>
+              </a:ext>
+            </a:extLst>
+          </p:cNvPr>
+          <p:cNvSpPr>
+            <a:spLocks noGrp="1"/>
+          </p:cNvSpPr>
+          <p:nvPr>
+            <p:ph idx="1"/>
+          </p:nvPr>
+        </p:nvSpPr>
+        <p:spPr/>
+        <p:txBody>
+          <a:bodyPr/>
+          <a:lstStyle/>
+          <a:p>
+            <a:r>
+              <a:rPr lang="en-US" dirty="0"/>
+              <a:t>Legg din “</a:t>
+            </a:r>
+            <a:r>
+              <a:rPr lang="en-US" dirty="0" err="1"/>
+              <a:t>lønns</a:t>
+            </a:r>
+            <a:r>
+              <a:rPr lang="en-US" dirty="0"/>
+              <a:t> </a:t>
+            </a:r>
+            <a:r>
+              <a:rPr lang="en-US" dirty="0" err="1"/>
+              <a:t>sjekk</a:t>
+            </a:r>
+            <a:r>
+              <a:rPr lang="en-US" dirty="0"/>
+              <a:t>” feature, inn </a:t>
+            </a:r>
+            <a:r>
+              <a:rPr lang="en-US" dirty="0" err="1"/>
+              <a:t>i</a:t>
+            </a:r>
+            <a:r>
+              <a:rPr lang="en-US" dirty="0"/>
+              <a:t> </a:t>
+            </a:r>
+            <a:r>
+              <a:rPr lang="en-US" dirty="0" err="1"/>
+              <a:t>en</a:t>
+            </a:r>
+            <a:r>
+              <a:rPr lang="en-US" dirty="0"/>
+              <a:t> </a:t>
+            </a:r>
+            <a:r>
+              <a:rPr lang="en-US" dirty="0" err="1"/>
+              <a:t>funksjon</a:t>
+            </a:r>
+            <a:r>
+              <a:rPr lang="en-US" dirty="0"/>
+              <a:t>, du </a:t>
+            </a:r>
+            <a:r>
+              <a:rPr lang="en-US" dirty="0" err="1"/>
+              <a:t>velger</a:t>
+            </a:r>
+            <a:r>
+              <a:rPr lang="en-US" dirty="0"/>
+              <a:t> </a:t>
+            </a:r>
+            <a:r>
+              <a:rPr lang="en-US" dirty="0" err="1"/>
+              <a:t>navnet</a:t>
+            </a:r>
+            <a:r>
+              <a:rPr lang="en-US" dirty="0"/>
+              <a:t> </a:t>
+            </a:r>
+            <a:r>
+              <a:rPr lang="en-US" dirty="0" err="1"/>
+              <a:t>på</a:t>
+            </a:r>
+            <a:r>
+              <a:rPr lang="en-US" dirty="0"/>
+              <a:t> </a:t>
+            </a:r>
+            <a:r>
+              <a:rPr lang="en-US" dirty="0" err="1"/>
+              <a:t>funksjonen</a:t>
+            </a:r>
+            <a:r>
+              <a:rPr lang="en-US" dirty="0"/>
+              <a:t> </a:t>
+            </a:r>
+            <a:r>
+              <a:rPr lang="en-US" dirty="0" err="1"/>
+              <a:t>selv</a:t>
+            </a:r>
+            <a:r>
+              <a:rPr lang="en-US" dirty="0"/>
+              <a:t>😁</a:t>
+            </a:r>
+          </a:p>
+          <a:p>
+            <a:r>
+              <a:rPr lang="en-US" dirty="0" err="1"/>
+              <a:t>Kall</a:t>
+            </a:r>
+            <a:r>
+              <a:rPr lang="en-US" dirty="0"/>
+              <a:t> </a:t>
+            </a:r>
+            <a:r>
+              <a:rPr lang="en-US" dirty="0" err="1"/>
+              <a:t>funksjonen</a:t>
+            </a:r>
+            <a:r>
+              <a:rPr lang="en-US" dirty="0"/>
+              <a:t> 2-3 ganger </a:t>
+            </a:r>
+            <a:r>
+              <a:rPr lang="en-US" dirty="0" err="1"/>
+              <a:t>får</a:t>
+            </a:r>
+            <a:r>
+              <a:rPr lang="en-US" dirty="0"/>
+              <a:t> å teste!</a:t>
+            </a:r>
+          </a:p>
+          <a:p>
+            <a:endParaRPr lang="en-US" dirty="0"/>
+          </a:p>
+          <a:p>
+            <a:pPr marL="0" indent="0">
+              <a:buNone/>
+            </a:pPr>
+            <a:endParaRPr lang="en-US" dirty="0"/>
+          </a:p>
+        </p:txBody>
+      </p:sp>
+    </p:spTree>
+    <p:extLst>
+      <p:ext uri="{BB962C8B-B14F-4D97-AF65-F5344CB8AC3E}">
+        <p14:creationId xmlns:p14="http://schemas.microsoft.com/office/powerpoint/2010/main" val="800385717"/>
+      </p:ext>
+    </p:extLst>
+  </p:cSld>
+  <p:clrMapOvr>
+    <a:masterClrMapping/>
+  </p:clrMapOvr>
+</p:sld>
+</file>
+
+<file path=ppt/slides/slide38.xml><?xml version="1.0" encoding="utf-8"?>
+<p:sld xmlns:a="http://schemas.openxmlformats.org/drawingml/2006/main" xmlns:r="http://schemas.openxmlformats.org/officeDocument/2006/relationships" xmlns:p="http://schemas.openxmlformats.org/presentationml/2006/main">
+  <p:cSld>
+    <p:spTree>
+      <p:nvGrpSpPr>
+        <p:cNvPr id="1" name=""/>
+        <p:cNvGrpSpPr/>
+        <p:nvPr/>
+      </p:nvGrpSpPr>
+      <p:grpSpPr>
+        <a:xfrm>
+          <a:off x="0" y="0"/>
+          <a:ext cx="0" cy="0"/>
+          <a:chOff x="0" y="0"/>
+          <a:chExt cx="0" cy="0"/>
+        </a:xfrm>
+      </p:grpSpPr>
+      <p:sp>
+        <p:nvSpPr>
+          <p:cNvPr id="2" name="Title 1">
+            <a:extLst>
+              <a:ext uri="{FF2B5EF4-FFF2-40B4-BE49-F238E27FC236}">
+                <a16:creationId xmlns:a16="http://schemas.microsoft.com/office/drawing/2014/main" id="{73162289-5740-5EFF-DBFD-1EF03AACD5F9}"/>
+              </a:ext>
+            </a:extLst>
+          </p:cNvPr>
+          <p:cNvSpPr>
+            <a:spLocks noGrp="1"/>
+          </p:cNvSpPr>
+          <p:nvPr>
+            <p:ph type="title"/>
+          </p:nvPr>
+        </p:nvSpPr>
+        <p:spPr/>
+        <p:txBody>
+          <a:bodyPr/>
+          <a:lstStyle/>
+          <a:p>
+            <a:r>
+              <a:rPr lang="en-US" dirty="0" err="1"/>
+              <a:t>Egendefinerte</a:t>
+            </a:r>
+            <a:r>
+              <a:rPr lang="en-US" dirty="0"/>
+              <a:t> </a:t>
+            </a:r>
+            <a:r>
+              <a:rPr lang="en-US" dirty="0" err="1"/>
+              <a:t>Funksjoner</a:t>
+            </a:r>
+            <a:r>
+              <a:rPr lang="en-US" dirty="0"/>
+              <a:t> </a:t>
+            </a:r>
+          </a:p>
+        </p:txBody>
+      </p:sp>
+      <p:sp>
+        <p:nvSpPr>
+          <p:cNvPr id="3" name="Content Placeholder 2">
+            <a:extLst>
+              <a:ext uri="{FF2B5EF4-FFF2-40B4-BE49-F238E27FC236}">
+                <a16:creationId xmlns:a16="http://schemas.microsoft.com/office/drawing/2014/main" id="{D261C4CA-DD96-DE25-8ABF-61F402DFA9CA}"/>
+              </a:ext>
+            </a:extLst>
+          </p:cNvPr>
+          <p:cNvSpPr>
+            <a:spLocks noGrp="1"/>
+          </p:cNvSpPr>
+          <p:nvPr>
+            <p:ph idx="1"/>
+          </p:nvPr>
+        </p:nvSpPr>
+        <p:spPr/>
+        <p:txBody>
+          <a:bodyPr/>
+          <a:lstStyle/>
+          <a:p>
+            <a:r>
+              <a:rPr lang="en-US" dirty="0"/>
+              <a:t>Legg din “print </a:t>
+            </a:r>
+            <a:r>
+              <a:rPr lang="en-US" dirty="0" err="1"/>
+              <a:t>fakta</a:t>
+            </a:r>
+            <a:r>
+              <a:rPr lang="en-US" dirty="0"/>
+              <a:t>” del av </a:t>
+            </a:r>
+            <a:r>
+              <a:rPr lang="en-US" dirty="0" err="1"/>
+              <a:t>ditt</a:t>
+            </a:r>
+            <a:r>
+              <a:rPr lang="en-US" dirty="0"/>
+              <a:t> program, inn I </a:t>
+            </a:r>
+            <a:r>
+              <a:rPr lang="en-US" dirty="0" err="1"/>
+              <a:t>en</a:t>
+            </a:r>
+            <a:r>
+              <a:rPr lang="en-US" dirty="0"/>
+              <a:t> </a:t>
+            </a:r>
+            <a:r>
+              <a:rPr lang="en-US" dirty="0" err="1"/>
+              <a:t>egen</a:t>
+            </a:r>
+            <a:r>
+              <a:rPr lang="en-US" dirty="0"/>
+              <a:t> </a:t>
+            </a:r>
+            <a:r>
+              <a:rPr lang="en-US" dirty="0" err="1"/>
+              <a:t>funksjon</a:t>
+            </a:r>
+            <a:r>
+              <a:rPr lang="en-US" dirty="0"/>
+              <a:t>’</a:t>
+            </a:r>
+          </a:p>
+          <a:p>
+            <a:r>
+              <a:rPr lang="en-US" dirty="0" err="1"/>
+              <a:t>Kall</a:t>
+            </a:r>
+            <a:r>
+              <a:rPr lang="en-US" dirty="0"/>
+              <a:t> </a:t>
+            </a:r>
+            <a:r>
+              <a:rPr lang="en-US" dirty="0" err="1"/>
+              <a:t>funksjonen</a:t>
+            </a:r>
+            <a:r>
+              <a:rPr lang="en-US" dirty="0"/>
+              <a:t> din 2-3 ganger </a:t>
+            </a:r>
+            <a:r>
+              <a:rPr lang="en-US" dirty="0" err="1"/>
+              <a:t>får</a:t>
+            </a:r>
+            <a:r>
+              <a:rPr lang="en-US" dirty="0"/>
+              <a:t> å teste!</a:t>
+            </a:r>
+          </a:p>
+        </p:txBody>
+      </p:sp>
+    </p:spTree>
+    <p:extLst>
+      <p:ext uri="{BB962C8B-B14F-4D97-AF65-F5344CB8AC3E}">
+        <p14:creationId xmlns:p14="http://schemas.microsoft.com/office/powerpoint/2010/main" val="3529055813"/>
+      </p:ext>
+    </p:extLst>
+  </p:cSld>
+  <p:clrMapOvr>
+    <a:masterClrMapping/>
+  </p:clrMapOvr>
+</p:sld>
+</file>
+
+<file path=ppt/slides/slide39.xml><?xml version="1.0" encoding="utf-8"?>
+<p:sld xmlns:a="http://schemas.openxmlformats.org/drawingml/2006/main" xmlns:r="http://schemas.openxmlformats.org/officeDocument/2006/relationships" xmlns:p="http://schemas.openxmlformats.org/presentationml/2006/main">
+  <p:cSld>
+    <p:spTree>
+      <p:nvGrpSpPr>
+        <p:cNvPr id="1" name=""/>
+        <p:cNvGrpSpPr/>
+        <p:nvPr/>
+      </p:nvGrpSpPr>
+      <p:grpSpPr>
+        <a:xfrm>
+          <a:off x="0" y="0"/>
+          <a:ext cx="0" cy="0"/>
+          <a:chOff x="0" y="0"/>
+          <a:chExt cx="0" cy="0"/>
+        </a:xfrm>
+      </p:grpSpPr>
+      <p:sp>
+        <p:nvSpPr>
+          <p:cNvPr id="2" name="Title 1">
+            <a:extLst>
+              <a:ext uri="{FF2B5EF4-FFF2-40B4-BE49-F238E27FC236}">
+                <a16:creationId xmlns:a16="http://schemas.microsoft.com/office/drawing/2014/main" id="{13CC243E-A3CB-B261-9A39-6136C045C869}"/>
+              </a:ext>
+            </a:extLst>
+          </p:cNvPr>
+          <p:cNvSpPr>
+            <a:spLocks noGrp="1"/>
+          </p:cNvSpPr>
+          <p:nvPr>
+            <p:ph type="title"/>
+          </p:nvPr>
+        </p:nvSpPr>
+        <p:spPr>
+          <a:xfrm>
+            <a:off x="575894" y="729658"/>
+            <a:ext cx="11029616" cy="988332"/>
+          </a:xfrm>
+        </p:spPr>
+        <p:txBody>
+          <a:bodyPr anchor="b">
+            <a:normAutofit/>
+          </a:bodyPr>
+          <a:lstStyle/>
+          <a:p>
+            <a:r>
+              <a:rPr lang="en-US" dirty="0" err="1"/>
+              <a:t>Dynamiske</a:t>
+            </a:r>
+            <a:r>
+              <a:rPr lang="en-US" dirty="0"/>
+              <a:t> </a:t>
+            </a:r>
+            <a:r>
+              <a:rPr lang="en-US" dirty="0" err="1"/>
+              <a:t>funksjoner</a:t>
+            </a:r>
+            <a:r>
+              <a:rPr lang="en-US" dirty="0"/>
+              <a:t> med </a:t>
+            </a:r>
+            <a:r>
+              <a:rPr lang="en-US" dirty="0" err="1"/>
+              <a:t>argumenter</a:t>
+            </a:r>
+            <a:endParaRPr lang="en-US" dirty="0"/>
+          </a:p>
+        </p:txBody>
+      </p:sp>
+      <p:pic>
+        <p:nvPicPr>
+          <p:cNvPr id="7" name="Picture 6">
+            <a:extLst>
+              <a:ext uri="{FF2B5EF4-FFF2-40B4-BE49-F238E27FC236}">
+                <a16:creationId xmlns:a16="http://schemas.microsoft.com/office/drawing/2014/main" id="{80563858-EDA9-060D-7836-0E9F1ABB7C55}"/>
+              </a:ext>
+            </a:extLst>
+          </p:cNvPr>
+          <p:cNvPicPr>
+            <a:picLocks noChangeAspect="1"/>
+          </p:cNvPicPr>
+          <p:nvPr/>
+        </p:nvPicPr>
+        <p:blipFill>
+          <a:blip r:embed="rId3"/>
+          <a:stretch>
+            <a:fillRect/>
+          </a:stretch>
+        </p:blipFill>
+        <p:spPr>
+          <a:xfrm>
+            <a:off x="2267411" y="1995039"/>
+            <a:ext cx="7657177" cy="4597413"/>
+          </a:xfrm>
+          <a:prstGeom prst="rect">
+            <a:avLst/>
+          </a:prstGeom>
+        </p:spPr>
+      </p:pic>
+    </p:spTree>
+    <p:extLst>
+      <p:ext uri="{BB962C8B-B14F-4D97-AF65-F5344CB8AC3E}">
+        <p14:creationId xmlns:p14="http://schemas.microsoft.com/office/powerpoint/2010/main" val="1718310831"/>
       </p:ext>
     </p:extLst>
   </p:cSld>
@@ -12619,6 +15138,574 @@
     <p:extLst>
       <p:ext uri="{BB962C8B-B14F-4D97-AF65-F5344CB8AC3E}">
         <p14:creationId xmlns:p14="http://schemas.microsoft.com/office/powerpoint/2010/main" val="4208128823"/>
+      </p:ext>
+    </p:extLst>
+  </p:cSld>
+  <p:clrMapOvr>
+    <a:masterClrMapping/>
+  </p:clrMapOvr>
+</p:sld>
+</file>
+
+<file path=ppt/slides/slide40.xml><?xml version="1.0" encoding="utf-8"?>
+<p:sld xmlns:a="http://schemas.openxmlformats.org/drawingml/2006/main" xmlns:r="http://schemas.openxmlformats.org/officeDocument/2006/relationships" xmlns:p="http://schemas.openxmlformats.org/presentationml/2006/main">
+  <p:cSld>
+    <p:spTree>
+      <p:nvGrpSpPr>
+        <p:cNvPr id="1" name=""/>
+        <p:cNvGrpSpPr/>
+        <p:nvPr/>
+      </p:nvGrpSpPr>
+      <p:grpSpPr>
+        <a:xfrm>
+          <a:off x="0" y="0"/>
+          <a:ext cx="0" cy="0"/>
+          <a:chOff x="0" y="0"/>
+          <a:chExt cx="0" cy="0"/>
+        </a:xfrm>
+      </p:grpSpPr>
+      <p:sp>
+        <p:nvSpPr>
+          <p:cNvPr id="2" name="Title 1">
+            <a:extLst>
+              <a:ext uri="{FF2B5EF4-FFF2-40B4-BE49-F238E27FC236}">
+                <a16:creationId xmlns:a16="http://schemas.microsoft.com/office/drawing/2014/main" id="{4E99F5D1-DED8-44DE-A89F-508A4FA92B15}"/>
+              </a:ext>
+            </a:extLst>
+          </p:cNvPr>
+          <p:cNvSpPr>
+            <a:spLocks noGrp="1"/>
+          </p:cNvSpPr>
+          <p:nvPr>
+            <p:ph type="title"/>
+          </p:nvPr>
+        </p:nvSpPr>
+        <p:spPr/>
+        <p:txBody>
+          <a:bodyPr/>
+          <a:lstStyle/>
+          <a:p>
+            <a:r>
+              <a:rPr lang="en-US" dirty="0" err="1"/>
+              <a:t>Dynamiske</a:t>
+            </a:r>
+            <a:r>
+              <a:rPr lang="en-US" dirty="0"/>
+              <a:t> </a:t>
+            </a:r>
+            <a:r>
+              <a:rPr lang="en-US" dirty="0" err="1"/>
+              <a:t>funksjoner</a:t>
+            </a:r>
+            <a:r>
+              <a:rPr lang="en-US" dirty="0"/>
+              <a:t> med </a:t>
+            </a:r>
+            <a:r>
+              <a:rPr lang="en-US" dirty="0" err="1"/>
+              <a:t>argumenter</a:t>
+            </a:r>
+            <a:endParaRPr lang="en-US" dirty="0"/>
+          </a:p>
+        </p:txBody>
+      </p:sp>
+      <p:pic>
+        <p:nvPicPr>
+          <p:cNvPr id="4" name="Picture 3">
+            <a:extLst>
+              <a:ext uri="{FF2B5EF4-FFF2-40B4-BE49-F238E27FC236}">
+                <a16:creationId xmlns:a16="http://schemas.microsoft.com/office/drawing/2014/main" id="{AEFB75B8-0FBB-59C4-246B-1ADA24DAB9B5}"/>
+              </a:ext>
+            </a:extLst>
+          </p:cNvPr>
+          <p:cNvPicPr>
+            <a:picLocks noChangeAspect="1"/>
+          </p:cNvPicPr>
+          <p:nvPr/>
+        </p:nvPicPr>
+        <p:blipFill>
+          <a:blip r:embed="rId3"/>
+          <a:stretch>
+            <a:fillRect/>
+          </a:stretch>
+        </p:blipFill>
+        <p:spPr>
+          <a:xfrm>
+            <a:off x="2279460" y="2305020"/>
+            <a:ext cx="7785309" cy="3823322"/>
+          </a:xfrm>
+          <a:prstGeom prst="rect">
+            <a:avLst/>
+          </a:prstGeom>
+        </p:spPr>
+      </p:pic>
+    </p:spTree>
+    <p:extLst>
+      <p:ext uri="{BB962C8B-B14F-4D97-AF65-F5344CB8AC3E}">
+        <p14:creationId xmlns:p14="http://schemas.microsoft.com/office/powerpoint/2010/main" val="883817305"/>
+      </p:ext>
+    </p:extLst>
+  </p:cSld>
+  <p:clrMapOvr>
+    <a:masterClrMapping/>
+  </p:clrMapOvr>
+</p:sld>
+</file>
+
+<file path=ppt/slides/slide41.xml><?xml version="1.0" encoding="utf-8"?>
+<p:sld xmlns:a="http://schemas.openxmlformats.org/drawingml/2006/main" xmlns:r="http://schemas.openxmlformats.org/officeDocument/2006/relationships" xmlns:p="http://schemas.openxmlformats.org/presentationml/2006/main">
+  <p:cSld>
+    <p:spTree>
+      <p:nvGrpSpPr>
+        <p:cNvPr id="1" name=""/>
+        <p:cNvGrpSpPr/>
+        <p:nvPr/>
+      </p:nvGrpSpPr>
+      <p:grpSpPr>
+        <a:xfrm>
+          <a:off x="0" y="0"/>
+          <a:ext cx="0" cy="0"/>
+          <a:chOff x="0" y="0"/>
+          <a:chExt cx="0" cy="0"/>
+        </a:xfrm>
+      </p:grpSpPr>
+      <p:pic>
+        <p:nvPicPr>
+          <p:cNvPr id="4" name="Picture 3">
+            <a:extLst>
+              <a:ext uri="{FF2B5EF4-FFF2-40B4-BE49-F238E27FC236}">
+                <a16:creationId xmlns:a16="http://schemas.microsoft.com/office/drawing/2014/main" id="{8BB17CB7-5612-BD98-EC74-0E166FA9A9B8}"/>
+              </a:ext>
+            </a:extLst>
+          </p:cNvPr>
+          <p:cNvPicPr>
+            <a:picLocks noChangeAspect="1"/>
+          </p:cNvPicPr>
+          <p:nvPr/>
+        </p:nvPicPr>
+        <p:blipFill>
+          <a:blip r:embed="rId3"/>
+          <a:stretch>
+            <a:fillRect/>
+          </a:stretch>
+        </p:blipFill>
+        <p:spPr>
+          <a:xfrm>
+            <a:off x="2610675" y="620713"/>
+            <a:ext cx="6970649" cy="6169025"/>
+          </a:xfrm>
+          <a:prstGeom prst="rect">
+            <a:avLst/>
+          </a:prstGeom>
+          <a:noFill/>
+        </p:spPr>
+      </p:pic>
+    </p:spTree>
+    <p:extLst>
+      <p:ext uri="{BB962C8B-B14F-4D97-AF65-F5344CB8AC3E}">
+        <p14:creationId xmlns:p14="http://schemas.microsoft.com/office/powerpoint/2010/main" val="4191127097"/>
+      </p:ext>
+    </p:extLst>
+  </p:cSld>
+  <p:clrMapOvr>
+    <a:masterClrMapping/>
+  </p:clrMapOvr>
+</p:sld>
+</file>
+
+<file path=ppt/slides/slide42.xml><?xml version="1.0" encoding="utf-8"?>
+<p:sld xmlns:a="http://schemas.openxmlformats.org/drawingml/2006/main" xmlns:r="http://schemas.openxmlformats.org/officeDocument/2006/relationships" xmlns:p="http://schemas.openxmlformats.org/presentationml/2006/main">
+  <p:cSld>
+    <p:spTree>
+      <p:nvGrpSpPr>
+        <p:cNvPr id="1" name=""/>
+        <p:cNvGrpSpPr/>
+        <p:nvPr/>
+      </p:nvGrpSpPr>
+      <p:grpSpPr>
+        <a:xfrm>
+          <a:off x="0" y="0"/>
+          <a:ext cx="0" cy="0"/>
+          <a:chOff x="0" y="0"/>
+          <a:chExt cx="0" cy="0"/>
+        </a:xfrm>
+      </p:grpSpPr>
+      <p:sp>
+        <p:nvSpPr>
+          <p:cNvPr id="2" name="Title 1">
+            <a:extLst>
+              <a:ext uri="{FF2B5EF4-FFF2-40B4-BE49-F238E27FC236}">
+                <a16:creationId xmlns:a16="http://schemas.microsoft.com/office/drawing/2014/main" id="{264A4A6B-65EF-1A5B-6873-A4372AECD06C}"/>
+              </a:ext>
+            </a:extLst>
+          </p:cNvPr>
+          <p:cNvSpPr>
+            <a:spLocks noGrp="1"/>
+          </p:cNvSpPr>
+          <p:nvPr>
+            <p:ph type="title"/>
+          </p:nvPr>
+        </p:nvSpPr>
+        <p:spPr/>
+        <p:txBody>
+          <a:bodyPr/>
+          <a:lstStyle/>
+          <a:p>
+            <a:r>
+              <a:rPr lang="en-US" dirty="0" err="1"/>
+              <a:t>Kassesystem</a:t>
+            </a:r>
+            <a:r>
+              <a:rPr lang="en-US" dirty="0"/>
+              <a:t> </a:t>
+            </a:r>
+            <a:r>
+              <a:rPr lang="en-US" dirty="0" err="1"/>
+              <a:t>eksempel</a:t>
+            </a:r>
+            <a:endParaRPr lang="en-US" dirty="0"/>
+          </a:p>
+        </p:txBody>
+      </p:sp>
+      <p:pic>
+        <p:nvPicPr>
+          <p:cNvPr id="5" name="Content Placeholder 4">
+            <a:extLst>
+              <a:ext uri="{FF2B5EF4-FFF2-40B4-BE49-F238E27FC236}">
+                <a16:creationId xmlns:a16="http://schemas.microsoft.com/office/drawing/2014/main" id="{E355F298-D88F-DEF4-6CAD-41AA62B20E47}"/>
+              </a:ext>
+            </a:extLst>
+          </p:cNvPr>
+          <p:cNvPicPr>
+            <a:picLocks noGrp="1" noChangeAspect="1"/>
+          </p:cNvPicPr>
+          <p:nvPr>
+            <p:ph idx="1"/>
+          </p:nvPr>
+        </p:nvPicPr>
+        <p:blipFill>
+          <a:blip r:embed="rId3"/>
+          <a:stretch>
+            <a:fillRect/>
+          </a:stretch>
+        </p:blipFill>
+        <p:spPr>
+          <a:xfrm>
+            <a:off x="581192" y="2450329"/>
+            <a:ext cx="11029950" cy="3140029"/>
+          </a:xfrm>
+        </p:spPr>
+      </p:pic>
+    </p:spTree>
+    <p:extLst>
+      <p:ext uri="{BB962C8B-B14F-4D97-AF65-F5344CB8AC3E}">
+        <p14:creationId xmlns:p14="http://schemas.microsoft.com/office/powerpoint/2010/main" val="1785526427"/>
+      </p:ext>
+    </p:extLst>
+  </p:cSld>
+  <p:clrMapOvr>
+    <a:masterClrMapping/>
+  </p:clrMapOvr>
+</p:sld>
+</file>
+
+<file path=ppt/slides/slide43.xml><?xml version="1.0" encoding="utf-8"?>
+<p:sld xmlns:a="http://schemas.openxmlformats.org/drawingml/2006/main" xmlns:r="http://schemas.openxmlformats.org/officeDocument/2006/relationships" xmlns:p="http://schemas.openxmlformats.org/presentationml/2006/main">
+  <p:cSld>
+    <p:spTree>
+      <p:nvGrpSpPr>
+        <p:cNvPr id="1" name=""/>
+        <p:cNvGrpSpPr/>
+        <p:nvPr/>
+      </p:nvGrpSpPr>
+      <p:grpSpPr>
+        <a:xfrm>
+          <a:off x="0" y="0"/>
+          <a:ext cx="0" cy="0"/>
+          <a:chOff x="0" y="0"/>
+          <a:chExt cx="0" cy="0"/>
+        </a:xfrm>
+      </p:grpSpPr>
+      <p:sp>
+        <p:nvSpPr>
+          <p:cNvPr id="2" name="Title 1">
+            <a:extLst>
+              <a:ext uri="{FF2B5EF4-FFF2-40B4-BE49-F238E27FC236}">
+                <a16:creationId xmlns:a16="http://schemas.microsoft.com/office/drawing/2014/main" id="{421E4DA1-4AD0-2B05-E32A-55D0B362216B}"/>
+              </a:ext>
+            </a:extLst>
+          </p:cNvPr>
+          <p:cNvSpPr>
+            <a:spLocks noGrp="1"/>
+          </p:cNvSpPr>
+          <p:nvPr>
+            <p:ph type="title"/>
+          </p:nvPr>
+        </p:nvSpPr>
+        <p:spPr/>
+        <p:txBody>
+          <a:bodyPr/>
+          <a:lstStyle/>
+          <a:p>
+            <a:r>
+              <a:rPr lang="en-US" dirty="0" err="1"/>
+              <a:t>Gjør</a:t>
+            </a:r>
+            <a:r>
+              <a:rPr lang="en-US" dirty="0"/>
+              <a:t> </a:t>
+            </a:r>
+            <a:r>
+              <a:rPr lang="en-US" dirty="0" err="1"/>
+              <a:t>funksjonen</a:t>
+            </a:r>
+            <a:r>
+              <a:rPr lang="en-US" dirty="0"/>
+              <a:t> dine </a:t>
+            </a:r>
+            <a:r>
+              <a:rPr lang="en-US" dirty="0" err="1"/>
+              <a:t>dynamiske</a:t>
+            </a:r>
+            <a:endParaRPr lang="en-US" dirty="0"/>
+          </a:p>
+        </p:txBody>
+      </p:sp>
+      <p:sp>
+        <p:nvSpPr>
+          <p:cNvPr id="3" name="Content Placeholder 2">
+            <a:extLst>
+              <a:ext uri="{FF2B5EF4-FFF2-40B4-BE49-F238E27FC236}">
+                <a16:creationId xmlns:a16="http://schemas.microsoft.com/office/drawing/2014/main" id="{A3F945F4-A4AA-CB71-7F60-3FBBE9D0D3BB}"/>
+              </a:ext>
+            </a:extLst>
+          </p:cNvPr>
+          <p:cNvSpPr>
+            <a:spLocks noGrp="1"/>
+          </p:cNvSpPr>
+          <p:nvPr>
+            <p:ph idx="1"/>
+          </p:nvPr>
+        </p:nvSpPr>
+        <p:spPr/>
+        <p:txBody>
+          <a:bodyPr/>
+          <a:lstStyle/>
+          <a:p>
+            <a:r>
+              <a:rPr lang="en-US" dirty="0" err="1"/>
+              <a:t>Oppdater</a:t>
+            </a:r>
+            <a:r>
+              <a:rPr lang="en-US" dirty="0"/>
+              <a:t> din “</a:t>
+            </a:r>
+            <a:r>
+              <a:rPr lang="en-US" dirty="0" err="1"/>
+              <a:t>lønns_sjekk</a:t>
+            </a:r>
+            <a:r>
+              <a:rPr lang="en-US" dirty="0"/>
+              <a:t>” </a:t>
+            </a:r>
+            <a:r>
+              <a:rPr lang="en-US" dirty="0" err="1"/>
+              <a:t>funksjon</a:t>
+            </a:r>
+            <a:r>
+              <a:rPr lang="en-US" dirty="0"/>
+              <a:t> </a:t>
+            </a:r>
+            <a:r>
+              <a:rPr lang="en-US" dirty="0" err="1"/>
+              <a:t>til</a:t>
+            </a:r>
+            <a:r>
+              <a:rPr lang="en-US" dirty="0"/>
+              <a:t> å ta inn 3 </a:t>
+            </a:r>
+            <a:r>
+              <a:rPr lang="en-US" dirty="0" err="1"/>
+              <a:t>argumenter</a:t>
+            </a:r>
+            <a:r>
+              <a:rPr lang="en-US" dirty="0"/>
+              <a:t> argument:</a:t>
+            </a:r>
+          </a:p>
+          <a:p>
+            <a:r>
+              <a:rPr lang="en-US" dirty="0"/>
+              <a:t>Alder</a:t>
+            </a:r>
+          </a:p>
+          <a:p>
+            <a:r>
+              <a:rPr lang="en-US" dirty="0" err="1"/>
+              <a:t>Nåværende_lønn</a:t>
+            </a:r>
+            <a:endParaRPr lang="en-US" dirty="0"/>
+          </a:p>
+          <a:p>
+            <a:r>
+              <a:rPr lang="en-US" dirty="0" err="1"/>
+              <a:t>Ønsket_lønn</a:t>
+            </a:r>
+            <a:endParaRPr lang="en-US" dirty="0"/>
+          </a:p>
+        </p:txBody>
+      </p:sp>
+    </p:spTree>
+    <p:extLst>
+      <p:ext uri="{BB962C8B-B14F-4D97-AF65-F5344CB8AC3E}">
+        <p14:creationId xmlns:p14="http://schemas.microsoft.com/office/powerpoint/2010/main" val="3345427749"/>
+      </p:ext>
+    </p:extLst>
+  </p:cSld>
+  <p:clrMapOvr>
+    <a:masterClrMapping/>
+  </p:clrMapOvr>
+</p:sld>
+</file>
+
+<file path=ppt/slides/slide44.xml><?xml version="1.0" encoding="utf-8"?>
+<p:sld xmlns:a="http://schemas.openxmlformats.org/drawingml/2006/main" xmlns:r="http://schemas.openxmlformats.org/officeDocument/2006/relationships" xmlns:p="http://schemas.openxmlformats.org/presentationml/2006/main">
+  <p:cSld>
+    <p:spTree>
+      <p:nvGrpSpPr>
+        <p:cNvPr id="1" name=""/>
+        <p:cNvGrpSpPr/>
+        <p:nvPr/>
+      </p:nvGrpSpPr>
+      <p:grpSpPr>
+        <a:xfrm>
+          <a:off x="0" y="0"/>
+          <a:ext cx="0" cy="0"/>
+          <a:chOff x="0" y="0"/>
+          <a:chExt cx="0" cy="0"/>
+        </a:xfrm>
+      </p:grpSpPr>
+      <p:sp>
+        <p:nvSpPr>
+          <p:cNvPr id="2" name="Title 1">
+            <a:extLst>
+              <a:ext uri="{FF2B5EF4-FFF2-40B4-BE49-F238E27FC236}">
+                <a16:creationId xmlns:a16="http://schemas.microsoft.com/office/drawing/2014/main" id="{46523C1D-A635-B8E4-846E-4F036D006DAF}"/>
+              </a:ext>
+            </a:extLst>
+          </p:cNvPr>
+          <p:cNvSpPr>
+            <a:spLocks noGrp="1"/>
+          </p:cNvSpPr>
+          <p:nvPr>
+            <p:ph type="title"/>
+          </p:nvPr>
+        </p:nvSpPr>
+        <p:spPr/>
+        <p:txBody>
+          <a:bodyPr/>
+          <a:lstStyle/>
+          <a:p>
+            <a:r>
+              <a:rPr lang="en-US" dirty="0" err="1"/>
+              <a:t>Gjør</a:t>
+            </a:r>
+            <a:r>
+              <a:rPr lang="en-US" dirty="0"/>
+              <a:t> </a:t>
+            </a:r>
+            <a:r>
+              <a:rPr lang="en-US" dirty="0" err="1"/>
+              <a:t>funksjonen</a:t>
+            </a:r>
+            <a:r>
+              <a:rPr lang="en-US" dirty="0"/>
+              <a:t> dine </a:t>
+            </a:r>
+            <a:r>
+              <a:rPr lang="en-US" dirty="0" err="1"/>
+              <a:t>dynamiske</a:t>
+            </a:r>
+            <a:endParaRPr lang="en-US" dirty="0"/>
+          </a:p>
+        </p:txBody>
+      </p:sp>
+      <p:sp>
+        <p:nvSpPr>
+          <p:cNvPr id="3" name="Content Placeholder 2">
+            <a:extLst>
+              <a:ext uri="{FF2B5EF4-FFF2-40B4-BE49-F238E27FC236}">
+                <a16:creationId xmlns:a16="http://schemas.microsoft.com/office/drawing/2014/main" id="{2B5A6888-BC17-58AB-8D95-B90D06CE3875}"/>
+              </a:ext>
+            </a:extLst>
+          </p:cNvPr>
+          <p:cNvSpPr>
+            <a:spLocks noGrp="1"/>
+          </p:cNvSpPr>
+          <p:nvPr>
+            <p:ph idx="1"/>
+          </p:nvPr>
+        </p:nvSpPr>
+        <p:spPr/>
+        <p:txBody>
+          <a:bodyPr/>
+          <a:lstStyle/>
+          <a:p>
+            <a:r>
+              <a:rPr lang="en-US" dirty="0" err="1"/>
+              <a:t>Oppdater</a:t>
+            </a:r>
+            <a:r>
+              <a:rPr lang="en-US" dirty="0"/>
+              <a:t> din “</a:t>
+            </a:r>
+            <a:r>
+              <a:rPr lang="en-US" dirty="0" err="1"/>
+              <a:t>print_fakta</a:t>
+            </a:r>
+            <a:r>
+              <a:rPr lang="en-US" dirty="0"/>
+              <a:t>()” </a:t>
+            </a:r>
+            <a:r>
+              <a:rPr lang="en-US" dirty="0" err="1"/>
+              <a:t>funksjon</a:t>
+            </a:r>
+            <a:r>
+              <a:rPr lang="en-US" dirty="0"/>
+              <a:t>, </a:t>
+            </a:r>
+            <a:r>
+              <a:rPr lang="en-US" dirty="0" err="1"/>
+              <a:t>slik</a:t>
+            </a:r>
+            <a:r>
+              <a:rPr lang="en-US" dirty="0"/>
+              <a:t> at den tar inn alle </a:t>
+            </a:r>
+            <a:r>
+              <a:rPr lang="en-US" dirty="0" err="1"/>
+              <a:t>argumenter</a:t>
+            </a:r>
+            <a:r>
+              <a:rPr lang="en-US" dirty="0"/>
+              <a:t> den </a:t>
+            </a:r>
+            <a:r>
+              <a:rPr lang="en-US" dirty="0" err="1"/>
+              <a:t>trenger</a:t>
+            </a:r>
+            <a:r>
+              <a:rPr lang="en-US" dirty="0"/>
+              <a:t>.</a:t>
+            </a:r>
+          </a:p>
+        </p:txBody>
+      </p:sp>
+    </p:spTree>
+    <p:extLst>
+      <p:ext uri="{BB962C8B-B14F-4D97-AF65-F5344CB8AC3E}">
+        <p14:creationId xmlns:p14="http://schemas.microsoft.com/office/powerpoint/2010/main" val="2558222068"/>
       </p:ext>
     </p:extLst>
   </p:cSld>

</xml_diff>

<commit_message>
Added the final stage of the task, however, the bonus tasks of Arrays and loops have not been added. Also finished the "final program" including the description of the task. I still have to make a cheatsheet for the students to be able to look at while they code.
</commit_message>
<xml_diff>
--- a/koding workshop powerpoint.pptx
+++ b/koding workshop powerpoint.pptx
@@ -5,10 +5,10 @@
     <p:sldMasterId id="2147483672" r:id="rId1"/>
   </p:sldMasterIdLst>
   <p:notesMasterIdLst>
-    <p:notesMasterId r:id="rId46"/>
+    <p:notesMasterId r:id="rId57"/>
   </p:notesMasterIdLst>
   <p:handoutMasterIdLst>
-    <p:handoutMasterId r:id="rId47"/>
+    <p:handoutMasterId r:id="rId58"/>
   </p:handoutMasterIdLst>
   <p:sldIdLst>
     <p:sldId id="256" r:id="rId2"/>
@@ -55,6 +55,17 @@
     <p:sldId id="298" r:id="rId43"/>
     <p:sldId id="292" r:id="rId44"/>
     <p:sldId id="299" r:id="rId45"/>
+    <p:sldId id="300" r:id="rId46"/>
+    <p:sldId id="301" r:id="rId47"/>
+    <p:sldId id="302" r:id="rId48"/>
+    <p:sldId id="303" r:id="rId49"/>
+    <p:sldId id="304" r:id="rId50"/>
+    <p:sldId id="305" r:id="rId51"/>
+    <p:sldId id="306" r:id="rId52"/>
+    <p:sldId id="307" r:id="rId53"/>
+    <p:sldId id="308" r:id="rId54"/>
+    <p:sldId id="309" r:id="rId55"/>
+    <p:sldId id="310" r:id="rId56"/>
   </p:sldIdLst>
   <p:sldSz cx="12192000" cy="6858000"/>
   <p:notesSz cx="6858000" cy="9144000"/>
@@ -258,7 +269,7 @@
           <a:p>
             <a:fld id="{AF869721-F543-4A6C-BF9D-65D7CC540427}" type="datetimeFigureOut">
               <a:rPr lang="en-US" smtClean="0"/>
-              <a:t>2/17/2023</a:t>
+              <a:t>2/20/2023</a:t>
             </a:fld>
             <a:endParaRPr lang="en-US" dirty="0"/>
           </a:p>
@@ -435,7 +446,7 @@
           <a:p>
             <a:fld id="{C732326A-4C88-4AFB-AA5B-5919D81DFF5B}" type="datetimeFigureOut">
               <a:rPr lang="en-US" smtClean="0"/>
-              <a:t>2/17/2023</a:t>
+              <a:t>2/20/2023</a:t>
             </a:fld>
             <a:endParaRPr lang="en-US" dirty="0"/>
           </a:p>
@@ -2906,6 +2917,615 @@
 </p:notes>
 </file>
 
+<file path=ppt/notesSlides/notesSlide26.xml><?xml version="1.0" encoding="utf-8"?>
+<p:notes xmlns:a="http://schemas.openxmlformats.org/drawingml/2006/main" xmlns:r="http://schemas.openxmlformats.org/officeDocument/2006/relationships" xmlns:p="http://schemas.openxmlformats.org/presentationml/2006/main">
+  <p:cSld>
+    <p:spTree>
+      <p:nvGrpSpPr>
+        <p:cNvPr id="1" name=""/>
+        <p:cNvGrpSpPr/>
+        <p:nvPr/>
+      </p:nvGrpSpPr>
+      <p:grpSpPr>
+        <a:xfrm>
+          <a:off x="0" y="0"/>
+          <a:ext cx="0" cy="0"/>
+          <a:chOff x="0" y="0"/>
+          <a:chExt cx="0" cy="0"/>
+        </a:xfrm>
+      </p:grpSpPr>
+      <p:sp>
+        <p:nvSpPr>
+          <p:cNvPr id="2" name="Slide Image Placeholder 1"/>
+          <p:cNvSpPr>
+            <a:spLocks noGrp="1" noRot="1" noChangeAspect="1"/>
+          </p:cNvSpPr>
+          <p:nvPr>
+            <p:ph type="sldImg"/>
+          </p:nvPr>
+        </p:nvSpPr>
+        <p:spPr/>
+      </p:sp>
+      <p:sp>
+        <p:nvSpPr>
+          <p:cNvPr id="3" name="Notes Placeholder 2"/>
+          <p:cNvSpPr>
+            <a:spLocks noGrp="1"/>
+          </p:cNvSpPr>
+          <p:nvPr>
+            <p:ph type="body" idx="1"/>
+          </p:nvPr>
+        </p:nvSpPr>
+        <p:spPr/>
+        <p:txBody>
+          <a:bodyPr/>
+          <a:lstStyle/>
+          <a:p>
+            <a:r>
+              <a:rPr lang="en-US" dirty="0"/>
+              <a:t>SPØR STUDENTENE</a:t>
+            </a:r>
+          </a:p>
+          <a:p>
+            <a:r>
+              <a:rPr lang="en-US" dirty="0" err="1"/>
+              <a:t>Hvis</a:t>
+            </a:r>
+            <a:r>
+              <a:rPr lang="en-US" dirty="0"/>
+              <a:t> det </a:t>
+            </a:r>
+            <a:r>
+              <a:rPr lang="en-US" dirty="0" err="1"/>
+              <a:t>ikke</a:t>
+            </a:r>
+            <a:r>
+              <a:rPr lang="en-US" dirty="0"/>
+              <a:t> </a:t>
+            </a:r>
+            <a:r>
+              <a:rPr lang="en-US" dirty="0" err="1"/>
+              <a:t>har</a:t>
+            </a:r>
+            <a:r>
+              <a:rPr lang="en-US" dirty="0"/>
+              <a:t> </a:t>
+            </a:r>
+            <a:r>
+              <a:rPr lang="en-US" dirty="0" err="1"/>
+              <a:t>vært</a:t>
+            </a:r>
+            <a:r>
+              <a:rPr lang="en-US" dirty="0"/>
+              <a:t> pause, er </a:t>
+            </a:r>
+            <a:r>
+              <a:rPr lang="en-US" dirty="0" err="1"/>
+              <a:t>dette</a:t>
+            </a:r>
+            <a:r>
+              <a:rPr lang="en-US" dirty="0"/>
+              <a:t> </a:t>
+            </a:r>
+            <a:r>
+              <a:rPr lang="en-US" dirty="0" err="1"/>
+              <a:t>en</a:t>
+            </a:r>
+            <a:r>
+              <a:rPr lang="en-US" dirty="0"/>
+              <a:t> god </a:t>
+            </a:r>
+            <a:r>
+              <a:rPr lang="en-US" dirty="0" err="1"/>
+              <a:t>tid</a:t>
+            </a:r>
+            <a:r>
+              <a:rPr lang="en-US" dirty="0"/>
+              <a:t> å ta det!</a:t>
+            </a:r>
+          </a:p>
+        </p:txBody>
+      </p:sp>
+      <p:sp>
+        <p:nvSpPr>
+          <p:cNvPr id="4" name="Slide Number Placeholder 3"/>
+          <p:cNvSpPr>
+            <a:spLocks noGrp="1"/>
+          </p:cNvSpPr>
+          <p:nvPr>
+            <p:ph type="sldNum" sz="quarter" idx="5"/>
+          </p:nvPr>
+        </p:nvSpPr>
+        <p:spPr/>
+        <p:txBody>
+          <a:bodyPr/>
+          <a:lstStyle/>
+          <a:p>
+            <a:fld id="{C6B3AB32-59DF-41F1-9618-EDFBF5049629}" type="slidenum">
+              <a:rPr lang="en-US" smtClean="0"/>
+              <a:t>45</a:t>
+            </a:fld>
+            <a:endParaRPr lang="en-US" dirty="0"/>
+          </a:p>
+        </p:txBody>
+      </p:sp>
+    </p:spTree>
+    <p:extLst>
+      <p:ext uri="{BB962C8B-B14F-4D97-AF65-F5344CB8AC3E}">
+        <p14:creationId xmlns:p14="http://schemas.microsoft.com/office/powerpoint/2010/main" val="3496797876"/>
+      </p:ext>
+    </p:extLst>
+  </p:cSld>
+  <p:clrMapOvr>
+    <a:masterClrMapping/>
+  </p:clrMapOvr>
+</p:notes>
+</file>
+
+<file path=ppt/notesSlides/notesSlide27.xml><?xml version="1.0" encoding="utf-8"?>
+<p:notes xmlns:a="http://schemas.openxmlformats.org/drawingml/2006/main" xmlns:r="http://schemas.openxmlformats.org/officeDocument/2006/relationships" xmlns:p="http://schemas.openxmlformats.org/presentationml/2006/main">
+  <p:cSld>
+    <p:spTree>
+      <p:nvGrpSpPr>
+        <p:cNvPr id="1" name=""/>
+        <p:cNvGrpSpPr/>
+        <p:nvPr/>
+      </p:nvGrpSpPr>
+      <p:grpSpPr>
+        <a:xfrm>
+          <a:off x="0" y="0"/>
+          <a:ext cx="0" cy="0"/>
+          <a:chOff x="0" y="0"/>
+          <a:chExt cx="0" cy="0"/>
+        </a:xfrm>
+      </p:grpSpPr>
+      <p:sp>
+        <p:nvSpPr>
+          <p:cNvPr id="2" name="Plassholder for lysbilde 1"/>
+          <p:cNvSpPr>
+            <a:spLocks noGrp="1" noRot="1" noChangeAspect="1"/>
+          </p:cNvSpPr>
+          <p:nvPr>
+            <p:ph type="sldImg"/>
+          </p:nvPr>
+        </p:nvSpPr>
+        <p:spPr/>
+      </p:sp>
+      <p:sp>
+        <p:nvSpPr>
+          <p:cNvPr id="3" name="Plassholder for notater 2"/>
+          <p:cNvSpPr>
+            <a:spLocks noGrp="1"/>
+          </p:cNvSpPr>
+          <p:nvPr>
+            <p:ph type="body" idx="1"/>
+          </p:nvPr>
+        </p:nvSpPr>
+        <p:spPr/>
+        <p:txBody>
+          <a:bodyPr/>
+          <a:lstStyle/>
+          <a:p>
+            <a:endParaRPr lang="nb-NO" dirty="0"/>
+          </a:p>
+        </p:txBody>
+      </p:sp>
+      <p:sp>
+        <p:nvSpPr>
+          <p:cNvPr id="4" name="Plassholder for lysbildenummer 3"/>
+          <p:cNvSpPr>
+            <a:spLocks noGrp="1"/>
+          </p:cNvSpPr>
+          <p:nvPr>
+            <p:ph type="sldNum" sz="quarter" idx="5"/>
+          </p:nvPr>
+        </p:nvSpPr>
+        <p:spPr/>
+        <p:txBody>
+          <a:bodyPr/>
+          <a:lstStyle/>
+          <a:p>
+            <a:fld id="{C6B3AB32-59DF-41F1-9618-EDFBF5049629}" type="slidenum">
+              <a:rPr lang="en-US" smtClean="0"/>
+              <a:t>48</a:t>
+            </a:fld>
+            <a:endParaRPr lang="en-US" dirty="0"/>
+          </a:p>
+        </p:txBody>
+      </p:sp>
+    </p:spTree>
+    <p:extLst>
+      <p:ext uri="{BB962C8B-B14F-4D97-AF65-F5344CB8AC3E}">
+        <p14:creationId xmlns:p14="http://schemas.microsoft.com/office/powerpoint/2010/main" val="3643865445"/>
+      </p:ext>
+    </p:extLst>
+  </p:cSld>
+  <p:clrMapOvr>
+    <a:masterClrMapping/>
+  </p:clrMapOvr>
+</p:notes>
+</file>
+
+<file path=ppt/notesSlides/notesSlide28.xml><?xml version="1.0" encoding="utf-8"?>
+<p:notes xmlns:a="http://schemas.openxmlformats.org/drawingml/2006/main" xmlns:r="http://schemas.openxmlformats.org/officeDocument/2006/relationships" xmlns:p="http://schemas.openxmlformats.org/presentationml/2006/main">
+  <p:cSld>
+    <p:spTree>
+      <p:nvGrpSpPr>
+        <p:cNvPr id="1" name=""/>
+        <p:cNvGrpSpPr/>
+        <p:nvPr/>
+      </p:nvGrpSpPr>
+      <p:grpSpPr>
+        <a:xfrm>
+          <a:off x="0" y="0"/>
+          <a:ext cx="0" cy="0"/>
+          <a:chOff x="0" y="0"/>
+          <a:chExt cx="0" cy="0"/>
+        </a:xfrm>
+      </p:grpSpPr>
+      <p:sp>
+        <p:nvSpPr>
+          <p:cNvPr id="2" name="Plassholder for lysbilde 1"/>
+          <p:cNvSpPr>
+            <a:spLocks noGrp="1" noRot="1" noChangeAspect="1"/>
+          </p:cNvSpPr>
+          <p:nvPr>
+            <p:ph type="sldImg"/>
+          </p:nvPr>
+        </p:nvSpPr>
+        <p:spPr/>
+      </p:sp>
+      <p:sp>
+        <p:nvSpPr>
+          <p:cNvPr id="3" name="Plassholder for notater 2"/>
+          <p:cNvSpPr>
+            <a:spLocks noGrp="1"/>
+          </p:cNvSpPr>
+          <p:nvPr>
+            <p:ph type="body" idx="1"/>
+          </p:nvPr>
+        </p:nvSpPr>
+        <p:spPr/>
+        <p:txBody>
+          <a:bodyPr/>
+          <a:lstStyle/>
+          <a:p>
+            <a:r>
+              <a:rPr lang="nb-NO" dirty="0" err="1"/>
+              <a:t>Task</a:t>
+            </a:r>
+            <a:r>
+              <a:rPr lang="nb-NO" dirty="0"/>
+              <a:t> 10:</a:t>
+            </a:r>
+          </a:p>
+          <a:p>
+            <a:pPr marL="0" marR="0" lvl="0" indent="0" algn="l" defTabSz="914400" rtl="0" eaLnBrk="1" fontAlgn="auto" latinLnBrk="0" hangingPunct="1">
+              <a:lnSpc>
+                <a:spcPct val="100000"/>
+              </a:lnSpc>
+              <a:spcBef>
+                <a:spcPts val="0"/>
+              </a:spcBef>
+              <a:spcAft>
+                <a:spcPts val="0"/>
+              </a:spcAft>
+              <a:buClrTx/>
+              <a:buSzTx/>
+              <a:buFontTx/>
+              <a:buNone/>
+              <a:tabLst/>
+              <a:defRPr/>
+            </a:pPr>
+            <a:r>
+              <a:rPr lang="en-US" sz="1200" dirty="0">
+                <a:solidFill>
+                  <a:srgbClr val="808080"/>
+                </a:solidFill>
+                <a:effectLst/>
+                <a:latin typeface="JetBrains Mono"/>
+              </a:rPr>
+              <a:t># Write a function that takes inn data from the user. You want to accept the following:</a:t>
+            </a:r>
+            <a:br>
+              <a:rPr lang="en-US" sz="1200" dirty="0">
+                <a:solidFill>
+                  <a:srgbClr val="808080"/>
+                </a:solidFill>
+                <a:effectLst/>
+                <a:latin typeface="JetBrains Mono"/>
+              </a:rPr>
+            </a:br>
+            <a:r>
+              <a:rPr lang="en-US" sz="1200" dirty="0">
+                <a:solidFill>
+                  <a:srgbClr val="808080"/>
+                </a:solidFill>
+                <a:effectLst/>
+                <a:latin typeface="JetBrains Mono"/>
+              </a:rPr>
+              <a:t># - name</a:t>
+            </a:r>
+            <a:br>
+              <a:rPr lang="en-US" sz="1200" dirty="0">
+                <a:solidFill>
+                  <a:srgbClr val="808080"/>
+                </a:solidFill>
+                <a:effectLst/>
+                <a:latin typeface="JetBrains Mono"/>
+              </a:rPr>
+            </a:br>
+            <a:r>
+              <a:rPr lang="en-US" sz="1200" dirty="0">
+                <a:solidFill>
+                  <a:srgbClr val="808080"/>
+                </a:solidFill>
+                <a:effectLst/>
+                <a:latin typeface="JetBrains Mono"/>
+              </a:rPr>
+              <a:t># - age</a:t>
+            </a:r>
+            <a:br>
+              <a:rPr lang="en-US" sz="1200" dirty="0">
+                <a:solidFill>
+                  <a:srgbClr val="808080"/>
+                </a:solidFill>
+                <a:effectLst/>
+                <a:latin typeface="JetBrains Mono"/>
+              </a:rPr>
+            </a:br>
+            <a:r>
+              <a:rPr lang="en-US" sz="1200" dirty="0">
+                <a:solidFill>
+                  <a:srgbClr val="808080"/>
+                </a:solidFill>
+                <a:effectLst/>
+                <a:latin typeface="JetBrains Mono"/>
+              </a:rPr>
+              <a:t># - position in PIT</a:t>
+            </a:r>
+            <a:br>
+              <a:rPr lang="en-US" sz="1200" dirty="0">
+                <a:solidFill>
+                  <a:srgbClr val="808080"/>
+                </a:solidFill>
+                <a:effectLst/>
+                <a:latin typeface="JetBrains Mono"/>
+              </a:rPr>
+            </a:br>
+            <a:r>
+              <a:rPr lang="en-US" sz="1200" dirty="0">
+                <a:solidFill>
+                  <a:srgbClr val="808080"/>
+                </a:solidFill>
+                <a:effectLst/>
+                <a:latin typeface="JetBrains Mono"/>
+              </a:rPr>
+              <a:t># - desired salary</a:t>
+            </a:r>
+            <a:br>
+              <a:rPr lang="en-US" sz="1200" dirty="0">
+                <a:solidFill>
+                  <a:srgbClr val="808080"/>
+                </a:solidFill>
+                <a:effectLst/>
+                <a:latin typeface="JetBrains Mono"/>
+              </a:rPr>
+            </a:br>
+            <a:r>
+              <a:rPr lang="en-US" sz="1200" dirty="0">
+                <a:solidFill>
+                  <a:srgbClr val="808080"/>
+                </a:solidFill>
+                <a:effectLst/>
+                <a:latin typeface="JetBrains Mono"/>
+              </a:rPr>
+              <a:t># - current salary</a:t>
+            </a:r>
+            <a:endParaRPr lang="en-US" sz="1200" dirty="0">
+              <a:solidFill>
+                <a:srgbClr val="A9B7C6"/>
+              </a:solidFill>
+              <a:effectLst/>
+              <a:latin typeface="JetBrains Mono"/>
+            </a:endParaRPr>
+          </a:p>
+          <a:p>
+            <a:endParaRPr lang="nb-NO" dirty="0"/>
+          </a:p>
+          <a:p>
+            <a:endParaRPr lang="nb-NO" dirty="0"/>
+          </a:p>
+        </p:txBody>
+      </p:sp>
+      <p:sp>
+        <p:nvSpPr>
+          <p:cNvPr id="4" name="Plassholder for lysbildenummer 3"/>
+          <p:cNvSpPr>
+            <a:spLocks noGrp="1"/>
+          </p:cNvSpPr>
+          <p:nvPr>
+            <p:ph type="sldNum" sz="quarter" idx="5"/>
+          </p:nvPr>
+        </p:nvSpPr>
+        <p:spPr/>
+        <p:txBody>
+          <a:bodyPr/>
+          <a:lstStyle/>
+          <a:p>
+            <a:fld id="{C6B3AB32-59DF-41F1-9618-EDFBF5049629}" type="slidenum">
+              <a:rPr lang="en-US" smtClean="0"/>
+              <a:t>49</a:t>
+            </a:fld>
+            <a:endParaRPr lang="en-US" dirty="0"/>
+          </a:p>
+        </p:txBody>
+      </p:sp>
+    </p:spTree>
+    <p:extLst>
+      <p:ext uri="{BB962C8B-B14F-4D97-AF65-F5344CB8AC3E}">
+        <p14:creationId xmlns:p14="http://schemas.microsoft.com/office/powerpoint/2010/main" val="2937124136"/>
+      </p:ext>
+    </p:extLst>
+  </p:cSld>
+  <p:clrMapOvr>
+    <a:masterClrMapping/>
+  </p:clrMapOvr>
+</p:notes>
+</file>
+
+<file path=ppt/notesSlides/notesSlide29.xml><?xml version="1.0" encoding="utf-8"?>
+<p:notes xmlns:a="http://schemas.openxmlformats.org/drawingml/2006/main" xmlns:r="http://schemas.openxmlformats.org/officeDocument/2006/relationships" xmlns:p="http://schemas.openxmlformats.org/presentationml/2006/main">
+  <p:cSld>
+    <p:spTree>
+      <p:nvGrpSpPr>
+        <p:cNvPr id="1" name=""/>
+        <p:cNvGrpSpPr/>
+        <p:nvPr/>
+      </p:nvGrpSpPr>
+      <p:grpSpPr>
+        <a:xfrm>
+          <a:off x="0" y="0"/>
+          <a:ext cx="0" cy="0"/>
+          <a:chOff x="0" y="0"/>
+          <a:chExt cx="0" cy="0"/>
+        </a:xfrm>
+      </p:grpSpPr>
+      <p:sp>
+        <p:nvSpPr>
+          <p:cNvPr id="2" name="Plassholder for lysbilde 1"/>
+          <p:cNvSpPr>
+            <a:spLocks noGrp="1" noRot="1" noChangeAspect="1"/>
+          </p:cNvSpPr>
+          <p:nvPr>
+            <p:ph type="sldImg"/>
+          </p:nvPr>
+        </p:nvSpPr>
+        <p:spPr/>
+      </p:sp>
+      <p:sp>
+        <p:nvSpPr>
+          <p:cNvPr id="3" name="Plassholder for notater 2"/>
+          <p:cNvSpPr>
+            <a:spLocks noGrp="1"/>
+          </p:cNvSpPr>
+          <p:nvPr>
+            <p:ph type="body" idx="1"/>
+          </p:nvPr>
+        </p:nvSpPr>
+        <p:spPr/>
+        <p:txBody>
+          <a:bodyPr/>
+          <a:lstStyle/>
+          <a:p>
+            <a:r>
+              <a:rPr lang="nb-NO" dirty="0" err="1"/>
+              <a:t>Task</a:t>
+            </a:r>
+            <a:r>
+              <a:rPr lang="nb-NO" dirty="0"/>
+              <a:t> 11: </a:t>
+            </a:r>
+            <a:r>
+              <a:rPr lang="nb-NO" dirty="0" err="1"/>
+              <a:t>Use</a:t>
+            </a:r>
+            <a:r>
+              <a:rPr lang="nb-NO" dirty="0"/>
+              <a:t> </a:t>
+            </a:r>
+            <a:r>
+              <a:rPr lang="nb-NO" dirty="0" err="1"/>
+              <a:t>the</a:t>
+            </a:r>
+            <a:r>
+              <a:rPr lang="nb-NO" dirty="0"/>
+              <a:t> </a:t>
+            </a:r>
+            <a:r>
+              <a:rPr lang="nb-NO" dirty="0" err="1"/>
+              <a:t>user</a:t>
+            </a:r>
+            <a:r>
+              <a:rPr lang="nb-NO" dirty="0"/>
+              <a:t> data to </a:t>
+            </a:r>
+            <a:r>
+              <a:rPr lang="nb-NO" dirty="0" err="1"/>
+              <a:t>call</a:t>
+            </a:r>
+            <a:r>
+              <a:rPr lang="nb-NO" dirty="0"/>
+              <a:t> </a:t>
+            </a:r>
+            <a:r>
+              <a:rPr lang="nb-NO" dirty="0" err="1"/>
+              <a:t>the</a:t>
+            </a:r>
+            <a:r>
+              <a:rPr lang="nb-NO" dirty="0"/>
+              <a:t> </a:t>
+            </a:r>
+            <a:r>
+              <a:rPr lang="nb-NO" dirty="0" err="1"/>
+              <a:t>sjekk_lønn</a:t>
+            </a:r>
+            <a:r>
+              <a:rPr lang="nb-NO" dirty="0"/>
+              <a:t> and </a:t>
+            </a:r>
+            <a:r>
+              <a:rPr lang="nb-NO" dirty="0" err="1"/>
+              <a:t>print_fakta</a:t>
+            </a:r>
+            <a:r>
+              <a:rPr lang="nb-NO" dirty="0"/>
+              <a:t> </a:t>
+            </a:r>
+            <a:r>
+              <a:rPr lang="nb-NO" dirty="0" err="1"/>
+              <a:t>functions</a:t>
+            </a:r>
+            <a:endParaRPr lang="nb-NO" dirty="0"/>
+          </a:p>
+        </p:txBody>
+      </p:sp>
+      <p:sp>
+        <p:nvSpPr>
+          <p:cNvPr id="4" name="Plassholder for lysbildenummer 3"/>
+          <p:cNvSpPr>
+            <a:spLocks noGrp="1"/>
+          </p:cNvSpPr>
+          <p:nvPr>
+            <p:ph type="sldNum" sz="quarter" idx="5"/>
+          </p:nvPr>
+        </p:nvSpPr>
+        <p:spPr/>
+        <p:txBody>
+          <a:bodyPr/>
+          <a:lstStyle/>
+          <a:p>
+            <a:fld id="{C6B3AB32-59DF-41F1-9618-EDFBF5049629}" type="slidenum">
+              <a:rPr lang="en-US" smtClean="0"/>
+              <a:t>50</a:t>
+            </a:fld>
+            <a:endParaRPr lang="en-US" dirty="0"/>
+          </a:p>
+        </p:txBody>
+      </p:sp>
+    </p:spTree>
+    <p:extLst>
+      <p:ext uri="{BB962C8B-B14F-4D97-AF65-F5344CB8AC3E}">
+        <p14:creationId xmlns:p14="http://schemas.microsoft.com/office/powerpoint/2010/main" val="4196230702"/>
+      </p:ext>
+    </p:extLst>
+  </p:cSld>
+  <p:clrMapOvr>
+    <a:masterClrMapping/>
+  </p:clrMapOvr>
+</p:notes>
+</file>
+
 <file path=ppt/notesSlides/notesSlide3.xml><?xml version="1.0" encoding="utf-8"?>
 <p:notes xmlns:a="http://schemas.openxmlformats.org/drawingml/2006/main" xmlns:r="http://schemas.openxmlformats.org/officeDocument/2006/relationships" xmlns:p="http://schemas.openxmlformats.org/presentationml/2006/main">
   <p:cSld>
@@ -3585,6 +4205,860 @@
     <p:extLst>
       <p:ext uri="{BB962C8B-B14F-4D97-AF65-F5344CB8AC3E}">
         <p14:creationId xmlns:p14="http://schemas.microsoft.com/office/powerpoint/2010/main" val="2147936048"/>
+      </p:ext>
+    </p:extLst>
+  </p:cSld>
+  <p:clrMapOvr>
+    <a:masterClrMapping/>
+  </p:clrMapOvr>
+</p:notes>
+</file>
+
+<file path=ppt/notesSlides/notesSlide30.xml><?xml version="1.0" encoding="utf-8"?>
+<p:notes xmlns:a="http://schemas.openxmlformats.org/drawingml/2006/main" xmlns:r="http://schemas.openxmlformats.org/officeDocument/2006/relationships" xmlns:p="http://schemas.openxmlformats.org/presentationml/2006/main">
+  <p:cSld>
+    <p:spTree>
+      <p:nvGrpSpPr>
+        <p:cNvPr id="1" name=""/>
+        <p:cNvGrpSpPr/>
+        <p:nvPr/>
+      </p:nvGrpSpPr>
+      <p:grpSpPr>
+        <a:xfrm>
+          <a:off x="0" y="0"/>
+          <a:ext cx="0" cy="0"/>
+          <a:chOff x="0" y="0"/>
+          <a:chExt cx="0" cy="0"/>
+        </a:xfrm>
+      </p:grpSpPr>
+      <p:sp>
+        <p:nvSpPr>
+          <p:cNvPr id="2" name="Plassholder for lysbilde 1"/>
+          <p:cNvSpPr>
+            <a:spLocks noGrp="1" noRot="1" noChangeAspect="1"/>
+          </p:cNvSpPr>
+          <p:nvPr>
+            <p:ph type="sldImg"/>
+          </p:nvPr>
+        </p:nvSpPr>
+        <p:spPr/>
+      </p:sp>
+      <p:sp>
+        <p:nvSpPr>
+          <p:cNvPr id="3" name="Plassholder for notater 2"/>
+          <p:cNvSpPr>
+            <a:spLocks noGrp="1"/>
+          </p:cNvSpPr>
+          <p:nvPr>
+            <p:ph type="body" idx="1"/>
+          </p:nvPr>
+        </p:nvSpPr>
+        <p:spPr/>
+        <p:txBody>
+          <a:bodyPr/>
+          <a:lstStyle/>
+          <a:p>
+            <a:endParaRPr lang="nb-NO" dirty="0"/>
+          </a:p>
+        </p:txBody>
+      </p:sp>
+      <p:sp>
+        <p:nvSpPr>
+          <p:cNvPr id="4" name="Plassholder for lysbildenummer 3"/>
+          <p:cNvSpPr>
+            <a:spLocks noGrp="1"/>
+          </p:cNvSpPr>
+          <p:nvPr>
+            <p:ph type="sldNum" sz="quarter" idx="5"/>
+          </p:nvPr>
+        </p:nvSpPr>
+        <p:spPr/>
+        <p:txBody>
+          <a:bodyPr/>
+          <a:lstStyle/>
+          <a:p>
+            <a:fld id="{C6B3AB32-59DF-41F1-9618-EDFBF5049629}" type="slidenum">
+              <a:rPr lang="en-US" smtClean="0"/>
+              <a:t>51</a:t>
+            </a:fld>
+            <a:endParaRPr lang="en-US" dirty="0"/>
+          </a:p>
+        </p:txBody>
+      </p:sp>
+    </p:spTree>
+    <p:extLst>
+      <p:ext uri="{BB962C8B-B14F-4D97-AF65-F5344CB8AC3E}">
+        <p14:creationId xmlns:p14="http://schemas.microsoft.com/office/powerpoint/2010/main" val="922811960"/>
+      </p:ext>
+    </p:extLst>
+  </p:cSld>
+  <p:clrMapOvr>
+    <a:masterClrMapping/>
+  </p:clrMapOvr>
+</p:notes>
+</file>
+
+<file path=ppt/notesSlides/notesSlide31.xml><?xml version="1.0" encoding="utf-8"?>
+<p:notes xmlns:a="http://schemas.openxmlformats.org/drawingml/2006/main" xmlns:r="http://schemas.openxmlformats.org/officeDocument/2006/relationships" xmlns:p="http://schemas.openxmlformats.org/presentationml/2006/main">
+  <p:cSld>
+    <p:spTree>
+      <p:nvGrpSpPr>
+        <p:cNvPr id="1" name=""/>
+        <p:cNvGrpSpPr/>
+        <p:nvPr/>
+      </p:nvGrpSpPr>
+      <p:grpSpPr>
+        <a:xfrm>
+          <a:off x="0" y="0"/>
+          <a:ext cx="0" cy="0"/>
+          <a:chOff x="0" y="0"/>
+          <a:chExt cx="0" cy="0"/>
+        </a:xfrm>
+      </p:grpSpPr>
+      <p:sp>
+        <p:nvSpPr>
+          <p:cNvPr id="2" name="Plassholder for lysbilde 1"/>
+          <p:cNvSpPr>
+            <a:spLocks noGrp="1" noRot="1" noChangeAspect="1"/>
+          </p:cNvSpPr>
+          <p:nvPr>
+            <p:ph type="sldImg"/>
+          </p:nvPr>
+        </p:nvSpPr>
+        <p:spPr/>
+      </p:sp>
+      <p:sp>
+        <p:nvSpPr>
+          <p:cNvPr id="3" name="Plassholder for notater 2"/>
+          <p:cNvSpPr>
+            <a:spLocks noGrp="1"/>
+          </p:cNvSpPr>
+          <p:nvPr>
+            <p:ph type="body" idx="1"/>
+          </p:nvPr>
+        </p:nvSpPr>
+        <p:spPr/>
+        <p:txBody>
+          <a:bodyPr/>
+          <a:lstStyle/>
+          <a:p>
+            <a:pPr marL="0" marR="0" lvl="0" indent="0" algn="l" defTabSz="914400" rtl="0" eaLnBrk="1" fontAlgn="auto" latinLnBrk="0" hangingPunct="1">
+              <a:lnSpc>
+                <a:spcPct val="100000"/>
+              </a:lnSpc>
+              <a:spcBef>
+                <a:spcPts val="0"/>
+              </a:spcBef>
+              <a:spcAft>
+                <a:spcPts val="0"/>
+              </a:spcAft>
+              <a:buClrTx/>
+              <a:buSzTx/>
+              <a:buFontTx/>
+              <a:buNone/>
+              <a:tabLst/>
+              <a:defRPr/>
+            </a:pPr>
+            <a:r>
+              <a:rPr lang="nb-NO" dirty="0" err="1"/>
+              <a:t>Task</a:t>
+            </a:r>
+            <a:r>
+              <a:rPr lang="nb-NO" dirty="0"/>
+              <a:t> 12: </a:t>
+            </a:r>
+            <a:r>
+              <a:rPr lang="en-US" sz="1200" dirty="0">
+                <a:solidFill>
+                  <a:srgbClr val="808080"/>
+                </a:solidFill>
+                <a:effectLst/>
+                <a:latin typeface="JetBrains Mono"/>
+              </a:rPr>
+              <a:t>Fix the </a:t>
+            </a:r>
+            <a:r>
+              <a:rPr lang="en-US" sz="1200" dirty="0" err="1">
+                <a:solidFill>
+                  <a:srgbClr val="808080"/>
+                </a:solidFill>
+                <a:effectLst/>
+                <a:latin typeface="JetBrains Mono"/>
+              </a:rPr>
+              <a:t>TypeError</a:t>
+            </a:r>
+            <a:endParaRPr lang="en-US" sz="1200" dirty="0">
+              <a:solidFill>
+                <a:srgbClr val="A9B7C6"/>
+              </a:solidFill>
+              <a:effectLst/>
+              <a:latin typeface="JetBrains Mono"/>
+            </a:endParaRPr>
+          </a:p>
+          <a:p>
+            <a:endParaRPr lang="nb-NO" dirty="0"/>
+          </a:p>
+        </p:txBody>
+      </p:sp>
+      <p:sp>
+        <p:nvSpPr>
+          <p:cNvPr id="4" name="Plassholder for lysbildenummer 3"/>
+          <p:cNvSpPr>
+            <a:spLocks noGrp="1"/>
+          </p:cNvSpPr>
+          <p:nvPr>
+            <p:ph type="sldNum" sz="quarter" idx="5"/>
+          </p:nvPr>
+        </p:nvSpPr>
+        <p:spPr/>
+        <p:txBody>
+          <a:bodyPr/>
+          <a:lstStyle/>
+          <a:p>
+            <a:fld id="{C6B3AB32-59DF-41F1-9618-EDFBF5049629}" type="slidenum">
+              <a:rPr lang="en-US" smtClean="0"/>
+              <a:t>52</a:t>
+            </a:fld>
+            <a:endParaRPr lang="en-US" dirty="0"/>
+          </a:p>
+        </p:txBody>
+      </p:sp>
+    </p:spTree>
+    <p:extLst>
+      <p:ext uri="{BB962C8B-B14F-4D97-AF65-F5344CB8AC3E}">
+        <p14:creationId xmlns:p14="http://schemas.microsoft.com/office/powerpoint/2010/main" val="3436542807"/>
+      </p:ext>
+    </p:extLst>
+  </p:cSld>
+  <p:clrMapOvr>
+    <a:masterClrMapping/>
+  </p:clrMapOvr>
+</p:notes>
+</file>
+
+<file path=ppt/notesSlides/notesSlide32.xml><?xml version="1.0" encoding="utf-8"?>
+<p:notes xmlns:a="http://schemas.openxmlformats.org/drawingml/2006/main" xmlns:r="http://schemas.openxmlformats.org/officeDocument/2006/relationships" xmlns:p="http://schemas.openxmlformats.org/presentationml/2006/main">
+  <p:cSld>
+    <p:spTree>
+      <p:nvGrpSpPr>
+        <p:cNvPr id="1" name=""/>
+        <p:cNvGrpSpPr/>
+        <p:nvPr/>
+      </p:nvGrpSpPr>
+      <p:grpSpPr>
+        <a:xfrm>
+          <a:off x="0" y="0"/>
+          <a:ext cx="0" cy="0"/>
+          <a:chOff x="0" y="0"/>
+          <a:chExt cx="0" cy="0"/>
+        </a:xfrm>
+      </p:grpSpPr>
+      <p:sp>
+        <p:nvSpPr>
+          <p:cNvPr id="2" name="Plassholder for lysbilde 1"/>
+          <p:cNvSpPr>
+            <a:spLocks noGrp="1" noRot="1" noChangeAspect="1"/>
+          </p:cNvSpPr>
+          <p:nvPr>
+            <p:ph type="sldImg"/>
+          </p:nvPr>
+        </p:nvSpPr>
+        <p:spPr/>
+      </p:sp>
+      <p:sp>
+        <p:nvSpPr>
+          <p:cNvPr id="3" name="Plassholder for notater 2"/>
+          <p:cNvSpPr>
+            <a:spLocks noGrp="1"/>
+          </p:cNvSpPr>
+          <p:nvPr>
+            <p:ph type="body" idx="1"/>
+          </p:nvPr>
+        </p:nvSpPr>
+        <p:spPr/>
+        <p:txBody>
+          <a:bodyPr/>
+          <a:lstStyle/>
+          <a:p>
+            <a:endParaRPr lang="nb-NO" dirty="0"/>
+          </a:p>
+        </p:txBody>
+      </p:sp>
+      <p:sp>
+        <p:nvSpPr>
+          <p:cNvPr id="4" name="Plassholder for lysbildenummer 3"/>
+          <p:cNvSpPr>
+            <a:spLocks noGrp="1"/>
+          </p:cNvSpPr>
+          <p:nvPr>
+            <p:ph type="sldNum" sz="quarter" idx="5"/>
+          </p:nvPr>
+        </p:nvSpPr>
+        <p:spPr/>
+        <p:txBody>
+          <a:bodyPr/>
+          <a:lstStyle/>
+          <a:p>
+            <a:fld id="{C6B3AB32-59DF-41F1-9618-EDFBF5049629}" type="slidenum">
+              <a:rPr lang="en-US" smtClean="0"/>
+              <a:t>53</a:t>
+            </a:fld>
+            <a:endParaRPr lang="en-US" dirty="0"/>
+          </a:p>
+        </p:txBody>
+      </p:sp>
+    </p:spTree>
+    <p:extLst>
+      <p:ext uri="{BB962C8B-B14F-4D97-AF65-F5344CB8AC3E}">
+        <p14:creationId xmlns:p14="http://schemas.microsoft.com/office/powerpoint/2010/main" val="766616095"/>
+      </p:ext>
+    </p:extLst>
+  </p:cSld>
+  <p:clrMapOvr>
+    <a:masterClrMapping/>
+  </p:clrMapOvr>
+</p:notes>
+</file>
+
+<file path=ppt/notesSlides/notesSlide33.xml><?xml version="1.0" encoding="utf-8"?>
+<p:notes xmlns:a="http://schemas.openxmlformats.org/drawingml/2006/main" xmlns:r="http://schemas.openxmlformats.org/officeDocument/2006/relationships" xmlns:p="http://schemas.openxmlformats.org/presentationml/2006/main">
+  <p:cSld>
+    <p:spTree>
+      <p:nvGrpSpPr>
+        <p:cNvPr id="1" name=""/>
+        <p:cNvGrpSpPr/>
+        <p:nvPr/>
+      </p:nvGrpSpPr>
+      <p:grpSpPr>
+        <a:xfrm>
+          <a:off x="0" y="0"/>
+          <a:ext cx="0" cy="0"/>
+          <a:chOff x="0" y="0"/>
+          <a:chExt cx="0" cy="0"/>
+        </a:xfrm>
+      </p:grpSpPr>
+      <p:sp>
+        <p:nvSpPr>
+          <p:cNvPr id="2" name="Plassholder for lysbilde 1"/>
+          <p:cNvSpPr>
+            <a:spLocks noGrp="1" noRot="1" noChangeAspect="1"/>
+          </p:cNvSpPr>
+          <p:nvPr>
+            <p:ph type="sldImg"/>
+          </p:nvPr>
+        </p:nvSpPr>
+        <p:spPr/>
+      </p:sp>
+      <p:sp>
+        <p:nvSpPr>
+          <p:cNvPr id="3" name="Plassholder for notater 2"/>
+          <p:cNvSpPr>
+            <a:spLocks noGrp="1"/>
+          </p:cNvSpPr>
+          <p:nvPr>
+            <p:ph type="body" idx="1"/>
+          </p:nvPr>
+        </p:nvSpPr>
+        <p:spPr/>
+        <p:txBody>
+          <a:bodyPr/>
+          <a:lstStyle/>
+          <a:p>
+            <a:pPr algn="l"/>
+            <a:r>
+              <a:rPr lang="nb-NO" b="1" i="0" dirty="0" err="1">
+                <a:solidFill>
+                  <a:srgbClr val="A9B7C6"/>
+                </a:solidFill>
+                <a:effectLst/>
+                <a:latin typeface="Helvetica" panose="020B0604020202020204" pitchFamily="34" charset="0"/>
+              </a:rPr>
+              <a:t>Premis</a:t>
+            </a:r>
+            <a:endParaRPr lang="nb-NO" b="1" i="0" dirty="0">
+              <a:solidFill>
+                <a:srgbClr val="A9B7C6"/>
+              </a:solidFill>
+              <a:effectLst/>
+              <a:latin typeface="Helvetica" panose="020B0604020202020204" pitchFamily="34" charset="0"/>
+            </a:endParaRPr>
+          </a:p>
+          <a:p>
+            <a:pPr algn="l"/>
+            <a:r>
+              <a:rPr lang="nb-NO" b="0" i="0" dirty="0">
+                <a:solidFill>
+                  <a:srgbClr val="A9B7C6"/>
+                </a:solidFill>
+                <a:effectLst/>
+                <a:latin typeface="Helvetica" panose="020B0604020202020204" pitchFamily="34" charset="0"/>
+              </a:rPr>
+              <a:t>Året er 1997 og du jobber som systemutvikler for det store og </a:t>
+            </a:r>
+            <a:r>
+              <a:rPr lang="nb-NO" b="0" i="0" dirty="0" err="1">
+                <a:solidFill>
+                  <a:srgbClr val="A9B7C6"/>
+                </a:solidFill>
+                <a:effectLst/>
+                <a:latin typeface="Helvetica" panose="020B0604020202020204" pitchFamily="34" charset="0"/>
+              </a:rPr>
+              <a:t>lukseriøse</a:t>
+            </a:r>
+            <a:r>
+              <a:rPr lang="nb-NO" b="0" i="0" dirty="0">
+                <a:solidFill>
+                  <a:srgbClr val="A9B7C6"/>
+                </a:solidFill>
+                <a:effectLst/>
+                <a:latin typeface="Helvetica" panose="020B0604020202020204" pitchFamily="34" charset="0"/>
+              </a:rPr>
+              <a:t> energi firmaet Enron.</a:t>
+            </a:r>
+          </a:p>
+          <a:p>
+            <a:pPr algn="l"/>
+            <a:r>
+              <a:rPr lang="nb-NO" b="0" i="0" dirty="0">
+                <a:solidFill>
+                  <a:srgbClr val="A9B7C6"/>
+                </a:solidFill>
+                <a:effectLst/>
+                <a:latin typeface="Helvetica" panose="020B0604020202020204" pitchFamily="34" charset="0"/>
+              </a:rPr>
+              <a:t>Din team leder har bedt deg om å utvikle et HR system for de ansatte. System har følgene krav:</a:t>
+            </a:r>
+          </a:p>
+          <a:p>
+            <a:pPr algn="l">
+              <a:buFont typeface="+mj-lt"/>
+              <a:buAutoNum type="arabicPeriod"/>
+            </a:pPr>
+            <a:r>
+              <a:rPr lang="nb-NO" b="0" i="0" dirty="0">
+                <a:solidFill>
+                  <a:srgbClr val="A9B7C6"/>
+                </a:solidFill>
+                <a:effectLst/>
+                <a:latin typeface="Helvetica" panose="020B0604020202020204" pitchFamily="34" charset="0"/>
+              </a:rPr>
+              <a:t>Systemet skal ta inn følgene data fra en ansatt:</a:t>
+            </a:r>
+          </a:p>
+          <a:p>
+            <a:pPr marL="742950" lvl="1" indent="-285750" algn="l">
+              <a:buFont typeface="+mj-lt"/>
+              <a:buAutoNum type="arabicPeriod"/>
+            </a:pPr>
+            <a:r>
+              <a:rPr lang="nb-NO" b="0" i="0" dirty="0">
+                <a:solidFill>
+                  <a:srgbClr val="A9B7C6"/>
+                </a:solidFill>
+                <a:effectLst/>
+                <a:latin typeface="Helvetica" panose="020B0604020202020204" pitchFamily="34" charset="0"/>
+              </a:rPr>
+              <a:t>Navn</a:t>
+            </a:r>
+          </a:p>
+          <a:p>
+            <a:pPr marL="742950" lvl="1" indent="-285750" algn="l">
+              <a:buFont typeface="+mj-lt"/>
+              <a:buAutoNum type="arabicPeriod"/>
+            </a:pPr>
+            <a:r>
+              <a:rPr lang="nb-NO" b="0" i="0" dirty="0">
+                <a:solidFill>
+                  <a:srgbClr val="A9B7C6"/>
+                </a:solidFill>
+                <a:effectLst/>
+                <a:latin typeface="Helvetica" panose="020B0604020202020204" pitchFamily="34" charset="0"/>
+              </a:rPr>
+              <a:t>årslønn</a:t>
+            </a:r>
+          </a:p>
+          <a:p>
+            <a:pPr marL="742950" lvl="1" indent="-285750" algn="l">
+              <a:buFont typeface="+mj-lt"/>
+              <a:buAutoNum type="arabicPeriod"/>
+            </a:pPr>
+            <a:r>
+              <a:rPr lang="nb-NO" b="0" i="0" dirty="0">
+                <a:solidFill>
+                  <a:srgbClr val="A9B7C6"/>
+                </a:solidFill>
+                <a:effectLst/>
+                <a:latin typeface="Helvetica" panose="020B0604020202020204" pitchFamily="34" charset="0"/>
+              </a:rPr>
+              <a:t>ønsketlønn</a:t>
+            </a:r>
+          </a:p>
+          <a:p>
+            <a:pPr marL="742950" lvl="1" indent="-285750" algn="l">
+              <a:buFont typeface="+mj-lt"/>
+              <a:buAutoNum type="arabicPeriod"/>
+            </a:pPr>
+            <a:r>
+              <a:rPr lang="nb-NO" b="0" i="0" dirty="0">
+                <a:solidFill>
+                  <a:srgbClr val="A9B7C6"/>
+                </a:solidFill>
+                <a:effectLst/>
+                <a:latin typeface="Helvetica" panose="020B0604020202020204" pitchFamily="34" charset="0"/>
+              </a:rPr>
+              <a:t>hvilket år de var født i (du behøver ikke å ta inn datoen, kun årstallet.)</a:t>
+            </a:r>
+          </a:p>
+          <a:p>
+            <a:pPr marL="742950" lvl="1" indent="-285750" algn="l">
+              <a:buFont typeface="+mj-lt"/>
+              <a:buAutoNum type="arabicPeriod"/>
+            </a:pPr>
+            <a:r>
+              <a:rPr lang="nb-NO" b="0" i="0" dirty="0">
+                <a:solidFill>
+                  <a:srgbClr val="A9B7C6"/>
+                </a:solidFill>
+                <a:effectLst/>
+                <a:latin typeface="Helvetica" panose="020B0604020202020204" pitchFamily="34" charset="0"/>
+              </a:rPr>
+              <a:t>Om de, hypotetisk, er ok med å hjelpe firmaet med litt "regnskapssvindel", spørsmålet er, selvfølgelig kun </a:t>
+            </a:r>
+            <a:r>
+              <a:rPr lang="nb-NO" b="0" i="0" dirty="0" err="1">
+                <a:solidFill>
+                  <a:srgbClr val="A9B7C6"/>
+                </a:solidFill>
+                <a:effectLst/>
+                <a:latin typeface="Helvetica" panose="020B0604020202020204" pitchFamily="34" charset="0"/>
+              </a:rPr>
+              <a:t>hyptotetisk</a:t>
+            </a:r>
+            <a:r>
+              <a:rPr lang="nb-NO" b="0" i="0" dirty="0">
+                <a:solidFill>
+                  <a:srgbClr val="A9B7C6"/>
+                </a:solidFill>
+                <a:effectLst/>
+                <a:latin typeface="Helvetica" panose="020B0604020202020204" pitchFamily="34" charset="0"/>
+              </a:rPr>
+              <a:t>. Svaret skal være et "ja" eller "nei"</a:t>
+            </a:r>
+          </a:p>
+          <a:p>
+            <a:pPr algn="l">
+              <a:buFont typeface="+mj-lt"/>
+              <a:buAutoNum type="arabicPeriod" startAt="2"/>
+            </a:pPr>
+            <a:r>
+              <a:rPr lang="nb-NO" b="0" i="0" dirty="0" err="1">
+                <a:solidFill>
+                  <a:srgbClr val="A9B7C6"/>
+                </a:solidFill>
+                <a:effectLst/>
+                <a:latin typeface="Helvetica" panose="020B0604020202020204" pitchFamily="34" charset="0"/>
+              </a:rPr>
+              <a:t>Programet</a:t>
+            </a:r>
+            <a:r>
+              <a:rPr lang="nb-NO" b="0" i="0" dirty="0">
+                <a:solidFill>
+                  <a:srgbClr val="A9B7C6"/>
+                </a:solidFill>
+                <a:effectLst/>
+                <a:latin typeface="Helvetica" panose="020B0604020202020204" pitchFamily="34" charset="0"/>
+              </a:rPr>
+              <a:t> skal ha en funksjon, som regner ut alder til den ansatte. Dette gjør du ved å ta det nåværende året (1997) og trekker fra den ansattes </a:t>
+            </a:r>
+            <a:r>
+              <a:rPr lang="nb-NO" b="0" i="0" dirty="0" err="1">
+                <a:solidFill>
+                  <a:srgbClr val="A9B7C6"/>
+                </a:solidFill>
+                <a:effectLst/>
+                <a:latin typeface="Helvetica" panose="020B0604020202020204" pitchFamily="34" charset="0"/>
+              </a:rPr>
+              <a:t>fødelesår</a:t>
+            </a:r>
+            <a:r>
+              <a:rPr lang="nb-NO" b="0" i="0" dirty="0">
+                <a:solidFill>
+                  <a:srgbClr val="A9B7C6"/>
+                </a:solidFill>
+                <a:effectLst/>
+                <a:latin typeface="Helvetica" panose="020B0604020202020204" pitchFamily="34" charset="0"/>
+              </a:rPr>
+              <a:t>.</a:t>
+            </a:r>
+          </a:p>
+          <a:p>
+            <a:pPr marL="742950" lvl="1" indent="-285750" algn="l">
+              <a:buFont typeface="+mj-lt"/>
+              <a:buAutoNum type="arabicPeriod" startAt="2"/>
+            </a:pPr>
+            <a:r>
+              <a:rPr lang="nb-NO" b="0" i="0" dirty="0">
+                <a:solidFill>
+                  <a:srgbClr val="A9B7C6"/>
+                </a:solidFill>
+                <a:effectLst/>
+                <a:latin typeface="Helvetica" panose="020B0604020202020204" pitchFamily="34" charset="0"/>
+              </a:rPr>
+              <a:t>Hvis en person er under 18, eller over 100, skal du gi dem en beskjed at de enten er for ung, eller for gammel til å jobbe for Enron og så avslutte programmet ved å bruke </a:t>
+            </a:r>
+            <a:r>
+              <a:rPr lang="nb-NO" b="0" i="0" dirty="0" err="1">
+                <a:solidFill>
+                  <a:srgbClr val="A9B7C6"/>
+                </a:solidFill>
+                <a:effectLst/>
+                <a:latin typeface="Helvetica" panose="020B0604020202020204" pitchFamily="34" charset="0"/>
+              </a:rPr>
+              <a:t>quit</a:t>
+            </a:r>
+            <a:r>
+              <a:rPr lang="nb-NO" b="0" i="0" dirty="0">
+                <a:solidFill>
+                  <a:srgbClr val="A9B7C6"/>
+                </a:solidFill>
+                <a:effectLst/>
+                <a:latin typeface="Helvetica" panose="020B0604020202020204" pitchFamily="34" charset="0"/>
+              </a:rPr>
+              <a:t>() </a:t>
+            </a:r>
+            <a:r>
+              <a:rPr lang="nb-NO" b="0" i="0" dirty="0" err="1">
+                <a:solidFill>
+                  <a:srgbClr val="A9B7C6"/>
+                </a:solidFill>
+                <a:effectLst/>
+                <a:latin typeface="Helvetica" panose="020B0604020202020204" pitchFamily="34" charset="0"/>
+              </a:rPr>
+              <a:t>funkjonen</a:t>
+            </a:r>
+            <a:r>
+              <a:rPr lang="nb-NO" b="0" i="0" dirty="0">
+                <a:solidFill>
+                  <a:srgbClr val="A9B7C6"/>
+                </a:solidFill>
+                <a:effectLst/>
+                <a:latin typeface="Helvetica" panose="020B0604020202020204" pitchFamily="34" charset="0"/>
+              </a:rPr>
+              <a:t>.</a:t>
+            </a:r>
+          </a:p>
+          <a:p>
+            <a:pPr algn="l">
+              <a:buFont typeface="+mj-lt"/>
+              <a:buAutoNum type="arabicPeriod" startAt="3"/>
+            </a:pPr>
+            <a:r>
+              <a:rPr lang="nb-NO" b="0" i="0" dirty="0">
+                <a:solidFill>
+                  <a:srgbClr val="A9B7C6"/>
+                </a:solidFill>
+                <a:effectLst/>
+                <a:latin typeface="Helvetica" panose="020B0604020202020204" pitchFamily="34" charset="0"/>
+              </a:rPr>
+              <a:t>Du skal lage en funksjon som regner ut den ansattes, måned, uke, dags og timelønn, basert på årslønnen de oppgir.</a:t>
+            </a:r>
+          </a:p>
+          <a:p>
+            <a:pPr algn="l">
+              <a:buFont typeface="+mj-lt"/>
+              <a:buAutoNum type="arabicPeriod" startAt="4"/>
+            </a:pPr>
+            <a:r>
+              <a:rPr lang="nb-NO" b="0" i="0" dirty="0">
+                <a:solidFill>
+                  <a:srgbClr val="A9B7C6"/>
+                </a:solidFill>
+                <a:effectLst/>
+                <a:latin typeface="Helvetica" panose="020B0604020202020204" pitchFamily="34" charset="0"/>
+              </a:rPr>
+              <a:t>Du skal lage en funksjon som sjekker om den ansatte skal få endre sin nåværendelønn, til den lønnen de har lyst på.</a:t>
+            </a:r>
+          </a:p>
+          <a:p>
+            <a:pPr marL="742950" lvl="1" indent="-285750" algn="l">
+              <a:buFont typeface="+mj-lt"/>
+              <a:buAutoNum type="arabicPeriod" startAt="4"/>
+            </a:pPr>
+            <a:r>
+              <a:rPr lang="nb-NO" b="0" i="0" dirty="0">
+                <a:solidFill>
+                  <a:srgbClr val="A9B7C6"/>
+                </a:solidFill>
+                <a:effectLst/>
+                <a:latin typeface="Helvetica" panose="020B0604020202020204" pitchFamily="34" charset="0"/>
+              </a:rPr>
+              <a:t>Hvis de </a:t>
+            </a:r>
+            <a:r>
+              <a:rPr lang="nb-NO" b="0" i="0" dirty="0" err="1">
+                <a:solidFill>
+                  <a:srgbClr val="A9B7C6"/>
+                </a:solidFill>
+                <a:effectLst/>
+                <a:latin typeface="Helvetica" panose="020B0604020202020204" pitchFamily="34" charset="0"/>
+              </a:rPr>
+              <a:t>alerede</a:t>
+            </a:r>
+            <a:r>
+              <a:rPr lang="nb-NO" b="0" i="0" dirty="0">
+                <a:solidFill>
+                  <a:srgbClr val="A9B7C6"/>
+                </a:solidFill>
+                <a:effectLst/>
+                <a:latin typeface="Helvetica" panose="020B0604020202020204" pitchFamily="34" charset="0"/>
+              </a:rPr>
+              <a:t> tjener det de ønsker å tjene, skal du fortelle dem at de </a:t>
+            </a:r>
+            <a:r>
+              <a:rPr lang="nb-NO" b="0" i="0" dirty="0" err="1">
+                <a:solidFill>
+                  <a:srgbClr val="A9B7C6"/>
+                </a:solidFill>
+                <a:effectLst/>
+                <a:latin typeface="Helvetica" panose="020B0604020202020204" pitchFamily="34" charset="0"/>
+              </a:rPr>
+              <a:t>alerede</a:t>
+            </a:r>
+            <a:r>
+              <a:rPr lang="nb-NO" b="0" i="0" dirty="0">
+                <a:solidFill>
+                  <a:srgbClr val="A9B7C6"/>
+                </a:solidFill>
+                <a:effectLst/>
+                <a:latin typeface="Helvetica" panose="020B0604020202020204" pitchFamily="34" charset="0"/>
+              </a:rPr>
+              <a:t> tjener det de ønsker.</a:t>
+            </a:r>
+          </a:p>
+          <a:p>
+            <a:pPr marL="742950" lvl="1" indent="-285750" algn="l">
+              <a:buFont typeface="+mj-lt"/>
+              <a:buAutoNum type="arabicPeriod" startAt="4"/>
+            </a:pPr>
+            <a:r>
+              <a:rPr lang="nb-NO" b="0" i="0" dirty="0">
+                <a:solidFill>
+                  <a:srgbClr val="A9B7C6"/>
+                </a:solidFill>
+                <a:effectLst/>
+                <a:latin typeface="Helvetica" panose="020B0604020202020204" pitchFamily="34" charset="0"/>
+              </a:rPr>
+              <a:t>Hvis de tjener mer enn det de ønsker å tjene, skal du med glede informere dem om at du har redusert deres lønn slik at den matcher deres "ønsket inntekt".</a:t>
+            </a:r>
+          </a:p>
+          <a:p>
+            <a:pPr marL="742950" lvl="1" indent="-285750" algn="l">
+              <a:buFont typeface="+mj-lt"/>
+              <a:buAutoNum type="arabicPeriod" startAt="4"/>
+            </a:pPr>
+            <a:r>
+              <a:rPr lang="nb-NO" b="0" i="0" dirty="0">
+                <a:solidFill>
+                  <a:srgbClr val="A9B7C6"/>
+                </a:solidFill>
+                <a:effectLst/>
+                <a:latin typeface="Helvetica" panose="020B0604020202020204" pitchFamily="34" charset="0"/>
+              </a:rPr>
+              <a:t>Hvis de tjener mindre enn det de ønsker, skal du sjekke om den ansatte, har svart "ja" eller "nei" på det hypotetiske spørsmålet angående "regnskapssvindel". Hvis de svarte "ja", gir du dem </a:t>
+            </a:r>
+            <a:r>
+              <a:rPr lang="nb-NO" b="0" i="0" dirty="0" err="1">
+                <a:solidFill>
+                  <a:srgbClr val="A9B7C6"/>
+                </a:solidFill>
+                <a:effectLst/>
+                <a:latin typeface="Helvetica" panose="020B0604020202020204" pitchFamily="34" charset="0"/>
+              </a:rPr>
+              <a:t>lønnøkningen</a:t>
+            </a:r>
+            <a:r>
+              <a:rPr lang="nb-NO" b="0" i="0" dirty="0">
+                <a:solidFill>
+                  <a:srgbClr val="A9B7C6"/>
+                </a:solidFill>
+                <a:effectLst/>
+                <a:latin typeface="Helvetica" panose="020B0604020202020204" pitchFamily="34" charset="0"/>
+              </a:rPr>
+              <a:t> fordi de er flink ansatte (helt urelatert til at de svarte ja) Hvis de svarte "nei" må de finne på en god </a:t>
+            </a:r>
+            <a:r>
+              <a:rPr lang="nb-NO" b="0" i="0" dirty="0" err="1">
+                <a:solidFill>
+                  <a:srgbClr val="A9B7C6"/>
+                </a:solidFill>
+                <a:effectLst/>
+                <a:latin typeface="Helvetica" panose="020B0604020202020204" pitchFamily="34" charset="0"/>
+              </a:rPr>
+              <a:t>unskyldning</a:t>
+            </a:r>
+            <a:r>
+              <a:rPr lang="nb-NO" b="0" i="0" dirty="0">
+                <a:solidFill>
+                  <a:srgbClr val="A9B7C6"/>
+                </a:solidFill>
+                <a:effectLst/>
+                <a:latin typeface="Helvetica" panose="020B0604020202020204" pitchFamily="34" charset="0"/>
+              </a:rPr>
+              <a:t> til hvorfor de ikke fikk </a:t>
+            </a:r>
+            <a:r>
+              <a:rPr lang="nb-NO" b="0" i="0" dirty="0" err="1">
+                <a:solidFill>
+                  <a:srgbClr val="A9B7C6"/>
+                </a:solidFill>
+                <a:effectLst/>
+                <a:latin typeface="Helvetica" panose="020B0604020202020204" pitchFamily="34" charset="0"/>
+              </a:rPr>
+              <a:t>lønnøkningen</a:t>
+            </a:r>
+            <a:r>
+              <a:rPr lang="nb-NO" b="0" i="0" dirty="0">
+                <a:solidFill>
+                  <a:srgbClr val="A9B7C6"/>
+                </a:solidFill>
+                <a:effectLst/>
+                <a:latin typeface="Helvetica" panose="020B0604020202020204" pitchFamily="34" charset="0"/>
+              </a:rPr>
+              <a:t>.</a:t>
+            </a:r>
+          </a:p>
+          <a:p>
+            <a:endParaRPr lang="nb-NO" dirty="0"/>
+          </a:p>
+        </p:txBody>
+      </p:sp>
+      <p:sp>
+        <p:nvSpPr>
+          <p:cNvPr id="4" name="Plassholder for lysbildenummer 3"/>
+          <p:cNvSpPr>
+            <a:spLocks noGrp="1"/>
+          </p:cNvSpPr>
+          <p:nvPr>
+            <p:ph type="sldNum" sz="quarter" idx="5"/>
+          </p:nvPr>
+        </p:nvSpPr>
+        <p:spPr/>
+        <p:txBody>
+          <a:bodyPr/>
+          <a:lstStyle/>
+          <a:p>
+            <a:fld id="{C6B3AB32-59DF-41F1-9618-EDFBF5049629}" type="slidenum">
+              <a:rPr lang="en-US" smtClean="0"/>
+              <a:t>55</a:t>
+            </a:fld>
+            <a:endParaRPr lang="en-US" dirty="0"/>
+          </a:p>
+        </p:txBody>
+      </p:sp>
+    </p:spTree>
+    <p:extLst>
+      <p:ext uri="{BB962C8B-B14F-4D97-AF65-F5344CB8AC3E}">
+        <p14:creationId xmlns:p14="http://schemas.microsoft.com/office/powerpoint/2010/main" val="2678053148"/>
       </p:ext>
     </p:extLst>
   </p:cSld>
@@ -4669,7 +6143,7 @@
             <a:fld id="{B61BEF0D-F0BB-DE4B-95CE-6DB70DBA9567}" type="datetimeFigureOut">
               <a:rPr lang="en-US" smtClean="0"/>
               <a:pPr/>
-              <a:t>2/17/2023</a:t>
+              <a:t>2/20/2023</a:t>
             </a:fld>
             <a:endParaRPr lang="en-US" dirty="0"/>
           </a:p>
@@ -4933,7 +6407,7 @@
             <a:fld id="{B61BEF0D-F0BB-DE4B-95CE-6DB70DBA9567}" type="datetimeFigureOut">
               <a:rPr lang="en-US" smtClean="0"/>
               <a:pPr/>
-              <a:t>2/17/2023</a:t>
+              <a:t>2/20/2023</a:t>
             </a:fld>
             <a:endParaRPr lang="en-US" dirty="0"/>
           </a:p>
@@ -5170,7 +6644,7 @@
             <a:fld id="{B61BEF0D-F0BB-DE4B-95CE-6DB70DBA9567}" type="datetimeFigureOut">
               <a:rPr lang="en-US" smtClean="0"/>
               <a:pPr/>
-              <a:t>2/17/2023</a:t>
+              <a:t>2/20/2023</a:t>
             </a:fld>
             <a:endParaRPr lang="en-US" dirty="0"/>
           </a:p>
@@ -5412,7 +6886,7 @@
             <a:fld id="{B61BEF0D-F0BB-DE4B-95CE-6DB70DBA9567}" type="datetimeFigureOut">
               <a:rPr lang="en-US" smtClean="0"/>
               <a:pPr/>
-              <a:t>2/17/2023</a:t>
+              <a:t>2/20/2023</a:t>
             </a:fld>
             <a:endParaRPr lang="en-US" dirty="0"/>
           </a:p>
@@ -5721,7 +7195,7 @@
             <a:fld id="{B61BEF0D-F0BB-DE4B-95CE-6DB70DBA9567}" type="datetimeFigureOut">
               <a:rPr lang="en-US" smtClean="0"/>
               <a:pPr/>
-              <a:t>2/17/2023</a:t>
+              <a:t>2/20/2023</a:t>
             </a:fld>
             <a:endParaRPr lang="en-US" dirty="0"/>
           </a:p>
@@ -6025,7 +7499,7 @@
             <a:fld id="{B61BEF0D-F0BB-DE4B-95CE-6DB70DBA9567}" type="datetimeFigureOut">
               <a:rPr lang="en-US" smtClean="0"/>
               <a:pPr/>
-              <a:t>2/17/2023</a:t>
+              <a:t>2/20/2023</a:t>
             </a:fld>
             <a:endParaRPr lang="en-US" dirty="0"/>
           </a:p>
@@ -6449,7 +7923,7 @@
             <a:fld id="{B61BEF0D-F0BB-DE4B-95CE-6DB70DBA9567}" type="datetimeFigureOut">
               <a:rPr lang="en-US" smtClean="0"/>
               <a:pPr/>
-              <a:t>2/17/2023</a:t>
+              <a:t>2/20/2023</a:t>
             </a:fld>
             <a:endParaRPr lang="en-US" dirty="0"/>
           </a:p>
@@ -6546,7 +8020,7 @@
             <a:fld id="{B61BEF0D-F0BB-DE4B-95CE-6DB70DBA9567}" type="datetimeFigureOut">
               <a:rPr lang="en-US" smtClean="0"/>
               <a:pPr/>
-              <a:t>2/17/2023</a:t>
+              <a:t>2/20/2023</a:t>
             </a:fld>
             <a:endParaRPr lang="en-US" dirty="0"/>
           </a:p>
@@ -6710,7 +8184,7 @@
             <a:fld id="{B61BEF0D-F0BB-DE4B-95CE-6DB70DBA9567}" type="datetimeFigureOut">
               <a:rPr lang="en-US" smtClean="0"/>
               <a:pPr/>
-              <a:t>2/17/2023</a:t>
+              <a:t>2/20/2023</a:t>
             </a:fld>
             <a:endParaRPr lang="en-US" dirty="0"/>
           </a:p>
@@ -7090,7 +8564,7 @@
             <a:fld id="{B61BEF0D-F0BB-DE4B-95CE-6DB70DBA9567}" type="datetimeFigureOut">
               <a:rPr lang="en-US" smtClean="0"/>
               <a:pPr/>
-              <a:t>2/17/2023</a:t>
+              <a:t>2/20/2023</a:t>
             </a:fld>
             <a:endParaRPr lang="en-US" dirty="0"/>
           </a:p>
@@ -7380,7 +8854,7 @@
             <a:fld id="{B61BEF0D-F0BB-DE4B-95CE-6DB70DBA9567}" type="datetimeFigureOut">
               <a:rPr lang="en-US" smtClean="0"/>
               <a:pPr/>
-              <a:t>2/17/2023</a:t>
+              <a:t>2/20/2023</a:t>
             </a:fld>
             <a:endParaRPr lang="en-US" dirty="0"/>
           </a:p>
@@ -7593,7 +9067,7 @@
             <a:fld id="{B61BEF0D-F0BB-DE4B-95CE-6DB70DBA9567}" type="datetimeFigureOut">
               <a:rPr lang="en-US" smtClean="0"/>
               <a:pPr/>
-              <a:t>2/17/2023</a:t>
+              <a:t>2/20/2023</a:t>
             </a:fld>
             <a:endParaRPr lang="en-US" dirty="0"/>
           </a:p>
@@ -15715,6 +17189,685 @@
 </p:sld>
 </file>
 
+<file path=ppt/slides/slide45.xml><?xml version="1.0" encoding="utf-8"?>
+<p:sld xmlns:a="http://schemas.openxmlformats.org/drawingml/2006/main" xmlns:r="http://schemas.openxmlformats.org/officeDocument/2006/relationships" xmlns:p="http://schemas.openxmlformats.org/presentationml/2006/main">
+  <p:cSld>
+    <p:spTree>
+      <p:nvGrpSpPr>
+        <p:cNvPr id="1" name=""/>
+        <p:cNvGrpSpPr/>
+        <p:nvPr/>
+      </p:nvGrpSpPr>
+      <p:grpSpPr>
+        <a:xfrm>
+          <a:off x="0" y="0"/>
+          <a:ext cx="0" cy="0"/>
+          <a:chOff x="0" y="0"/>
+          <a:chExt cx="0" cy="0"/>
+        </a:xfrm>
+      </p:grpSpPr>
+      <p:sp>
+        <p:nvSpPr>
+          <p:cNvPr id="2" name="Title 1">
+            <a:extLst>
+              <a:ext uri="{FF2B5EF4-FFF2-40B4-BE49-F238E27FC236}">
+                <a16:creationId xmlns:a16="http://schemas.microsoft.com/office/drawing/2014/main" id="{FA16B2EC-95B9-2CD5-E8D3-018AB65481CB}"/>
+              </a:ext>
+            </a:extLst>
+          </p:cNvPr>
+          <p:cNvSpPr>
+            <a:spLocks noGrp="1"/>
+          </p:cNvSpPr>
+          <p:nvPr>
+            <p:ph type="title"/>
+          </p:nvPr>
+        </p:nvSpPr>
+        <p:spPr/>
+        <p:txBody>
+          <a:bodyPr/>
+          <a:lstStyle/>
+          <a:p>
+            <a:r>
+              <a:rPr lang="en-US" dirty="0" err="1"/>
+              <a:t>Oppsummering</a:t>
+            </a:r>
+            <a:endParaRPr lang="en-US" dirty="0"/>
+          </a:p>
+        </p:txBody>
+      </p:sp>
+      <p:sp>
+        <p:nvSpPr>
+          <p:cNvPr id="3" name="Content Placeholder 2">
+            <a:extLst>
+              <a:ext uri="{FF2B5EF4-FFF2-40B4-BE49-F238E27FC236}">
+                <a16:creationId xmlns:a16="http://schemas.microsoft.com/office/drawing/2014/main" id="{71F967BE-8E5B-E8BB-3733-DAD2C98F521B}"/>
+              </a:ext>
+            </a:extLst>
+          </p:cNvPr>
+          <p:cNvSpPr>
+            <a:spLocks noGrp="1"/>
+          </p:cNvSpPr>
+          <p:nvPr>
+            <p:ph idx="1"/>
+          </p:nvPr>
+        </p:nvSpPr>
+        <p:spPr/>
+        <p:txBody>
+          <a:bodyPr/>
+          <a:lstStyle/>
+          <a:p>
+            <a:r>
+              <a:rPr lang="en-US" dirty="0"/>
+              <a:t>PAUSE⏰</a:t>
+            </a:r>
+          </a:p>
+          <a:p>
+            <a:r>
+              <a:rPr lang="en-US" dirty="0" err="1"/>
+              <a:t>Hva</a:t>
+            </a:r>
+            <a:r>
+              <a:rPr lang="en-US" dirty="0"/>
+              <a:t> er </a:t>
+            </a:r>
+            <a:r>
+              <a:rPr lang="en-US" dirty="0" err="1"/>
+              <a:t>en</a:t>
+            </a:r>
+            <a:r>
+              <a:rPr lang="en-US" dirty="0"/>
+              <a:t> variable? </a:t>
+            </a:r>
+          </a:p>
+          <a:p>
+            <a:r>
+              <a:rPr lang="en-US" dirty="0" err="1"/>
+              <a:t>Hva</a:t>
+            </a:r>
+            <a:r>
+              <a:rPr lang="en-US" dirty="0"/>
+              <a:t> er </a:t>
+            </a:r>
+            <a:r>
+              <a:rPr lang="en-US" dirty="0" err="1"/>
+              <a:t>kontroll</a:t>
+            </a:r>
+            <a:r>
+              <a:rPr lang="en-US" dirty="0"/>
+              <a:t> </a:t>
+            </a:r>
+            <a:r>
+              <a:rPr lang="en-US" dirty="0" err="1"/>
+              <a:t>logikk</a:t>
+            </a:r>
+            <a:r>
+              <a:rPr lang="en-US" dirty="0"/>
+              <a:t> (if, else etc.)</a:t>
+            </a:r>
+          </a:p>
+          <a:p>
+            <a:r>
+              <a:rPr lang="en-US" dirty="0" err="1"/>
+              <a:t>Hva</a:t>
+            </a:r>
+            <a:r>
+              <a:rPr lang="en-US" dirty="0"/>
+              <a:t> er </a:t>
+            </a:r>
+            <a:r>
+              <a:rPr lang="en-US" dirty="0" err="1"/>
+              <a:t>en</a:t>
+            </a:r>
+            <a:r>
+              <a:rPr lang="en-US" dirty="0"/>
+              <a:t> </a:t>
+            </a:r>
+            <a:r>
+              <a:rPr lang="en-US" dirty="0" err="1"/>
+              <a:t>funksjon</a:t>
+            </a:r>
+            <a:r>
+              <a:rPr lang="en-US" dirty="0"/>
+              <a:t>?</a:t>
+            </a:r>
+          </a:p>
+          <a:p>
+            <a:r>
+              <a:rPr lang="en-US" dirty="0" err="1"/>
+              <a:t>Hva</a:t>
+            </a:r>
+            <a:r>
+              <a:rPr lang="en-US" dirty="0"/>
+              <a:t> er et argument I </a:t>
+            </a:r>
+            <a:r>
+              <a:rPr lang="en-US" dirty="0" err="1"/>
+              <a:t>en</a:t>
+            </a:r>
+            <a:r>
+              <a:rPr lang="en-US" dirty="0"/>
+              <a:t> </a:t>
+            </a:r>
+            <a:r>
+              <a:rPr lang="en-US" dirty="0" err="1"/>
+              <a:t>funksjon</a:t>
+            </a:r>
+            <a:r>
+              <a:rPr lang="en-US" dirty="0"/>
+              <a:t>?</a:t>
+            </a:r>
+          </a:p>
+        </p:txBody>
+      </p:sp>
+    </p:spTree>
+    <p:extLst>
+      <p:ext uri="{BB962C8B-B14F-4D97-AF65-F5344CB8AC3E}">
+        <p14:creationId xmlns:p14="http://schemas.microsoft.com/office/powerpoint/2010/main" val="3030744215"/>
+      </p:ext>
+    </p:extLst>
+  </p:cSld>
+  <p:clrMapOvr>
+    <a:masterClrMapping/>
+  </p:clrMapOvr>
+</p:sld>
+</file>
+
+<file path=ppt/slides/slide46.xml><?xml version="1.0" encoding="utf-8"?>
+<p:sld xmlns:a="http://schemas.openxmlformats.org/drawingml/2006/main" xmlns:r="http://schemas.openxmlformats.org/officeDocument/2006/relationships" xmlns:p="http://schemas.openxmlformats.org/presentationml/2006/main">
+  <p:cSld>
+    <p:spTree>
+      <p:nvGrpSpPr>
+        <p:cNvPr id="1" name=""/>
+        <p:cNvGrpSpPr/>
+        <p:nvPr/>
+      </p:nvGrpSpPr>
+      <p:grpSpPr>
+        <a:xfrm>
+          <a:off x="0" y="0"/>
+          <a:ext cx="0" cy="0"/>
+          <a:chOff x="0" y="0"/>
+          <a:chExt cx="0" cy="0"/>
+        </a:xfrm>
+      </p:grpSpPr>
+      <p:sp>
+        <p:nvSpPr>
+          <p:cNvPr id="2" name="Title 1">
+            <a:extLst>
+              <a:ext uri="{FF2B5EF4-FFF2-40B4-BE49-F238E27FC236}">
+                <a16:creationId xmlns:a16="http://schemas.microsoft.com/office/drawing/2014/main" id="{32203CAE-D968-CFC0-5CE7-62A753330F55}"/>
+              </a:ext>
+            </a:extLst>
+          </p:cNvPr>
+          <p:cNvSpPr>
+            <a:spLocks noGrp="1"/>
+          </p:cNvSpPr>
+          <p:nvPr>
+            <p:ph type="title"/>
+          </p:nvPr>
+        </p:nvSpPr>
+        <p:spPr/>
+        <p:txBody>
+          <a:bodyPr/>
+          <a:lstStyle/>
+          <a:p>
+            <a:r>
+              <a:rPr lang="en-US" dirty="0"/>
+              <a:t>Ta inn data </a:t>
+            </a:r>
+            <a:r>
+              <a:rPr lang="en-US" dirty="0" err="1"/>
+              <a:t>dynamisk</a:t>
+            </a:r>
+            <a:endParaRPr lang="en-US" dirty="0"/>
+          </a:p>
+        </p:txBody>
+      </p:sp>
+      <p:sp>
+        <p:nvSpPr>
+          <p:cNvPr id="3" name="Content Placeholder 2">
+            <a:extLst>
+              <a:ext uri="{FF2B5EF4-FFF2-40B4-BE49-F238E27FC236}">
+                <a16:creationId xmlns:a16="http://schemas.microsoft.com/office/drawing/2014/main" id="{1F8B147B-7375-ACE9-39F8-E811C33A84A2}"/>
+              </a:ext>
+            </a:extLst>
+          </p:cNvPr>
+          <p:cNvSpPr>
+            <a:spLocks noGrp="1"/>
+          </p:cNvSpPr>
+          <p:nvPr>
+            <p:ph idx="1"/>
+          </p:nvPr>
+        </p:nvSpPr>
+        <p:spPr/>
+        <p:txBody>
+          <a:bodyPr/>
+          <a:lstStyle/>
+          <a:p>
+            <a:r>
+              <a:rPr lang="nb-NO" dirty="0"/>
+              <a:t>Vårt program har </a:t>
+            </a:r>
+            <a:r>
+              <a:rPr lang="nb-NO" dirty="0" err="1"/>
+              <a:t>hardkoded</a:t>
+            </a:r>
+            <a:r>
+              <a:rPr lang="nb-NO" dirty="0"/>
+              <a:t> variabler. La oss gjøre dette dynamisk!</a:t>
+            </a:r>
+          </a:p>
+          <a:p>
+            <a:r>
+              <a:rPr lang="nb-NO" dirty="0"/>
+              <a:t>Ditt program skal nå ta inn dynamisk data fra bruker!</a:t>
+            </a:r>
+          </a:p>
+          <a:p>
+            <a:r>
+              <a:rPr lang="nb-NO" dirty="0"/>
+              <a:t>Dette gjør vi ved å bruke input() funksjonene, som kommer med Python</a:t>
+            </a:r>
+          </a:p>
+          <a:p>
+            <a:r>
+              <a:rPr lang="nb-NO" dirty="0"/>
+              <a:t>Demo time!</a:t>
+            </a:r>
+          </a:p>
+        </p:txBody>
+      </p:sp>
+    </p:spTree>
+    <p:extLst>
+      <p:ext uri="{BB962C8B-B14F-4D97-AF65-F5344CB8AC3E}">
+        <p14:creationId xmlns:p14="http://schemas.microsoft.com/office/powerpoint/2010/main" val="1253452976"/>
+      </p:ext>
+    </p:extLst>
+  </p:cSld>
+  <p:clrMapOvr>
+    <a:masterClrMapping/>
+  </p:clrMapOvr>
+</p:sld>
+</file>
+
+<file path=ppt/slides/slide47.xml><?xml version="1.0" encoding="utf-8"?>
+<p:sld xmlns:a="http://schemas.openxmlformats.org/drawingml/2006/main" xmlns:r="http://schemas.openxmlformats.org/officeDocument/2006/relationships" xmlns:p="http://schemas.openxmlformats.org/presentationml/2006/main">
+  <p:cSld>
+    <p:spTree>
+      <p:nvGrpSpPr>
+        <p:cNvPr id="1" name=""/>
+        <p:cNvGrpSpPr/>
+        <p:nvPr/>
+      </p:nvGrpSpPr>
+      <p:grpSpPr>
+        <a:xfrm>
+          <a:off x="0" y="0"/>
+          <a:ext cx="0" cy="0"/>
+          <a:chOff x="0" y="0"/>
+          <a:chExt cx="0" cy="0"/>
+        </a:xfrm>
+      </p:grpSpPr>
+      <p:sp>
+        <p:nvSpPr>
+          <p:cNvPr id="2" name="Tittel 1">
+            <a:extLst>
+              <a:ext uri="{FF2B5EF4-FFF2-40B4-BE49-F238E27FC236}">
+                <a16:creationId xmlns:a16="http://schemas.microsoft.com/office/drawing/2014/main" id="{369643DE-C486-270A-8934-3E32BE541076}"/>
+              </a:ext>
+            </a:extLst>
+          </p:cNvPr>
+          <p:cNvSpPr>
+            <a:spLocks noGrp="1"/>
+          </p:cNvSpPr>
+          <p:nvPr>
+            <p:ph type="title"/>
+          </p:nvPr>
+        </p:nvSpPr>
+        <p:spPr/>
+        <p:txBody>
+          <a:bodyPr/>
+          <a:lstStyle/>
+          <a:p>
+            <a:r>
+              <a:rPr lang="nb-NO" dirty="0"/>
+              <a:t>Ta inn data fra bruker med input()</a:t>
+            </a:r>
+          </a:p>
+        </p:txBody>
+      </p:sp>
+      <p:pic>
+        <p:nvPicPr>
+          <p:cNvPr id="5" name="Plassholder for innhold 4">
+            <a:extLst>
+              <a:ext uri="{FF2B5EF4-FFF2-40B4-BE49-F238E27FC236}">
+                <a16:creationId xmlns:a16="http://schemas.microsoft.com/office/drawing/2014/main" id="{D3BD9E80-5ACF-19EA-8192-A4A1703B7FAE}"/>
+              </a:ext>
+            </a:extLst>
+          </p:cNvPr>
+          <p:cNvPicPr>
+            <a:picLocks noGrp="1" noChangeAspect="1"/>
+          </p:cNvPicPr>
+          <p:nvPr>
+            <p:ph idx="1"/>
+          </p:nvPr>
+        </p:nvPicPr>
+        <p:blipFill>
+          <a:blip r:embed="rId2"/>
+          <a:stretch>
+            <a:fillRect/>
+          </a:stretch>
+        </p:blipFill>
+        <p:spPr>
+          <a:xfrm>
+            <a:off x="1266151" y="2590683"/>
+            <a:ext cx="9659698" cy="838317"/>
+          </a:xfrm>
+        </p:spPr>
+      </p:pic>
+    </p:spTree>
+    <p:extLst>
+      <p:ext uri="{BB962C8B-B14F-4D97-AF65-F5344CB8AC3E}">
+        <p14:creationId xmlns:p14="http://schemas.microsoft.com/office/powerpoint/2010/main" val="1992511391"/>
+      </p:ext>
+    </p:extLst>
+  </p:cSld>
+  <p:clrMapOvr>
+    <a:masterClrMapping/>
+  </p:clrMapOvr>
+</p:sld>
+</file>
+
+<file path=ppt/slides/slide48.xml><?xml version="1.0" encoding="utf-8"?>
+<p:sld xmlns:a="http://schemas.openxmlformats.org/drawingml/2006/main" xmlns:r="http://schemas.openxmlformats.org/officeDocument/2006/relationships" xmlns:p="http://schemas.openxmlformats.org/presentationml/2006/main">
+  <p:cSld>
+    <p:spTree>
+      <p:nvGrpSpPr>
+        <p:cNvPr id="1" name=""/>
+        <p:cNvGrpSpPr/>
+        <p:nvPr/>
+      </p:nvGrpSpPr>
+      <p:grpSpPr>
+        <a:xfrm>
+          <a:off x="0" y="0"/>
+          <a:ext cx="0" cy="0"/>
+          <a:chOff x="0" y="0"/>
+          <a:chExt cx="0" cy="0"/>
+        </a:xfrm>
+      </p:grpSpPr>
+      <p:sp>
+        <p:nvSpPr>
+          <p:cNvPr id="2" name="Tittel 1">
+            <a:extLst>
+              <a:ext uri="{FF2B5EF4-FFF2-40B4-BE49-F238E27FC236}">
+                <a16:creationId xmlns:a16="http://schemas.microsoft.com/office/drawing/2014/main" id="{369643DE-C486-270A-8934-3E32BE541076}"/>
+              </a:ext>
+            </a:extLst>
+          </p:cNvPr>
+          <p:cNvSpPr>
+            <a:spLocks noGrp="1"/>
+          </p:cNvSpPr>
+          <p:nvPr>
+            <p:ph type="title"/>
+          </p:nvPr>
+        </p:nvSpPr>
+        <p:spPr>
+          <a:xfrm>
+            <a:off x="581193" y="729658"/>
+            <a:ext cx="11029616" cy="988332"/>
+          </a:xfrm>
+        </p:spPr>
+        <p:txBody>
+          <a:bodyPr anchor="b">
+            <a:normAutofit/>
+          </a:bodyPr>
+          <a:lstStyle/>
+          <a:p>
+            <a:r>
+              <a:rPr lang="nb-NO" dirty="0"/>
+              <a:t>Ta inn data fra bruker med input()</a:t>
+            </a:r>
+          </a:p>
+        </p:txBody>
+      </p:sp>
+      <p:pic>
+        <p:nvPicPr>
+          <p:cNvPr id="7" name="Bilde 6">
+            <a:extLst>
+              <a:ext uri="{FF2B5EF4-FFF2-40B4-BE49-F238E27FC236}">
+                <a16:creationId xmlns:a16="http://schemas.microsoft.com/office/drawing/2014/main" id="{74EAD505-94B0-CF8A-0A81-8848573DD104}"/>
+              </a:ext>
+            </a:extLst>
+          </p:cNvPr>
+          <p:cNvPicPr>
+            <a:picLocks noChangeAspect="1"/>
+          </p:cNvPicPr>
+          <p:nvPr/>
+        </p:nvPicPr>
+        <p:blipFill>
+          <a:blip r:embed="rId3"/>
+          <a:stretch>
+            <a:fillRect/>
+          </a:stretch>
+        </p:blipFill>
+        <p:spPr>
+          <a:xfrm>
+            <a:off x="581193" y="2913925"/>
+            <a:ext cx="5422390" cy="2261203"/>
+          </a:xfrm>
+          <a:prstGeom prst="rect">
+            <a:avLst/>
+          </a:prstGeom>
+          <a:noFill/>
+        </p:spPr>
+      </p:pic>
+      <p:sp>
+        <p:nvSpPr>
+          <p:cNvPr id="4" name="Plassholder for innhold 3">
+            <a:extLst>
+              <a:ext uri="{FF2B5EF4-FFF2-40B4-BE49-F238E27FC236}">
+                <a16:creationId xmlns:a16="http://schemas.microsoft.com/office/drawing/2014/main" id="{FC93A7B7-D0C0-2DC0-FF5E-B696AFE13766}"/>
+              </a:ext>
+            </a:extLst>
+          </p:cNvPr>
+          <p:cNvSpPr>
+            <a:spLocks noGrp="1"/>
+          </p:cNvSpPr>
+          <p:nvPr>
+            <p:ph sz="half" idx="2"/>
+          </p:nvPr>
+        </p:nvSpPr>
+        <p:spPr>
+          <a:xfrm>
+            <a:off x="6188417" y="2228003"/>
+            <a:ext cx="5422392" cy="3633047"/>
+          </a:xfrm>
+        </p:spPr>
+        <p:txBody>
+          <a:bodyPr anchor="ctr">
+            <a:normAutofit/>
+          </a:bodyPr>
+          <a:lstStyle/>
+          <a:p>
+            <a:endParaRPr lang="nb-NO" dirty="0"/>
+          </a:p>
+          <a:p>
+            <a:pPr marL="0" indent="0">
+              <a:buNone/>
+            </a:pPr>
+            <a:endParaRPr lang="nb-NO" dirty="0"/>
+          </a:p>
+        </p:txBody>
+      </p:sp>
+      <p:pic>
+        <p:nvPicPr>
+          <p:cNvPr id="9" name="Bilde 8">
+            <a:extLst>
+              <a:ext uri="{FF2B5EF4-FFF2-40B4-BE49-F238E27FC236}">
+                <a16:creationId xmlns:a16="http://schemas.microsoft.com/office/drawing/2014/main" id="{35FD2C0A-B007-EF8B-8EA8-AF9A48A847FB}"/>
+              </a:ext>
+            </a:extLst>
+          </p:cNvPr>
+          <p:cNvPicPr>
+            <a:picLocks noChangeAspect="1"/>
+          </p:cNvPicPr>
+          <p:nvPr/>
+        </p:nvPicPr>
+        <p:blipFill>
+          <a:blip r:embed="rId4"/>
+          <a:stretch>
+            <a:fillRect/>
+          </a:stretch>
+        </p:blipFill>
+        <p:spPr>
+          <a:xfrm>
+            <a:off x="6353164" y="2653682"/>
+            <a:ext cx="7354326" cy="2781688"/>
+          </a:xfrm>
+          <a:prstGeom prst="rect">
+            <a:avLst/>
+          </a:prstGeom>
+        </p:spPr>
+      </p:pic>
+    </p:spTree>
+    <p:extLst>
+      <p:ext uri="{BB962C8B-B14F-4D97-AF65-F5344CB8AC3E}">
+        <p14:creationId xmlns:p14="http://schemas.microsoft.com/office/powerpoint/2010/main" val="3968829943"/>
+      </p:ext>
+    </p:extLst>
+  </p:cSld>
+  <p:clrMapOvr>
+    <a:masterClrMapping/>
+  </p:clrMapOvr>
+</p:sld>
+</file>
+
+<file path=ppt/slides/slide49.xml><?xml version="1.0" encoding="utf-8"?>
+<p:sld xmlns:a="http://schemas.openxmlformats.org/drawingml/2006/main" xmlns:r="http://schemas.openxmlformats.org/officeDocument/2006/relationships" xmlns:p="http://schemas.openxmlformats.org/presentationml/2006/main">
+  <p:cSld>
+    <p:spTree>
+      <p:nvGrpSpPr>
+        <p:cNvPr id="1" name=""/>
+        <p:cNvGrpSpPr/>
+        <p:nvPr/>
+      </p:nvGrpSpPr>
+      <p:grpSpPr>
+        <a:xfrm>
+          <a:off x="0" y="0"/>
+          <a:ext cx="0" cy="0"/>
+          <a:chOff x="0" y="0"/>
+          <a:chExt cx="0" cy="0"/>
+        </a:xfrm>
+      </p:grpSpPr>
+      <p:sp>
+        <p:nvSpPr>
+          <p:cNvPr id="2" name="Tittel 1">
+            <a:extLst>
+              <a:ext uri="{FF2B5EF4-FFF2-40B4-BE49-F238E27FC236}">
+                <a16:creationId xmlns:a16="http://schemas.microsoft.com/office/drawing/2014/main" id="{744970BE-CE7D-2C7C-35AB-43781DF1E34B}"/>
+              </a:ext>
+            </a:extLst>
+          </p:cNvPr>
+          <p:cNvSpPr>
+            <a:spLocks noGrp="1"/>
+          </p:cNvSpPr>
+          <p:nvPr>
+            <p:ph type="title"/>
+          </p:nvPr>
+        </p:nvSpPr>
+        <p:spPr/>
+        <p:txBody>
+          <a:bodyPr/>
+          <a:lstStyle/>
+          <a:p>
+            <a:r>
+              <a:rPr lang="nb-NO" dirty="0"/>
+              <a:t>Ta inn data fra bruker</a:t>
+            </a:r>
+          </a:p>
+        </p:txBody>
+      </p:sp>
+      <p:sp>
+        <p:nvSpPr>
+          <p:cNvPr id="3" name="Plassholder for innhold 2">
+            <a:extLst>
+              <a:ext uri="{FF2B5EF4-FFF2-40B4-BE49-F238E27FC236}">
+                <a16:creationId xmlns:a16="http://schemas.microsoft.com/office/drawing/2014/main" id="{9FC1A349-6825-99E0-9B65-357B10807233}"/>
+              </a:ext>
+            </a:extLst>
+          </p:cNvPr>
+          <p:cNvSpPr>
+            <a:spLocks noGrp="1"/>
+          </p:cNvSpPr>
+          <p:nvPr>
+            <p:ph idx="1"/>
+          </p:nvPr>
+        </p:nvSpPr>
+        <p:spPr/>
+        <p:txBody>
+          <a:bodyPr/>
+          <a:lstStyle/>
+          <a:p>
+            <a:r>
+              <a:rPr lang="nb-NO" dirty="0"/>
+              <a:t>Oppgave:</a:t>
+            </a:r>
+          </a:p>
+          <a:p>
+            <a:pPr lvl="1"/>
+            <a:r>
+              <a:rPr lang="nb-NO" dirty="0"/>
+              <a:t>Lag en funksjon som tar inn følgene data fra brukeren:</a:t>
+            </a:r>
+          </a:p>
+          <a:p>
+            <a:pPr lvl="1"/>
+            <a:r>
+              <a:rPr lang="nb-NO" dirty="0"/>
+              <a:t>Navn</a:t>
+            </a:r>
+          </a:p>
+          <a:p>
+            <a:pPr lvl="1"/>
+            <a:r>
+              <a:rPr lang="nb-NO" dirty="0"/>
+              <a:t>Alder</a:t>
+            </a:r>
+          </a:p>
+          <a:p>
+            <a:pPr lvl="1"/>
+            <a:r>
+              <a:rPr lang="nb-NO" dirty="0"/>
+              <a:t>Stilling</a:t>
+            </a:r>
+          </a:p>
+          <a:p>
+            <a:pPr lvl="1"/>
+            <a:r>
+              <a:rPr lang="nb-NO" dirty="0"/>
+              <a:t>Nåværende lønn</a:t>
+            </a:r>
+          </a:p>
+          <a:p>
+            <a:pPr lvl="1"/>
+            <a:r>
+              <a:rPr lang="nb-NO" dirty="0"/>
+              <a:t>Ønsket lønn</a:t>
+            </a:r>
+          </a:p>
+        </p:txBody>
+      </p:sp>
+    </p:spTree>
+    <p:extLst>
+      <p:ext uri="{BB962C8B-B14F-4D97-AF65-F5344CB8AC3E}">
+        <p14:creationId xmlns:p14="http://schemas.microsoft.com/office/powerpoint/2010/main" val="2622576972"/>
+      </p:ext>
+    </p:extLst>
+  </p:cSld>
+  <p:clrMapOvr>
+    <a:masterClrMapping/>
+  </p:clrMapOvr>
+</p:sld>
+</file>
+
 <file path=ppt/slides/slide5.xml><?xml version="1.0" encoding="utf-8"?>
 <p:sld xmlns:a="http://schemas.openxmlformats.org/drawingml/2006/main" xmlns:r="http://schemas.openxmlformats.org/officeDocument/2006/relationships" xmlns:p="http://schemas.openxmlformats.org/presentationml/2006/main">
   <p:cSld>
@@ -15893,6 +18046,721 @@
   <p:clrMapOvr>
     <a:masterClrMapping/>
   </p:clrMapOvr>
+</p:sld>
+</file>
+
+<file path=ppt/slides/slide50.xml><?xml version="1.0" encoding="utf-8"?>
+<p:sld xmlns:a="http://schemas.openxmlformats.org/drawingml/2006/main" xmlns:r="http://schemas.openxmlformats.org/officeDocument/2006/relationships" xmlns:p="http://schemas.openxmlformats.org/presentationml/2006/main">
+  <p:cSld>
+    <p:spTree>
+      <p:nvGrpSpPr>
+        <p:cNvPr id="1" name=""/>
+        <p:cNvGrpSpPr/>
+        <p:nvPr/>
+      </p:nvGrpSpPr>
+      <p:grpSpPr>
+        <a:xfrm>
+          <a:off x="0" y="0"/>
+          <a:ext cx="0" cy="0"/>
+          <a:chOff x="0" y="0"/>
+          <a:chExt cx="0" cy="0"/>
+        </a:xfrm>
+      </p:grpSpPr>
+      <p:sp>
+        <p:nvSpPr>
+          <p:cNvPr id="2" name="Tittel 1">
+            <a:extLst>
+              <a:ext uri="{FF2B5EF4-FFF2-40B4-BE49-F238E27FC236}">
+                <a16:creationId xmlns:a16="http://schemas.microsoft.com/office/drawing/2014/main" id="{BF6B1AC5-8258-2C39-0C1D-88BC73095BB6}"/>
+              </a:ext>
+            </a:extLst>
+          </p:cNvPr>
+          <p:cNvSpPr>
+            <a:spLocks noGrp="1"/>
+          </p:cNvSpPr>
+          <p:nvPr>
+            <p:ph type="title"/>
+          </p:nvPr>
+        </p:nvSpPr>
+        <p:spPr/>
+        <p:txBody>
+          <a:bodyPr/>
+          <a:lstStyle/>
+          <a:p>
+            <a:r>
+              <a:rPr lang="nb-NO" dirty="0"/>
+              <a:t>Bruk brukere data</a:t>
+            </a:r>
+          </a:p>
+        </p:txBody>
+      </p:sp>
+      <p:sp>
+        <p:nvSpPr>
+          <p:cNvPr id="3" name="Plassholder for innhold 2">
+            <a:extLst>
+              <a:ext uri="{FF2B5EF4-FFF2-40B4-BE49-F238E27FC236}">
+                <a16:creationId xmlns:a16="http://schemas.microsoft.com/office/drawing/2014/main" id="{885C0CE6-D176-2172-8C18-CC7B468810A5}"/>
+              </a:ext>
+            </a:extLst>
+          </p:cNvPr>
+          <p:cNvSpPr>
+            <a:spLocks noGrp="1"/>
+          </p:cNvSpPr>
+          <p:nvPr>
+            <p:ph idx="1"/>
+          </p:nvPr>
+        </p:nvSpPr>
+        <p:spPr/>
+        <p:txBody>
+          <a:bodyPr/>
+          <a:lstStyle/>
+          <a:p>
+            <a:r>
+              <a:rPr lang="nb-NO" dirty="0"/>
+              <a:t>Bruk dataen dere får fra brukeren, til å kalle </a:t>
+            </a:r>
+            <a:r>
+              <a:rPr lang="nb-NO" dirty="0" err="1"/>
+              <a:t>sjekk_lønn</a:t>
+            </a:r>
+            <a:r>
+              <a:rPr lang="nb-NO" dirty="0"/>
+              <a:t> og </a:t>
+            </a:r>
+            <a:r>
+              <a:rPr lang="nb-NO" dirty="0" err="1"/>
+              <a:t>print_fakta</a:t>
+            </a:r>
+            <a:r>
+              <a:rPr lang="nb-NO" dirty="0"/>
+              <a:t> funksjonene</a:t>
+            </a:r>
+          </a:p>
+          <a:p>
+            <a:r>
+              <a:rPr lang="nb-NO" dirty="0"/>
+              <a:t>Hvis koden deres </a:t>
+            </a:r>
+            <a:r>
+              <a:rPr lang="nb-NO" dirty="0" err="1"/>
+              <a:t>kræsjer</a:t>
+            </a:r>
+            <a:r>
+              <a:rPr lang="nb-NO" dirty="0"/>
+              <a:t>, er dette </a:t>
+            </a:r>
+            <a:r>
+              <a:rPr lang="nb-NO" dirty="0" err="1"/>
+              <a:t>forventent</a:t>
+            </a:r>
+            <a:r>
+              <a:rPr lang="nb-NO" dirty="0"/>
+              <a:t>!</a:t>
+            </a:r>
+          </a:p>
+        </p:txBody>
+      </p:sp>
+    </p:spTree>
+    <p:extLst>
+      <p:ext uri="{BB962C8B-B14F-4D97-AF65-F5344CB8AC3E}">
+        <p14:creationId xmlns:p14="http://schemas.microsoft.com/office/powerpoint/2010/main" val="999813467"/>
+      </p:ext>
+    </p:extLst>
+  </p:cSld>
+  <p:clrMapOvr>
+    <a:masterClrMapping/>
+  </p:clrMapOvr>
+</p:sld>
+</file>
+
+<file path=ppt/slides/slide51.xml><?xml version="1.0" encoding="utf-8"?>
+<p:sld xmlns:a="http://schemas.openxmlformats.org/drawingml/2006/main" xmlns:r="http://schemas.openxmlformats.org/officeDocument/2006/relationships" xmlns:p="http://schemas.openxmlformats.org/presentationml/2006/main">
+  <p:cSld>
+    <p:spTree>
+      <p:nvGrpSpPr>
+        <p:cNvPr id="1" name=""/>
+        <p:cNvGrpSpPr/>
+        <p:nvPr/>
+      </p:nvGrpSpPr>
+      <p:grpSpPr>
+        <a:xfrm>
+          <a:off x="0" y="0"/>
+          <a:ext cx="0" cy="0"/>
+          <a:chOff x="0" y="0"/>
+          <a:chExt cx="0" cy="0"/>
+        </a:xfrm>
+      </p:grpSpPr>
+      <p:sp>
+        <p:nvSpPr>
+          <p:cNvPr id="2" name="Tittel 1">
+            <a:extLst>
+              <a:ext uri="{FF2B5EF4-FFF2-40B4-BE49-F238E27FC236}">
+                <a16:creationId xmlns:a16="http://schemas.microsoft.com/office/drawing/2014/main" id="{25F03466-F082-B1D2-413E-06386A163FEA}"/>
+              </a:ext>
+            </a:extLst>
+          </p:cNvPr>
+          <p:cNvSpPr>
+            <a:spLocks noGrp="1"/>
+          </p:cNvSpPr>
+          <p:nvPr>
+            <p:ph type="title"/>
+          </p:nvPr>
+        </p:nvSpPr>
+        <p:spPr/>
+        <p:txBody>
+          <a:bodyPr/>
+          <a:lstStyle/>
+          <a:p>
+            <a:r>
+              <a:rPr lang="nb-NO" dirty="0"/>
+              <a:t>Fiks </a:t>
+            </a:r>
+            <a:r>
+              <a:rPr lang="nb-NO" dirty="0" err="1"/>
+              <a:t>kræsjen</a:t>
+            </a:r>
+            <a:endParaRPr lang="nb-NO" dirty="0"/>
+          </a:p>
+        </p:txBody>
+      </p:sp>
+      <p:pic>
+        <p:nvPicPr>
+          <p:cNvPr id="5" name="Plassholder for innhold 4">
+            <a:extLst>
+              <a:ext uri="{FF2B5EF4-FFF2-40B4-BE49-F238E27FC236}">
+                <a16:creationId xmlns:a16="http://schemas.microsoft.com/office/drawing/2014/main" id="{80C736D5-B65C-6E04-AE6A-76DD05DCDA48}"/>
+              </a:ext>
+            </a:extLst>
+          </p:cNvPr>
+          <p:cNvPicPr>
+            <a:picLocks noGrp="1" noChangeAspect="1"/>
+          </p:cNvPicPr>
+          <p:nvPr>
+            <p:ph idx="1"/>
+          </p:nvPr>
+        </p:nvPicPr>
+        <p:blipFill>
+          <a:blip r:embed="rId3"/>
+          <a:stretch>
+            <a:fillRect/>
+          </a:stretch>
+        </p:blipFill>
+        <p:spPr>
+          <a:xfrm>
+            <a:off x="2189690" y="1905000"/>
+            <a:ext cx="7796348" cy="4250844"/>
+          </a:xfrm>
+        </p:spPr>
+      </p:pic>
+    </p:spTree>
+    <p:extLst>
+      <p:ext uri="{BB962C8B-B14F-4D97-AF65-F5344CB8AC3E}">
+        <p14:creationId xmlns:p14="http://schemas.microsoft.com/office/powerpoint/2010/main" val="1081108807"/>
+      </p:ext>
+    </p:extLst>
+  </p:cSld>
+  <p:clrMapOvr>
+    <a:masterClrMapping/>
+  </p:clrMapOvr>
+</p:sld>
+</file>
+
+<file path=ppt/slides/slide52.xml><?xml version="1.0" encoding="utf-8"?>
+<p:sld xmlns:a="http://schemas.openxmlformats.org/drawingml/2006/main" xmlns:r="http://schemas.openxmlformats.org/officeDocument/2006/relationships" xmlns:p="http://schemas.openxmlformats.org/presentationml/2006/main">
+  <p:cSld>
+    <p:spTree>
+      <p:nvGrpSpPr>
+        <p:cNvPr id="1" name=""/>
+        <p:cNvGrpSpPr/>
+        <p:nvPr/>
+      </p:nvGrpSpPr>
+      <p:grpSpPr>
+        <a:xfrm>
+          <a:off x="0" y="0"/>
+          <a:ext cx="0" cy="0"/>
+          <a:chOff x="0" y="0"/>
+          <a:chExt cx="0" cy="0"/>
+        </a:xfrm>
+      </p:grpSpPr>
+      <p:sp>
+        <p:nvSpPr>
+          <p:cNvPr id="2" name="Tittel 1">
+            <a:extLst>
+              <a:ext uri="{FF2B5EF4-FFF2-40B4-BE49-F238E27FC236}">
+                <a16:creationId xmlns:a16="http://schemas.microsoft.com/office/drawing/2014/main" id="{7F6D52C7-916A-0364-471A-D8F1911CDDC7}"/>
+              </a:ext>
+            </a:extLst>
+          </p:cNvPr>
+          <p:cNvSpPr>
+            <a:spLocks noGrp="1"/>
+          </p:cNvSpPr>
+          <p:nvPr>
+            <p:ph type="title"/>
+          </p:nvPr>
+        </p:nvSpPr>
+        <p:spPr/>
+        <p:txBody>
+          <a:bodyPr/>
+          <a:lstStyle/>
+          <a:p>
+            <a:r>
+              <a:rPr lang="nb-NO" dirty="0"/>
+              <a:t>Hvordan fikse type </a:t>
+            </a:r>
+            <a:r>
+              <a:rPr lang="nb-NO" dirty="0" err="1"/>
+              <a:t>error</a:t>
+            </a:r>
+            <a:endParaRPr lang="nb-NO" dirty="0"/>
+          </a:p>
+        </p:txBody>
+      </p:sp>
+      <p:sp>
+        <p:nvSpPr>
+          <p:cNvPr id="3" name="Plassholder for innhold 2">
+            <a:extLst>
+              <a:ext uri="{FF2B5EF4-FFF2-40B4-BE49-F238E27FC236}">
+                <a16:creationId xmlns:a16="http://schemas.microsoft.com/office/drawing/2014/main" id="{C6236BFB-C9AF-3A74-9588-C1077ACF9C91}"/>
+              </a:ext>
+            </a:extLst>
+          </p:cNvPr>
+          <p:cNvSpPr>
+            <a:spLocks noGrp="1"/>
+          </p:cNvSpPr>
+          <p:nvPr>
+            <p:ph idx="1"/>
+          </p:nvPr>
+        </p:nvSpPr>
+        <p:spPr/>
+        <p:txBody>
+          <a:bodyPr/>
+          <a:lstStyle/>
+          <a:p>
+            <a:r>
+              <a:rPr lang="nb-NO" dirty="0"/>
+              <a:t>Du må fortelle </a:t>
+            </a:r>
+            <a:r>
+              <a:rPr lang="nb-NO" dirty="0" err="1"/>
+              <a:t>python</a:t>
+            </a:r>
+            <a:r>
+              <a:rPr lang="nb-NO" dirty="0"/>
+              <a:t> at det er et tall den får.</a:t>
+            </a:r>
+          </a:p>
+          <a:p>
+            <a:endParaRPr lang="nb-NO" dirty="0"/>
+          </a:p>
+        </p:txBody>
+      </p:sp>
+      <p:pic>
+        <p:nvPicPr>
+          <p:cNvPr id="5" name="Bilde 4">
+            <a:extLst>
+              <a:ext uri="{FF2B5EF4-FFF2-40B4-BE49-F238E27FC236}">
+                <a16:creationId xmlns:a16="http://schemas.microsoft.com/office/drawing/2014/main" id="{B0D60CA7-4E66-F025-45BB-4A1C4362BC43}"/>
+              </a:ext>
+            </a:extLst>
+          </p:cNvPr>
+          <p:cNvPicPr>
+            <a:picLocks noChangeAspect="1"/>
+          </p:cNvPicPr>
+          <p:nvPr/>
+        </p:nvPicPr>
+        <p:blipFill>
+          <a:blip r:embed="rId3"/>
+          <a:stretch>
+            <a:fillRect/>
+          </a:stretch>
+        </p:blipFill>
+        <p:spPr>
+          <a:xfrm>
+            <a:off x="929959" y="4057747"/>
+            <a:ext cx="6051331" cy="1200053"/>
+          </a:xfrm>
+          <a:prstGeom prst="rect">
+            <a:avLst/>
+          </a:prstGeom>
+        </p:spPr>
+      </p:pic>
+    </p:spTree>
+    <p:extLst>
+      <p:ext uri="{BB962C8B-B14F-4D97-AF65-F5344CB8AC3E}">
+        <p14:creationId xmlns:p14="http://schemas.microsoft.com/office/powerpoint/2010/main" val="293867412"/>
+      </p:ext>
+    </p:extLst>
+  </p:cSld>
+  <p:clrMapOvr>
+    <a:masterClrMapping/>
+  </p:clrMapOvr>
+</p:sld>
+</file>
+
+<file path=ppt/slides/slide53.xml><?xml version="1.0" encoding="utf-8"?>
+<p:sld xmlns:a="http://schemas.openxmlformats.org/drawingml/2006/main" xmlns:r="http://schemas.openxmlformats.org/officeDocument/2006/relationships" xmlns:p="http://schemas.openxmlformats.org/presentationml/2006/main">
+  <p:cSld>
+    <p:spTree>
+      <p:nvGrpSpPr>
+        <p:cNvPr id="1" name=""/>
+        <p:cNvGrpSpPr/>
+        <p:nvPr/>
+      </p:nvGrpSpPr>
+      <p:grpSpPr>
+        <a:xfrm>
+          <a:off x="0" y="0"/>
+          <a:ext cx="0" cy="0"/>
+          <a:chOff x="0" y="0"/>
+          <a:chExt cx="0" cy="0"/>
+        </a:xfrm>
+      </p:grpSpPr>
+      <p:sp>
+        <p:nvSpPr>
+          <p:cNvPr id="2" name="Tittel 1">
+            <a:extLst>
+              <a:ext uri="{FF2B5EF4-FFF2-40B4-BE49-F238E27FC236}">
+                <a16:creationId xmlns:a16="http://schemas.microsoft.com/office/drawing/2014/main" id="{7DED249B-CFF0-483C-04D0-A8480B973625}"/>
+              </a:ext>
+            </a:extLst>
+          </p:cNvPr>
+          <p:cNvSpPr>
+            <a:spLocks noGrp="1"/>
+          </p:cNvSpPr>
+          <p:nvPr>
+            <p:ph type="title"/>
+          </p:nvPr>
+        </p:nvSpPr>
+        <p:spPr/>
+        <p:txBody>
+          <a:bodyPr/>
+          <a:lstStyle/>
+          <a:p>
+            <a:r>
+              <a:rPr lang="nb-NO" dirty="0"/>
+              <a:t>Gratulerer</a:t>
+            </a:r>
+            <a:r>
+              <a:rPr lang="en-US" dirty="0"/>
+              <a:t>🎊🥳</a:t>
+            </a:r>
+            <a:endParaRPr lang="nb-NO" dirty="0"/>
+          </a:p>
+        </p:txBody>
+      </p:sp>
+      <p:sp>
+        <p:nvSpPr>
+          <p:cNvPr id="3" name="Plassholder for innhold 2">
+            <a:extLst>
+              <a:ext uri="{FF2B5EF4-FFF2-40B4-BE49-F238E27FC236}">
+                <a16:creationId xmlns:a16="http://schemas.microsoft.com/office/drawing/2014/main" id="{39DE6EDB-746D-398B-CC19-6998359A9E2E}"/>
+              </a:ext>
+            </a:extLst>
+          </p:cNvPr>
+          <p:cNvSpPr>
+            <a:spLocks noGrp="1"/>
+          </p:cNvSpPr>
+          <p:nvPr>
+            <p:ph idx="1"/>
+          </p:nvPr>
+        </p:nvSpPr>
+        <p:spPr/>
+        <p:txBody>
+          <a:bodyPr/>
+          <a:lstStyle/>
+          <a:p>
+            <a:r>
+              <a:rPr lang="nb-NO" dirty="0"/>
+              <a:t>Dere har kommet igjennom introduksjon til koding!</a:t>
+            </a:r>
+          </a:p>
+          <a:p>
+            <a:r>
+              <a:rPr lang="nb-NO" dirty="0"/>
+              <a:t>Nå skal dere lage deres eget HR program!</a:t>
+            </a:r>
+          </a:p>
+          <a:p>
+            <a:r>
+              <a:rPr lang="nb-NO" dirty="0"/>
+              <a:t>Hvis vi får tid, er det bonus materiale!  </a:t>
+            </a:r>
+          </a:p>
+        </p:txBody>
+      </p:sp>
+    </p:spTree>
+    <p:extLst>
+      <p:ext uri="{BB962C8B-B14F-4D97-AF65-F5344CB8AC3E}">
+        <p14:creationId xmlns:p14="http://schemas.microsoft.com/office/powerpoint/2010/main" val="2958761626"/>
+      </p:ext>
+    </p:extLst>
+  </p:cSld>
+  <p:clrMapOvr>
+    <a:masterClrMapping/>
+  </p:clrMapOvr>
+</p:sld>
+</file>
+
+<file path=ppt/slides/slide54.xml><?xml version="1.0" encoding="utf-8"?>
+<p:sld xmlns:a="http://schemas.openxmlformats.org/drawingml/2006/main" xmlns:r="http://schemas.openxmlformats.org/officeDocument/2006/relationships" xmlns:p="http://schemas.openxmlformats.org/presentationml/2006/main">
+  <p:cSld>
+    <p:spTree>
+      <p:nvGrpSpPr>
+        <p:cNvPr id="1" name=""/>
+        <p:cNvGrpSpPr/>
+        <p:nvPr/>
+      </p:nvGrpSpPr>
+      <p:grpSpPr>
+        <a:xfrm>
+          <a:off x="0" y="0"/>
+          <a:ext cx="0" cy="0"/>
+          <a:chOff x="0" y="0"/>
+          <a:chExt cx="0" cy="0"/>
+        </a:xfrm>
+      </p:grpSpPr>
+      <p:sp>
+        <p:nvSpPr>
+          <p:cNvPr id="2" name="Tittel 1">
+            <a:extLst>
+              <a:ext uri="{FF2B5EF4-FFF2-40B4-BE49-F238E27FC236}">
+                <a16:creationId xmlns:a16="http://schemas.microsoft.com/office/drawing/2014/main" id="{27206479-DEE0-8BFE-CA5A-6F767A59BB25}"/>
+              </a:ext>
+            </a:extLst>
+          </p:cNvPr>
+          <p:cNvSpPr>
+            <a:spLocks noGrp="1"/>
+          </p:cNvSpPr>
+          <p:nvPr>
+            <p:ph type="title"/>
+          </p:nvPr>
+        </p:nvSpPr>
+        <p:spPr/>
+        <p:txBody>
+          <a:bodyPr/>
+          <a:lstStyle/>
+          <a:p>
+            <a:r>
+              <a:rPr lang="nb-NO" dirty="0"/>
+              <a:t>HR program</a:t>
+            </a:r>
+          </a:p>
+        </p:txBody>
+      </p:sp>
+      <p:sp>
+        <p:nvSpPr>
+          <p:cNvPr id="3" name="Plassholder for innhold 2">
+            <a:extLst>
+              <a:ext uri="{FF2B5EF4-FFF2-40B4-BE49-F238E27FC236}">
+                <a16:creationId xmlns:a16="http://schemas.microsoft.com/office/drawing/2014/main" id="{2EABD2F5-82B5-34CA-7058-0FA3CA64DA0F}"/>
+              </a:ext>
+            </a:extLst>
+          </p:cNvPr>
+          <p:cNvSpPr>
+            <a:spLocks noGrp="1"/>
+          </p:cNvSpPr>
+          <p:nvPr>
+            <p:ph idx="1"/>
+          </p:nvPr>
+        </p:nvSpPr>
+        <p:spPr/>
+        <p:txBody>
+          <a:bodyPr/>
+          <a:lstStyle/>
+          <a:p>
+            <a:r>
+              <a:rPr lang="nb-NO" dirty="0"/>
+              <a:t>Du skal lage et program for å holde styr over ansatte og deres lønn.</a:t>
+            </a:r>
+          </a:p>
+          <a:p>
+            <a:r>
+              <a:rPr lang="nb-NO" dirty="0"/>
+              <a:t>Gå til https://xx5.no/koding/oppgave.md</a:t>
+            </a:r>
+          </a:p>
+        </p:txBody>
+      </p:sp>
+    </p:spTree>
+    <p:extLst>
+      <p:ext uri="{BB962C8B-B14F-4D97-AF65-F5344CB8AC3E}">
+        <p14:creationId xmlns:p14="http://schemas.microsoft.com/office/powerpoint/2010/main" val="3188968382"/>
+      </p:ext>
+    </p:extLst>
+  </p:cSld>
+  <p:clrMapOvr>
+    <a:masterClrMapping/>
+  </p:clrMapOvr>
+</p:sld>
+</file>
+
+<file path=ppt/slides/slide55.xml><?xml version="1.0" encoding="utf-8"?>
+<p:sld xmlns:a="http://schemas.openxmlformats.org/drawingml/2006/main" xmlns:r="http://schemas.openxmlformats.org/officeDocument/2006/relationships" xmlns:p="http://schemas.openxmlformats.org/presentationml/2006/main">
+  <p:cSld>
+    <p:spTree>
+      <p:nvGrpSpPr>
+        <p:cNvPr id="1" name=""/>
+        <p:cNvGrpSpPr/>
+        <p:nvPr/>
+      </p:nvGrpSpPr>
+      <p:grpSpPr>
+        <a:xfrm>
+          <a:off x="0" y="0"/>
+          <a:ext cx="0" cy="0"/>
+          <a:chOff x="0" y="0"/>
+          <a:chExt cx="0" cy="0"/>
+        </a:xfrm>
+      </p:grpSpPr>
+      <p:pic>
+        <p:nvPicPr>
+          <p:cNvPr id="5" name="Plassholder for innhold 4" descr="Et bilde som inneholder tekst, innendørs, person&#10;&#10;Automatisk generert beskrivelse">
+            <a:extLst>
+              <a:ext uri="{FF2B5EF4-FFF2-40B4-BE49-F238E27FC236}">
+                <a16:creationId xmlns:a16="http://schemas.microsoft.com/office/drawing/2014/main" id="{8E1A9EA9-AA38-06F3-5E69-39F32CF0EA43}"/>
+              </a:ext>
+            </a:extLst>
+          </p:cNvPr>
+          <p:cNvPicPr>
+            <a:picLocks noGrp="1" noChangeAspect="1"/>
+          </p:cNvPicPr>
+          <p:nvPr>
+            <p:ph type="pic" idx="1"/>
+          </p:nvPr>
+        </p:nvPicPr>
+        <p:blipFill rotWithShape="1">
+          <a:blip r:embed="rId3"/>
+          <a:srcRect t="13013" b="7200"/>
+          <a:stretch/>
+        </p:blipFill>
+        <p:spPr>
+          <a:xfrm>
+            <a:off x="20" y="10"/>
+            <a:ext cx="12191980" cy="6857990"/>
+          </a:xfrm>
+          <a:noFill/>
+        </p:spPr>
+      </p:pic>
+      <p:pic>
+        <p:nvPicPr>
+          <p:cNvPr id="7" name="Bilde 6">
+            <a:extLst>
+              <a:ext uri="{FF2B5EF4-FFF2-40B4-BE49-F238E27FC236}">
+                <a16:creationId xmlns:a16="http://schemas.microsoft.com/office/drawing/2014/main" id="{5C7BB5C8-6663-6E36-4F00-F0B3A84CDC1C}"/>
+              </a:ext>
+            </a:extLst>
+          </p:cNvPr>
+          <p:cNvPicPr>
+            <a:picLocks noChangeAspect="1"/>
+          </p:cNvPicPr>
+          <p:nvPr/>
+        </p:nvPicPr>
+        <p:blipFill>
+          <a:blip r:embed="rId4"/>
+          <a:stretch>
+            <a:fillRect/>
+          </a:stretch>
+        </p:blipFill>
+        <p:spPr>
+          <a:xfrm>
+            <a:off x="-20" y="-632319"/>
+            <a:ext cx="12192000" cy="8122638"/>
+          </a:xfrm>
+          <a:prstGeom prst="rect">
+            <a:avLst/>
+          </a:prstGeom>
+        </p:spPr>
+      </p:pic>
+    </p:spTree>
+    <p:extLst>
+      <p:ext uri="{BB962C8B-B14F-4D97-AF65-F5344CB8AC3E}">
+        <p14:creationId xmlns:p14="http://schemas.microsoft.com/office/powerpoint/2010/main" val="3201574808"/>
+      </p:ext>
+    </p:extLst>
+  </p:cSld>
+  <p:clrMapOvr>
+    <a:masterClrMapping/>
+  </p:clrMapOvr>
+  <p:timing>
+    <p:tnLst>
+      <p:par>
+        <p:cTn id="1" dur="indefinite" restart="never" nodeType="tmRoot">
+          <p:childTnLst>
+            <p:seq concurrent="1" nextAc="seek">
+              <p:cTn id="2" dur="indefinite" nodeType="mainSeq">
+                <p:childTnLst>
+                  <p:par>
+                    <p:cTn id="3" fill="hold">
+                      <p:stCondLst>
+                        <p:cond delay="indefinite"/>
+                      </p:stCondLst>
+                      <p:childTnLst>
+                        <p:par>
+                          <p:cTn id="4" fill="hold">
+                            <p:stCondLst>
+                              <p:cond delay="0"/>
+                            </p:stCondLst>
+                            <p:childTnLst>
+                              <p:par>
+                                <p:cTn id="5" presetID="10" presetClass="entr" presetSubtype="0" fill="hold" nodeType="clickEffect">
+                                  <p:stCondLst>
+                                    <p:cond delay="0"/>
+                                  </p:stCondLst>
+                                  <p:childTnLst>
+                                    <p:set>
+                                      <p:cBhvr>
+                                        <p:cTn id="6" dur="1" fill="hold">
+                                          <p:stCondLst>
+                                            <p:cond delay="0"/>
+                                          </p:stCondLst>
+                                        </p:cTn>
+                                        <p:tgtEl>
+                                          <p:spTgt spid="7"/>
+                                        </p:tgtEl>
+                                        <p:attrNameLst>
+                                          <p:attrName>style.visibility</p:attrName>
+                                        </p:attrNameLst>
+                                      </p:cBhvr>
+                                      <p:to>
+                                        <p:strVal val="visible"/>
+                                      </p:to>
+                                    </p:set>
+                                    <p:animEffect transition="in" filter="fade">
+                                      <p:cBhvr>
+                                        <p:cTn id="7" dur="1250"/>
+                                        <p:tgtEl>
+                                          <p:spTgt spid="7"/>
+                                        </p:tgtEl>
+                                      </p:cBhvr>
+                                    </p:animEffect>
+                                  </p:childTnLst>
+                                </p:cTn>
+                              </p:par>
+                            </p:childTnLst>
+                          </p:cTn>
+                        </p:par>
+                      </p:childTnLst>
+                    </p:cTn>
+                  </p:par>
+                </p:childTnLst>
+              </p:cTn>
+              <p:prevCondLst>
+                <p:cond evt="onPrev" delay="0">
+                  <p:tgtEl>
+                    <p:sldTgt/>
+                  </p:tgtEl>
+                </p:cond>
+              </p:prevCondLst>
+              <p:nextCondLst>
+                <p:cond evt="onNext" delay="0">
+                  <p:tgtEl>
+                    <p:sldTgt/>
+                  </p:tgtEl>
+                </p:cond>
+              </p:nextCondLst>
+            </p:seq>
+          </p:childTnLst>
+        </p:cTn>
+      </p:par>
+    </p:tnLst>
+  </p:timing>
 </p:sld>
 </file>
 

</xml_diff>